<commit_message>
[update] proposal.pptx; [add] paper for U-Net
</commit_message>
<xml_diff>
--- a/proposal.pptx
+++ b/proposal.pptx
@@ -4,19 +4,27 @@
   <p:sldMasterIdLst>
     <p:sldMasterId id="2147483648" r:id="rId1"/>
   </p:sldMasterIdLst>
+  <p:notesMasterIdLst>
+    <p:notesMasterId r:id="rId19"/>
+  </p:notesMasterIdLst>
   <p:sldIdLst>
     <p:sldId id="267" r:id="rId2"/>
     <p:sldId id="266" r:id="rId3"/>
-    <p:sldId id="295" r:id="rId4"/>
-    <p:sldId id="301" r:id="rId5"/>
-    <p:sldId id="302" r:id="rId6"/>
-    <p:sldId id="303" r:id="rId7"/>
-    <p:sldId id="304" r:id="rId8"/>
-    <p:sldId id="305" r:id="rId9"/>
-    <p:sldId id="306" r:id="rId10"/>
-    <p:sldId id="298" r:id="rId11"/>
-    <p:sldId id="268" r:id="rId12"/>
-    <p:sldId id="300" r:id="rId13"/>
+    <p:sldId id="307" r:id="rId4"/>
+    <p:sldId id="295" r:id="rId5"/>
+    <p:sldId id="301" r:id="rId6"/>
+    <p:sldId id="311" r:id="rId7"/>
+    <p:sldId id="302" r:id="rId8"/>
+    <p:sldId id="303" r:id="rId9"/>
+    <p:sldId id="304" r:id="rId10"/>
+    <p:sldId id="309" r:id="rId11"/>
+    <p:sldId id="310" r:id="rId12"/>
+    <p:sldId id="305" r:id="rId13"/>
+    <p:sldId id="306" r:id="rId14"/>
+    <p:sldId id="308" r:id="rId15"/>
+    <p:sldId id="298" r:id="rId16"/>
+    <p:sldId id="268" r:id="rId17"/>
+    <p:sldId id="300" r:id="rId18"/>
   </p:sldIdLst>
   <p:sldSz cx="12192000" cy="6858000"/>
   <p:notesSz cx="6858000" cy="9144000"/>
@@ -121,6 +129,1261 @@
     </p:ext>
   </p:extLst>
 </p:presentation>
+</file>
+
+<file path=ppt/notesMasters/notesMaster1.xml><?xml version="1.0" encoding="utf-8"?>
+<p:notesMaster xmlns:a="http://schemas.openxmlformats.org/drawingml/2006/main" xmlns:r="http://schemas.openxmlformats.org/officeDocument/2006/relationships" xmlns:p="http://schemas.openxmlformats.org/presentationml/2006/main">
+  <p:cSld>
+    <p:bg>
+      <p:bgRef idx="1001">
+        <a:schemeClr val="bg1"/>
+      </p:bgRef>
+    </p:bg>
+    <p:spTree>
+      <p:nvGrpSpPr>
+        <p:cNvPr id="1" name=""/>
+        <p:cNvGrpSpPr/>
+        <p:nvPr/>
+      </p:nvGrpSpPr>
+      <p:grpSpPr>
+        <a:xfrm>
+          <a:off x="0" y="0"/>
+          <a:ext cx="0" cy="0"/>
+          <a:chOff x="0" y="0"/>
+          <a:chExt cx="0" cy="0"/>
+        </a:xfrm>
+      </p:grpSpPr>
+      <p:sp>
+        <p:nvSpPr>
+          <p:cNvPr id="2" name="页眉占位符 1"/>
+          <p:cNvSpPr>
+            <a:spLocks noGrp="1"/>
+          </p:cNvSpPr>
+          <p:nvPr>
+            <p:ph type="hdr" sz="quarter"/>
+          </p:nvPr>
+        </p:nvSpPr>
+        <p:spPr>
+          <a:xfrm>
+            <a:off x="0" y="0"/>
+            <a:ext cx="2971800" cy="458788"/>
+          </a:xfrm>
+          <a:prstGeom prst="rect">
+            <a:avLst/>
+          </a:prstGeom>
+        </p:spPr>
+        <p:txBody>
+          <a:bodyPr vert="horz" lIns="91440" tIns="45720" rIns="91440" bIns="45720" rtlCol="0"/>
+          <a:lstStyle>
+            <a:lvl1pPr algn="l">
+              <a:defRPr sz="1200"/>
+            </a:lvl1pPr>
+          </a:lstStyle>
+          <a:p>
+            <a:endParaRPr lang="zh-CN" altLang="en-US"/>
+          </a:p>
+        </p:txBody>
+      </p:sp>
+      <p:sp>
+        <p:nvSpPr>
+          <p:cNvPr id="3" name="日期占位符 2"/>
+          <p:cNvSpPr>
+            <a:spLocks noGrp="1"/>
+          </p:cNvSpPr>
+          <p:nvPr>
+            <p:ph type="dt" idx="1"/>
+          </p:nvPr>
+        </p:nvSpPr>
+        <p:spPr>
+          <a:xfrm>
+            <a:off x="3884613" y="0"/>
+            <a:ext cx="2971800" cy="458788"/>
+          </a:xfrm>
+          <a:prstGeom prst="rect">
+            <a:avLst/>
+          </a:prstGeom>
+        </p:spPr>
+        <p:txBody>
+          <a:bodyPr vert="horz" lIns="91440" tIns="45720" rIns="91440" bIns="45720" rtlCol="0"/>
+          <a:lstStyle>
+            <a:lvl1pPr algn="r">
+              <a:defRPr sz="1200"/>
+            </a:lvl1pPr>
+          </a:lstStyle>
+          <a:p>
+            <a:fld id="{66A6A335-5269-4B85-95DB-91C53040B856}" type="datetimeFigureOut">
+              <a:rPr lang="zh-CN" altLang="en-US" smtClean="0"/>
+              <a:t>2023/12/8</a:t>
+            </a:fld>
+            <a:endParaRPr lang="zh-CN" altLang="en-US"/>
+          </a:p>
+        </p:txBody>
+      </p:sp>
+      <p:sp>
+        <p:nvSpPr>
+          <p:cNvPr id="4" name="幻灯片图像占位符 3"/>
+          <p:cNvSpPr>
+            <a:spLocks noGrp="1" noRot="1" noChangeAspect="1"/>
+          </p:cNvSpPr>
+          <p:nvPr>
+            <p:ph type="sldImg" idx="2"/>
+          </p:nvPr>
+        </p:nvSpPr>
+        <p:spPr>
+          <a:xfrm>
+            <a:off x="685800" y="1143000"/>
+            <a:ext cx="5486400" cy="3086100"/>
+          </a:xfrm>
+          <a:prstGeom prst="rect">
+            <a:avLst/>
+          </a:prstGeom>
+          <a:noFill/>
+          <a:ln w="12700">
+            <a:solidFill>
+              <a:prstClr val="black"/>
+            </a:solidFill>
+          </a:ln>
+        </p:spPr>
+        <p:txBody>
+          <a:bodyPr vert="horz" lIns="91440" tIns="45720" rIns="91440" bIns="45720" rtlCol="0" anchor="ctr"/>
+          <a:lstStyle/>
+          <a:p>
+            <a:endParaRPr lang="zh-CN" altLang="en-US"/>
+          </a:p>
+        </p:txBody>
+      </p:sp>
+      <p:sp>
+        <p:nvSpPr>
+          <p:cNvPr id="5" name="备注占位符 4"/>
+          <p:cNvSpPr>
+            <a:spLocks noGrp="1"/>
+          </p:cNvSpPr>
+          <p:nvPr>
+            <p:ph type="body" sz="quarter" idx="3"/>
+          </p:nvPr>
+        </p:nvSpPr>
+        <p:spPr>
+          <a:xfrm>
+            <a:off x="685800" y="4400550"/>
+            <a:ext cx="5486400" cy="3600450"/>
+          </a:xfrm>
+          <a:prstGeom prst="rect">
+            <a:avLst/>
+          </a:prstGeom>
+        </p:spPr>
+        <p:txBody>
+          <a:bodyPr vert="horz" lIns="91440" tIns="45720" rIns="91440" bIns="45720" rtlCol="0"/>
+          <a:lstStyle/>
+          <a:p>
+            <a:pPr lvl="0"/>
+            <a:r>
+              <a:rPr lang="zh-CN" altLang="en-US"/>
+              <a:t>单击此处编辑母版文本样式</a:t>
+            </a:r>
+          </a:p>
+          <a:p>
+            <a:pPr lvl="1"/>
+            <a:r>
+              <a:rPr lang="zh-CN" altLang="en-US"/>
+              <a:t>二级</a:t>
+            </a:r>
+          </a:p>
+          <a:p>
+            <a:pPr lvl="2"/>
+            <a:r>
+              <a:rPr lang="zh-CN" altLang="en-US"/>
+              <a:t>三级</a:t>
+            </a:r>
+          </a:p>
+          <a:p>
+            <a:pPr lvl="3"/>
+            <a:r>
+              <a:rPr lang="zh-CN" altLang="en-US"/>
+              <a:t>四级</a:t>
+            </a:r>
+          </a:p>
+          <a:p>
+            <a:pPr lvl="4"/>
+            <a:r>
+              <a:rPr lang="zh-CN" altLang="en-US"/>
+              <a:t>五级</a:t>
+            </a:r>
+          </a:p>
+        </p:txBody>
+      </p:sp>
+      <p:sp>
+        <p:nvSpPr>
+          <p:cNvPr id="6" name="页脚占位符 5"/>
+          <p:cNvSpPr>
+            <a:spLocks noGrp="1"/>
+          </p:cNvSpPr>
+          <p:nvPr>
+            <p:ph type="ftr" sz="quarter" idx="4"/>
+          </p:nvPr>
+        </p:nvSpPr>
+        <p:spPr>
+          <a:xfrm>
+            <a:off x="0" y="8685213"/>
+            <a:ext cx="2971800" cy="458787"/>
+          </a:xfrm>
+          <a:prstGeom prst="rect">
+            <a:avLst/>
+          </a:prstGeom>
+        </p:spPr>
+        <p:txBody>
+          <a:bodyPr vert="horz" lIns="91440" tIns="45720" rIns="91440" bIns="45720" rtlCol="0" anchor="b"/>
+          <a:lstStyle>
+            <a:lvl1pPr algn="l">
+              <a:defRPr sz="1200"/>
+            </a:lvl1pPr>
+          </a:lstStyle>
+          <a:p>
+            <a:endParaRPr lang="zh-CN" altLang="en-US"/>
+          </a:p>
+        </p:txBody>
+      </p:sp>
+      <p:sp>
+        <p:nvSpPr>
+          <p:cNvPr id="7" name="灯片编号占位符 6"/>
+          <p:cNvSpPr>
+            <a:spLocks noGrp="1"/>
+          </p:cNvSpPr>
+          <p:nvPr>
+            <p:ph type="sldNum" sz="quarter" idx="5"/>
+          </p:nvPr>
+        </p:nvSpPr>
+        <p:spPr>
+          <a:xfrm>
+            <a:off x="3884613" y="8685213"/>
+            <a:ext cx="2971800" cy="458787"/>
+          </a:xfrm>
+          <a:prstGeom prst="rect">
+            <a:avLst/>
+          </a:prstGeom>
+        </p:spPr>
+        <p:txBody>
+          <a:bodyPr vert="horz" lIns="91440" tIns="45720" rIns="91440" bIns="45720" rtlCol="0" anchor="b"/>
+          <a:lstStyle>
+            <a:lvl1pPr algn="r">
+              <a:defRPr sz="1200"/>
+            </a:lvl1pPr>
+          </a:lstStyle>
+          <a:p>
+            <a:fld id="{54290F55-E33F-4F55-B56D-790968137D6B}" type="slidenum">
+              <a:rPr lang="zh-CN" altLang="en-US" smtClean="0"/>
+              <a:t>‹#›</a:t>
+            </a:fld>
+            <a:endParaRPr lang="zh-CN" altLang="en-US"/>
+          </a:p>
+        </p:txBody>
+      </p:sp>
+    </p:spTree>
+    <p:extLst>
+      <p:ext uri="{BB962C8B-B14F-4D97-AF65-F5344CB8AC3E}">
+        <p14:creationId xmlns:p14="http://schemas.microsoft.com/office/powerpoint/2010/main" val="2486485410"/>
+      </p:ext>
+    </p:extLst>
+  </p:cSld>
+  <p:clrMap bg1="lt1" tx1="dk1" bg2="lt2" tx2="dk2" accent1="accent1" accent2="accent2" accent3="accent3" accent4="accent4" accent5="accent5" accent6="accent6" hlink="hlink" folHlink="folHlink"/>
+  <p:notesStyle>
+    <a:lvl1pPr marL="0" algn="l" defTabSz="914400" rtl="0" eaLnBrk="1" latinLnBrk="0" hangingPunct="1">
+      <a:defRPr sz="1200" kern="1200">
+        <a:solidFill>
+          <a:schemeClr val="tx1"/>
+        </a:solidFill>
+        <a:latin typeface="+mn-lt"/>
+        <a:ea typeface="+mn-ea"/>
+        <a:cs typeface="+mn-cs"/>
+      </a:defRPr>
+    </a:lvl1pPr>
+    <a:lvl2pPr marL="457200" algn="l" defTabSz="914400" rtl="0" eaLnBrk="1" latinLnBrk="0" hangingPunct="1">
+      <a:defRPr sz="1200" kern="1200">
+        <a:solidFill>
+          <a:schemeClr val="tx1"/>
+        </a:solidFill>
+        <a:latin typeface="+mn-lt"/>
+        <a:ea typeface="+mn-ea"/>
+        <a:cs typeface="+mn-cs"/>
+      </a:defRPr>
+    </a:lvl2pPr>
+    <a:lvl3pPr marL="914400" algn="l" defTabSz="914400" rtl="0" eaLnBrk="1" latinLnBrk="0" hangingPunct="1">
+      <a:defRPr sz="1200" kern="1200">
+        <a:solidFill>
+          <a:schemeClr val="tx1"/>
+        </a:solidFill>
+        <a:latin typeface="+mn-lt"/>
+        <a:ea typeface="+mn-ea"/>
+        <a:cs typeface="+mn-cs"/>
+      </a:defRPr>
+    </a:lvl3pPr>
+    <a:lvl4pPr marL="1371600" algn="l" defTabSz="914400" rtl="0" eaLnBrk="1" latinLnBrk="0" hangingPunct="1">
+      <a:defRPr sz="1200" kern="1200">
+        <a:solidFill>
+          <a:schemeClr val="tx1"/>
+        </a:solidFill>
+        <a:latin typeface="+mn-lt"/>
+        <a:ea typeface="+mn-ea"/>
+        <a:cs typeface="+mn-cs"/>
+      </a:defRPr>
+    </a:lvl4pPr>
+    <a:lvl5pPr marL="1828800" algn="l" defTabSz="914400" rtl="0" eaLnBrk="1" latinLnBrk="0" hangingPunct="1">
+      <a:defRPr sz="1200" kern="1200">
+        <a:solidFill>
+          <a:schemeClr val="tx1"/>
+        </a:solidFill>
+        <a:latin typeface="+mn-lt"/>
+        <a:ea typeface="+mn-ea"/>
+        <a:cs typeface="+mn-cs"/>
+      </a:defRPr>
+    </a:lvl5pPr>
+    <a:lvl6pPr marL="2286000" algn="l" defTabSz="914400" rtl="0" eaLnBrk="1" latinLnBrk="0" hangingPunct="1">
+      <a:defRPr sz="1200" kern="1200">
+        <a:solidFill>
+          <a:schemeClr val="tx1"/>
+        </a:solidFill>
+        <a:latin typeface="+mn-lt"/>
+        <a:ea typeface="+mn-ea"/>
+        <a:cs typeface="+mn-cs"/>
+      </a:defRPr>
+    </a:lvl6pPr>
+    <a:lvl7pPr marL="2743200" algn="l" defTabSz="914400" rtl="0" eaLnBrk="1" latinLnBrk="0" hangingPunct="1">
+      <a:defRPr sz="1200" kern="1200">
+        <a:solidFill>
+          <a:schemeClr val="tx1"/>
+        </a:solidFill>
+        <a:latin typeface="+mn-lt"/>
+        <a:ea typeface="+mn-ea"/>
+        <a:cs typeface="+mn-cs"/>
+      </a:defRPr>
+    </a:lvl7pPr>
+    <a:lvl8pPr marL="3200400" algn="l" defTabSz="914400" rtl="0" eaLnBrk="1" latinLnBrk="0" hangingPunct="1">
+      <a:defRPr sz="1200" kern="1200">
+        <a:solidFill>
+          <a:schemeClr val="tx1"/>
+        </a:solidFill>
+        <a:latin typeface="+mn-lt"/>
+        <a:ea typeface="+mn-ea"/>
+        <a:cs typeface="+mn-cs"/>
+      </a:defRPr>
+    </a:lvl8pPr>
+    <a:lvl9pPr marL="3657600" algn="l" defTabSz="914400" rtl="0" eaLnBrk="1" latinLnBrk="0" hangingPunct="1">
+      <a:defRPr sz="1200" kern="1200">
+        <a:solidFill>
+          <a:schemeClr val="tx1"/>
+        </a:solidFill>
+        <a:latin typeface="+mn-lt"/>
+        <a:ea typeface="+mn-ea"/>
+        <a:cs typeface="+mn-cs"/>
+      </a:defRPr>
+    </a:lvl9pPr>
+  </p:notesStyle>
+</p:notesMaster>
+</file>
+
+<file path=ppt/notesSlides/notesSlide1.xml><?xml version="1.0" encoding="utf-8"?>
+<p:notes xmlns:a="http://schemas.openxmlformats.org/drawingml/2006/main" xmlns:r="http://schemas.openxmlformats.org/officeDocument/2006/relationships" xmlns:p="http://schemas.openxmlformats.org/presentationml/2006/main">
+  <p:cSld>
+    <p:spTree>
+      <p:nvGrpSpPr>
+        <p:cNvPr id="1" name=""/>
+        <p:cNvGrpSpPr/>
+        <p:nvPr/>
+      </p:nvGrpSpPr>
+      <p:grpSpPr>
+        <a:xfrm>
+          <a:off x="0" y="0"/>
+          <a:ext cx="0" cy="0"/>
+          <a:chOff x="0" y="0"/>
+          <a:chExt cx="0" cy="0"/>
+        </a:xfrm>
+      </p:grpSpPr>
+      <p:sp>
+        <p:nvSpPr>
+          <p:cNvPr id="2" name="幻灯片图像占位符 1"/>
+          <p:cNvSpPr>
+            <a:spLocks noGrp="1" noRot="1" noChangeAspect="1"/>
+          </p:cNvSpPr>
+          <p:nvPr>
+            <p:ph type="sldImg"/>
+          </p:nvPr>
+        </p:nvSpPr>
+        <p:spPr/>
+      </p:sp>
+      <p:sp>
+        <p:nvSpPr>
+          <p:cNvPr id="3" name="备注占位符 2"/>
+          <p:cNvSpPr>
+            <a:spLocks noGrp="1"/>
+          </p:cNvSpPr>
+          <p:nvPr>
+            <p:ph type="body" idx="1"/>
+          </p:nvPr>
+        </p:nvSpPr>
+        <p:spPr/>
+        <p:txBody>
+          <a:bodyPr/>
+          <a:lstStyle/>
+          <a:p>
+            <a:r>
+              <a:rPr lang="zh-CN" altLang="en-US" dirty="0"/>
+              <a:t>自动驾驶，也被称为自动驾驶或无人驾驶技术，代表了汽车行业的革命性进步。它涉及无需人工干预即可导航和操作的车辆。自动驾驶汽车利用传感器、摄像头、雷达和人工智能的组合来感知周围环境并做出实时决策，使它们能够独立在道路上行驶。自动驾驶汽车的发展基于关键要素，包括环境感知、数据处理、路径规划和控制系统。这些因素共同确保了安全舒适的自动驾驶体验。环境感知是自动驾驶的关键功能，它关注的是车辆解读和理解周围环境的能力。</a:t>
+            </a:r>
+            <a:endParaRPr lang="en-US" altLang="zh-CN" dirty="0"/>
+          </a:p>
+          <a:p>
+            <a:endParaRPr lang="en-US" altLang="zh-CN" dirty="0"/>
+          </a:p>
+          <a:p>
+            <a:r>
+              <a:rPr lang="zh-CN" altLang="en-US" dirty="0"/>
+              <a:t>然而，环境状态的不确定性给自动驾驶系统带来了挑战。不可预测的路况和动态场景等因素需要先进的感知技术来适应并做出准确的决策。为了应对这些挑战，我们将语义分割应用于环境感知。语义分割是一种感知方法，它将图像中的像素划分为不同的语义类，如道路、行人、车辆和障碍物，使车辆能够理解其环境。自动驾驶中语义分割的主要目的是提供对周围环境的详细了解，帮助自动驾驶车辆做出决策。</a:t>
+            </a:r>
+            <a:endParaRPr lang="en-US" altLang="zh-CN" dirty="0"/>
+          </a:p>
+        </p:txBody>
+      </p:sp>
+      <p:sp>
+        <p:nvSpPr>
+          <p:cNvPr id="4" name="灯片编号占位符 3"/>
+          <p:cNvSpPr>
+            <a:spLocks noGrp="1"/>
+          </p:cNvSpPr>
+          <p:nvPr>
+            <p:ph type="sldNum" sz="quarter" idx="5"/>
+          </p:nvPr>
+        </p:nvSpPr>
+        <p:spPr/>
+        <p:txBody>
+          <a:bodyPr/>
+          <a:lstStyle/>
+          <a:p>
+            <a:fld id="{54290F55-E33F-4F55-B56D-790968137D6B}" type="slidenum">
+              <a:rPr lang="zh-CN" altLang="en-US" smtClean="0"/>
+              <a:t>3</a:t>
+            </a:fld>
+            <a:endParaRPr lang="zh-CN" altLang="en-US"/>
+          </a:p>
+        </p:txBody>
+      </p:sp>
+    </p:spTree>
+    <p:extLst>
+      <p:ext uri="{BB962C8B-B14F-4D97-AF65-F5344CB8AC3E}">
+        <p14:creationId xmlns:p14="http://schemas.microsoft.com/office/powerpoint/2010/main" val="2110359930"/>
+      </p:ext>
+    </p:extLst>
+  </p:cSld>
+  <p:clrMapOvr>
+    <a:masterClrMapping/>
+  </p:clrMapOvr>
+</p:notes>
+</file>
+
+<file path=ppt/notesSlides/notesSlide2.xml><?xml version="1.0" encoding="utf-8"?>
+<p:notes xmlns:a="http://schemas.openxmlformats.org/drawingml/2006/main" xmlns:r="http://schemas.openxmlformats.org/officeDocument/2006/relationships" xmlns:p="http://schemas.openxmlformats.org/presentationml/2006/main">
+  <p:cSld>
+    <p:spTree>
+      <p:nvGrpSpPr>
+        <p:cNvPr id="1" name=""/>
+        <p:cNvGrpSpPr/>
+        <p:nvPr/>
+      </p:nvGrpSpPr>
+      <p:grpSpPr>
+        <a:xfrm>
+          <a:off x="0" y="0"/>
+          <a:ext cx="0" cy="0"/>
+          <a:chOff x="0" y="0"/>
+          <a:chExt cx="0" cy="0"/>
+        </a:xfrm>
+      </p:grpSpPr>
+      <p:sp>
+        <p:nvSpPr>
+          <p:cNvPr id="2" name="幻灯片图像占位符 1"/>
+          <p:cNvSpPr>
+            <a:spLocks noGrp="1" noRot="1" noChangeAspect="1"/>
+          </p:cNvSpPr>
+          <p:nvPr>
+            <p:ph type="sldImg"/>
+          </p:nvPr>
+        </p:nvSpPr>
+        <p:spPr/>
+      </p:sp>
+      <p:sp>
+        <p:nvSpPr>
+          <p:cNvPr id="3" name="备注占位符 2"/>
+          <p:cNvSpPr>
+            <a:spLocks noGrp="1"/>
+          </p:cNvSpPr>
+          <p:nvPr>
+            <p:ph type="body" idx="1"/>
+          </p:nvPr>
+        </p:nvSpPr>
+        <p:spPr/>
+        <p:txBody>
+          <a:bodyPr/>
+          <a:lstStyle/>
+          <a:p>
+            <a:r>
+              <a:rPr lang="zh-CN" altLang="en-US" b="0" i="0" dirty="0">
+                <a:solidFill>
+                  <a:srgbClr val="D1D5DB"/>
+                </a:solidFill>
+                <a:effectLst/>
+                <a:latin typeface="Söhne"/>
+              </a:rPr>
+              <a:t>语义分割是计算机视觉领域的一个重要分支，它旨在将数字图像分割成若干个语义区域。在语义分割任务中，每个像素都被分配一个类别标签，使得具有相同类别的像素被归为同一区域。这些类别通常是有意义的物体或场景的一部分，如人、车辆、建筑物、树木等。语义分割有助于计算机深入理解图像内容，识别图像中不同的对象及布局。</a:t>
+            </a:r>
+            <a:endParaRPr lang="en-US" altLang="zh-CN" b="0" i="0" dirty="0">
+              <a:solidFill>
+                <a:srgbClr val="D1D5DB"/>
+              </a:solidFill>
+              <a:effectLst/>
+              <a:latin typeface="Söhne"/>
+            </a:endParaRPr>
+          </a:p>
+          <a:p>
+            <a:endParaRPr lang="en-US" altLang="zh-CN" b="0" i="0" dirty="0">
+              <a:solidFill>
+                <a:srgbClr val="D1D5DB"/>
+              </a:solidFill>
+              <a:effectLst/>
+              <a:latin typeface="Söhne"/>
+            </a:endParaRPr>
+          </a:p>
+          <a:p>
+            <a:r>
+              <a:rPr lang="zh-CN" altLang="en-US" b="0" i="0" dirty="0">
+                <a:solidFill>
+                  <a:srgbClr val="D1D5DB"/>
+                </a:solidFill>
+                <a:effectLst/>
+                <a:latin typeface="Söhne"/>
+              </a:rPr>
+              <a:t>它的应用非常广泛，包括上文提到的自动驾驶领域以及 医疗影像中对于病变区域的识别、机器人视觉任务中机器人对于周围环境的理解 和 通过监控视频对人群进行识别和分析。</a:t>
+            </a:r>
+            <a:endParaRPr lang="en-US" altLang="zh-CN" b="0" i="0" dirty="0">
+              <a:solidFill>
+                <a:srgbClr val="D1D5DB"/>
+              </a:solidFill>
+              <a:effectLst/>
+              <a:latin typeface="Söhne"/>
+            </a:endParaRPr>
+          </a:p>
+          <a:p>
+            <a:endParaRPr lang="en-US" altLang="zh-CN" b="0" i="0" dirty="0">
+              <a:solidFill>
+                <a:srgbClr val="D1D5DB"/>
+              </a:solidFill>
+              <a:effectLst/>
+              <a:latin typeface="Söhne"/>
+            </a:endParaRPr>
+          </a:p>
+          <a:p>
+            <a:r>
+              <a:rPr lang="zh-CN" altLang="en-US" b="0" i="0" dirty="0">
+                <a:solidFill>
+                  <a:srgbClr val="D1D5DB"/>
+                </a:solidFill>
+                <a:effectLst/>
+                <a:latin typeface="Söhne"/>
+              </a:rPr>
+              <a:t>近年来，随着深度学习技术的发展，特别是卷积神经网络（</a:t>
+            </a:r>
+            <a:r>
+              <a:rPr lang="en-US" altLang="zh-CN" b="0" i="0" dirty="0">
+                <a:solidFill>
+                  <a:srgbClr val="D1D5DB"/>
+                </a:solidFill>
+                <a:effectLst/>
+                <a:latin typeface="Söhne"/>
+              </a:rPr>
+              <a:t>CNN</a:t>
+            </a:r>
+            <a:r>
+              <a:rPr lang="zh-CN" altLang="en-US" b="0" i="0" dirty="0">
+                <a:solidFill>
+                  <a:srgbClr val="D1D5DB"/>
+                </a:solidFill>
+                <a:effectLst/>
+                <a:latin typeface="Söhne"/>
+              </a:rPr>
+              <a:t>）的广泛应用，语义分割的性能得到了显著提升。常见的深度学习模型包括 </a:t>
+            </a:r>
+            <a:r>
+              <a:rPr lang="en-US" altLang="zh-CN" b="0" i="0" dirty="0">
+                <a:solidFill>
+                  <a:srgbClr val="D1D5DB"/>
+                </a:solidFill>
+                <a:effectLst/>
+                <a:latin typeface="Söhne"/>
+              </a:rPr>
+              <a:t>U-Net</a:t>
+            </a:r>
+            <a:r>
+              <a:rPr lang="zh-CN" altLang="en-US" b="0" i="0" dirty="0">
+                <a:solidFill>
+                  <a:srgbClr val="D1D5DB"/>
+                </a:solidFill>
+                <a:effectLst/>
+                <a:latin typeface="Söhne"/>
+              </a:rPr>
+              <a:t>、全卷积网络 </a:t>
+            </a:r>
+            <a:r>
+              <a:rPr lang="en-US" altLang="zh-CN" b="0" i="0" dirty="0">
+                <a:solidFill>
+                  <a:srgbClr val="D1D5DB"/>
+                </a:solidFill>
+                <a:effectLst/>
+                <a:latin typeface="Söhne"/>
+              </a:rPr>
+              <a:t>- FCN</a:t>
+            </a:r>
+            <a:r>
+              <a:rPr lang="zh-CN" altLang="en-US" b="0" i="0" dirty="0">
+                <a:solidFill>
+                  <a:srgbClr val="D1D5DB"/>
+                </a:solidFill>
+                <a:effectLst/>
+                <a:latin typeface="Söhne"/>
+              </a:rPr>
+              <a:t>和 </a:t>
+            </a:r>
+            <a:r>
+              <a:rPr lang="en-US" altLang="zh-CN" b="0" i="0" dirty="0" err="1">
+                <a:solidFill>
+                  <a:srgbClr val="D1D5DB"/>
+                </a:solidFill>
+                <a:effectLst/>
+                <a:latin typeface="Söhne"/>
+              </a:rPr>
+              <a:t>SegNet</a:t>
+            </a:r>
+            <a:r>
+              <a:rPr lang="en-US" altLang="zh-CN" b="0" i="0" dirty="0">
+                <a:solidFill>
+                  <a:srgbClr val="D1D5DB"/>
+                </a:solidFill>
+                <a:effectLst/>
+                <a:latin typeface="Söhne"/>
+              </a:rPr>
+              <a:t> </a:t>
+            </a:r>
+            <a:r>
+              <a:rPr lang="zh-CN" altLang="en-US" b="0" i="0" dirty="0">
+                <a:solidFill>
+                  <a:srgbClr val="D1D5DB"/>
+                </a:solidFill>
+                <a:effectLst/>
+                <a:latin typeface="Söhne"/>
+              </a:rPr>
+              <a:t>等。</a:t>
+            </a:r>
+            <a:endParaRPr lang="en-US" altLang="zh-CN" b="0" i="0" dirty="0">
+              <a:solidFill>
+                <a:srgbClr val="D1D5DB"/>
+              </a:solidFill>
+              <a:effectLst/>
+              <a:latin typeface="Söhne"/>
+            </a:endParaRPr>
+          </a:p>
+          <a:p>
+            <a:endParaRPr lang="en-US" altLang="zh-CN" b="0" i="0" dirty="0">
+              <a:solidFill>
+                <a:srgbClr val="D1D5DB"/>
+              </a:solidFill>
+              <a:effectLst/>
+              <a:latin typeface="Söhne"/>
+            </a:endParaRPr>
+          </a:p>
+          <a:p>
+            <a:r>
+              <a:rPr lang="zh-CN" altLang="en-US" b="0" i="0" dirty="0">
+                <a:solidFill>
+                  <a:srgbClr val="D1D5DB"/>
+                </a:solidFill>
+                <a:effectLst/>
+                <a:latin typeface="Söhne"/>
+              </a:rPr>
+              <a:t>但语义分割仍面临非常多的挑战，包括类别不平衡（某些类别的样本比其他类别多得多）、小对象识别难度大、以及在复杂背景中的难以精确分割等问题。</a:t>
+            </a:r>
+            <a:endParaRPr lang="en-US" altLang="zh-CN" b="0" i="0" dirty="0">
+              <a:solidFill>
+                <a:srgbClr val="D1D5DB"/>
+              </a:solidFill>
+              <a:effectLst/>
+              <a:latin typeface="Söhne"/>
+            </a:endParaRPr>
+          </a:p>
+        </p:txBody>
+      </p:sp>
+      <p:sp>
+        <p:nvSpPr>
+          <p:cNvPr id="4" name="灯片编号占位符 3"/>
+          <p:cNvSpPr>
+            <a:spLocks noGrp="1"/>
+          </p:cNvSpPr>
+          <p:nvPr>
+            <p:ph type="sldNum" sz="quarter" idx="5"/>
+          </p:nvPr>
+        </p:nvSpPr>
+        <p:spPr/>
+        <p:txBody>
+          <a:bodyPr/>
+          <a:lstStyle/>
+          <a:p>
+            <a:fld id="{54290F55-E33F-4F55-B56D-790968137D6B}" type="slidenum">
+              <a:rPr lang="zh-CN" altLang="en-US" smtClean="0"/>
+              <a:t>4</a:t>
+            </a:fld>
+            <a:endParaRPr lang="zh-CN" altLang="en-US"/>
+          </a:p>
+        </p:txBody>
+      </p:sp>
+    </p:spTree>
+    <p:extLst>
+      <p:ext uri="{BB962C8B-B14F-4D97-AF65-F5344CB8AC3E}">
+        <p14:creationId xmlns:p14="http://schemas.microsoft.com/office/powerpoint/2010/main" val="706377538"/>
+      </p:ext>
+    </p:extLst>
+  </p:cSld>
+  <p:clrMapOvr>
+    <a:masterClrMapping/>
+  </p:clrMapOvr>
+</p:notes>
+</file>
+
+<file path=ppt/notesSlides/notesSlide3.xml><?xml version="1.0" encoding="utf-8"?>
+<p:notes xmlns:a="http://schemas.openxmlformats.org/drawingml/2006/main" xmlns:r="http://schemas.openxmlformats.org/officeDocument/2006/relationships" xmlns:p="http://schemas.openxmlformats.org/presentationml/2006/main">
+  <p:cSld>
+    <p:spTree>
+      <p:nvGrpSpPr>
+        <p:cNvPr id="1" name=""/>
+        <p:cNvGrpSpPr/>
+        <p:nvPr/>
+      </p:nvGrpSpPr>
+      <p:grpSpPr>
+        <a:xfrm>
+          <a:off x="0" y="0"/>
+          <a:ext cx="0" cy="0"/>
+          <a:chOff x="0" y="0"/>
+          <a:chExt cx="0" cy="0"/>
+        </a:xfrm>
+      </p:grpSpPr>
+      <p:sp>
+        <p:nvSpPr>
+          <p:cNvPr id="2" name="幻灯片图像占位符 1"/>
+          <p:cNvSpPr>
+            <a:spLocks noGrp="1" noRot="1" noChangeAspect="1"/>
+          </p:cNvSpPr>
+          <p:nvPr>
+            <p:ph type="sldImg"/>
+          </p:nvPr>
+        </p:nvSpPr>
+        <p:spPr/>
+      </p:sp>
+      <p:sp>
+        <p:nvSpPr>
+          <p:cNvPr id="3" name="备注占位符 2"/>
+          <p:cNvSpPr>
+            <a:spLocks noGrp="1"/>
+          </p:cNvSpPr>
+          <p:nvPr>
+            <p:ph type="body" idx="1"/>
+          </p:nvPr>
+        </p:nvSpPr>
+        <p:spPr/>
+        <p:txBody>
+          <a:bodyPr/>
+          <a:lstStyle/>
+          <a:p>
+            <a:pPr marL="0" marR="0" lvl="0" indent="0" algn="l" defTabSz="914400" rtl="0" eaLnBrk="1" fontAlgn="auto" latinLnBrk="0" hangingPunct="1">
+              <a:lnSpc>
+                <a:spcPct val="100000"/>
+              </a:lnSpc>
+              <a:spcBef>
+                <a:spcPts val="0"/>
+              </a:spcBef>
+              <a:spcAft>
+                <a:spcPts val="0"/>
+              </a:spcAft>
+              <a:buClrTx/>
+              <a:buSzTx/>
+              <a:buFontTx/>
+              <a:buNone/>
+              <a:tabLst/>
+              <a:defRPr/>
+            </a:pPr>
+            <a:r>
+              <a:rPr lang="en-US" altLang="zh-CN" b="0" i="0" dirty="0">
+                <a:solidFill>
+                  <a:srgbClr val="191B1F"/>
+                </a:solidFill>
+                <a:effectLst/>
+                <a:latin typeface="-apple-system"/>
+              </a:rPr>
+              <a:t>U-Net</a:t>
+            </a:r>
+            <a:r>
+              <a:rPr lang="zh-CN" altLang="en-US" b="0" i="0" dirty="0">
+                <a:solidFill>
+                  <a:srgbClr val="191B1F"/>
+                </a:solidFill>
+                <a:effectLst/>
+                <a:latin typeface="-apple-system"/>
+              </a:rPr>
+              <a:t>是比较早的使用全卷积网络进行语义分割的算法之一，论文中使用包含压缩路径和扩展路径的对称</a:t>
+            </a:r>
+            <a:r>
+              <a:rPr lang="en-US" altLang="zh-CN" b="0" i="0" dirty="0">
+                <a:solidFill>
+                  <a:srgbClr val="191B1F"/>
+                </a:solidFill>
+                <a:effectLst/>
+                <a:latin typeface="-apple-system"/>
+              </a:rPr>
+              <a:t>U</a:t>
+            </a:r>
+            <a:r>
+              <a:rPr lang="zh-CN" altLang="en-US" b="0" i="0" dirty="0">
+                <a:solidFill>
+                  <a:srgbClr val="191B1F"/>
+                </a:solidFill>
+                <a:effectLst/>
+                <a:latin typeface="-apple-system"/>
+              </a:rPr>
+              <a:t>形结构在当时非常具有创新性，且一定程度上影响了后面若干个分割网络的设计，该网络的名字也是取自其</a:t>
+            </a:r>
+            <a:r>
+              <a:rPr lang="en-US" altLang="zh-CN" b="0" i="0" dirty="0">
+                <a:solidFill>
+                  <a:srgbClr val="191B1F"/>
+                </a:solidFill>
+                <a:effectLst/>
+                <a:latin typeface="-apple-system"/>
+              </a:rPr>
+              <a:t>U</a:t>
+            </a:r>
+            <a:r>
+              <a:rPr lang="zh-CN" altLang="en-US" b="0" i="0" dirty="0">
+                <a:solidFill>
+                  <a:srgbClr val="191B1F"/>
+                </a:solidFill>
+                <a:effectLst/>
+                <a:latin typeface="-apple-system"/>
+              </a:rPr>
+              <a:t>形形状。</a:t>
+            </a:r>
+            <a:endParaRPr lang="en-US" altLang="zh-CN" b="0" i="0" dirty="0">
+              <a:solidFill>
+                <a:srgbClr val="191B1F"/>
+              </a:solidFill>
+              <a:effectLst/>
+              <a:latin typeface="-apple-system"/>
+            </a:endParaRPr>
+          </a:p>
+          <a:p>
+            <a:pPr marL="0" marR="0" lvl="0" indent="0" algn="l" defTabSz="914400" rtl="0" eaLnBrk="1" fontAlgn="auto" latinLnBrk="0" hangingPunct="1">
+              <a:lnSpc>
+                <a:spcPct val="100000"/>
+              </a:lnSpc>
+              <a:spcBef>
+                <a:spcPts val="0"/>
+              </a:spcBef>
+              <a:spcAft>
+                <a:spcPts val="0"/>
+              </a:spcAft>
+              <a:buClrTx/>
+              <a:buSzTx/>
+              <a:buFontTx/>
+              <a:buNone/>
+              <a:tabLst/>
+              <a:defRPr/>
+            </a:pPr>
+            <a:r>
+              <a:rPr lang="en-US" altLang="zh-CN" b="0" i="0" dirty="0">
+                <a:solidFill>
+                  <a:srgbClr val="191B1F"/>
+                </a:solidFill>
+                <a:effectLst/>
+                <a:latin typeface="-apple-system"/>
+              </a:rPr>
+              <a:t>U-Net</a:t>
+            </a:r>
+            <a:r>
+              <a:rPr lang="zh-CN" altLang="en-US" b="0" i="0" dirty="0">
+                <a:solidFill>
+                  <a:srgbClr val="191B1F"/>
+                </a:solidFill>
+                <a:effectLst/>
+                <a:latin typeface="-apple-system"/>
+              </a:rPr>
+              <a:t>的实验是一个比较简单的</a:t>
+            </a:r>
+            <a:r>
+              <a:rPr lang="en-US" altLang="zh-CN" b="0" i="0" dirty="0">
+                <a:solidFill>
+                  <a:srgbClr val="191B1F"/>
+                </a:solidFill>
+                <a:effectLst/>
+                <a:latin typeface="-apple-system"/>
+              </a:rPr>
+              <a:t>ISBI cell tracking</a:t>
+            </a:r>
+            <a:r>
+              <a:rPr lang="zh-CN" altLang="en-US" b="0" i="0" dirty="0">
+                <a:solidFill>
+                  <a:srgbClr val="191B1F"/>
+                </a:solidFill>
+                <a:effectLst/>
+                <a:latin typeface="-apple-system"/>
+              </a:rPr>
+              <a:t>数据集，由于本身的任务比较简单，</a:t>
+            </a:r>
+            <a:r>
+              <a:rPr lang="en-US" altLang="zh-CN" b="0" i="0" dirty="0">
+                <a:solidFill>
+                  <a:srgbClr val="191B1F"/>
+                </a:solidFill>
+                <a:effectLst/>
+                <a:latin typeface="-apple-system"/>
+              </a:rPr>
+              <a:t>U-Net</a:t>
+            </a:r>
+            <a:r>
+              <a:rPr lang="zh-CN" altLang="en-US" b="0" i="0" dirty="0">
+                <a:solidFill>
+                  <a:srgbClr val="191B1F"/>
+                </a:solidFill>
+                <a:effectLst/>
+                <a:latin typeface="-apple-system"/>
+              </a:rPr>
+              <a:t>紧紧通过</a:t>
+            </a:r>
+            <a:r>
+              <a:rPr lang="en-US" altLang="zh-CN" b="0" i="0" dirty="0">
+                <a:solidFill>
+                  <a:srgbClr val="191B1F"/>
+                </a:solidFill>
+                <a:effectLst/>
+                <a:latin typeface="-apple-system"/>
+              </a:rPr>
+              <a:t>30</a:t>
+            </a:r>
+            <a:r>
+              <a:rPr lang="zh-CN" altLang="en-US" b="0" i="0" dirty="0">
+                <a:solidFill>
+                  <a:srgbClr val="191B1F"/>
+                </a:solidFill>
+                <a:effectLst/>
+                <a:latin typeface="-apple-system"/>
+              </a:rPr>
+              <a:t>张图片并辅以数据扩充策略便达到非常低的错误率，拿了当届比赛的冠军。</a:t>
+            </a:r>
+            <a:endParaRPr lang="zh-CN" altLang="en-US" dirty="0"/>
+          </a:p>
+        </p:txBody>
+      </p:sp>
+      <p:sp>
+        <p:nvSpPr>
+          <p:cNvPr id="4" name="灯片编号占位符 3"/>
+          <p:cNvSpPr>
+            <a:spLocks noGrp="1"/>
+          </p:cNvSpPr>
+          <p:nvPr>
+            <p:ph type="sldNum" sz="quarter" idx="5"/>
+          </p:nvPr>
+        </p:nvSpPr>
+        <p:spPr/>
+        <p:txBody>
+          <a:bodyPr/>
+          <a:lstStyle/>
+          <a:p>
+            <a:fld id="{54290F55-E33F-4F55-B56D-790968137D6B}" type="slidenum">
+              <a:rPr lang="zh-CN" altLang="en-US" smtClean="0"/>
+              <a:t>5</a:t>
+            </a:fld>
+            <a:endParaRPr lang="zh-CN" altLang="en-US"/>
+          </a:p>
+        </p:txBody>
+      </p:sp>
+    </p:spTree>
+    <p:extLst>
+      <p:ext uri="{BB962C8B-B14F-4D97-AF65-F5344CB8AC3E}">
+        <p14:creationId xmlns:p14="http://schemas.microsoft.com/office/powerpoint/2010/main" val="2013938060"/>
+      </p:ext>
+    </p:extLst>
+  </p:cSld>
+  <p:clrMapOvr>
+    <a:masterClrMapping/>
+  </p:clrMapOvr>
+</p:notes>
+</file>
+
+<file path=ppt/notesSlides/notesSlide4.xml><?xml version="1.0" encoding="utf-8"?>
+<p:notes xmlns:a="http://schemas.openxmlformats.org/drawingml/2006/main" xmlns:r="http://schemas.openxmlformats.org/officeDocument/2006/relationships" xmlns:p="http://schemas.openxmlformats.org/presentationml/2006/main">
+  <p:cSld>
+    <p:spTree>
+      <p:nvGrpSpPr>
+        <p:cNvPr id="1" name=""/>
+        <p:cNvGrpSpPr/>
+        <p:nvPr/>
+      </p:nvGrpSpPr>
+      <p:grpSpPr>
+        <a:xfrm>
+          <a:off x="0" y="0"/>
+          <a:ext cx="0" cy="0"/>
+          <a:chOff x="0" y="0"/>
+          <a:chExt cx="0" cy="0"/>
+        </a:xfrm>
+      </p:grpSpPr>
+      <p:sp>
+        <p:nvSpPr>
+          <p:cNvPr id="2" name="幻灯片图像占位符 1"/>
+          <p:cNvSpPr>
+            <a:spLocks noGrp="1" noRot="1" noChangeAspect="1"/>
+          </p:cNvSpPr>
+          <p:nvPr>
+            <p:ph type="sldImg"/>
+          </p:nvPr>
+        </p:nvSpPr>
+        <p:spPr/>
+      </p:sp>
+      <p:sp>
+        <p:nvSpPr>
+          <p:cNvPr id="3" name="备注占位符 2"/>
+          <p:cNvSpPr>
+            <a:spLocks noGrp="1"/>
+          </p:cNvSpPr>
+          <p:nvPr>
+            <p:ph type="body" idx="1"/>
+          </p:nvPr>
+        </p:nvSpPr>
+        <p:spPr/>
+        <p:txBody>
+          <a:bodyPr/>
+          <a:lstStyle/>
+          <a:p>
+            <a:pPr marL="0" marR="0" lvl="0" indent="0" algn="l" defTabSz="914400" rtl="0" eaLnBrk="1" fontAlgn="auto" latinLnBrk="0" hangingPunct="1">
+              <a:lnSpc>
+                <a:spcPct val="100000"/>
+              </a:lnSpc>
+              <a:spcBef>
+                <a:spcPts val="0"/>
+              </a:spcBef>
+              <a:spcAft>
+                <a:spcPts val="0"/>
+              </a:spcAft>
+              <a:buClrTx/>
+              <a:buSzTx/>
+              <a:buFontTx/>
+              <a:buNone/>
+              <a:tabLst/>
+              <a:defRPr/>
+            </a:pPr>
+            <a:r>
+              <a:rPr lang="en-US" altLang="zh-CN" b="0" i="0" dirty="0">
+                <a:solidFill>
+                  <a:srgbClr val="191B1F"/>
+                </a:solidFill>
+                <a:effectLst/>
+                <a:latin typeface="-apple-system"/>
+              </a:rPr>
+              <a:t>U-Net</a:t>
+            </a:r>
+            <a:r>
+              <a:rPr lang="zh-CN" altLang="en-US" b="0" i="0" dirty="0">
+                <a:solidFill>
+                  <a:srgbClr val="191B1F"/>
+                </a:solidFill>
+                <a:effectLst/>
+                <a:latin typeface="-apple-system"/>
+              </a:rPr>
+              <a:t>是比较早的使用全卷积网络进行语义分割的算法之一，论文中使用包含压缩路径和扩展路径的对称</a:t>
+            </a:r>
+            <a:r>
+              <a:rPr lang="en-US" altLang="zh-CN" b="0" i="0" dirty="0">
+                <a:solidFill>
+                  <a:srgbClr val="191B1F"/>
+                </a:solidFill>
+                <a:effectLst/>
+                <a:latin typeface="-apple-system"/>
+              </a:rPr>
+              <a:t>U</a:t>
+            </a:r>
+            <a:r>
+              <a:rPr lang="zh-CN" altLang="en-US" b="0" i="0" dirty="0">
+                <a:solidFill>
+                  <a:srgbClr val="191B1F"/>
+                </a:solidFill>
+                <a:effectLst/>
+                <a:latin typeface="-apple-system"/>
+              </a:rPr>
+              <a:t>形结构在当时非常具有创新性，且一定程度上影响了后面若干个分割网络的设计，该网络的名字也是取自其</a:t>
+            </a:r>
+            <a:r>
+              <a:rPr lang="en-US" altLang="zh-CN" b="0" i="0" dirty="0">
+                <a:solidFill>
+                  <a:srgbClr val="191B1F"/>
+                </a:solidFill>
+                <a:effectLst/>
+                <a:latin typeface="-apple-system"/>
+              </a:rPr>
+              <a:t>U</a:t>
+            </a:r>
+            <a:r>
+              <a:rPr lang="zh-CN" altLang="en-US" b="0" i="0" dirty="0">
+                <a:solidFill>
+                  <a:srgbClr val="191B1F"/>
+                </a:solidFill>
+                <a:effectLst/>
+                <a:latin typeface="-apple-system"/>
+              </a:rPr>
+              <a:t>形形状。</a:t>
+            </a:r>
+            <a:endParaRPr lang="en-US" altLang="zh-CN" b="0" i="0" dirty="0">
+              <a:solidFill>
+                <a:srgbClr val="191B1F"/>
+              </a:solidFill>
+              <a:effectLst/>
+              <a:latin typeface="-apple-system"/>
+            </a:endParaRPr>
+          </a:p>
+          <a:p>
+            <a:pPr marL="0" marR="0" lvl="0" indent="0" algn="l" defTabSz="914400" rtl="0" eaLnBrk="1" fontAlgn="auto" latinLnBrk="0" hangingPunct="1">
+              <a:lnSpc>
+                <a:spcPct val="100000"/>
+              </a:lnSpc>
+              <a:spcBef>
+                <a:spcPts val="0"/>
+              </a:spcBef>
+              <a:spcAft>
+                <a:spcPts val="0"/>
+              </a:spcAft>
+              <a:buClrTx/>
+              <a:buSzTx/>
+              <a:buFontTx/>
+              <a:buNone/>
+              <a:tabLst/>
+              <a:defRPr/>
+            </a:pPr>
+            <a:r>
+              <a:rPr lang="en-US" altLang="zh-CN" b="0" i="0" dirty="0">
+                <a:solidFill>
+                  <a:srgbClr val="191B1F"/>
+                </a:solidFill>
+                <a:effectLst/>
+                <a:latin typeface="-apple-system"/>
+              </a:rPr>
+              <a:t>U-Net</a:t>
+            </a:r>
+            <a:r>
+              <a:rPr lang="zh-CN" altLang="en-US" b="0" i="0" dirty="0">
+                <a:solidFill>
+                  <a:srgbClr val="191B1F"/>
+                </a:solidFill>
+                <a:effectLst/>
+                <a:latin typeface="-apple-system"/>
+              </a:rPr>
+              <a:t>的实验是一个比较简单的</a:t>
+            </a:r>
+            <a:r>
+              <a:rPr lang="en-US" altLang="zh-CN" b="0" i="0" dirty="0">
+                <a:solidFill>
+                  <a:srgbClr val="191B1F"/>
+                </a:solidFill>
+                <a:effectLst/>
+                <a:latin typeface="-apple-system"/>
+              </a:rPr>
+              <a:t>ISBI cell tracking</a:t>
+            </a:r>
+            <a:r>
+              <a:rPr lang="zh-CN" altLang="en-US" b="0" i="0" dirty="0">
+                <a:solidFill>
+                  <a:srgbClr val="191B1F"/>
+                </a:solidFill>
+                <a:effectLst/>
+                <a:latin typeface="-apple-system"/>
+              </a:rPr>
+              <a:t>数据集，由于本身的任务比较简单，</a:t>
+            </a:r>
+            <a:r>
+              <a:rPr lang="en-US" altLang="zh-CN" b="0" i="0" dirty="0">
+                <a:solidFill>
+                  <a:srgbClr val="191B1F"/>
+                </a:solidFill>
+                <a:effectLst/>
+                <a:latin typeface="-apple-system"/>
+              </a:rPr>
+              <a:t>U-Net</a:t>
+            </a:r>
+            <a:r>
+              <a:rPr lang="zh-CN" altLang="en-US" b="0" i="0" dirty="0">
+                <a:solidFill>
+                  <a:srgbClr val="191B1F"/>
+                </a:solidFill>
+                <a:effectLst/>
+                <a:latin typeface="-apple-system"/>
+              </a:rPr>
+              <a:t>紧紧通过</a:t>
+            </a:r>
+            <a:r>
+              <a:rPr lang="en-US" altLang="zh-CN" b="0" i="0" dirty="0">
+                <a:solidFill>
+                  <a:srgbClr val="191B1F"/>
+                </a:solidFill>
+                <a:effectLst/>
+                <a:latin typeface="-apple-system"/>
+              </a:rPr>
+              <a:t>30</a:t>
+            </a:r>
+            <a:r>
+              <a:rPr lang="zh-CN" altLang="en-US" b="0" i="0" dirty="0">
+                <a:solidFill>
+                  <a:srgbClr val="191B1F"/>
+                </a:solidFill>
+                <a:effectLst/>
+                <a:latin typeface="-apple-system"/>
+              </a:rPr>
+              <a:t>张图片并辅以数据扩充策略便达到非常低的错误率，拿了当届比赛的冠军。</a:t>
+            </a:r>
+            <a:endParaRPr lang="zh-CN" altLang="en-US" dirty="0"/>
+          </a:p>
+        </p:txBody>
+      </p:sp>
+      <p:sp>
+        <p:nvSpPr>
+          <p:cNvPr id="4" name="灯片编号占位符 3"/>
+          <p:cNvSpPr>
+            <a:spLocks noGrp="1"/>
+          </p:cNvSpPr>
+          <p:nvPr>
+            <p:ph type="sldNum" sz="quarter" idx="5"/>
+          </p:nvPr>
+        </p:nvSpPr>
+        <p:spPr/>
+        <p:txBody>
+          <a:bodyPr/>
+          <a:lstStyle/>
+          <a:p>
+            <a:fld id="{54290F55-E33F-4F55-B56D-790968137D6B}" type="slidenum">
+              <a:rPr lang="zh-CN" altLang="en-US" smtClean="0"/>
+              <a:t>6</a:t>
+            </a:fld>
+            <a:endParaRPr lang="zh-CN" altLang="en-US"/>
+          </a:p>
+        </p:txBody>
+      </p:sp>
+    </p:spTree>
+    <p:extLst>
+      <p:ext uri="{BB962C8B-B14F-4D97-AF65-F5344CB8AC3E}">
+        <p14:creationId xmlns:p14="http://schemas.microsoft.com/office/powerpoint/2010/main" val="1602455186"/>
+      </p:ext>
+    </p:extLst>
+  </p:cSld>
+  <p:clrMapOvr>
+    <a:masterClrMapping/>
+  </p:clrMapOvr>
+</p:notes>
 </file>
 
 <file path=ppt/slideLayouts/slideLayout1.xml><?xml version="1.0" encoding="utf-8"?>
@@ -2985,7 +4248,7 @@
                 <a:ea typeface="微软雅黑" panose="020B0503020204020204" pitchFamily="34" charset="-122"/>
                 <a:cs typeface="Times New Roman" panose="02020603050405020304" charset="0"/>
               </a:rPr>
-              <a:t>Proposal</a:t>
+              <a:t>Proposal for Machine Learning Project</a:t>
             </a:r>
           </a:p>
           <a:p>
@@ -3016,16 +4279,13 @@
                 <a:ea typeface="微软雅黑" panose="020B0503020204020204" pitchFamily="34" charset="-122"/>
                 <a:cs typeface="Times New Roman" panose="02020603050405020304" charset="0"/>
               </a:rPr>
-              <a:t>202</a:t>
-            </a:r>
-            <a:r>
-              <a:rPr lang="en-US" sz="3200" b="1" dirty="0">
-                <a:latin typeface="Times New Roman" panose="02020603050405020304" charset="0"/>
-                <a:ea typeface="微软雅黑" panose="020B0503020204020204" pitchFamily="34" charset="-122"/>
-                <a:cs typeface="Times New Roman" panose="02020603050405020304" charset="0"/>
-              </a:rPr>
-              <a:t>2</a:t>
-            </a:r>
+              <a:t>2023</a:t>
+            </a:r>
+            <a:endParaRPr lang="en-US" sz="3200" b="1" dirty="0">
+              <a:latin typeface="Times New Roman" panose="02020603050405020304" charset="0"/>
+              <a:ea typeface="微软雅黑" panose="020B0503020204020204" pitchFamily="34" charset="-122"/>
+              <a:cs typeface="Times New Roman" panose="02020603050405020304" charset="0"/>
+            </a:endParaRPr>
           </a:p>
         </p:txBody>
       </p:sp>
@@ -3172,13 +4432,13 @@
         </p:nvSpPr>
         <p:spPr>
           <a:xfrm>
-            <a:off x="3002295" y="127905"/>
-            <a:ext cx="6389370" cy="579755"/>
+            <a:off x="0" y="127905"/>
+            <a:ext cx="12192000" cy="579755"/>
           </a:xfrm>
         </p:spPr>
         <p:txBody>
           <a:bodyPr anchor="ctr" anchorCtr="0">
-            <a:noAutofit/>
+            <a:normAutofit/>
           </a:bodyPr>
           <a:lstStyle/>
           <a:p>
@@ -3192,7 +4452,7 @@
                 <a:cs typeface="Times New Roman" panose="02020603050405020304" charset="0"/>
                 <a:sym typeface="+mn-ea"/>
               </a:rPr>
-              <a:t>Reference</a:t>
+              <a:t>Initial Results</a:t>
             </a:r>
           </a:p>
         </p:txBody>
@@ -3272,115 +4532,98 @@
       </p:pic>
       <p:sp>
         <p:nvSpPr>
-          <p:cNvPr id="4" name="矩形 3"/>
-          <p:cNvSpPr/>
+          <p:cNvPr id="5" name="文本框 4"/>
+          <p:cNvSpPr txBox="1"/>
           <p:nvPr/>
         </p:nvSpPr>
         <p:spPr>
           <a:xfrm>
-            <a:off x="1442476" y="2058421"/>
-            <a:ext cx="9307047" cy="2585323"/>
+            <a:off x="1378811" y="1641315"/>
+            <a:ext cx="3554426" cy="461665"/>
           </a:xfrm>
           <a:prstGeom prst="rect">
             <a:avLst/>
           </a:prstGeom>
-        </p:spPr>
-        <p:txBody>
-          <a:bodyPr wrap="square">
+          <a:noFill/>
+        </p:spPr>
+        <p:txBody>
+          <a:bodyPr wrap="square" rtlCol="0">
             <a:spAutoFit/>
           </a:bodyPr>
           <a:lstStyle/>
           <a:p>
             <a:r>
-              <a:rPr lang="en-US" altLang="zh-CN" dirty="0"/>
-              <a:t>[1]  Olaf </a:t>
-            </a:r>
-            <a:r>
-              <a:rPr lang="en-US" altLang="zh-CN" dirty="0" err="1"/>
-              <a:t>Ronneberger</a:t>
-            </a:r>
-            <a:r>
-              <a:rPr lang="en-US" altLang="zh-CN" dirty="0"/>
-              <a:t>, Philipp Fisher and M. </a:t>
-            </a:r>
-            <a:r>
-              <a:rPr lang="en-US" altLang="zh-CN" dirty="0" err="1"/>
-              <a:t>Kozubek</a:t>
-            </a:r>
-            <a:r>
-              <a:rPr lang="en-US" altLang="zh-CN" dirty="0"/>
-              <a:t>. U-Net: Convolutional Networks for Biomedical Image Segmentation[J] .</a:t>
-            </a:r>
-            <a:r>
-              <a:rPr lang="en-US" altLang="zh-CN" dirty="0" err="1"/>
-              <a:t>arXiv</a:t>
-            </a:r>
-            <a:r>
-              <a:rPr lang="en-US" altLang="zh-CN" dirty="0"/>
-              <a:t> e-prints arXiv:1505.04597,2015.</a:t>
-            </a:r>
-          </a:p>
-          <a:p>
-            <a:endParaRPr lang="en-US" altLang="zh-CN" dirty="0"/>
-          </a:p>
-          <a:p>
-            <a:r>
-              <a:rPr lang="en-US" altLang="zh-CN" dirty="0"/>
-              <a:t>[2]  </a:t>
-            </a:r>
-            <a:r>
-              <a:rPr lang="en-US" altLang="zh-CN" dirty="0" err="1"/>
-              <a:t>Prannay</a:t>
-            </a:r>
-            <a:r>
-              <a:rPr lang="en-US" altLang="zh-CN" dirty="0"/>
-              <a:t> Khosla, Piotr </a:t>
-            </a:r>
-            <a:r>
-              <a:rPr lang="en-US" altLang="zh-CN" dirty="0" err="1"/>
-              <a:t>Teterwak</a:t>
-            </a:r>
-            <a:r>
-              <a:rPr lang="en-US" altLang="zh-CN" dirty="0"/>
-              <a:t> and Chen Wang. Supervised Contrastive Learning[J] .</a:t>
-            </a:r>
-            <a:r>
-              <a:rPr lang="en-US" altLang="zh-CN" dirty="0" err="1"/>
-              <a:t>arXiv</a:t>
-            </a:r>
-            <a:r>
-              <a:rPr lang="en-US" altLang="zh-CN" dirty="0"/>
-              <a:t> e-prints arXiv:2004.11362,2021.</a:t>
-            </a:r>
-          </a:p>
-          <a:p>
-            <a:endParaRPr lang="en-US" altLang="zh-CN" dirty="0"/>
-          </a:p>
-          <a:p>
-            <a:r>
-              <a:rPr lang="en-US" altLang="zh-CN" dirty="0"/>
-              <a:t>[3]  </a:t>
-            </a:r>
-            <a:r>
-              <a:rPr lang="en-US" altLang="zh-CN" dirty="0" err="1"/>
-              <a:t>Xudong</a:t>
-            </a:r>
-            <a:r>
-              <a:rPr lang="en-US" altLang="zh-CN" dirty="0"/>
-              <a:t> Wang, Rohit Girdhar, Stella X. Yu, and Ishan Misra. Cut and Learn for Unsupervised Object Detection and Instance Segmentation[J]. </a:t>
-            </a:r>
-            <a:r>
-              <a:rPr lang="en-US" altLang="zh-CN" dirty="0" err="1"/>
-              <a:t>arXiv</a:t>
-            </a:r>
-            <a:r>
-              <a:rPr lang="en-US" altLang="zh-CN" dirty="0"/>
-              <a:t> pre-prints arXiv:2301.11320,2023.</a:t>
-            </a:r>
-          </a:p>
-        </p:txBody>
-      </p:sp>
+              <a:rPr lang="en-US" altLang="zh-CN" sz="2400" b="1" u="sng" dirty="0">
+                <a:solidFill>
+                  <a:srgbClr val="002060"/>
+                </a:solidFill>
+                <a:latin typeface="微软雅黑" panose="020B0503020204020204" pitchFamily="34" charset="-122"/>
+                <a:ea typeface="微软雅黑" panose="020B0503020204020204" pitchFamily="34" charset="-122"/>
+                <a:cs typeface="微软雅黑" panose="020B0503020204020204" pitchFamily="34" charset="-122"/>
+                <a:sym typeface="+mn-ea"/>
+              </a:rPr>
+              <a:t>Hyperparameters</a:t>
+            </a:r>
+            <a:r>
+              <a:rPr lang="zh-CN" altLang="en-US" sz="2400" b="1" u="sng" dirty="0">
+                <a:solidFill>
+                  <a:srgbClr val="002060"/>
+                </a:solidFill>
+                <a:latin typeface="微软雅黑" panose="020B0503020204020204" pitchFamily="34" charset="-122"/>
+                <a:ea typeface="微软雅黑" panose="020B0503020204020204" pitchFamily="34" charset="-122"/>
+                <a:cs typeface="微软雅黑" panose="020B0503020204020204" pitchFamily="34" charset="-122"/>
+                <a:sym typeface="+mn-ea"/>
+              </a:rPr>
+              <a:t> </a:t>
+            </a:r>
+            <a:endParaRPr lang="en-US" altLang="zh-CN" sz="2400" b="1" u="sng" dirty="0">
+              <a:solidFill>
+                <a:srgbClr val="002060"/>
+              </a:solidFill>
+              <a:latin typeface="微软雅黑" panose="020B0503020204020204" pitchFamily="34" charset="-122"/>
+              <a:ea typeface="微软雅黑" panose="020B0503020204020204" pitchFamily="34" charset="-122"/>
+              <a:cs typeface="微软雅黑" panose="020B0503020204020204" pitchFamily="34" charset="-122"/>
+              <a:sym typeface="+mn-ea"/>
+            </a:endParaRPr>
+          </a:p>
+        </p:txBody>
+      </p:sp>
+      <p:pic>
+        <p:nvPicPr>
+          <p:cNvPr id="8" name="图片 7">
+            <a:extLst>
+              <a:ext uri="{FF2B5EF4-FFF2-40B4-BE49-F238E27FC236}">
+                <a16:creationId xmlns:a16="http://schemas.microsoft.com/office/drawing/2014/main" id="{D451E4A0-1CF9-84F2-B5F9-730E8144B828}"/>
+              </a:ext>
+            </a:extLst>
+          </p:cNvPr>
+          <p:cNvPicPr>
+            <a:picLocks noChangeAspect="1"/>
+          </p:cNvPicPr>
+          <p:nvPr/>
+        </p:nvPicPr>
+        <p:blipFill>
+          <a:blip r:embed="rId3"/>
+          <a:stretch>
+            <a:fillRect/>
+          </a:stretch>
+        </p:blipFill>
+        <p:spPr>
+          <a:xfrm>
+            <a:off x="1378811" y="2308763"/>
+            <a:ext cx="9434378" cy="2240474"/>
+          </a:xfrm>
+          <a:prstGeom prst="rect">
+            <a:avLst/>
+          </a:prstGeom>
+        </p:spPr>
+      </p:pic>
     </p:spTree>
+    <p:extLst>
+      <p:ext uri="{BB962C8B-B14F-4D97-AF65-F5344CB8AC3E}">
+        <p14:creationId xmlns:p14="http://schemas.microsoft.com/office/powerpoint/2010/main" val="4055491203"/>
+      </p:ext>
+    </p:extLst>
   </p:cSld>
   <p:clrMapOvr>
     <a:masterClrMapping/>
@@ -3420,57 +4663,31 @@
         </p:nvSpPr>
         <p:spPr>
           <a:xfrm>
-            <a:off x="3182564" y="2094249"/>
-            <a:ext cx="5826868" cy="1006429"/>
-          </a:xfrm>
-        </p:spPr>
-        <p:txBody>
-          <a:bodyPr wrap="square">
-            <a:spAutoFit/>
+            <a:off x="0" y="127905"/>
+            <a:ext cx="12192000" cy="579755"/>
+          </a:xfrm>
+        </p:spPr>
+        <p:txBody>
+          <a:bodyPr anchor="ctr" anchorCtr="0">
+            <a:normAutofit/>
           </a:bodyPr>
           <a:lstStyle/>
           <a:p>
             <a:r>
-              <a:rPr lang="en-US" altLang="zh-CN" sz="6600" dirty="0">
+              <a:rPr lang="en-US" altLang="zh-CN" sz="3100" b="1" dirty="0">
+                <a:solidFill>
+                  <a:srgbClr val="002060"/>
+                </a:solidFill>
                 <a:latin typeface="Times New Roman" panose="02020603050405020304" charset="0"/>
                 <a:ea typeface="微软雅黑" panose="020B0503020204020204" pitchFamily="34" charset="-122"/>
                 <a:cs typeface="Times New Roman" panose="02020603050405020304" charset="0"/>
-              </a:rPr>
-              <a:t>THANK YOU!</a:t>
-            </a:r>
-            <a:endParaRPr lang="zh-CN" altLang="en-US" sz="6600" dirty="0">
-              <a:latin typeface="Times New Roman" panose="02020603050405020304" charset="0"/>
-              <a:ea typeface="微软雅黑" panose="020B0503020204020204" pitchFamily="34" charset="-122"/>
-              <a:cs typeface="Times New Roman" panose="02020603050405020304" charset="0"/>
-            </a:endParaRPr>
-          </a:p>
-        </p:txBody>
-      </p:sp>
-      <p:pic>
-        <p:nvPicPr>
-          <p:cNvPr id="9" name="图片 8" descr="校徽"/>
-          <p:cNvPicPr>
-            <a:picLocks noChangeAspect="1"/>
-          </p:cNvPicPr>
-          <p:nvPr/>
-        </p:nvPicPr>
-        <p:blipFill>
-          <a:blip r:embed="rId2"/>
-          <a:srcRect l="21146" t="9697" r="22583" b="12705"/>
-          <a:stretch>
-            <a:fillRect/>
-          </a:stretch>
-        </p:blipFill>
-        <p:spPr>
-          <a:xfrm>
-            <a:off x="10811510" y="5556250"/>
-            <a:ext cx="1028700" cy="1020445"/>
-          </a:xfrm>
-          <a:prstGeom prst="rect">
-            <a:avLst/>
-          </a:prstGeom>
-        </p:spPr>
-      </p:pic>
+                <a:sym typeface="+mn-ea"/>
+              </a:rPr>
+              <a:t>Initial Results</a:t>
+            </a:r>
+          </a:p>
+        </p:txBody>
+      </p:sp>
       <p:sp>
         <p:nvSpPr>
           <p:cNvPr id="6" name="矩形 5"/>
@@ -3478,9 +4695,9 @@
           <p:nvPr/>
         </p:nvSpPr>
         <p:spPr>
-          <a:xfrm flipV="1">
-            <a:off x="3113721" y="3024478"/>
-            <a:ext cx="5964555" cy="76200"/>
+          <a:xfrm>
+            <a:off x="-13970" y="707390"/>
+            <a:ext cx="12219940" cy="76200"/>
           </a:xfrm>
           <a:prstGeom prst="rect">
             <a:avLst/>
@@ -3519,6 +4736,1391 @@
           </a:p>
         </p:txBody>
       </p:sp>
+      <p:pic>
+        <p:nvPicPr>
+          <p:cNvPr id="9" name="图片 8" descr="校徽"/>
+          <p:cNvPicPr>
+            <a:picLocks noChangeAspect="1"/>
+          </p:cNvPicPr>
+          <p:nvPr/>
+        </p:nvPicPr>
+        <p:blipFill>
+          <a:blip r:embed="rId2"/>
+          <a:srcRect l="21146" t="9697" r="22583" b="12705"/>
+          <a:stretch>
+            <a:fillRect/>
+          </a:stretch>
+        </p:blipFill>
+        <p:spPr>
+          <a:xfrm>
+            <a:off x="10811510" y="5556250"/>
+            <a:ext cx="1028700" cy="1020445"/>
+          </a:xfrm>
+          <a:prstGeom prst="rect">
+            <a:avLst/>
+          </a:prstGeom>
+        </p:spPr>
+      </p:pic>
+      <p:sp>
+        <p:nvSpPr>
+          <p:cNvPr id="5" name="文本框 4"/>
+          <p:cNvSpPr txBox="1"/>
+          <p:nvPr/>
+        </p:nvSpPr>
+        <p:spPr>
+          <a:xfrm>
+            <a:off x="648119" y="1733601"/>
+            <a:ext cx="2769335" cy="461665"/>
+          </a:xfrm>
+          <a:prstGeom prst="rect">
+            <a:avLst/>
+          </a:prstGeom>
+          <a:noFill/>
+        </p:spPr>
+        <p:txBody>
+          <a:bodyPr wrap="square" rtlCol="0">
+            <a:spAutoFit/>
+          </a:bodyPr>
+          <a:lstStyle/>
+          <a:p>
+            <a:r>
+              <a:rPr lang="en-US" altLang="zh-CN" sz="2400" b="1" u="sng" dirty="0">
+                <a:solidFill>
+                  <a:srgbClr val="002060"/>
+                </a:solidFill>
+                <a:latin typeface="微软雅黑" panose="020B0503020204020204" pitchFamily="34" charset="-122"/>
+                <a:ea typeface="微软雅黑" panose="020B0503020204020204" pitchFamily="34" charset="-122"/>
+                <a:cs typeface="微软雅黑" panose="020B0503020204020204" pitchFamily="34" charset="-122"/>
+                <a:sym typeface="+mn-ea"/>
+              </a:rPr>
+              <a:t>Training Loss</a:t>
+            </a:r>
+          </a:p>
+        </p:txBody>
+      </p:sp>
+      <p:pic>
+        <p:nvPicPr>
+          <p:cNvPr id="4" name="图片 3">
+            <a:extLst>
+              <a:ext uri="{FF2B5EF4-FFF2-40B4-BE49-F238E27FC236}">
+                <a16:creationId xmlns:a16="http://schemas.microsoft.com/office/drawing/2014/main" id="{3428BAFF-1167-975D-E568-73D5487E7C01}"/>
+              </a:ext>
+            </a:extLst>
+          </p:cNvPr>
+          <p:cNvPicPr>
+            <a:picLocks noChangeAspect="1"/>
+          </p:cNvPicPr>
+          <p:nvPr/>
+        </p:nvPicPr>
+        <p:blipFill>
+          <a:blip r:embed="rId3"/>
+          <a:stretch>
+            <a:fillRect/>
+          </a:stretch>
+        </p:blipFill>
+        <p:spPr>
+          <a:xfrm>
+            <a:off x="259426" y="2549237"/>
+            <a:ext cx="5621719" cy="2871701"/>
+          </a:xfrm>
+          <a:prstGeom prst="rect">
+            <a:avLst/>
+          </a:prstGeom>
+        </p:spPr>
+      </p:pic>
+      <p:pic>
+        <p:nvPicPr>
+          <p:cNvPr id="8" name="图片 7">
+            <a:extLst>
+              <a:ext uri="{FF2B5EF4-FFF2-40B4-BE49-F238E27FC236}">
+                <a16:creationId xmlns:a16="http://schemas.microsoft.com/office/drawing/2014/main" id="{3F200CC7-0424-BD23-6DC5-497D74C63D28}"/>
+              </a:ext>
+            </a:extLst>
+          </p:cNvPr>
+          <p:cNvPicPr>
+            <a:picLocks noChangeAspect="1"/>
+          </p:cNvPicPr>
+          <p:nvPr/>
+        </p:nvPicPr>
+        <p:blipFill>
+          <a:blip r:embed="rId4"/>
+          <a:stretch>
+            <a:fillRect/>
+          </a:stretch>
+        </p:blipFill>
+        <p:spPr>
+          <a:xfrm>
+            <a:off x="7621587" y="2416118"/>
+            <a:ext cx="2815503" cy="4441882"/>
+          </a:xfrm>
+          <a:prstGeom prst="rect">
+            <a:avLst/>
+          </a:prstGeom>
+        </p:spPr>
+      </p:pic>
+      <p:sp>
+        <p:nvSpPr>
+          <p:cNvPr id="13" name="文本框 12">
+            <a:extLst>
+              <a:ext uri="{FF2B5EF4-FFF2-40B4-BE49-F238E27FC236}">
+                <a16:creationId xmlns:a16="http://schemas.microsoft.com/office/drawing/2014/main" id="{0B7828CF-239D-472E-4733-EFB27FBBFEE0}"/>
+              </a:ext>
+            </a:extLst>
+          </p:cNvPr>
+          <p:cNvSpPr txBox="1"/>
+          <p:nvPr/>
+        </p:nvSpPr>
+        <p:spPr>
+          <a:xfrm>
+            <a:off x="7228595" y="1133436"/>
+            <a:ext cx="3582915" cy="830997"/>
+          </a:xfrm>
+          <a:prstGeom prst="rect">
+            <a:avLst/>
+          </a:prstGeom>
+          <a:noFill/>
+        </p:spPr>
+        <p:txBody>
+          <a:bodyPr wrap="square">
+            <a:spAutoFit/>
+          </a:bodyPr>
+          <a:lstStyle/>
+          <a:p>
+            <a:pPr marL="0" marR="0" lvl="0" indent="0" algn="l" defTabSz="914400" rtl="0" eaLnBrk="1" fontAlgn="auto" latinLnBrk="0" hangingPunct="1">
+              <a:lnSpc>
+                <a:spcPct val="100000"/>
+              </a:lnSpc>
+              <a:spcBef>
+                <a:spcPts val="0"/>
+              </a:spcBef>
+              <a:spcAft>
+                <a:spcPts val="0"/>
+              </a:spcAft>
+              <a:buClrTx/>
+              <a:buSzTx/>
+              <a:buFontTx/>
+              <a:buNone/>
+              <a:tabLst/>
+              <a:defRPr/>
+            </a:pPr>
+            <a:r>
+              <a:rPr kumimoji="0" lang="en-US" altLang="zh-CN" sz="2400" b="1" i="0" u="sng" strike="noStrike" kern="1200" cap="none" spc="0" normalizeH="0" baseline="0" noProof="0" dirty="0">
+                <a:ln>
+                  <a:noFill/>
+                </a:ln>
+                <a:solidFill>
+                  <a:srgbClr val="002060"/>
+                </a:solidFill>
+                <a:effectLst/>
+                <a:uLnTx/>
+                <a:uFillTx/>
+                <a:latin typeface="微软雅黑" panose="020B0503020204020204" pitchFamily="34" charset="-122"/>
+                <a:ea typeface="微软雅黑" panose="020B0503020204020204" pitchFamily="34" charset="-122"/>
+                <a:cs typeface="微软雅黑" panose="020B0503020204020204" pitchFamily="34" charset="-122"/>
+                <a:sym typeface="+mn-ea"/>
+              </a:rPr>
+              <a:t>example of semantic segmentation result</a:t>
+            </a:r>
+          </a:p>
+        </p:txBody>
+      </p:sp>
+    </p:spTree>
+    <p:extLst>
+      <p:ext uri="{BB962C8B-B14F-4D97-AF65-F5344CB8AC3E}">
+        <p14:creationId xmlns:p14="http://schemas.microsoft.com/office/powerpoint/2010/main" val="2251863625"/>
+      </p:ext>
+    </p:extLst>
+  </p:cSld>
+  <p:clrMapOvr>
+    <a:masterClrMapping/>
+  </p:clrMapOvr>
+  <p:transition spd="slow">
+    <p:push dir="u"/>
+  </p:transition>
+</p:sld>
+</file>
+
+<file path=ppt/slides/slide12.xml><?xml version="1.0" encoding="utf-8"?>
+<p:sld xmlns:a="http://schemas.openxmlformats.org/drawingml/2006/main" xmlns:r="http://schemas.openxmlformats.org/officeDocument/2006/relationships" xmlns:p="http://schemas.openxmlformats.org/presentationml/2006/main">
+  <p:cSld>
+    <p:spTree>
+      <p:nvGrpSpPr>
+        <p:cNvPr id="1" name=""/>
+        <p:cNvGrpSpPr/>
+        <p:nvPr/>
+      </p:nvGrpSpPr>
+      <p:grpSpPr>
+        <a:xfrm>
+          <a:off x="0" y="0"/>
+          <a:ext cx="0" cy="0"/>
+          <a:chOff x="0" y="0"/>
+          <a:chExt cx="0" cy="0"/>
+        </a:xfrm>
+      </p:grpSpPr>
+      <p:sp>
+        <p:nvSpPr>
+          <p:cNvPr id="2" name="标题 1"/>
+          <p:cNvSpPr>
+            <a:spLocks noGrp="1"/>
+          </p:cNvSpPr>
+          <p:nvPr>
+            <p:ph type="ctrTitle"/>
+          </p:nvPr>
+        </p:nvSpPr>
+        <p:spPr>
+          <a:xfrm>
+            <a:off x="0" y="127905"/>
+            <a:ext cx="12192000" cy="579755"/>
+          </a:xfrm>
+        </p:spPr>
+        <p:txBody>
+          <a:bodyPr anchor="ctr" anchorCtr="0">
+            <a:normAutofit/>
+          </a:bodyPr>
+          <a:lstStyle/>
+          <a:p>
+            <a:r>
+              <a:rPr lang="en-US" altLang="zh-CN" sz="3100" b="1" dirty="0">
+                <a:solidFill>
+                  <a:srgbClr val="002060"/>
+                </a:solidFill>
+                <a:latin typeface="Times New Roman" panose="02020603050405020304" charset="0"/>
+                <a:ea typeface="微软雅黑" panose="020B0503020204020204" pitchFamily="34" charset="-122"/>
+                <a:cs typeface="Times New Roman" panose="02020603050405020304" charset="0"/>
+                <a:sym typeface="+mn-ea"/>
+              </a:rPr>
+              <a:t>Goals and Objects</a:t>
+            </a:r>
+          </a:p>
+        </p:txBody>
+      </p:sp>
+      <p:sp>
+        <p:nvSpPr>
+          <p:cNvPr id="6" name="矩形 5"/>
+          <p:cNvSpPr/>
+          <p:nvPr/>
+        </p:nvSpPr>
+        <p:spPr>
+          <a:xfrm>
+            <a:off x="-13970" y="707390"/>
+            <a:ext cx="12219940" cy="76200"/>
+          </a:xfrm>
+          <a:prstGeom prst="rect">
+            <a:avLst/>
+          </a:prstGeom>
+          <a:solidFill>
+            <a:srgbClr val="002060">
+              <a:alpha val="97000"/>
+            </a:srgbClr>
+          </a:solidFill>
+          <a:ln>
+            <a:noFill/>
+          </a:ln>
+        </p:spPr>
+        <p:style>
+          <a:lnRef idx="2">
+            <a:schemeClr val="accent1">
+              <a:shade val="50000"/>
+            </a:schemeClr>
+          </a:lnRef>
+          <a:fillRef idx="1">
+            <a:schemeClr val="accent1"/>
+          </a:fillRef>
+          <a:effectRef idx="0">
+            <a:schemeClr val="accent1"/>
+          </a:effectRef>
+          <a:fontRef idx="minor">
+            <a:schemeClr val="lt1"/>
+          </a:fontRef>
+        </p:style>
+        <p:txBody>
+          <a:bodyPr rtlCol="0" anchor="ctr"/>
+          <a:lstStyle/>
+          <a:p>
+            <a:pPr algn="ctr"/>
+            <a:endParaRPr lang="zh-CN" altLang="en-US"/>
+          </a:p>
+        </p:txBody>
+      </p:sp>
+      <p:pic>
+        <p:nvPicPr>
+          <p:cNvPr id="9" name="图片 8" descr="校徽"/>
+          <p:cNvPicPr>
+            <a:picLocks noChangeAspect="1"/>
+          </p:cNvPicPr>
+          <p:nvPr/>
+        </p:nvPicPr>
+        <p:blipFill>
+          <a:blip r:embed="rId2"/>
+          <a:srcRect l="21146" t="9697" r="22583" b="12705"/>
+          <a:stretch>
+            <a:fillRect/>
+          </a:stretch>
+        </p:blipFill>
+        <p:spPr>
+          <a:xfrm>
+            <a:off x="10811510" y="5556250"/>
+            <a:ext cx="1028700" cy="1020445"/>
+          </a:xfrm>
+          <a:prstGeom prst="rect">
+            <a:avLst/>
+          </a:prstGeom>
+        </p:spPr>
+      </p:pic>
+      <p:sp>
+        <p:nvSpPr>
+          <p:cNvPr id="5" name="文本框 4"/>
+          <p:cNvSpPr txBox="1"/>
+          <p:nvPr/>
+        </p:nvSpPr>
+        <p:spPr>
+          <a:xfrm>
+            <a:off x="1285427" y="1554586"/>
+            <a:ext cx="9188610" cy="3416320"/>
+          </a:xfrm>
+          <a:prstGeom prst="rect">
+            <a:avLst/>
+          </a:prstGeom>
+          <a:noFill/>
+        </p:spPr>
+        <p:txBody>
+          <a:bodyPr wrap="square" rtlCol="0">
+            <a:spAutoFit/>
+          </a:bodyPr>
+          <a:lstStyle/>
+          <a:p>
+            <a:endParaRPr lang="en-US" altLang="zh-CN" sz="2000" b="1" u="sng" dirty="0">
+              <a:solidFill>
+                <a:srgbClr val="002060"/>
+              </a:solidFill>
+              <a:latin typeface="微软雅黑" panose="020B0503020204020204" pitchFamily="34" charset="-122"/>
+              <a:ea typeface="微软雅黑" panose="020B0503020204020204" pitchFamily="34" charset="-122"/>
+              <a:cs typeface="微软雅黑" panose="020B0503020204020204" pitchFamily="34" charset="-122"/>
+              <a:sym typeface="+mn-ea"/>
+            </a:endParaRPr>
+          </a:p>
+          <a:p>
+            <a:pPr marL="285750" indent="-285750">
+              <a:buFont typeface="Arial" panose="020B0604020202020204" pitchFamily="34" charset="0"/>
+              <a:buChar char="•"/>
+            </a:pPr>
+            <a:r>
+              <a:rPr lang="en-US" altLang="zh-CN" sz="2000" dirty="0">
+                <a:latin typeface="微软雅黑" panose="020B0503020204020204" pitchFamily="34" charset="-122"/>
+                <a:ea typeface="微软雅黑" panose="020B0503020204020204" pitchFamily="34" charset="-122"/>
+                <a:cs typeface="微软雅黑" panose="020B0503020204020204" pitchFamily="34" charset="-122"/>
+              </a:rPr>
+              <a:t>Learn the basic mathematics behind CNN and self-attention mechanism in transformer. </a:t>
+            </a:r>
+          </a:p>
+          <a:p>
+            <a:pPr marL="285750" indent="-285750">
+              <a:buFont typeface="Arial" panose="020B0604020202020204" pitchFamily="34" charset="0"/>
+              <a:buChar char="•"/>
+            </a:pPr>
+            <a:endParaRPr lang="en-US" altLang="zh-CN" sz="2000" dirty="0">
+              <a:latin typeface="微软雅黑" panose="020B0503020204020204" pitchFamily="34" charset="-122"/>
+              <a:ea typeface="微软雅黑" panose="020B0503020204020204" pitchFamily="34" charset="-122"/>
+              <a:cs typeface="微软雅黑" panose="020B0503020204020204" pitchFamily="34" charset="-122"/>
+            </a:endParaRPr>
+          </a:p>
+          <a:p>
+            <a:pPr marL="285750" indent="-285750">
+              <a:buFont typeface="Arial" panose="020B0604020202020204" pitchFamily="34" charset="0"/>
+              <a:buChar char="•"/>
+            </a:pPr>
+            <a:r>
+              <a:rPr lang="en-US" altLang="zh-CN" sz="2000" dirty="0">
+                <a:latin typeface="微软雅黑" panose="020B0503020204020204" pitchFamily="34" charset="-122"/>
+                <a:ea typeface="微软雅黑" panose="020B0503020204020204" pitchFamily="34" charset="-122"/>
+                <a:cs typeface="微软雅黑" panose="020B0503020204020204" pitchFamily="34" charset="-122"/>
+              </a:rPr>
+              <a:t>Deploy models on semantic segmentation tasks. </a:t>
+            </a:r>
+          </a:p>
+          <a:p>
+            <a:pPr marL="285750" indent="-285750">
+              <a:buFont typeface="Arial" panose="020B0604020202020204" pitchFamily="34" charset="0"/>
+              <a:buChar char="•"/>
+            </a:pPr>
+            <a:endParaRPr lang="en-US" altLang="zh-CN" sz="2000" dirty="0">
+              <a:latin typeface="微软雅黑" panose="020B0503020204020204" pitchFamily="34" charset="-122"/>
+              <a:ea typeface="微软雅黑" panose="020B0503020204020204" pitchFamily="34" charset="-122"/>
+              <a:cs typeface="微软雅黑" panose="020B0503020204020204" pitchFamily="34" charset="-122"/>
+            </a:endParaRPr>
+          </a:p>
+          <a:p>
+            <a:pPr marL="285750" indent="-285750">
+              <a:buFont typeface="Arial" panose="020B0604020202020204" pitchFamily="34" charset="0"/>
+              <a:buChar char="•"/>
+            </a:pPr>
+            <a:r>
+              <a:rPr lang="en-US" altLang="zh-CN" sz="2000" dirty="0">
+                <a:latin typeface="微软雅黑" panose="020B0503020204020204" pitchFamily="34" charset="-122"/>
+                <a:ea typeface="微软雅黑" panose="020B0503020204020204" pitchFamily="34" charset="-122"/>
+                <a:cs typeface="微软雅黑" panose="020B0503020204020204" pitchFamily="34" charset="-122"/>
+              </a:rPr>
+              <a:t>Explore models in </a:t>
+            </a:r>
+            <a:r>
+              <a:rPr lang="en-US" altLang="zh-CN" sz="2000" dirty="0" err="1">
+                <a:latin typeface="微软雅黑" panose="020B0503020204020204" pitchFamily="34" charset="-122"/>
+                <a:ea typeface="微软雅黑" panose="020B0503020204020204" pitchFamily="34" charset="-122"/>
+                <a:cs typeface="微软雅黑" panose="020B0503020204020204" pitchFamily="34" charset="-122"/>
+              </a:rPr>
+              <a:t>SUSTech</a:t>
+            </a:r>
+            <a:r>
+              <a:rPr lang="en-US" altLang="zh-CN" sz="2000" dirty="0">
+                <a:latin typeface="微软雅黑" panose="020B0503020204020204" pitchFamily="34" charset="-122"/>
+                <a:ea typeface="微软雅黑" panose="020B0503020204020204" pitchFamily="34" charset="-122"/>
+                <a:cs typeface="微软雅黑" panose="020B0503020204020204" pitchFamily="34" charset="-122"/>
+              </a:rPr>
+              <a:t> dataset.</a:t>
+            </a:r>
+          </a:p>
+          <a:p>
+            <a:pPr marL="285750" indent="-285750">
+              <a:buFont typeface="Arial" panose="020B0604020202020204" pitchFamily="34" charset="0"/>
+              <a:buChar char="•"/>
+            </a:pPr>
+            <a:endParaRPr lang="en-US" altLang="zh-CN" sz="2000" dirty="0">
+              <a:latin typeface="微软雅黑" panose="020B0503020204020204" pitchFamily="34" charset="-122"/>
+              <a:ea typeface="微软雅黑" panose="020B0503020204020204" pitchFamily="34" charset="-122"/>
+              <a:cs typeface="微软雅黑" panose="020B0503020204020204" pitchFamily="34" charset="-122"/>
+            </a:endParaRPr>
+          </a:p>
+          <a:p>
+            <a:pPr marL="285750" indent="-285750">
+              <a:buFont typeface="Arial" panose="020B0604020202020204" pitchFamily="34" charset="0"/>
+              <a:buChar char="•"/>
+            </a:pPr>
+            <a:r>
+              <a:rPr lang="en-US" altLang="zh-CN" sz="2000" dirty="0">
+                <a:latin typeface="微软雅黑" panose="020B0503020204020204" pitchFamily="34" charset="-122"/>
+                <a:ea typeface="微软雅黑" panose="020B0503020204020204" pitchFamily="34" charset="-122"/>
+                <a:cs typeface="微软雅黑" panose="020B0503020204020204" pitchFamily="34" charset="-122"/>
+              </a:rPr>
+              <a:t>Optimize the architecture of models. </a:t>
+            </a:r>
+          </a:p>
+          <a:p>
+            <a:endParaRPr lang="en-US" altLang="zh-CN" dirty="0">
+              <a:latin typeface="微软雅黑" panose="020B0503020204020204" pitchFamily="34" charset="-122"/>
+              <a:ea typeface="微软雅黑" panose="020B0503020204020204" pitchFamily="34" charset="-122"/>
+              <a:cs typeface="微软雅黑" panose="020B0503020204020204" pitchFamily="34" charset="-122"/>
+            </a:endParaRPr>
+          </a:p>
+          <a:p>
+            <a:endParaRPr lang="en-US" altLang="zh-CN" dirty="0">
+              <a:latin typeface="微软雅黑" panose="020B0503020204020204" pitchFamily="34" charset="-122"/>
+              <a:ea typeface="微软雅黑" panose="020B0503020204020204" pitchFamily="34" charset="-122"/>
+              <a:cs typeface="微软雅黑" panose="020B0503020204020204" pitchFamily="34" charset="-122"/>
+            </a:endParaRPr>
+          </a:p>
+        </p:txBody>
+      </p:sp>
+    </p:spTree>
+    <p:extLst>
+      <p:ext uri="{BB962C8B-B14F-4D97-AF65-F5344CB8AC3E}">
+        <p14:creationId xmlns:p14="http://schemas.microsoft.com/office/powerpoint/2010/main" val="203805915"/>
+      </p:ext>
+    </p:extLst>
+  </p:cSld>
+  <p:clrMapOvr>
+    <a:masterClrMapping/>
+  </p:clrMapOvr>
+  <p:transition spd="slow">
+    <p:push dir="u"/>
+  </p:transition>
+</p:sld>
+</file>
+
+<file path=ppt/slides/slide13.xml><?xml version="1.0" encoding="utf-8"?>
+<p:sld xmlns:a="http://schemas.openxmlformats.org/drawingml/2006/main" xmlns:r="http://schemas.openxmlformats.org/officeDocument/2006/relationships" xmlns:p="http://schemas.openxmlformats.org/presentationml/2006/main">
+  <p:cSld>
+    <p:spTree>
+      <p:nvGrpSpPr>
+        <p:cNvPr id="1" name=""/>
+        <p:cNvGrpSpPr/>
+        <p:nvPr/>
+      </p:nvGrpSpPr>
+      <p:grpSpPr>
+        <a:xfrm>
+          <a:off x="0" y="0"/>
+          <a:ext cx="0" cy="0"/>
+          <a:chOff x="0" y="0"/>
+          <a:chExt cx="0" cy="0"/>
+        </a:xfrm>
+      </p:grpSpPr>
+      <p:sp>
+        <p:nvSpPr>
+          <p:cNvPr id="2" name="标题 1"/>
+          <p:cNvSpPr>
+            <a:spLocks noGrp="1"/>
+          </p:cNvSpPr>
+          <p:nvPr>
+            <p:ph type="ctrTitle"/>
+          </p:nvPr>
+        </p:nvSpPr>
+        <p:spPr>
+          <a:xfrm>
+            <a:off x="0" y="127905"/>
+            <a:ext cx="12192000" cy="579755"/>
+          </a:xfrm>
+        </p:spPr>
+        <p:txBody>
+          <a:bodyPr anchor="ctr" anchorCtr="0">
+            <a:normAutofit/>
+          </a:bodyPr>
+          <a:lstStyle/>
+          <a:p>
+            <a:r>
+              <a:rPr lang="en-US" altLang="zh-CN" sz="3100" b="1" dirty="0">
+                <a:solidFill>
+                  <a:srgbClr val="002060"/>
+                </a:solidFill>
+                <a:latin typeface="Times New Roman" panose="02020603050405020304" charset="0"/>
+                <a:ea typeface="微软雅黑" panose="020B0503020204020204" pitchFamily="34" charset="-122"/>
+                <a:cs typeface="Times New Roman" panose="02020603050405020304" charset="0"/>
+                <a:sym typeface="+mn-ea"/>
+              </a:rPr>
+              <a:t>Task Assignment </a:t>
+            </a:r>
+          </a:p>
+        </p:txBody>
+      </p:sp>
+      <p:sp>
+        <p:nvSpPr>
+          <p:cNvPr id="6" name="矩形 5"/>
+          <p:cNvSpPr/>
+          <p:nvPr/>
+        </p:nvSpPr>
+        <p:spPr>
+          <a:xfrm>
+            <a:off x="-13970" y="707390"/>
+            <a:ext cx="12219940" cy="76200"/>
+          </a:xfrm>
+          <a:prstGeom prst="rect">
+            <a:avLst/>
+          </a:prstGeom>
+          <a:solidFill>
+            <a:srgbClr val="002060">
+              <a:alpha val="97000"/>
+            </a:srgbClr>
+          </a:solidFill>
+          <a:ln>
+            <a:noFill/>
+          </a:ln>
+        </p:spPr>
+        <p:style>
+          <a:lnRef idx="2">
+            <a:schemeClr val="accent1">
+              <a:shade val="50000"/>
+            </a:schemeClr>
+          </a:lnRef>
+          <a:fillRef idx="1">
+            <a:schemeClr val="accent1"/>
+          </a:fillRef>
+          <a:effectRef idx="0">
+            <a:schemeClr val="accent1"/>
+          </a:effectRef>
+          <a:fontRef idx="minor">
+            <a:schemeClr val="lt1"/>
+          </a:fontRef>
+        </p:style>
+        <p:txBody>
+          <a:bodyPr rtlCol="0" anchor="ctr"/>
+          <a:lstStyle/>
+          <a:p>
+            <a:pPr algn="ctr"/>
+            <a:endParaRPr lang="zh-CN" altLang="en-US"/>
+          </a:p>
+        </p:txBody>
+      </p:sp>
+      <p:pic>
+        <p:nvPicPr>
+          <p:cNvPr id="9" name="图片 8" descr="校徽"/>
+          <p:cNvPicPr>
+            <a:picLocks noChangeAspect="1"/>
+          </p:cNvPicPr>
+          <p:nvPr/>
+        </p:nvPicPr>
+        <p:blipFill>
+          <a:blip r:embed="rId2"/>
+          <a:srcRect l="21146" t="9697" r="22583" b="12705"/>
+          <a:stretch>
+            <a:fillRect/>
+          </a:stretch>
+        </p:blipFill>
+        <p:spPr>
+          <a:xfrm>
+            <a:off x="10811510" y="5556250"/>
+            <a:ext cx="1028700" cy="1020445"/>
+          </a:xfrm>
+          <a:prstGeom prst="rect">
+            <a:avLst/>
+          </a:prstGeom>
+        </p:spPr>
+      </p:pic>
+      <p:sp>
+        <p:nvSpPr>
+          <p:cNvPr id="5" name="文本框 4"/>
+          <p:cNvSpPr txBox="1"/>
+          <p:nvPr/>
+        </p:nvSpPr>
+        <p:spPr>
+          <a:xfrm>
+            <a:off x="2042810" y="1287145"/>
+            <a:ext cx="7609190" cy="5078313"/>
+          </a:xfrm>
+          <a:prstGeom prst="rect">
+            <a:avLst/>
+          </a:prstGeom>
+          <a:noFill/>
+        </p:spPr>
+        <p:txBody>
+          <a:bodyPr wrap="square" rtlCol="0">
+            <a:spAutoFit/>
+          </a:bodyPr>
+          <a:lstStyle/>
+          <a:p>
+            <a:pPr indent="-285750">
+              <a:buFont typeface="Arial" panose="020B0604020202020204" pitchFamily="34" charset="0"/>
+              <a:buChar char="•"/>
+            </a:pPr>
+            <a:r>
+              <a:rPr lang="zh-CN" altLang="en-US" b="1" u="sng" dirty="0">
+                <a:solidFill>
+                  <a:srgbClr val="002060"/>
+                </a:solidFill>
+                <a:latin typeface="微软雅黑" panose="020B0503020204020204" pitchFamily="34" charset="-122"/>
+                <a:ea typeface="微软雅黑" panose="020B0503020204020204" pitchFamily="34" charset="-122"/>
+              </a:rPr>
+              <a:t>王浩羽：</a:t>
+            </a:r>
+          </a:p>
+          <a:p>
+            <a:pPr marL="742950" lvl="1" indent="-285750">
+              <a:buFont typeface="Arial" panose="020B0604020202020204" pitchFamily="34" charset="0"/>
+              <a:buChar char="•"/>
+            </a:pPr>
+            <a:r>
+              <a:rPr lang="en-US" altLang="zh-CN" dirty="0">
+                <a:latin typeface="微软雅黑" panose="020B0503020204020204" pitchFamily="34" charset="-122"/>
+                <a:ea typeface="微软雅黑" panose="020B0503020204020204" pitchFamily="34" charset="-122"/>
+                <a:cs typeface="微软雅黑" panose="020B0503020204020204" pitchFamily="34" charset="-122"/>
+              </a:rPr>
+              <a:t>Survey on 2D semantic segmentation</a:t>
+            </a:r>
+          </a:p>
+          <a:p>
+            <a:pPr marL="742950" lvl="1" indent="-285750">
+              <a:buFont typeface="Arial" panose="020B0604020202020204" pitchFamily="34" charset="0"/>
+              <a:buChar char="•"/>
+            </a:pPr>
+            <a:r>
+              <a:rPr lang="en-US" altLang="zh-CN" dirty="0">
+                <a:latin typeface="微软雅黑" panose="020B0503020204020204" pitchFamily="34" charset="-122"/>
+                <a:ea typeface="微软雅黑" panose="020B0503020204020204" pitchFamily="34" charset="-122"/>
+                <a:cs typeface="微软雅黑" panose="020B0503020204020204" pitchFamily="34" charset="-122"/>
+              </a:rPr>
+              <a:t>Construct cityscapes dataset</a:t>
+            </a:r>
+          </a:p>
+          <a:p>
+            <a:pPr lvl="1"/>
+            <a:endParaRPr lang="en-US" altLang="zh-CN" dirty="0">
+              <a:latin typeface="微软雅黑" panose="020B0503020204020204" pitchFamily="34" charset="-122"/>
+              <a:ea typeface="微软雅黑" panose="020B0503020204020204" pitchFamily="34" charset="-122"/>
+              <a:cs typeface="微软雅黑" panose="020B0503020204020204" pitchFamily="34" charset="-122"/>
+            </a:endParaRPr>
+          </a:p>
+          <a:p>
+            <a:pPr indent="-285750">
+              <a:buFont typeface="Arial" panose="020B0604020202020204" pitchFamily="34" charset="0"/>
+              <a:buChar char="•"/>
+            </a:pPr>
+            <a:r>
+              <a:rPr lang="zh-CN" altLang="en-US" b="1" u="sng" dirty="0">
+                <a:solidFill>
+                  <a:srgbClr val="002060"/>
+                </a:solidFill>
+                <a:latin typeface="微软雅黑" panose="020B0503020204020204" pitchFamily="34" charset="-122"/>
+                <a:ea typeface="微软雅黑" panose="020B0503020204020204" pitchFamily="34" charset="-122"/>
+              </a:rPr>
+              <a:t>陈张杰</a:t>
+            </a:r>
+            <a:r>
+              <a:rPr lang="en-US" altLang="zh-CN" b="1" u="sng" dirty="0">
+                <a:solidFill>
+                  <a:srgbClr val="002060"/>
+                </a:solidFill>
+                <a:latin typeface="微软雅黑" panose="020B0503020204020204" pitchFamily="34" charset="-122"/>
+                <a:ea typeface="微软雅黑" panose="020B0503020204020204" pitchFamily="34" charset="-122"/>
+              </a:rPr>
+              <a:t>:</a:t>
+            </a:r>
+          </a:p>
+          <a:p>
+            <a:pPr marL="742950" lvl="1" indent="-285750">
+              <a:buFont typeface="Arial" panose="020B0604020202020204" pitchFamily="34" charset="0"/>
+              <a:buChar char="•"/>
+            </a:pPr>
+            <a:r>
+              <a:rPr lang="en-US" altLang="zh-CN" dirty="0">
+                <a:latin typeface="微软雅黑" panose="020B0503020204020204" pitchFamily="34" charset="-122"/>
+                <a:ea typeface="微软雅黑" panose="020B0503020204020204" pitchFamily="34" charset="-122"/>
+                <a:cs typeface="微软雅黑" panose="020B0503020204020204" pitchFamily="34" charset="-122"/>
+              </a:rPr>
+              <a:t>Train the model</a:t>
+            </a:r>
+          </a:p>
+          <a:p>
+            <a:pPr marL="742950" lvl="1" indent="-285750">
+              <a:buFont typeface="Arial" panose="020B0604020202020204" pitchFamily="34" charset="0"/>
+              <a:buChar char="•"/>
+            </a:pPr>
+            <a:r>
+              <a:rPr lang="en-US" altLang="zh-CN" dirty="0">
+                <a:latin typeface="微软雅黑" panose="020B0503020204020204" pitchFamily="34" charset="-122"/>
+                <a:ea typeface="微软雅黑" panose="020B0503020204020204" pitchFamily="34" charset="-122"/>
+                <a:cs typeface="微软雅黑" panose="020B0503020204020204" pitchFamily="34" charset="-122"/>
+              </a:rPr>
+              <a:t>Evaluate test performance</a:t>
+            </a:r>
+          </a:p>
+          <a:p>
+            <a:pPr marL="742950" lvl="1" indent="-285750">
+              <a:buFont typeface="Arial" panose="020B0604020202020204" pitchFamily="34" charset="0"/>
+              <a:buChar char="•"/>
+            </a:pPr>
+            <a:r>
+              <a:rPr lang="en-US" altLang="zh-CN" dirty="0">
+                <a:latin typeface="微软雅黑" panose="020B0503020204020204" pitchFamily="34" charset="-122"/>
+                <a:ea typeface="微软雅黑" panose="020B0503020204020204" pitchFamily="34" charset="-122"/>
+                <a:cs typeface="微软雅黑" panose="020B0503020204020204" pitchFamily="34" charset="-122"/>
+              </a:rPr>
+              <a:t>Try better Performance</a:t>
+            </a:r>
+          </a:p>
+          <a:p>
+            <a:pPr lvl="1"/>
+            <a:endParaRPr lang="en-US" altLang="zh-CN" dirty="0">
+              <a:latin typeface="微软雅黑" panose="020B0503020204020204" pitchFamily="34" charset="-122"/>
+              <a:ea typeface="微软雅黑" panose="020B0503020204020204" pitchFamily="34" charset="-122"/>
+              <a:cs typeface="微软雅黑" panose="020B0503020204020204" pitchFamily="34" charset="-122"/>
+            </a:endParaRPr>
+          </a:p>
+          <a:p>
+            <a:pPr indent="-285750">
+              <a:buFont typeface="Arial" panose="020B0604020202020204" pitchFamily="34" charset="0"/>
+              <a:buChar char="•"/>
+            </a:pPr>
+            <a:r>
+              <a:rPr lang="zh-CN" altLang="en-US" b="1" u="sng" dirty="0">
+                <a:solidFill>
+                  <a:srgbClr val="002060"/>
+                </a:solidFill>
+                <a:latin typeface="微软雅黑" panose="020B0503020204020204" pitchFamily="34" charset="-122"/>
+                <a:ea typeface="微软雅黑" panose="020B0503020204020204" pitchFamily="34" charset="-122"/>
+              </a:rPr>
+              <a:t>张旭东</a:t>
+            </a:r>
+            <a:r>
+              <a:rPr lang="en-US" altLang="zh-CN" b="1" u="sng" dirty="0">
+                <a:solidFill>
+                  <a:srgbClr val="002060"/>
+                </a:solidFill>
+                <a:latin typeface="微软雅黑" panose="020B0503020204020204" pitchFamily="34" charset="-122"/>
+                <a:ea typeface="微软雅黑" panose="020B0503020204020204" pitchFamily="34" charset="-122"/>
+              </a:rPr>
+              <a:t>:</a:t>
+            </a:r>
+          </a:p>
+          <a:p>
+            <a:pPr marL="742950" lvl="1" indent="-285750">
+              <a:buFont typeface="Arial" panose="020B0604020202020204" pitchFamily="34" charset="0"/>
+              <a:buChar char="•"/>
+            </a:pPr>
+            <a:r>
+              <a:rPr lang="en-US" altLang="zh-CN" dirty="0">
+                <a:latin typeface="微软雅黑" panose="020B0503020204020204" pitchFamily="34" charset="-122"/>
+                <a:ea typeface="微软雅黑" panose="020B0503020204020204" pitchFamily="34" charset="-122"/>
+                <a:cs typeface="微软雅黑" panose="020B0503020204020204" pitchFamily="34" charset="-122"/>
+              </a:rPr>
+              <a:t>Choose model and estimate memory consumption</a:t>
+            </a:r>
+          </a:p>
+          <a:p>
+            <a:pPr marL="742950" lvl="1" indent="-285750">
+              <a:buFont typeface="Arial" panose="020B0604020202020204" pitchFamily="34" charset="0"/>
+              <a:buChar char="•"/>
+            </a:pPr>
+            <a:r>
+              <a:rPr lang="en-US" altLang="zh-CN" dirty="0">
+                <a:latin typeface="微软雅黑" panose="020B0503020204020204" pitchFamily="34" charset="-122"/>
+                <a:ea typeface="微软雅黑" panose="020B0503020204020204" pitchFamily="34" charset="-122"/>
+                <a:cs typeface="微软雅黑" panose="020B0503020204020204" pitchFamily="34" charset="-122"/>
+              </a:rPr>
+              <a:t>Evaluate test performance</a:t>
+            </a:r>
+          </a:p>
+          <a:p>
+            <a:pPr marL="742950" lvl="1" indent="-285750">
+              <a:buFont typeface="Arial" panose="020B0604020202020204" pitchFamily="34" charset="0"/>
+              <a:buChar char="•"/>
+            </a:pPr>
+            <a:r>
+              <a:rPr lang="en-US" altLang="zh-CN" dirty="0">
+                <a:latin typeface="微软雅黑" panose="020B0503020204020204" pitchFamily="34" charset="-122"/>
+                <a:ea typeface="微软雅黑" panose="020B0503020204020204" pitchFamily="34" charset="-122"/>
+                <a:cs typeface="微软雅黑" panose="020B0503020204020204" pitchFamily="34" charset="-122"/>
+              </a:rPr>
+              <a:t>Try better Performance</a:t>
+            </a:r>
+          </a:p>
+          <a:p>
+            <a:pPr lvl="1"/>
+            <a:endParaRPr lang="en-US" altLang="zh-CN" dirty="0">
+              <a:latin typeface="微软雅黑" panose="020B0503020204020204" pitchFamily="34" charset="-122"/>
+              <a:ea typeface="微软雅黑" panose="020B0503020204020204" pitchFamily="34" charset="-122"/>
+              <a:cs typeface="微软雅黑" panose="020B0503020204020204" pitchFamily="34" charset="-122"/>
+            </a:endParaRPr>
+          </a:p>
+          <a:p>
+            <a:pPr marL="285750" indent="-285750">
+              <a:buFont typeface="Arial" panose="020B0604020202020204" pitchFamily="34" charset="0"/>
+              <a:buChar char="•"/>
+            </a:pPr>
+            <a:r>
+              <a:rPr lang="zh-CN" altLang="en-US" b="1" u="sng" dirty="0">
+                <a:solidFill>
+                  <a:srgbClr val="002060"/>
+                </a:solidFill>
+                <a:latin typeface="微软雅黑" panose="020B0503020204020204" pitchFamily="34" charset="-122"/>
+                <a:ea typeface="微软雅黑" panose="020B0503020204020204" pitchFamily="34" charset="-122"/>
+              </a:rPr>
+              <a:t>李宇轩</a:t>
+            </a:r>
+            <a:r>
+              <a:rPr lang="en-US" altLang="zh-CN" b="1" u="sng" dirty="0">
+                <a:solidFill>
+                  <a:srgbClr val="002060"/>
+                </a:solidFill>
+                <a:latin typeface="微软雅黑" panose="020B0503020204020204" pitchFamily="34" charset="-122"/>
+                <a:ea typeface="微软雅黑" panose="020B0503020204020204" pitchFamily="34" charset="-122"/>
+              </a:rPr>
+              <a:t>:</a:t>
+            </a:r>
+          </a:p>
+          <a:p>
+            <a:pPr marL="742950" lvl="1" indent="-285750">
+              <a:buFont typeface="Arial" panose="020B0604020202020204" pitchFamily="34" charset="0"/>
+              <a:buChar char="•"/>
+            </a:pPr>
+            <a:r>
+              <a:rPr lang="en-US" altLang="zh-CN" dirty="0">
+                <a:latin typeface="微软雅黑" panose="020B0503020204020204" pitchFamily="34" charset="-122"/>
+                <a:ea typeface="微软雅黑" panose="020B0503020204020204" pitchFamily="34" charset="-122"/>
+                <a:cs typeface="微软雅黑" panose="020B0503020204020204" pitchFamily="34" charset="-122"/>
+              </a:rPr>
+              <a:t>Construct self-sampled </a:t>
+            </a:r>
+            <a:r>
+              <a:rPr lang="en-US" altLang="zh-CN" dirty="0" err="1">
+                <a:latin typeface="微软雅黑" panose="020B0503020204020204" pitchFamily="34" charset="-122"/>
+                <a:ea typeface="微软雅黑" panose="020B0503020204020204" pitchFamily="34" charset="-122"/>
+                <a:cs typeface="微软雅黑" panose="020B0503020204020204" pitchFamily="34" charset="-122"/>
+              </a:rPr>
+              <a:t>SUSTech</a:t>
+            </a:r>
+            <a:r>
+              <a:rPr lang="en-US" altLang="zh-CN" dirty="0">
+                <a:latin typeface="微软雅黑" panose="020B0503020204020204" pitchFamily="34" charset="-122"/>
+                <a:ea typeface="微软雅黑" panose="020B0503020204020204" pitchFamily="34" charset="-122"/>
+                <a:cs typeface="微软雅黑" panose="020B0503020204020204" pitchFamily="34" charset="-122"/>
+              </a:rPr>
+              <a:t> dataset</a:t>
+            </a:r>
+          </a:p>
+          <a:p>
+            <a:pPr marL="742950" lvl="1" indent="-285750">
+              <a:buFont typeface="Arial" panose="020B0604020202020204" pitchFamily="34" charset="0"/>
+              <a:buChar char="•"/>
+            </a:pPr>
+            <a:r>
+              <a:rPr lang="en-US" altLang="zh-CN" dirty="0">
+                <a:latin typeface="微软雅黑" panose="020B0503020204020204" pitchFamily="34" charset="-122"/>
+                <a:ea typeface="微软雅黑" panose="020B0503020204020204" pitchFamily="34" charset="-122"/>
+                <a:cs typeface="微软雅黑" panose="020B0503020204020204" pitchFamily="34" charset="-122"/>
+              </a:rPr>
+              <a:t>Data preprocessing for </a:t>
+            </a:r>
+            <a:r>
+              <a:rPr lang="en-US" altLang="zh-CN" dirty="0" err="1">
+                <a:latin typeface="微软雅黑" panose="020B0503020204020204" pitchFamily="34" charset="-122"/>
+                <a:ea typeface="微软雅黑" panose="020B0503020204020204" pitchFamily="34" charset="-122"/>
+                <a:cs typeface="微软雅黑" panose="020B0503020204020204" pitchFamily="34" charset="-122"/>
+              </a:rPr>
+              <a:t>SUSTech</a:t>
+            </a:r>
+            <a:r>
+              <a:rPr lang="en-US" altLang="zh-CN" dirty="0">
+                <a:latin typeface="微软雅黑" panose="020B0503020204020204" pitchFamily="34" charset="-122"/>
+                <a:ea typeface="微软雅黑" panose="020B0503020204020204" pitchFamily="34" charset="-122"/>
+                <a:cs typeface="微软雅黑" panose="020B0503020204020204" pitchFamily="34" charset="-122"/>
+              </a:rPr>
+              <a:t> dataset</a:t>
+            </a:r>
+          </a:p>
+          <a:p>
+            <a:pPr marL="742950" lvl="1" indent="-285750">
+              <a:buFont typeface="Arial" panose="020B0604020202020204" pitchFamily="34" charset="0"/>
+              <a:buChar char="•"/>
+            </a:pPr>
+            <a:r>
+              <a:rPr lang="en-US" altLang="zh-CN" dirty="0">
+                <a:latin typeface="微软雅黑" panose="020B0503020204020204" pitchFamily="34" charset="-122"/>
+                <a:ea typeface="微软雅黑" panose="020B0503020204020204" pitchFamily="34" charset="-122"/>
+                <a:cs typeface="微软雅黑" panose="020B0503020204020204" pitchFamily="34" charset="-122"/>
+              </a:rPr>
+              <a:t>Try better Performance</a:t>
+            </a:r>
+            <a:endParaRPr lang="zh-CN" altLang="en-US" dirty="0">
+              <a:latin typeface="微软雅黑" panose="020B0503020204020204" pitchFamily="34" charset="-122"/>
+              <a:ea typeface="微软雅黑" panose="020B0503020204020204" pitchFamily="34" charset="-122"/>
+              <a:cs typeface="微软雅黑" panose="020B0503020204020204" pitchFamily="34" charset="-122"/>
+            </a:endParaRPr>
+          </a:p>
+        </p:txBody>
+      </p:sp>
+    </p:spTree>
+    <p:extLst>
+      <p:ext uri="{BB962C8B-B14F-4D97-AF65-F5344CB8AC3E}">
+        <p14:creationId xmlns:p14="http://schemas.microsoft.com/office/powerpoint/2010/main" val="3110451033"/>
+      </p:ext>
+    </p:extLst>
+  </p:cSld>
+  <p:clrMapOvr>
+    <a:masterClrMapping/>
+  </p:clrMapOvr>
+  <p:transition spd="slow">
+    <p:push dir="u"/>
+  </p:transition>
+</p:sld>
+</file>
+
+<file path=ppt/slides/slide14.xml><?xml version="1.0" encoding="utf-8"?>
+<p:sld xmlns:a="http://schemas.openxmlformats.org/drawingml/2006/main" xmlns:r="http://schemas.openxmlformats.org/officeDocument/2006/relationships" xmlns:p="http://schemas.openxmlformats.org/presentationml/2006/main">
+  <p:cSld>
+    <p:spTree>
+      <p:nvGrpSpPr>
+        <p:cNvPr id="1" name=""/>
+        <p:cNvGrpSpPr/>
+        <p:nvPr/>
+      </p:nvGrpSpPr>
+      <p:grpSpPr>
+        <a:xfrm>
+          <a:off x="0" y="0"/>
+          <a:ext cx="0" cy="0"/>
+          <a:chOff x="0" y="0"/>
+          <a:chExt cx="0" cy="0"/>
+        </a:xfrm>
+      </p:grpSpPr>
+      <p:sp>
+        <p:nvSpPr>
+          <p:cNvPr id="2" name="标题 1"/>
+          <p:cNvSpPr>
+            <a:spLocks noGrp="1"/>
+          </p:cNvSpPr>
+          <p:nvPr>
+            <p:ph type="ctrTitle"/>
+          </p:nvPr>
+        </p:nvSpPr>
+        <p:spPr>
+          <a:xfrm>
+            <a:off x="0" y="127905"/>
+            <a:ext cx="12192000" cy="579755"/>
+          </a:xfrm>
+        </p:spPr>
+        <p:txBody>
+          <a:bodyPr anchor="ctr" anchorCtr="0">
+            <a:normAutofit/>
+          </a:bodyPr>
+          <a:lstStyle/>
+          <a:p>
+            <a:r>
+              <a:rPr lang="en-US" altLang="zh-CN" sz="3100" b="1" dirty="0">
+                <a:solidFill>
+                  <a:srgbClr val="002060"/>
+                </a:solidFill>
+                <a:latin typeface="Times New Roman" panose="02020603050405020304" charset="0"/>
+                <a:ea typeface="微软雅黑" panose="020B0503020204020204" pitchFamily="34" charset="-122"/>
+                <a:cs typeface="Times New Roman" panose="02020603050405020304" charset="0"/>
+                <a:sym typeface="+mn-ea"/>
+              </a:rPr>
+              <a:t>Project Schedule</a:t>
+            </a:r>
+          </a:p>
+        </p:txBody>
+      </p:sp>
+      <p:sp>
+        <p:nvSpPr>
+          <p:cNvPr id="6" name="矩形 5"/>
+          <p:cNvSpPr/>
+          <p:nvPr/>
+        </p:nvSpPr>
+        <p:spPr>
+          <a:xfrm>
+            <a:off x="-13970" y="707390"/>
+            <a:ext cx="12219940" cy="76200"/>
+          </a:xfrm>
+          <a:prstGeom prst="rect">
+            <a:avLst/>
+          </a:prstGeom>
+          <a:solidFill>
+            <a:srgbClr val="002060">
+              <a:alpha val="97000"/>
+            </a:srgbClr>
+          </a:solidFill>
+          <a:ln>
+            <a:noFill/>
+          </a:ln>
+        </p:spPr>
+        <p:style>
+          <a:lnRef idx="2">
+            <a:schemeClr val="accent1">
+              <a:shade val="50000"/>
+            </a:schemeClr>
+          </a:lnRef>
+          <a:fillRef idx="1">
+            <a:schemeClr val="accent1"/>
+          </a:fillRef>
+          <a:effectRef idx="0">
+            <a:schemeClr val="accent1"/>
+          </a:effectRef>
+          <a:fontRef idx="minor">
+            <a:schemeClr val="lt1"/>
+          </a:fontRef>
+        </p:style>
+        <p:txBody>
+          <a:bodyPr rtlCol="0" anchor="ctr"/>
+          <a:lstStyle/>
+          <a:p>
+            <a:pPr algn="ctr"/>
+            <a:endParaRPr lang="zh-CN" altLang="en-US"/>
+          </a:p>
+        </p:txBody>
+      </p:sp>
+      <p:pic>
+        <p:nvPicPr>
+          <p:cNvPr id="9" name="图片 8" descr="校徽"/>
+          <p:cNvPicPr>
+            <a:picLocks noChangeAspect="1"/>
+          </p:cNvPicPr>
+          <p:nvPr/>
+        </p:nvPicPr>
+        <p:blipFill>
+          <a:blip r:embed="rId2"/>
+          <a:srcRect l="21146" t="9697" r="22583" b="12705"/>
+          <a:stretch>
+            <a:fillRect/>
+          </a:stretch>
+        </p:blipFill>
+        <p:spPr>
+          <a:xfrm>
+            <a:off x="10811510" y="5556250"/>
+            <a:ext cx="1028700" cy="1020445"/>
+          </a:xfrm>
+          <a:prstGeom prst="rect">
+            <a:avLst/>
+          </a:prstGeom>
+        </p:spPr>
+      </p:pic>
+      <p:pic>
+        <p:nvPicPr>
+          <p:cNvPr id="4" name="图片 3">
+            <a:extLst>
+              <a:ext uri="{FF2B5EF4-FFF2-40B4-BE49-F238E27FC236}">
+                <a16:creationId xmlns:a16="http://schemas.microsoft.com/office/drawing/2014/main" id="{56027C00-49AC-5573-65D6-5FE25416ACB7}"/>
+              </a:ext>
+            </a:extLst>
+          </p:cNvPr>
+          <p:cNvPicPr>
+            <a:picLocks noChangeAspect="1"/>
+          </p:cNvPicPr>
+          <p:nvPr/>
+        </p:nvPicPr>
+        <p:blipFill>
+          <a:blip r:embed="rId3"/>
+          <a:stretch>
+            <a:fillRect/>
+          </a:stretch>
+        </p:blipFill>
+        <p:spPr>
+          <a:xfrm>
+            <a:off x="1325466" y="1494147"/>
+            <a:ext cx="9541067" cy="4183743"/>
+          </a:xfrm>
+          <a:prstGeom prst="rect">
+            <a:avLst/>
+          </a:prstGeom>
+        </p:spPr>
+      </p:pic>
+    </p:spTree>
+    <p:extLst>
+      <p:ext uri="{BB962C8B-B14F-4D97-AF65-F5344CB8AC3E}">
+        <p14:creationId xmlns:p14="http://schemas.microsoft.com/office/powerpoint/2010/main" val="1941561364"/>
+      </p:ext>
+    </p:extLst>
+  </p:cSld>
+  <p:clrMapOvr>
+    <a:masterClrMapping/>
+  </p:clrMapOvr>
+  <p:transition spd="slow">
+    <p:push dir="u"/>
+  </p:transition>
+</p:sld>
+</file>
+
+<file path=ppt/slides/slide15.xml><?xml version="1.0" encoding="utf-8"?>
+<p:sld xmlns:a="http://schemas.openxmlformats.org/drawingml/2006/main" xmlns:r="http://schemas.openxmlformats.org/officeDocument/2006/relationships" xmlns:p="http://schemas.openxmlformats.org/presentationml/2006/main">
+  <p:cSld>
+    <p:spTree>
+      <p:nvGrpSpPr>
+        <p:cNvPr id="1" name=""/>
+        <p:cNvGrpSpPr/>
+        <p:nvPr/>
+      </p:nvGrpSpPr>
+      <p:grpSpPr>
+        <a:xfrm>
+          <a:off x="0" y="0"/>
+          <a:ext cx="0" cy="0"/>
+          <a:chOff x="0" y="0"/>
+          <a:chExt cx="0" cy="0"/>
+        </a:xfrm>
+      </p:grpSpPr>
+      <p:sp>
+        <p:nvSpPr>
+          <p:cNvPr id="2" name="标题 1"/>
+          <p:cNvSpPr>
+            <a:spLocks noGrp="1"/>
+          </p:cNvSpPr>
+          <p:nvPr>
+            <p:ph type="ctrTitle"/>
+          </p:nvPr>
+        </p:nvSpPr>
+        <p:spPr>
+          <a:xfrm>
+            <a:off x="3002295" y="127905"/>
+            <a:ext cx="6389370" cy="579755"/>
+          </a:xfrm>
+        </p:spPr>
+        <p:txBody>
+          <a:bodyPr anchor="ctr" anchorCtr="0">
+            <a:noAutofit/>
+          </a:bodyPr>
+          <a:lstStyle/>
+          <a:p>
+            <a:r>
+              <a:rPr lang="en-US" altLang="zh-CN" sz="3100" b="1" dirty="0">
+                <a:solidFill>
+                  <a:srgbClr val="002060"/>
+                </a:solidFill>
+                <a:latin typeface="Times New Roman" panose="02020603050405020304" charset="0"/>
+                <a:ea typeface="微软雅黑" panose="020B0503020204020204" pitchFamily="34" charset="-122"/>
+                <a:cs typeface="Times New Roman" panose="02020603050405020304" charset="0"/>
+                <a:sym typeface="+mn-ea"/>
+              </a:rPr>
+              <a:t>Reference</a:t>
+            </a:r>
+          </a:p>
+        </p:txBody>
+      </p:sp>
+      <p:sp>
+        <p:nvSpPr>
+          <p:cNvPr id="6" name="矩形 5"/>
+          <p:cNvSpPr/>
+          <p:nvPr/>
+        </p:nvSpPr>
+        <p:spPr>
+          <a:xfrm>
+            <a:off x="-13970" y="707390"/>
+            <a:ext cx="12219940" cy="76200"/>
+          </a:xfrm>
+          <a:prstGeom prst="rect">
+            <a:avLst/>
+          </a:prstGeom>
+          <a:solidFill>
+            <a:srgbClr val="002060">
+              <a:alpha val="97000"/>
+            </a:srgbClr>
+          </a:solidFill>
+          <a:ln>
+            <a:noFill/>
+          </a:ln>
+        </p:spPr>
+        <p:style>
+          <a:lnRef idx="2">
+            <a:schemeClr val="accent1">
+              <a:shade val="50000"/>
+            </a:schemeClr>
+          </a:lnRef>
+          <a:fillRef idx="1">
+            <a:schemeClr val="accent1"/>
+          </a:fillRef>
+          <a:effectRef idx="0">
+            <a:schemeClr val="accent1"/>
+          </a:effectRef>
+          <a:fontRef idx="minor">
+            <a:schemeClr val="lt1"/>
+          </a:fontRef>
+        </p:style>
+        <p:txBody>
+          <a:bodyPr rtlCol="0" anchor="ctr"/>
+          <a:lstStyle/>
+          <a:p>
+            <a:pPr algn="ctr"/>
+            <a:endParaRPr lang="zh-CN" altLang="en-US"/>
+          </a:p>
+        </p:txBody>
+      </p:sp>
+      <p:pic>
+        <p:nvPicPr>
+          <p:cNvPr id="9" name="图片 8" descr="校徽"/>
+          <p:cNvPicPr>
+            <a:picLocks noChangeAspect="1"/>
+          </p:cNvPicPr>
+          <p:nvPr/>
+        </p:nvPicPr>
+        <p:blipFill>
+          <a:blip r:embed="rId2"/>
+          <a:srcRect l="21146" t="9697" r="22583" b="12705"/>
+          <a:stretch>
+            <a:fillRect/>
+          </a:stretch>
+        </p:blipFill>
+        <p:spPr>
+          <a:xfrm>
+            <a:off x="10811510" y="5556250"/>
+            <a:ext cx="1028700" cy="1020445"/>
+          </a:xfrm>
+          <a:prstGeom prst="rect">
+            <a:avLst/>
+          </a:prstGeom>
+        </p:spPr>
+      </p:pic>
+      <p:sp>
+        <p:nvSpPr>
+          <p:cNvPr id="4" name="矩形 3"/>
+          <p:cNvSpPr/>
+          <p:nvPr/>
+        </p:nvSpPr>
+        <p:spPr>
+          <a:xfrm>
+            <a:off x="1442476" y="2058421"/>
+            <a:ext cx="9307047" cy="2585323"/>
+          </a:xfrm>
+          <a:prstGeom prst="rect">
+            <a:avLst/>
+          </a:prstGeom>
+        </p:spPr>
+        <p:txBody>
+          <a:bodyPr wrap="square">
+            <a:spAutoFit/>
+          </a:bodyPr>
+          <a:lstStyle/>
+          <a:p>
+            <a:r>
+              <a:rPr lang="en-US" altLang="zh-CN" dirty="0"/>
+              <a:t>[1]  Olaf </a:t>
+            </a:r>
+            <a:r>
+              <a:rPr lang="en-US" altLang="zh-CN" dirty="0" err="1"/>
+              <a:t>Ronneberger</a:t>
+            </a:r>
+            <a:r>
+              <a:rPr lang="en-US" altLang="zh-CN" dirty="0"/>
+              <a:t>, Philipp Fisher and M. </a:t>
+            </a:r>
+            <a:r>
+              <a:rPr lang="en-US" altLang="zh-CN" dirty="0" err="1"/>
+              <a:t>Kozubek</a:t>
+            </a:r>
+            <a:r>
+              <a:rPr lang="en-US" altLang="zh-CN" dirty="0"/>
+              <a:t>. U-Net: Convolutional Networks for Biomedical Image Segmentation[J] .</a:t>
+            </a:r>
+            <a:r>
+              <a:rPr lang="en-US" altLang="zh-CN" dirty="0" err="1"/>
+              <a:t>arXiv</a:t>
+            </a:r>
+            <a:r>
+              <a:rPr lang="en-US" altLang="zh-CN" dirty="0"/>
+              <a:t> e-prints arXiv:1505.04597,2015.</a:t>
+            </a:r>
+          </a:p>
+          <a:p>
+            <a:endParaRPr lang="en-US" altLang="zh-CN" dirty="0"/>
+          </a:p>
+          <a:p>
+            <a:r>
+              <a:rPr lang="en-US" altLang="zh-CN" dirty="0"/>
+              <a:t>[2]  </a:t>
+            </a:r>
+            <a:r>
+              <a:rPr lang="en-US" altLang="zh-CN" dirty="0" err="1"/>
+              <a:t>Prannay</a:t>
+            </a:r>
+            <a:r>
+              <a:rPr lang="en-US" altLang="zh-CN" dirty="0"/>
+              <a:t> Khosla, Piotr </a:t>
+            </a:r>
+            <a:r>
+              <a:rPr lang="en-US" altLang="zh-CN" dirty="0" err="1"/>
+              <a:t>Teterwak</a:t>
+            </a:r>
+            <a:r>
+              <a:rPr lang="en-US" altLang="zh-CN" dirty="0"/>
+              <a:t> and Chen Wang. Supervised Contrastive Learning[J] .</a:t>
+            </a:r>
+            <a:r>
+              <a:rPr lang="en-US" altLang="zh-CN" dirty="0" err="1"/>
+              <a:t>arXiv</a:t>
+            </a:r>
+            <a:r>
+              <a:rPr lang="en-US" altLang="zh-CN" dirty="0"/>
+              <a:t> e-prints arXiv:2004.11362,2021.</a:t>
+            </a:r>
+          </a:p>
+          <a:p>
+            <a:endParaRPr lang="en-US" altLang="zh-CN" dirty="0"/>
+          </a:p>
+          <a:p>
+            <a:r>
+              <a:rPr lang="en-US" altLang="zh-CN" dirty="0"/>
+              <a:t>[3]  </a:t>
+            </a:r>
+            <a:r>
+              <a:rPr lang="en-US" altLang="zh-CN" dirty="0" err="1"/>
+              <a:t>Xudong</a:t>
+            </a:r>
+            <a:r>
+              <a:rPr lang="en-US" altLang="zh-CN" dirty="0"/>
+              <a:t> Wang, Rohit Girdhar, Stella X. Yu, and Ishan Misra. Cut and Learn for Unsupervised Object Detection and Instance Segmentation[J]. </a:t>
+            </a:r>
+            <a:r>
+              <a:rPr lang="en-US" altLang="zh-CN" dirty="0" err="1"/>
+              <a:t>arXiv</a:t>
+            </a:r>
+            <a:r>
+              <a:rPr lang="en-US" altLang="zh-CN" dirty="0"/>
+              <a:t> pre-prints arXiv:2301.11320,2023.</a:t>
+            </a:r>
+          </a:p>
+        </p:txBody>
+      </p:sp>
     </p:spTree>
   </p:cSld>
   <p:clrMapOvr>
@@ -3530,7 +6132,146 @@
 </p:sld>
 </file>
 
-<file path=ppt/slides/slide12.xml><?xml version="1.0" encoding="utf-8"?>
+<file path=ppt/slides/slide16.xml><?xml version="1.0" encoding="utf-8"?>
+<p:sld xmlns:a="http://schemas.openxmlformats.org/drawingml/2006/main" xmlns:r="http://schemas.openxmlformats.org/officeDocument/2006/relationships" xmlns:p="http://schemas.openxmlformats.org/presentationml/2006/main">
+  <p:cSld>
+    <p:spTree>
+      <p:nvGrpSpPr>
+        <p:cNvPr id="1" name=""/>
+        <p:cNvGrpSpPr/>
+        <p:nvPr/>
+      </p:nvGrpSpPr>
+      <p:grpSpPr>
+        <a:xfrm>
+          <a:off x="0" y="0"/>
+          <a:ext cx="0" cy="0"/>
+          <a:chOff x="0" y="0"/>
+          <a:chExt cx="0" cy="0"/>
+        </a:xfrm>
+      </p:grpSpPr>
+      <p:sp>
+        <p:nvSpPr>
+          <p:cNvPr id="2" name="标题 1"/>
+          <p:cNvSpPr>
+            <a:spLocks noGrp="1"/>
+          </p:cNvSpPr>
+          <p:nvPr>
+            <p:ph type="ctrTitle"/>
+          </p:nvPr>
+        </p:nvSpPr>
+        <p:spPr>
+          <a:xfrm>
+            <a:off x="3182564" y="2094249"/>
+            <a:ext cx="5826868" cy="1006429"/>
+          </a:xfrm>
+        </p:spPr>
+        <p:txBody>
+          <a:bodyPr wrap="square">
+            <a:spAutoFit/>
+          </a:bodyPr>
+          <a:lstStyle/>
+          <a:p>
+            <a:r>
+              <a:rPr lang="en-US" altLang="zh-CN" sz="6600" dirty="0">
+                <a:latin typeface="Times New Roman" panose="02020603050405020304" charset="0"/>
+                <a:ea typeface="微软雅黑" panose="020B0503020204020204" pitchFamily="34" charset="-122"/>
+                <a:cs typeface="Times New Roman" panose="02020603050405020304" charset="0"/>
+              </a:rPr>
+              <a:t>THANK YOU!</a:t>
+            </a:r>
+            <a:endParaRPr lang="zh-CN" altLang="en-US" sz="6600" dirty="0">
+              <a:latin typeface="Times New Roman" panose="02020603050405020304" charset="0"/>
+              <a:ea typeface="微软雅黑" panose="020B0503020204020204" pitchFamily="34" charset="-122"/>
+              <a:cs typeface="Times New Roman" panose="02020603050405020304" charset="0"/>
+            </a:endParaRPr>
+          </a:p>
+        </p:txBody>
+      </p:sp>
+      <p:pic>
+        <p:nvPicPr>
+          <p:cNvPr id="9" name="图片 8" descr="校徽"/>
+          <p:cNvPicPr>
+            <a:picLocks noChangeAspect="1"/>
+          </p:cNvPicPr>
+          <p:nvPr/>
+        </p:nvPicPr>
+        <p:blipFill>
+          <a:blip r:embed="rId2"/>
+          <a:srcRect l="21146" t="9697" r="22583" b="12705"/>
+          <a:stretch>
+            <a:fillRect/>
+          </a:stretch>
+        </p:blipFill>
+        <p:spPr>
+          <a:xfrm>
+            <a:off x="10811510" y="5556250"/>
+            <a:ext cx="1028700" cy="1020445"/>
+          </a:xfrm>
+          <a:prstGeom prst="rect">
+            <a:avLst/>
+          </a:prstGeom>
+        </p:spPr>
+      </p:pic>
+      <p:sp>
+        <p:nvSpPr>
+          <p:cNvPr id="6" name="矩形 5"/>
+          <p:cNvSpPr/>
+          <p:nvPr/>
+        </p:nvSpPr>
+        <p:spPr>
+          <a:xfrm flipV="1">
+            <a:off x="3113721" y="3024478"/>
+            <a:ext cx="5964555" cy="76200"/>
+          </a:xfrm>
+          <a:prstGeom prst="rect">
+            <a:avLst/>
+          </a:prstGeom>
+          <a:solidFill>
+            <a:srgbClr val="002060">
+              <a:alpha val="97000"/>
+            </a:srgbClr>
+          </a:solidFill>
+          <a:ln>
+            <a:noFill/>
+          </a:ln>
+        </p:spPr>
+        <p:style>
+          <a:lnRef idx="2">
+            <a:schemeClr val="accent1">
+              <a:shade val="50000"/>
+            </a:schemeClr>
+          </a:lnRef>
+          <a:fillRef idx="1">
+            <a:schemeClr val="accent1"/>
+          </a:fillRef>
+          <a:effectRef idx="0">
+            <a:schemeClr val="accent1"/>
+          </a:effectRef>
+          <a:fontRef idx="minor">
+            <a:schemeClr val="lt1"/>
+          </a:fontRef>
+        </p:style>
+        <p:txBody>
+          <a:bodyPr rtlCol="0" anchor="ctr"/>
+          <a:lstStyle/>
+          <a:p>
+            <a:pPr algn="ctr"/>
+            <a:endParaRPr lang="zh-CN" altLang="en-US"/>
+          </a:p>
+        </p:txBody>
+      </p:sp>
+    </p:spTree>
+  </p:cSld>
+  <p:clrMapOvr>
+    <a:masterClrMapping/>
+  </p:clrMapOvr>
+  <p:transition spd="slow">
+    <p:push dir="u"/>
+  </p:transition>
+</p:sld>
+</file>
+
+<file path=ppt/slides/slide17.xml><?xml version="1.0" encoding="utf-8"?>
 <p:sld xmlns:a="http://schemas.openxmlformats.org/drawingml/2006/main" xmlns:r="http://schemas.openxmlformats.org/officeDocument/2006/relationships" xmlns:p="http://schemas.openxmlformats.org/presentationml/2006/main" show="0">
   <p:cSld>
     <p:spTree>
@@ -3689,7 +6430,7 @@
                 <a:cs typeface="微软雅黑" panose="020B0503020204020204" pitchFamily="34" charset="-122"/>
                 <a:sym typeface="+mn-ea"/>
               </a:rPr>
-              <a:t>强调文字</a:t>
+              <a:t>强调</a:t>
             </a:r>
             <a:endParaRPr lang="en-US" altLang="zh-CN" b="1" u="sng" dirty="0">
               <a:solidFill>
@@ -3801,8 +6542,8 @@
         </p:nvSpPr>
         <p:spPr>
           <a:xfrm>
-            <a:off x="579506" y="943206"/>
-            <a:ext cx="7860030" cy="5150449"/>
+            <a:off x="1261316" y="1143521"/>
+            <a:ext cx="7860030" cy="4922951"/>
           </a:xfrm>
           <a:prstGeom prst="rect">
             <a:avLst/>
@@ -3840,7 +6581,7 @@
               <a:buChar char="•"/>
             </a:pPr>
             <a:r>
-              <a:rPr lang="en-US" altLang="zh-CN" sz="2400" b="1" dirty="0">
+              <a:rPr lang="en-US" altLang="zh-CN" sz="2000" b="1" dirty="0">
                 <a:latin typeface="Times New Roman" panose="02020603050405020304" charset="0"/>
                 <a:ea typeface="微软雅黑" panose="020B0503020204020204" pitchFamily="34" charset="-122"/>
                 <a:cs typeface="Times New Roman" panose="02020603050405020304" charset="0"/>
@@ -3857,7 +6598,7 @@
               <a:buChar char="•"/>
             </a:pPr>
             <a:r>
-              <a:rPr lang="en-US" altLang="zh-CN" sz="2400" b="1" dirty="0">
+              <a:rPr lang="en-US" altLang="zh-CN" sz="2000" b="1" dirty="0">
                 <a:latin typeface="Times New Roman" panose="02020603050405020304" charset="0"/>
                 <a:ea typeface="微软雅黑" panose="020B0503020204020204" pitchFamily="34" charset="-122"/>
                 <a:cs typeface="Times New Roman" panose="02020603050405020304" charset="0"/>
@@ -3874,7 +6615,7 @@
               <a:buChar char="•"/>
             </a:pPr>
             <a:r>
-              <a:rPr lang="en-US" altLang="zh-CN" sz="2400" b="1" dirty="0">
+              <a:rPr lang="en-US" altLang="zh-CN" sz="2000" b="1" dirty="0">
                 <a:latin typeface="Times New Roman" panose="02020603050405020304" charset="0"/>
                 <a:ea typeface="微软雅黑" panose="020B0503020204020204" pitchFamily="34" charset="-122"/>
                 <a:cs typeface="Times New Roman" panose="02020603050405020304" charset="0"/>
@@ -3891,7 +6632,7 @@
               <a:buChar char="•"/>
             </a:pPr>
             <a:r>
-              <a:rPr lang="en-US" altLang="zh-CN" sz="2400" b="1" dirty="0">
+              <a:rPr lang="en-US" altLang="zh-CN" sz="2000" b="1" dirty="0">
                 <a:latin typeface="Times New Roman" panose="02020603050405020304" charset="0"/>
                 <a:ea typeface="微软雅黑" panose="020B0503020204020204" pitchFamily="34" charset="-122"/>
                 <a:cs typeface="Times New Roman" panose="02020603050405020304" charset="0"/>
@@ -3908,7 +6649,7 @@
               <a:buChar char="•"/>
             </a:pPr>
             <a:r>
-              <a:rPr lang="en-US" altLang="zh-CN" sz="2400" b="1" dirty="0">
+              <a:rPr lang="en-US" altLang="zh-CN" sz="2000" b="1" dirty="0">
                 <a:latin typeface="Times New Roman" panose="02020603050405020304" charset="0"/>
                 <a:ea typeface="微软雅黑" panose="020B0503020204020204" pitchFamily="34" charset="-122"/>
                 <a:cs typeface="Times New Roman" panose="02020603050405020304" charset="0"/>
@@ -3925,12 +6666,12 @@
               <a:buChar char="•"/>
             </a:pPr>
             <a:r>
-              <a:rPr lang="en-US" altLang="zh-CN" sz="2400" b="1" dirty="0">
+              <a:rPr lang="en-US" altLang="zh-CN" sz="2000" b="1" dirty="0">
                 <a:latin typeface="Times New Roman" panose="02020603050405020304" charset="0"/>
                 <a:ea typeface="微软雅黑" panose="020B0503020204020204" pitchFamily="34" charset="-122"/>
                 <a:cs typeface="Times New Roman" panose="02020603050405020304" charset="0"/>
               </a:rPr>
-              <a:t>Goals and Objectives</a:t>
+              <a:t>Initial Results</a:t>
             </a:r>
           </a:p>
           <a:p>
@@ -3942,7 +6683,24 @@
               <a:buChar char="•"/>
             </a:pPr>
             <a:r>
-              <a:rPr lang="en-US" altLang="zh-CN" sz="2400" b="1" dirty="0">
+              <a:rPr lang="en-US" altLang="zh-CN" sz="2000" b="1" dirty="0">
+                <a:latin typeface="Times New Roman" panose="02020603050405020304" charset="0"/>
+                <a:ea typeface="微软雅黑" panose="020B0503020204020204" pitchFamily="34" charset="-122"/>
+                <a:cs typeface="Times New Roman" panose="02020603050405020304" charset="0"/>
+              </a:rPr>
+              <a:t>Goals and Objectives</a:t>
+            </a:r>
+          </a:p>
+          <a:p>
+            <a:pPr marL="571500" indent="-571500" algn="l">
+              <a:lnSpc>
+                <a:spcPct val="200000"/>
+              </a:lnSpc>
+              <a:buFont typeface="Arial" panose="020B0604020202020204" pitchFamily="34" charset="0"/>
+              <a:buChar char="•"/>
+            </a:pPr>
+            <a:r>
+              <a:rPr lang="en-US" altLang="zh-CN" sz="2000" b="1" dirty="0">
                 <a:latin typeface="Times New Roman" panose="02020603050405020304" charset="0"/>
                 <a:ea typeface="微软雅黑" panose="020B0503020204020204" pitchFamily="34" charset="-122"/>
                 <a:cs typeface="Times New Roman" panose="02020603050405020304" charset="0"/>
@@ -4147,7 +6905,7 @@
           <p:nvPr/>
         </p:nvPicPr>
         <p:blipFill>
-          <a:blip r:embed="rId2"/>
+          <a:blip r:embed="rId3"/>
           <a:srcRect l="21146" t="9697" r="22583" b="12705"/>
           <a:stretch>
             <a:fillRect/>
@@ -4171,8 +6929,8 @@
         </p:nvSpPr>
         <p:spPr>
           <a:xfrm>
-            <a:off x="712774" y="1197969"/>
-            <a:ext cx="1616958" cy="923330"/>
+            <a:off x="1421182" y="1196489"/>
+            <a:ext cx="3770869" cy="461665"/>
           </a:xfrm>
           <a:prstGeom prst="rect">
             <a:avLst/>
@@ -4186,51 +6944,113 @@
           <a:lstStyle/>
           <a:p>
             <a:r>
-              <a:rPr lang="zh-CN" altLang="en-US" b="1" u="sng" dirty="0">
-                <a:solidFill>
-                  <a:srgbClr val="002060"/>
-                </a:solidFill>
+              <a:rPr lang="en-US" altLang="zh-CN" sz="2400" b="1" dirty="0">
                 <a:latin typeface="微软雅黑" panose="020B0503020204020204" pitchFamily="34" charset="-122"/>
                 <a:ea typeface="微软雅黑" panose="020B0503020204020204" pitchFamily="34" charset="-122"/>
                 <a:cs typeface="微软雅黑" panose="020B0503020204020204" pitchFamily="34" charset="-122"/>
-                <a:sym typeface="+mn-ea"/>
-              </a:rPr>
-              <a:t>强调文字</a:t>
-            </a:r>
-            <a:endParaRPr lang="en-US" altLang="zh-CN" b="1" u="sng" dirty="0">
-              <a:solidFill>
-                <a:srgbClr val="002060"/>
-              </a:solidFill>
+              </a:rPr>
+              <a:t>Autonomous driving</a:t>
+            </a:r>
+            <a:endParaRPr lang="zh-CN" altLang="en-US" sz="2400" b="1" dirty="0">
               <a:latin typeface="微软雅黑" panose="020B0503020204020204" pitchFamily="34" charset="-122"/>
               <a:ea typeface="微软雅黑" panose="020B0503020204020204" pitchFamily="34" charset="-122"/>
               <a:cs typeface="微软雅黑" panose="020B0503020204020204" pitchFamily="34" charset="-122"/>
-              <a:sym typeface="+mn-ea"/>
             </a:endParaRPr>
           </a:p>
-          <a:p>
-            <a:endParaRPr lang="en-US" altLang="zh-CN" b="1" u="sng" dirty="0">
-              <a:solidFill>
-                <a:srgbClr val="002060"/>
-              </a:solidFill>
-              <a:latin typeface="微软雅黑" panose="020B0503020204020204" pitchFamily="34" charset="-122"/>
-              <a:ea typeface="微软雅黑" panose="020B0503020204020204" pitchFamily="34" charset="-122"/>
-              <a:cs typeface="微软雅黑" panose="020B0503020204020204" pitchFamily="34" charset="-122"/>
-              <a:sym typeface="+mn-ea"/>
-            </a:endParaRPr>
-          </a:p>
-          <a:p>
-            <a:r>
-              <a:rPr lang="zh-CN" altLang="en-US" dirty="0">
+        </p:txBody>
+      </p:sp>
+      <p:pic>
+        <p:nvPicPr>
+          <p:cNvPr id="12" name="图片 11">
+            <a:extLst>
+              <a:ext uri="{FF2B5EF4-FFF2-40B4-BE49-F238E27FC236}">
+                <a16:creationId xmlns:a16="http://schemas.microsoft.com/office/drawing/2014/main" id="{602FD596-3D99-820F-63E3-BE2D8EAAC1CA}"/>
+              </a:ext>
+            </a:extLst>
+          </p:cNvPr>
+          <p:cNvPicPr>
+            <a:picLocks noChangeAspect="1"/>
+          </p:cNvPicPr>
+          <p:nvPr/>
+        </p:nvPicPr>
+        <p:blipFill>
+          <a:blip r:embed="rId4" cstate="print">
+            <a:extLst>
+              <a:ext uri="{28A0092B-C50C-407E-A947-70E740481C1C}">
+                <a14:useLocalDpi xmlns:a14="http://schemas.microsoft.com/office/drawing/2010/main" val="0"/>
+              </a:ext>
+            </a:extLst>
+          </a:blip>
+          <a:stretch>
+            <a:fillRect/>
+          </a:stretch>
+        </p:blipFill>
+        <p:spPr>
+          <a:xfrm>
+            <a:off x="3541115" y="2071054"/>
+            <a:ext cx="4831835" cy="3625975"/>
+          </a:xfrm>
+          <a:prstGeom prst="rect">
+            <a:avLst/>
+          </a:prstGeom>
+        </p:spPr>
+      </p:pic>
+      <p:sp>
+        <p:nvSpPr>
+          <p:cNvPr id="4" name="文本框 3">
+            <a:extLst>
+              <a:ext uri="{FF2B5EF4-FFF2-40B4-BE49-F238E27FC236}">
+                <a16:creationId xmlns:a16="http://schemas.microsoft.com/office/drawing/2014/main" id="{30C6DA68-7102-463E-B833-4685A054E7EB}"/>
+              </a:ext>
+            </a:extLst>
+          </p:cNvPr>
+          <p:cNvSpPr txBox="1"/>
+          <p:nvPr/>
+        </p:nvSpPr>
+        <p:spPr>
+          <a:xfrm>
+            <a:off x="3306616" y="6066472"/>
+            <a:ext cx="6114472" cy="461665"/>
+          </a:xfrm>
+          <a:prstGeom prst="rect">
+            <a:avLst/>
+          </a:prstGeom>
+          <a:noFill/>
+        </p:spPr>
+        <p:txBody>
+          <a:bodyPr wrap="square">
+            <a:spAutoFit/>
+          </a:bodyPr>
+          <a:lstStyle/>
+          <a:p>
+            <a:r>
+              <a:rPr lang="en-US" altLang="zh-CN" sz="1200" dirty="0">
                 <a:latin typeface="微软雅黑" panose="020B0503020204020204" pitchFamily="34" charset="-122"/>
                 <a:ea typeface="微软雅黑" panose="020B0503020204020204" pitchFamily="34" charset="-122"/>
                 <a:cs typeface="微软雅黑" panose="020B0503020204020204" pitchFamily="34" charset="-122"/>
               </a:rPr>
-              <a:t>正文</a:t>
-            </a:r>
+              <a:t>Image </a:t>
+            </a:r>
+            <a:r>
+              <a:rPr lang="en-US" altLang="zh-CN" sz="1200" dirty="0">
+                <a:latin typeface="微软雅黑" panose="020B0503020204020204" pitchFamily="34" charset="-122"/>
+                <a:ea typeface="微软雅黑" panose="020B0503020204020204" pitchFamily="34" charset="-122"/>
+              </a:rPr>
+              <a:t>source: https://www.independent.co.uk/travel/news-and-advice/self-driving-cars-buses-autonomous-vehicles-b2413681.html</a:t>
+            </a:r>
+            <a:endParaRPr lang="zh-CN" altLang="en-US" sz="1200" dirty="0">
+              <a:latin typeface="微软雅黑" panose="020B0503020204020204" pitchFamily="34" charset="-122"/>
+              <a:ea typeface="微软雅黑" panose="020B0503020204020204" pitchFamily="34" charset="-122"/>
+            </a:endParaRPr>
           </a:p>
         </p:txBody>
       </p:sp>
     </p:spTree>
+    <p:extLst>
+      <p:ext uri="{BB962C8B-B14F-4D97-AF65-F5344CB8AC3E}">
+        <p14:creationId xmlns:p14="http://schemas.microsoft.com/office/powerpoint/2010/main" val="2278243924"/>
+      </p:ext>
+    </p:extLst>
   </p:cSld>
   <p:clrMapOvr>
     <a:masterClrMapping/>
@@ -4290,7 +7110,7 @@
                 <a:cs typeface="Times New Roman" panose="02020603050405020304" charset="0"/>
                 <a:sym typeface="+mn-ea"/>
               </a:rPr>
-              <a:t>Related Work</a:t>
+              <a:t>Background and Motivation</a:t>
             </a:r>
           </a:p>
         </p:txBody>
@@ -4352,7 +7172,7 @@
           <p:nvPr/>
         </p:nvPicPr>
         <p:blipFill>
-          <a:blip r:embed="rId2"/>
+          <a:blip r:embed="rId3"/>
           <a:srcRect l="21146" t="9697" r="22583" b="12705"/>
           <a:stretch>
             <a:fillRect/>
@@ -4370,14 +7190,20 @@
       </p:pic>
       <p:sp>
         <p:nvSpPr>
-          <p:cNvPr id="5" name="文本框 4"/>
+          <p:cNvPr id="10" name="文本框 9">
+            <a:extLst>
+              <a:ext uri="{FF2B5EF4-FFF2-40B4-BE49-F238E27FC236}">
+                <a16:creationId xmlns:a16="http://schemas.microsoft.com/office/drawing/2014/main" id="{897E56B3-E264-D044-8709-D5FEC693174D}"/>
+              </a:ext>
+            </a:extLst>
+          </p:cNvPr>
           <p:cNvSpPr txBox="1"/>
           <p:nvPr/>
         </p:nvSpPr>
         <p:spPr>
           <a:xfrm>
-            <a:off x="712774" y="1197969"/>
-            <a:ext cx="1616958" cy="923330"/>
+            <a:off x="775730" y="1115487"/>
+            <a:ext cx="4855202" cy="523220"/>
           </a:xfrm>
           <a:prstGeom prst="rect">
             <a:avLst/>
@@ -4391,56 +7217,354 @@
           <a:lstStyle/>
           <a:p>
             <a:r>
-              <a:rPr lang="zh-CN" altLang="en-US" b="1" u="sng" dirty="0">
-                <a:solidFill>
-                  <a:srgbClr val="002060"/>
-                </a:solidFill>
+              <a:rPr lang="en-US" altLang="zh-CN" sz="2800" b="1" dirty="0">
                 <a:latin typeface="微软雅黑" panose="020B0503020204020204" pitchFamily="34" charset="-122"/>
                 <a:ea typeface="微软雅黑" panose="020B0503020204020204" pitchFamily="34" charset="-122"/>
                 <a:cs typeface="微软雅黑" panose="020B0503020204020204" pitchFamily="34" charset="-122"/>
-                <a:sym typeface="+mn-ea"/>
-              </a:rPr>
-              <a:t>强调文字</a:t>
-            </a:r>
-            <a:endParaRPr lang="en-US" altLang="zh-CN" b="1" u="sng" dirty="0">
-              <a:solidFill>
-                <a:srgbClr val="002060"/>
-              </a:solidFill>
+              </a:rPr>
+              <a:t>Semantic Segmentation </a:t>
+            </a:r>
+            <a:endParaRPr lang="zh-CN" altLang="en-US" sz="2800" b="1" dirty="0">
               <a:latin typeface="微软雅黑" panose="020B0503020204020204" pitchFamily="34" charset="-122"/>
               <a:ea typeface="微软雅黑" panose="020B0503020204020204" pitchFamily="34" charset="-122"/>
               <a:cs typeface="微软雅黑" panose="020B0503020204020204" pitchFamily="34" charset="-122"/>
-              <a:sym typeface="+mn-ea"/>
             </a:endParaRPr>
           </a:p>
-          <a:p>
-            <a:endParaRPr lang="en-US" altLang="zh-CN" b="1" u="sng" dirty="0">
-              <a:solidFill>
-                <a:srgbClr val="002060"/>
-              </a:solidFill>
-              <a:latin typeface="微软雅黑" panose="020B0503020204020204" pitchFamily="34" charset="-122"/>
-              <a:ea typeface="微软雅黑" panose="020B0503020204020204" pitchFamily="34" charset="-122"/>
-              <a:cs typeface="微软雅黑" panose="020B0503020204020204" pitchFamily="34" charset="-122"/>
-              <a:sym typeface="+mn-ea"/>
+        </p:txBody>
+      </p:sp>
+      <p:sp>
+        <p:nvSpPr>
+          <p:cNvPr id="17" name="文本框 16">
+            <a:extLst>
+              <a:ext uri="{FF2B5EF4-FFF2-40B4-BE49-F238E27FC236}">
+                <a16:creationId xmlns:a16="http://schemas.microsoft.com/office/drawing/2014/main" id="{F8AC207A-4126-4321-F27C-ECB9DAA0D9A1}"/>
+              </a:ext>
+            </a:extLst>
+          </p:cNvPr>
+          <p:cNvSpPr txBox="1"/>
+          <p:nvPr/>
+        </p:nvSpPr>
+        <p:spPr>
+          <a:xfrm>
+            <a:off x="6445719" y="1638707"/>
+            <a:ext cx="5159133" cy="4524315"/>
+          </a:xfrm>
+          <a:prstGeom prst="rect">
+            <a:avLst/>
+          </a:prstGeom>
+          <a:noFill/>
+        </p:spPr>
+        <p:txBody>
+          <a:bodyPr wrap="square">
+            <a:spAutoFit/>
+          </a:bodyPr>
+          <a:lstStyle/>
+          <a:p>
+            <a:pPr marL="342900" indent="-342900">
+              <a:buFont typeface="Arial" panose="020B0604020202020204" pitchFamily="34" charset="0"/>
+              <a:buChar char="•"/>
+            </a:pPr>
+            <a:r>
+              <a:rPr lang="en-US" altLang="zh-CN" sz="2400" i="0" dirty="0">
+                <a:effectLst/>
+                <a:latin typeface="Söhne"/>
+              </a:rPr>
+              <a:t>Pixel-level Classification </a:t>
+            </a:r>
+            <a:r>
+              <a:rPr lang="zh-CN" altLang="en-US" sz="2400" i="0" dirty="0">
+                <a:effectLst/>
+                <a:latin typeface="Söhne"/>
+              </a:rPr>
+              <a:t>像素级</a:t>
+            </a:r>
+            <a:endParaRPr lang="en-US" altLang="zh-CN" sz="2400" i="0" dirty="0">
+              <a:effectLst/>
+              <a:latin typeface="Söhne"/>
             </a:endParaRPr>
           </a:p>
           <a:p>
-            <a:r>
-              <a:rPr lang="zh-CN" altLang="en-US" dirty="0">
+            <a:endParaRPr lang="en-US" altLang="zh-CN" sz="2400" dirty="0">
+              <a:latin typeface="Söhne"/>
+            </a:endParaRPr>
+          </a:p>
+          <a:p>
+            <a:pPr marL="342900" indent="-342900">
+              <a:buFont typeface="Arial" panose="020B0604020202020204" pitchFamily="34" charset="0"/>
+              <a:buChar char="•"/>
+            </a:pPr>
+            <a:r>
+              <a:rPr lang="en-US" altLang="zh-CN" sz="2400" i="0" dirty="0">
+                <a:effectLst/>
+                <a:latin typeface="Söhne"/>
+              </a:rPr>
+              <a:t>Wide applications</a:t>
+            </a:r>
+          </a:p>
+          <a:p>
+            <a:pPr marL="800100" lvl="1" indent="-342900">
+              <a:buFont typeface="Arial" panose="020B0604020202020204" pitchFamily="34" charset="0"/>
+              <a:buChar char="•"/>
+            </a:pPr>
+            <a:r>
+              <a:rPr lang="en-US" altLang="zh-CN" sz="2400" i="0" dirty="0">
+                <a:effectLst/>
+                <a:latin typeface="Söhne"/>
+              </a:rPr>
+              <a:t>autonomous driving</a:t>
+            </a:r>
+          </a:p>
+          <a:p>
+            <a:pPr marL="800100" lvl="1" indent="-342900">
+              <a:buFont typeface="Arial" panose="020B0604020202020204" pitchFamily="34" charset="0"/>
+              <a:buChar char="•"/>
+            </a:pPr>
+            <a:r>
+              <a:rPr lang="en-US" altLang="zh-CN" sz="2400" i="0" dirty="0">
+                <a:effectLst/>
+                <a:latin typeface="Söhne"/>
+              </a:rPr>
+              <a:t>medical imaging</a:t>
+            </a:r>
+          </a:p>
+          <a:p>
+            <a:pPr marL="800100" lvl="1" indent="-342900">
+              <a:buFont typeface="Arial" panose="020B0604020202020204" pitchFamily="34" charset="0"/>
+              <a:buChar char="•"/>
+            </a:pPr>
+            <a:r>
+              <a:rPr lang="en-US" altLang="zh-CN" sz="2400" i="0" dirty="0">
+                <a:effectLst/>
+                <a:latin typeface="Söhne"/>
+              </a:rPr>
+              <a:t>robotic vision</a:t>
+            </a:r>
+          </a:p>
+          <a:p>
+            <a:pPr marL="800100" lvl="1" indent="-342900">
+              <a:buFont typeface="Arial" panose="020B0604020202020204" pitchFamily="34" charset="0"/>
+              <a:buChar char="•"/>
+            </a:pPr>
+            <a:r>
+              <a:rPr lang="en-US" altLang="zh-CN" sz="2400" i="0" dirty="0">
+                <a:effectLst/>
+                <a:latin typeface="Söhne"/>
+              </a:rPr>
+              <a:t>video surveillance</a:t>
+            </a:r>
+          </a:p>
+          <a:p>
+            <a:pPr marL="342900" indent="-342900">
+              <a:buFont typeface="Arial" panose="020B0604020202020204" pitchFamily="34" charset="0"/>
+              <a:buChar char="•"/>
+            </a:pPr>
+            <a:endParaRPr lang="en-US" altLang="zh-CN" sz="2400" dirty="0">
+              <a:latin typeface="Söhne"/>
+            </a:endParaRPr>
+          </a:p>
+          <a:p>
+            <a:pPr marL="342900" indent="-342900">
+              <a:buFont typeface="Arial" panose="020B0604020202020204" pitchFamily="34" charset="0"/>
+              <a:buChar char="•"/>
+            </a:pPr>
+            <a:r>
+              <a:rPr lang="en-US" altLang="zh-CN" sz="2400" i="0" dirty="0">
+                <a:effectLst/>
+                <a:latin typeface="Söhne"/>
+              </a:rPr>
+              <a:t>Deep learning Approaches</a:t>
+            </a:r>
+          </a:p>
+          <a:p>
+            <a:pPr marL="800100" lvl="1" indent="-342900">
+              <a:buFont typeface="Arial" panose="020B0604020202020204" pitchFamily="34" charset="0"/>
+              <a:buChar char="•"/>
+            </a:pPr>
+            <a:r>
+              <a:rPr lang="en-US" altLang="zh-CN" sz="2400" dirty="0">
+                <a:latin typeface="Söhne"/>
+              </a:rPr>
+              <a:t>U-Net, FCN, </a:t>
+            </a:r>
+            <a:r>
+              <a:rPr lang="en-US" altLang="zh-CN" sz="2400" dirty="0" err="1">
+                <a:latin typeface="Söhne"/>
+              </a:rPr>
+              <a:t>SegNet</a:t>
+            </a:r>
+            <a:r>
+              <a:rPr lang="en-US" altLang="zh-CN" sz="2400" dirty="0">
+                <a:latin typeface="Söhne"/>
+              </a:rPr>
+              <a:t>, …</a:t>
+            </a:r>
+            <a:endParaRPr lang="en-US" altLang="zh-CN" sz="2400" i="0" dirty="0">
+              <a:effectLst/>
+              <a:latin typeface="Söhne"/>
+            </a:endParaRPr>
+          </a:p>
+          <a:p>
+            <a:pPr marL="342900" indent="-342900">
+              <a:buFont typeface="Arial" panose="020B0604020202020204" pitchFamily="34" charset="0"/>
+              <a:buChar char="•"/>
+            </a:pPr>
+            <a:endParaRPr lang="en-US" altLang="zh-CN" sz="2400" dirty="0">
+              <a:latin typeface="Söhne"/>
+            </a:endParaRPr>
+          </a:p>
+          <a:p>
+            <a:pPr marL="342900" indent="-342900">
+              <a:buFont typeface="Arial" panose="020B0604020202020204" pitchFamily="34" charset="0"/>
+              <a:buChar char="•"/>
+            </a:pPr>
+            <a:r>
+              <a:rPr lang="en-US" altLang="zh-CN" sz="2400" i="0" dirty="0">
+                <a:effectLst/>
+                <a:latin typeface="Söhne"/>
+              </a:rPr>
+              <a:t>Challenges</a:t>
+            </a:r>
+          </a:p>
+        </p:txBody>
+      </p:sp>
+      <p:grpSp>
+        <p:nvGrpSpPr>
+          <p:cNvPr id="20" name="组合 19">
+            <a:extLst>
+              <a:ext uri="{FF2B5EF4-FFF2-40B4-BE49-F238E27FC236}">
+                <a16:creationId xmlns:a16="http://schemas.microsoft.com/office/drawing/2014/main" id="{7681CC4E-B3E2-452D-D704-901AB89BC8EE}"/>
+              </a:ext>
+            </a:extLst>
+          </p:cNvPr>
+          <p:cNvGrpSpPr/>
+          <p:nvPr/>
+        </p:nvGrpSpPr>
+        <p:grpSpPr>
+          <a:xfrm>
+            <a:off x="775730" y="1797477"/>
+            <a:ext cx="4663618" cy="4206773"/>
+            <a:chOff x="471799" y="1910068"/>
+            <a:chExt cx="5159133" cy="4559614"/>
+          </a:xfrm>
+        </p:grpSpPr>
+        <p:pic>
+          <p:nvPicPr>
+            <p:cNvPr id="8" name="图片 7">
+              <a:extLst>
+                <a:ext uri="{FF2B5EF4-FFF2-40B4-BE49-F238E27FC236}">
+                  <a16:creationId xmlns:a16="http://schemas.microsoft.com/office/drawing/2014/main" id="{2433EDC4-314A-85CB-8C3D-AF542B2B2447}"/>
+                </a:ext>
+              </a:extLst>
+            </p:cNvPr>
+            <p:cNvPicPr>
+              <a:picLocks noChangeAspect="1"/>
+            </p:cNvPicPr>
+            <p:nvPr/>
+          </p:nvPicPr>
+          <p:blipFill>
+            <a:blip r:embed="rId4" cstate="print">
+              <a:extLst>
+                <a:ext uri="{28A0092B-C50C-407E-A947-70E740481C1C}">
+                  <a14:useLocalDpi xmlns:a14="http://schemas.microsoft.com/office/drawing/2010/main" val="0"/>
+                </a:ext>
+              </a:extLst>
+            </a:blip>
+            <a:stretch>
+              <a:fillRect/>
+            </a:stretch>
+          </p:blipFill>
+          <p:spPr>
+            <a:xfrm>
+              <a:off x="471799" y="3900864"/>
+              <a:ext cx="5159133" cy="2568818"/>
+            </a:xfrm>
+            <a:prstGeom prst="rect">
+              <a:avLst/>
+            </a:prstGeom>
+          </p:spPr>
+        </p:pic>
+        <p:pic>
+          <p:nvPicPr>
+            <p:cNvPr id="19" name="图片 18">
+              <a:extLst>
+                <a:ext uri="{FF2B5EF4-FFF2-40B4-BE49-F238E27FC236}">
+                  <a16:creationId xmlns:a16="http://schemas.microsoft.com/office/drawing/2014/main" id="{A7C4EE44-C0C2-987D-0C2D-A6335EC8C9C3}"/>
+                </a:ext>
+              </a:extLst>
+            </p:cNvPr>
+            <p:cNvPicPr>
+              <a:picLocks noChangeAspect="1"/>
+            </p:cNvPicPr>
+            <p:nvPr/>
+          </p:nvPicPr>
+          <p:blipFill>
+            <a:blip r:embed="rId5"/>
+            <a:stretch>
+              <a:fillRect/>
+            </a:stretch>
+          </p:blipFill>
+          <p:spPr>
+            <a:xfrm>
+              <a:off x="471799" y="1910068"/>
+              <a:ext cx="5159133" cy="1960830"/>
+            </a:xfrm>
+            <a:prstGeom prst="rect">
+              <a:avLst/>
+            </a:prstGeom>
+          </p:spPr>
+        </p:pic>
+      </p:grpSp>
+      <p:sp>
+        <p:nvSpPr>
+          <p:cNvPr id="21" name="文本框 20">
+            <a:extLst>
+              <a:ext uri="{FF2B5EF4-FFF2-40B4-BE49-F238E27FC236}">
+                <a16:creationId xmlns:a16="http://schemas.microsoft.com/office/drawing/2014/main" id="{ACD4F129-6FBF-4559-C649-D08C6658B9E5}"/>
+              </a:ext>
+            </a:extLst>
+          </p:cNvPr>
+          <p:cNvSpPr txBox="1"/>
+          <p:nvPr/>
+        </p:nvSpPr>
+        <p:spPr>
+          <a:xfrm>
+            <a:off x="775730" y="6163022"/>
+            <a:ext cx="4663618" cy="276999"/>
+          </a:xfrm>
+          <a:prstGeom prst="rect">
+            <a:avLst/>
+          </a:prstGeom>
+          <a:noFill/>
+        </p:spPr>
+        <p:txBody>
+          <a:bodyPr wrap="square">
+            <a:spAutoFit/>
+          </a:bodyPr>
+          <a:lstStyle/>
+          <a:p>
+            <a:r>
+              <a:rPr lang="en-US" altLang="zh-CN" sz="1200" dirty="0">
                 <a:latin typeface="微软雅黑" panose="020B0503020204020204" pitchFamily="34" charset="-122"/>
                 <a:ea typeface="微软雅黑" panose="020B0503020204020204" pitchFamily="34" charset="-122"/>
                 <a:cs typeface="微软雅黑" panose="020B0503020204020204" pitchFamily="34" charset="-122"/>
               </a:rPr>
-              <a:t>正文</a:t>
-            </a:r>
+              <a:t>Image </a:t>
+            </a:r>
+            <a:r>
+              <a:rPr lang="en-US" altLang="zh-CN" sz="1200" dirty="0">
+                <a:latin typeface="微软雅黑" panose="020B0503020204020204" pitchFamily="34" charset="-122"/>
+                <a:ea typeface="微软雅黑" panose="020B0503020204020204" pitchFamily="34" charset="-122"/>
+              </a:rPr>
+              <a:t>source: https://zhuanlan.zhihu.com/p/31428783</a:t>
+            </a:r>
+            <a:endParaRPr lang="zh-CN" altLang="en-US" sz="1200" dirty="0">
+              <a:latin typeface="微软雅黑" panose="020B0503020204020204" pitchFamily="34" charset="-122"/>
+              <a:ea typeface="微软雅黑" panose="020B0503020204020204" pitchFamily="34" charset="-122"/>
+            </a:endParaRPr>
           </a:p>
         </p:txBody>
       </p:sp>
     </p:spTree>
-    <p:extLst>
-      <p:ext uri="{BB962C8B-B14F-4D97-AF65-F5344CB8AC3E}">
-        <p14:creationId xmlns:p14="http://schemas.microsoft.com/office/powerpoint/2010/main" val="3185989473"/>
-      </p:ext>
-    </p:extLst>
   </p:cSld>
   <p:clrMapOvr>
     <a:masterClrMapping/>
@@ -4500,7 +7624,7 @@
                 <a:cs typeface="Times New Roman" panose="02020603050405020304" charset="0"/>
                 <a:sym typeface="+mn-ea"/>
               </a:rPr>
-              <a:t>Improvements</a:t>
+              <a:t>Related Work</a:t>
             </a:r>
           </a:p>
         </p:txBody>
@@ -4562,7 +7686,7 @@
           <p:nvPr/>
         </p:nvPicPr>
         <p:blipFill>
-          <a:blip r:embed="rId2"/>
+          <a:blip r:embed="rId3"/>
           <a:srcRect l="21146" t="9697" r="22583" b="12705"/>
           <a:stretch>
             <a:fillRect/>
@@ -4570,7 +7694,7 @@
         </p:blipFill>
         <p:spPr>
           <a:xfrm>
-            <a:off x="10811510" y="5556250"/>
+            <a:off x="11163300" y="5818909"/>
             <a:ext cx="1028700" cy="1020445"/>
           </a:xfrm>
           <a:prstGeom prst="rect">
@@ -4587,7 +7711,7 @@
         <p:spPr>
           <a:xfrm>
             <a:off x="712774" y="1197969"/>
-            <a:ext cx="1616958" cy="923330"/>
+            <a:ext cx="5161794" cy="2185214"/>
           </a:xfrm>
           <a:prstGeom prst="rect">
             <a:avLst/>
@@ -4601,7 +7725,7 @@
           <a:lstStyle/>
           <a:p>
             <a:r>
-              <a:rPr lang="zh-CN" altLang="en-US" b="1" u="sng" dirty="0">
+              <a:rPr lang="en-US" altLang="zh-CN" sz="2800" b="1" u="sng" dirty="0">
                 <a:solidFill>
                   <a:srgbClr val="002060"/>
                 </a:solidFill>
@@ -4610,7 +7734,7 @@
                 <a:cs typeface="微软雅黑" panose="020B0503020204020204" pitchFamily="34" charset="-122"/>
                 <a:sym typeface="+mn-ea"/>
               </a:rPr>
-              <a:t>强调文字</a:t>
+              <a:t>U-Net: Architecture</a:t>
             </a:r>
             <a:endParaRPr lang="en-US" altLang="zh-CN" b="1" u="sng" dirty="0">
               <a:solidFill>
@@ -4623,32 +7747,186 @@
             </a:endParaRPr>
           </a:p>
           <a:p>
-            <a:endParaRPr lang="en-US" altLang="zh-CN" b="1" u="sng" dirty="0">
-              <a:solidFill>
-                <a:srgbClr val="002060"/>
-              </a:solidFill>
+            <a:endParaRPr lang="en-US" altLang="zh-CN" dirty="0">
               <a:latin typeface="微软雅黑" panose="020B0503020204020204" pitchFamily="34" charset="-122"/>
               <a:ea typeface="微软雅黑" panose="020B0503020204020204" pitchFamily="34" charset="-122"/>
               <a:cs typeface="微软雅黑" panose="020B0503020204020204" pitchFamily="34" charset="-122"/>
-              <a:sym typeface="+mn-ea"/>
             </a:endParaRPr>
           </a:p>
           <a:p>
+            <a:endParaRPr lang="en-US" altLang="zh-CN" dirty="0">
+              <a:latin typeface="微软雅黑" panose="020B0503020204020204" pitchFamily="34" charset="-122"/>
+              <a:ea typeface="微软雅黑" panose="020B0503020204020204" pitchFamily="34" charset="-122"/>
+              <a:cs typeface="微软雅黑" panose="020B0503020204020204" pitchFamily="34" charset="-122"/>
+            </a:endParaRPr>
+          </a:p>
+          <a:p>
+            <a:r>
+              <a:rPr lang="en-US" altLang="zh-CN" dirty="0">
+                <a:latin typeface="微软雅黑" panose="020B0503020204020204" pitchFamily="34" charset="-122"/>
+                <a:ea typeface="微软雅黑" panose="020B0503020204020204" pitchFamily="34" charset="-122"/>
+                <a:cs typeface="微软雅黑" panose="020B0503020204020204" pitchFamily="34" charset="-122"/>
+              </a:rPr>
+              <a:t>Fully convolutional network</a:t>
+            </a:r>
+          </a:p>
+          <a:p>
+            <a:endParaRPr lang="en-US" altLang="zh-CN" dirty="0">
+              <a:latin typeface="微软雅黑" panose="020B0503020204020204" pitchFamily="34" charset="-122"/>
+              <a:ea typeface="微软雅黑" panose="020B0503020204020204" pitchFamily="34" charset="-122"/>
+              <a:cs typeface="微软雅黑" panose="020B0503020204020204" pitchFamily="34" charset="-122"/>
+            </a:endParaRPr>
+          </a:p>
+          <a:p>
+            <a:r>
+              <a:rPr lang="en-US" altLang="zh-CN" dirty="0">
+                <a:latin typeface="微软雅黑" panose="020B0503020204020204" pitchFamily="34" charset="-122"/>
+                <a:ea typeface="微软雅黑" panose="020B0503020204020204" pitchFamily="34" charset="-122"/>
+                <a:cs typeface="微软雅黑" panose="020B0503020204020204" pitchFamily="34" charset="-122"/>
+              </a:rPr>
+              <a:t>contracting path</a:t>
+            </a:r>
             <a:r>
               <a:rPr lang="zh-CN" altLang="en-US" dirty="0">
                 <a:latin typeface="微软雅黑" panose="020B0503020204020204" pitchFamily="34" charset="-122"/>
                 <a:ea typeface="微软雅黑" panose="020B0503020204020204" pitchFamily="34" charset="-122"/>
                 <a:cs typeface="微软雅黑" panose="020B0503020204020204" pitchFamily="34" charset="-122"/>
               </a:rPr>
-              <a:t>正文</a:t>
-            </a:r>
+              <a:t> </a:t>
+            </a:r>
+            <a:r>
+              <a:rPr lang="en-US" altLang="zh-CN" dirty="0">
+                <a:latin typeface="微软雅黑" panose="020B0503020204020204" pitchFamily="34" charset="-122"/>
+                <a:ea typeface="微软雅黑" panose="020B0503020204020204" pitchFamily="34" charset="-122"/>
+                <a:cs typeface="微软雅黑" panose="020B0503020204020204" pitchFamily="34" charset="-122"/>
+              </a:rPr>
+              <a:t>=&gt;</a:t>
+            </a:r>
+            <a:r>
+              <a:rPr lang="zh-CN" altLang="en-US" dirty="0">
+                <a:latin typeface="微软雅黑" panose="020B0503020204020204" pitchFamily="34" charset="-122"/>
+                <a:ea typeface="微软雅黑" panose="020B0503020204020204" pitchFamily="34" charset="-122"/>
+                <a:cs typeface="微软雅黑" panose="020B0503020204020204" pitchFamily="34" charset="-122"/>
+              </a:rPr>
+              <a:t> </a:t>
+            </a:r>
+            <a:r>
+              <a:rPr lang="en-US" altLang="zh-CN" dirty="0">
+                <a:latin typeface="微软雅黑" panose="020B0503020204020204" pitchFamily="34" charset="-122"/>
+                <a:ea typeface="微软雅黑" panose="020B0503020204020204" pitchFamily="34" charset="-122"/>
+                <a:cs typeface="微软雅黑" panose="020B0503020204020204" pitchFamily="34" charset="-122"/>
+              </a:rPr>
+              <a:t>expansive path</a:t>
+            </a:r>
+          </a:p>
+          <a:p>
+            <a:endParaRPr lang="en-US" altLang="zh-CN" dirty="0">
+              <a:latin typeface="微软雅黑" panose="020B0503020204020204" pitchFamily="34" charset="-122"/>
+              <a:ea typeface="微软雅黑" panose="020B0503020204020204" pitchFamily="34" charset="-122"/>
+              <a:cs typeface="微软雅黑" panose="020B0503020204020204" pitchFamily="34" charset="-122"/>
+            </a:endParaRPr>
+          </a:p>
+        </p:txBody>
+      </p:sp>
+      <p:pic>
+        <p:nvPicPr>
+          <p:cNvPr id="4" name="图片 3">
+            <a:extLst>
+              <a:ext uri="{FF2B5EF4-FFF2-40B4-BE49-F238E27FC236}">
+                <a16:creationId xmlns:a16="http://schemas.microsoft.com/office/drawing/2014/main" id="{5BB16C2E-9CE9-21DD-4B30-C270242FB02A}"/>
+              </a:ext>
+            </a:extLst>
+          </p:cNvPr>
+          <p:cNvPicPr>
+            <a:picLocks noChangeAspect="1"/>
+          </p:cNvPicPr>
+          <p:nvPr/>
+        </p:nvPicPr>
+        <p:blipFill rotWithShape="1">
+          <a:blip r:embed="rId4"/>
+          <a:srcRect b="19846"/>
+          <a:stretch/>
+        </p:blipFill>
+        <p:spPr>
+          <a:xfrm>
+            <a:off x="5438105" y="1667533"/>
+            <a:ext cx="6254606" cy="4151376"/>
+          </a:xfrm>
+          <a:prstGeom prst="rect">
+            <a:avLst/>
+          </a:prstGeom>
+        </p:spPr>
+      </p:pic>
+      <p:pic>
+        <p:nvPicPr>
+          <p:cNvPr id="8" name="图片 7">
+            <a:extLst>
+              <a:ext uri="{FF2B5EF4-FFF2-40B4-BE49-F238E27FC236}">
+                <a16:creationId xmlns:a16="http://schemas.microsoft.com/office/drawing/2014/main" id="{EBF68F69-6D05-7C24-F9E8-3AA83CFC9A18}"/>
+              </a:ext>
+            </a:extLst>
+          </p:cNvPr>
+          <p:cNvPicPr>
+            <a:picLocks noChangeAspect="1"/>
+          </p:cNvPicPr>
+          <p:nvPr/>
+        </p:nvPicPr>
+        <p:blipFill>
+          <a:blip r:embed="rId5"/>
+          <a:stretch>
+            <a:fillRect/>
+          </a:stretch>
+        </p:blipFill>
+        <p:spPr>
+          <a:xfrm>
+            <a:off x="712774" y="3701521"/>
+            <a:ext cx="4404742" cy="1958510"/>
+          </a:xfrm>
+          <a:prstGeom prst="rect">
+            <a:avLst/>
+          </a:prstGeom>
+        </p:spPr>
+      </p:pic>
+      <p:sp>
+        <p:nvSpPr>
+          <p:cNvPr id="13" name="文本框 12">
+            <a:extLst>
+              <a:ext uri="{FF2B5EF4-FFF2-40B4-BE49-F238E27FC236}">
+                <a16:creationId xmlns:a16="http://schemas.microsoft.com/office/drawing/2014/main" id="{E91596B3-9EA4-E7A5-89B5-5052C0D4CC17}"/>
+              </a:ext>
+            </a:extLst>
+          </p:cNvPr>
+          <p:cNvSpPr txBox="1"/>
+          <p:nvPr/>
+        </p:nvSpPr>
+        <p:spPr>
+          <a:xfrm>
+            <a:off x="4819773" y="6299696"/>
+            <a:ext cx="6114472" cy="276999"/>
+          </a:xfrm>
+          <a:prstGeom prst="rect">
+            <a:avLst/>
+          </a:prstGeom>
+          <a:noFill/>
+        </p:spPr>
+        <p:txBody>
+          <a:bodyPr wrap="square">
+            <a:spAutoFit/>
+          </a:bodyPr>
+          <a:lstStyle/>
+          <a:p>
+            <a:r>
+              <a:rPr lang="en-US" altLang="zh-CN" sz="1200" dirty="0"/>
+              <a:t>Image source: U-Net: Convolutional Networks for Biomedical Image Segmentation</a:t>
+            </a:r>
+            <a:endParaRPr lang="zh-CN" altLang="en-US" sz="1200" dirty="0"/>
           </a:p>
         </p:txBody>
       </p:sp>
     </p:spTree>
     <p:extLst>
       <p:ext uri="{BB962C8B-B14F-4D97-AF65-F5344CB8AC3E}">
-        <p14:creationId xmlns:p14="http://schemas.microsoft.com/office/powerpoint/2010/main" val="1189555699"/>
+        <p14:creationId xmlns:p14="http://schemas.microsoft.com/office/powerpoint/2010/main" val="3185989473"/>
       </p:ext>
     </p:extLst>
   </p:cSld>
@@ -4710,7 +7988,7 @@
                 <a:cs typeface="Times New Roman" panose="02020603050405020304" charset="0"/>
                 <a:sym typeface="+mn-ea"/>
               </a:rPr>
-              <a:t>Proposed Method</a:t>
+              <a:t>Related Work</a:t>
             </a:r>
           </a:p>
         </p:txBody>
@@ -4772,7 +8050,7 @@
           <p:nvPr/>
         </p:nvPicPr>
         <p:blipFill>
-          <a:blip r:embed="rId2"/>
+          <a:blip r:embed="rId3"/>
           <a:srcRect l="21146" t="9697" r="22583" b="12705"/>
           <a:stretch>
             <a:fillRect/>
@@ -4780,7 +8058,7 @@
         </p:blipFill>
         <p:spPr>
           <a:xfrm>
-            <a:off x="10811510" y="5556250"/>
+            <a:off x="11163300" y="5818909"/>
             <a:ext cx="1028700" cy="1020445"/>
           </a:xfrm>
           <a:prstGeom prst="rect">
@@ -4797,7 +8075,7 @@
         <p:spPr>
           <a:xfrm>
             <a:off x="712774" y="1197969"/>
-            <a:ext cx="1616958" cy="923330"/>
+            <a:ext cx="7766208" cy="1908215"/>
           </a:xfrm>
           <a:prstGeom prst="rect">
             <a:avLst/>
@@ -4811,7 +8089,7 @@
           <a:lstStyle/>
           <a:p>
             <a:r>
-              <a:rPr lang="zh-CN" altLang="en-US" b="1" u="sng" dirty="0">
+              <a:rPr lang="en-US" altLang="zh-CN" sz="2800" b="1" u="sng" dirty="0">
                 <a:solidFill>
                   <a:srgbClr val="002060"/>
                 </a:solidFill>
@@ -4820,7 +8098,7 @@
                 <a:cs typeface="微软雅黑" panose="020B0503020204020204" pitchFamily="34" charset="-122"/>
                 <a:sym typeface="+mn-ea"/>
               </a:rPr>
-              <a:t>强调文字</a:t>
+              <a:t>U-Net: Optimizer and Loss Function</a:t>
             </a:r>
             <a:endParaRPr lang="en-US" altLang="zh-CN" b="1" u="sng" dirty="0">
               <a:solidFill>
@@ -4833,32 +8111,220 @@
             </a:endParaRPr>
           </a:p>
           <a:p>
-            <a:endParaRPr lang="en-US" altLang="zh-CN" b="1" u="sng" dirty="0">
-              <a:solidFill>
-                <a:srgbClr val="002060"/>
-              </a:solidFill>
+            <a:endParaRPr lang="en-US" altLang="zh-CN" dirty="0">
               <a:latin typeface="微软雅黑" panose="020B0503020204020204" pitchFamily="34" charset="-122"/>
               <a:ea typeface="微软雅黑" panose="020B0503020204020204" pitchFamily="34" charset="-122"/>
               <a:cs typeface="微软雅黑" panose="020B0503020204020204" pitchFamily="34" charset="-122"/>
-              <a:sym typeface="+mn-ea"/>
             </a:endParaRPr>
           </a:p>
           <a:p>
-            <a:r>
-              <a:rPr lang="zh-CN" altLang="en-US" dirty="0">
+            <a:pPr marL="285750" indent="-285750">
+              <a:buFont typeface="Arial" panose="020B0604020202020204" pitchFamily="34" charset="0"/>
+              <a:buChar char="•"/>
+            </a:pPr>
+            <a:r>
+              <a:rPr lang="en-US" altLang="zh-CN" dirty="0">
                 <a:latin typeface="微软雅黑" panose="020B0503020204020204" pitchFamily="34" charset="-122"/>
                 <a:ea typeface="微软雅黑" panose="020B0503020204020204" pitchFamily="34" charset="-122"/>
                 <a:cs typeface="微软雅黑" panose="020B0503020204020204" pitchFamily="34" charset="-122"/>
               </a:rPr>
-              <a:t>正文</a:t>
-            </a:r>
-          </a:p>
-        </p:txBody>
-      </p:sp>
+              <a:t>Stochastic Gradient Descent (SGD) with a high momentum (0.99)</a:t>
+            </a:r>
+          </a:p>
+          <a:p>
+            <a:pPr marL="285750" indent="-285750">
+              <a:buFont typeface="Arial" panose="020B0604020202020204" pitchFamily="34" charset="0"/>
+              <a:buChar char="•"/>
+            </a:pPr>
+            <a:endParaRPr lang="en-US" altLang="zh-CN" dirty="0">
+              <a:latin typeface="微软雅黑" panose="020B0503020204020204" pitchFamily="34" charset="-122"/>
+              <a:ea typeface="微软雅黑" panose="020B0503020204020204" pitchFamily="34" charset="-122"/>
+              <a:cs typeface="微软雅黑" panose="020B0503020204020204" pitchFamily="34" charset="-122"/>
+            </a:endParaRPr>
+          </a:p>
+          <a:p>
+            <a:pPr marL="285750" indent="-285750">
+              <a:buFont typeface="Arial" panose="020B0604020202020204" pitchFamily="34" charset="0"/>
+              <a:buChar char="•"/>
+            </a:pPr>
+            <a:r>
+              <a:rPr lang="en-US" altLang="zh-CN" dirty="0">
+                <a:latin typeface="微软雅黑" panose="020B0503020204020204" pitchFamily="34" charset="-122"/>
+                <a:ea typeface="微软雅黑" panose="020B0503020204020204" pitchFamily="34" charset="-122"/>
+                <a:cs typeface="微软雅黑" panose="020B0503020204020204" pitchFamily="34" charset="-122"/>
+              </a:rPr>
+              <a:t>Pixel-wise soft-max + Cross entropy loss function</a:t>
+            </a:r>
+          </a:p>
+          <a:p>
+            <a:endParaRPr lang="en-US" altLang="zh-CN" dirty="0">
+              <a:latin typeface="微软雅黑" panose="020B0503020204020204" pitchFamily="34" charset="-122"/>
+              <a:ea typeface="微软雅黑" panose="020B0503020204020204" pitchFamily="34" charset="-122"/>
+              <a:cs typeface="微软雅黑" panose="020B0503020204020204" pitchFamily="34" charset="-122"/>
+            </a:endParaRPr>
+          </a:p>
+        </p:txBody>
+      </p:sp>
+      <p:pic>
+        <p:nvPicPr>
+          <p:cNvPr id="7" name="图片 6">
+            <a:extLst>
+              <a:ext uri="{FF2B5EF4-FFF2-40B4-BE49-F238E27FC236}">
+                <a16:creationId xmlns:a16="http://schemas.microsoft.com/office/drawing/2014/main" id="{157B42EF-45F7-CD41-97F3-445C3978DD3C}"/>
+              </a:ext>
+            </a:extLst>
+          </p:cNvPr>
+          <p:cNvPicPr>
+            <a:picLocks noChangeAspect="1"/>
+          </p:cNvPicPr>
+          <p:nvPr/>
+        </p:nvPicPr>
+        <p:blipFill>
+          <a:blip r:embed="rId4"/>
+          <a:stretch>
+            <a:fillRect/>
+          </a:stretch>
+        </p:blipFill>
+        <p:spPr>
+          <a:xfrm>
+            <a:off x="2810663" y="4783594"/>
+            <a:ext cx="6240974" cy="1560243"/>
+          </a:xfrm>
+          <a:prstGeom prst="rect">
+            <a:avLst/>
+          </a:prstGeom>
+        </p:spPr>
+      </p:pic>
+      <p:sp>
+        <p:nvSpPr>
+          <p:cNvPr id="10" name="文本框 9">
+            <a:extLst>
+              <a:ext uri="{FF2B5EF4-FFF2-40B4-BE49-F238E27FC236}">
+                <a16:creationId xmlns:a16="http://schemas.microsoft.com/office/drawing/2014/main" id="{E1CD7A2E-8F8A-653D-7317-AF0737A033B8}"/>
+              </a:ext>
+            </a:extLst>
+          </p:cNvPr>
+          <p:cNvSpPr txBox="1"/>
+          <p:nvPr/>
+        </p:nvSpPr>
+        <p:spPr>
+          <a:xfrm>
+            <a:off x="5421746" y="6453096"/>
+            <a:ext cx="6114472" cy="276999"/>
+          </a:xfrm>
+          <a:prstGeom prst="rect">
+            <a:avLst/>
+          </a:prstGeom>
+          <a:noFill/>
+        </p:spPr>
+        <p:txBody>
+          <a:bodyPr wrap="square">
+            <a:spAutoFit/>
+          </a:bodyPr>
+          <a:lstStyle/>
+          <a:p>
+            <a:r>
+              <a:rPr lang="en-US" altLang="zh-CN" sz="1200" dirty="0"/>
+              <a:t>Image source: U-Net: Convolutional Networks for Biomedical Image Segmentation</a:t>
+            </a:r>
+            <a:endParaRPr lang="zh-CN" altLang="en-US" sz="1200" dirty="0"/>
+          </a:p>
+        </p:txBody>
+      </p:sp>
+      <p:pic>
+        <p:nvPicPr>
+          <p:cNvPr id="12" name="图片 11">
+            <a:extLst>
+              <a:ext uri="{FF2B5EF4-FFF2-40B4-BE49-F238E27FC236}">
+                <a16:creationId xmlns:a16="http://schemas.microsoft.com/office/drawing/2014/main" id="{4A9145A7-EE30-8984-24E8-63E9A5990F57}"/>
+              </a:ext>
+            </a:extLst>
+          </p:cNvPr>
+          <p:cNvPicPr>
+            <a:picLocks noChangeAspect="1"/>
+          </p:cNvPicPr>
+          <p:nvPr/>
+        </p:nvPicPr>
+        <p:blipFill>
+          <a:blip r:embed="rId5"/>
+          <a:stretch>
+            <a:fillRect/>
+          </a:stretch>
+        </p:blipFill>
+        <p:spPr>
+          <a:xfrm>
+            <a:off x="1061472" y="4062753"/>
+            <a:ext cx="4477506" cy="442222"/>
+          </a:xfrm>
+          <a:prstGeom prst="rect">
+            <a:avLst/>
+          </a:prstGeom>
+        </p:spPr>
+      </p:pic>
+      <p:pic>
+        <p:nvPicPr>
+          <p:cNvPr id="15" name="图片 14">
+            <a:extLst>
+              <a:ext uri="{FF2B5EF4-FFF2-40B4-BE49-F238E27FC236}">
+                <a16:creationId xmlns:a16="http://schemas.microsoft.com/office/drawing/2014/main" id="{AF6D8B4E-0039-FBA2-A323-4557D399E9AF}"/>
+              </a:ext>
+            </a:extLst>
+          </p:cNvPr>
+          <p:cNvPicPr>
+            <a:picLocks noChangeAspect="1"/>
+          </p:cNvPicPr>
+          <p:nvPr/>
+        </p:nvPicPr>
+        <p:blipFill>
+          <a:blip r:embed="rId6"/>
+          <a:stretch>
+            <a:fillRect/>
+          </a:stretch>
+        </p:blipFill>
+        <p:spPr>
+          <a:xfrm>
+            <a:off x="6458316" y="3893681"/>
+            <a:ext cx="4477507" cy="835284"/>
+          </a:xfrm>
+          <a:prstGeom prst="rect">
+            <a:avLst/>
+          </a:prstGeom>
+        </p:spPr>
+      </p:pic>
+      <p:pic>
+        <p:nvPicPr>
+          <p:cNvPr id="17" name="图片 16">
+            <a:extLst>
+              <a:ext uri="{FF2B5EF4-FFF2-40B4-BE49-F238E27FC236}">
+                <a16:creationId xmlns:a16="http://schemas.microsoft.com/office/drawing/2014/main" id="{CC7CCA70-D4A0-219B-86DF-F13AA665B72A}"/>
+              </a:ext>
+            </a:extLst>
+          </p:cNvPr>
+          <p:cNvPicPr>
+            <a:picLocks noChangeAspect="1"/>
+          </p:cNvPicPr>
+          <p:nvPr/>
+        </p:nvPicPr>
+        <p:blipFill>
+          <a:blip r:embed="rId7"/>
+          <a:stretch>
+            <a:fillRect/>
+          </a:stretch>
+        </p:blipFill>
+        <p:spPr>
+          <a:xfrm>
+            <a:off x="4814575" y="2956376"/>
+            <a:ext cx="2562849" cy="789283"/>
+          </a:xfrm>
+          <a:prstGeom prst="rect">
+            <a:avLst/>
+          </a:prstGeom>
+        </p:spPr>
+      </p:pic>
     </p:spTree>
     <p:extLst>
       <p:ext uri="{BB962C8B-B14F-4D97-AF65-F5344CB8AC3E}">
-        <p14:creationId xmlns:p14="http://schemas.microsoft.com/office/powerpoint/2010/main" val="2498790264"/>
+        <p14:creationId xmlns:p14="http://schemas.microsoft.com/office/powerpoint/2010/main" val="3636401044"/>
       </p:ext>
     </p:extLst>
   </p:cSld>
@@ -4920,7 +8386,7 @@
                 <a:cs typeface="Times New Roman" panose="02020603050405020304" charset="0"/>
                 <a:sym typeface="+mn-ea"/>
               </a:rPr>
-              <a:t>Resources and Experiment Platform</a:t>
+              <a:t>Improvements / Enlighten</a:t>
             </a:r>
           </a:p>
         </p:txBody>
@@ -5030,7 +8496,7 @@
                 <a:cs typeface="微软雅黑" panose="020B0503020204020204" pitchFamily="34" charset="-122"/>
                 <a:sym typeface="+mn-ea"/>
               </a:rPr>
-              <a:t>强调文字</a:t>
+              <a:t>强调</a:t>
             </a:r>
             <a:endParaRPr lang="en-US" altLang="zh-CN" b="1" u="sng" dirty="0">
               <a:solidFill>
@@ -5068,7 +8534,7 @@
     </p:spTree>
     <p:extLst>
       <p:ext uri="{BB962C8B-B14F-4D97-AF65-F5344CB8AC3E}">
-        <p14:creationId xmlns:p14="http://schemas.microsoft.com/office/powerpoint/2010/main" val="2267199000"/>
+        <p14:creationId xmlns:p14="http://schemas.microsoft.com/office/powerpoint/2010/main" val="1189555699"/>
       </p:ext>
     </p:extLst>
   </p:cSld>
@@ -5130,7 +8596,7 @@
                 <a:cs typeface="Times New Roman" panose="02020603050405020304" charset="0"/>
                 <a:sym typeface="+mn-ea"/>
               </a:rPr>
-              <a:t>Goals and Objects</a:t>
+              <a:t>Proposed Method</a:t>
             </a:r>
           </a:p>
         </p:txBody>
@@ -5240,7 +8706,7 @@
                 <a:cs typeface="微软雅黑" panose="020B0503020204020204" pitchFamily="34" charset="-122"/>
                 <a:sym typeface="+mn-ea"/>
               </a:rPr>
-              <a:t>强调文字</a:t>
+              <a:t>强调</a:t>
             </a:r>
             <a:endParaRPr lang="en-US" altLang="zh-CN" b="1" u="sng" dirty="0">
               <a:solidFill>
@@ -5278,7 +8744,7 @@
     </p:spTree>
     <p:extLst>
       <p:ext uri="{BB962C8B-B14F-4D97-AF65-F5344CB8AC3E}">
-        <p14:creationId xmlns:p14="http://schemas.microsoft.com/office/powerpoint/2010/main" val="203805915"/>
+        <p14:creationId xmlns:p14="http://schemas.microsoft.com/office/powerpoint/2010/main" val="2498790264"/>
       </p:ext>
     </p:extLst>
   </p:cSld>
@@ -5340,7 +8806,7 @@
                 <a:cs typeface="Times New Roman" panose="02020603050405020304" charset="0"/>
                 <a:sym typeface="+mn-ea"/>
               </a:rPr>
-              <a:t>Project Schedule</a:t>
+              <a:t>Resources and Experiment Platform</a:t>
             </a:r>
           </a:p>
         </p:txBody>
@@ -5418,16 +8884,52 @@
           </a:prstGeom>
         </p:spPr>
       </p:pic>
-      <p:sp>
-        <p:nvSpPr>
-          <p:cNvPr id="5" name="文本框 4"/>
+      <p:pic>
+        <p:nvPicPr>
+          <p:cNvPr id="4" name="图片 3">
+            <a:extLst>
+              <a:ext uri="{FF2B5EF4-FFF2-40B4-BE49-F238E27FC236}">
+                <a16:creationId xmlns:a16="http://schemas.microsoft.com/office/drawing/2014/main" id="{74BA0674-6764-F9AF-416B-BA2D6CB95B4E}"/>
+              </a:ext>
+            </a:extLst>
+          </p:cNvPr>
+          <p:cNvPicPr>
+            <a:picLocks noChangeAspect="1"/>
+          </p:cNvPicPr>
+          <p:nvPr/>
+        </p:nvPicPr>
+        <p:blipFill>
+          <a:blip r:embed="rId3"/>
+          <a:stretch>
+            <a:fillRect/>
+          </a:stretch>
+        </p:blipFill>
+        <p:spPr>
+          <a:xfrm>
+            <a:off x="829059" y="2190810"/>
+            <a:ext cx="10533882" cy="3301289"/>
+          </a:xfrm>
+          <a:prstGeom prst="rect">
+            <a:avLst/>
+          </a:prstGeom>
+        </p:spPr>
+      </p:pic>
+      <p:sp>
+        <p:nvSpPr>
+          <p:cNvPr id="8" name="文本框 7">
+            <a:extLst>
+              <a:ext uri="{FF2B5EF4-FFF2-40B4-BE49-F238E27FC236}">
+                <a16:creationId xmlns:a16="http://schemas.microsoft.com/office/drawing/2014/main" id="{B560E9D0-BD97-153D-5D84-57CE87E6F269}"/>
+              </a:ext>
+            </a:extLst>
+          </p:cNvPr>
           <p:cNvSpPr txBox="1"/>
           <p:nvPr/>
         </p:nvSpPr>
         <p:spPr>
           <a:xfrm>
-            <a:off x="712774" y="1197969"/>
-            <a:ext cx="1616958" cy="923330"/>
+            <a:off x="1006765" y="1471872"/>
+            <a:ext cx="6114472" cy="461665"/>
           </a:xfrm>
           <a:prstGeom prst="rect">
             <a:avLst/>
@@ -5435,60 +8937,31 @@
           <a:noFill/>
         </p:spPr>
         <p:txBody>
-          <a:bodyPr wrap="square" rtlCol="0">
+          <a:bodyPr wrap="square">
             <a:spAutoFit/>
           </a:bodyPr>
           <a:lstStyle/>
           <a:p>
             <a:r>
-              <a:rPr lang="zh-CN" altLang="en-US" b="1" u="sng" dirty="0">
-                <a:solidFill>
-                  <a:srgbClr val="002060"/>
-                </a:solidFill>
-                <a:latin typeface="微软雅黑" panose="020B0503020204020204" pitchFamily="34" charset="-122"/>
-                <a:ea typeface="微软雅黑" panose="020B0503020204020204" pitchFamily="34" charset="-122"/>
-                <a:cs typeface="微软雅黑" panose="020B0503020204020204" pitchFamily="34" charset="-122"/>
-                <a:sym typeface="+mn-ea"/>
-              </a:rPr>
-              <a:t>强调文字</a:t>
-            </a:r>
-            <a:endParaRPr lang="en-US" altLang="zh-CN" b="1" u="sng" dirty="0">
-              <a:solidFill>
-                <a:srgbClr val="002060"/>
-              </a:solidFill>
-              <a:latin typeface="微软雅黑" panose="020B0503020204020204" pitchFamily="34" charset="-122"/>
-              <a:ea typeface="微软雅黑" panose="020B0503020204020204" pitchFamily="34" charset="-122"/>
-              <a:cs typeface="微软雅黑" panose="020B0503020204020204" pitchFamily="34" charset="-122"/>
-              <a:sym typeface="+mn-ea"/>
-            </a:endParaRPr>
-          </a:p>
-          <a:p>
-            <a:endParaRPr lang="en-US" altLang="zh-CN" b="1" u="sng" dirty="0">
-              <a:solidFill>
-                <a:srgbClr val="002060"/>
-              </a:solidFill>
-              <a:latin typeface="微软雅黑" panose="020B0503020204020204" pitchFamily="34" charset="-122"/>
-              <a:ea typeface="微软雅黑" panose="020B0503020204020204" pitchFamily="34" charset="-122"/>
-              <a:cs typeface="微软雅黑" panose="020B0503020204020204" pitchFamily="34" charset="-122"/>
-              <a:sym typeface="+mn-ea"/>
-            </a:endParaRPr>
-          </a:p>
-          <a:p>
-            <a:r>
-              <a:rPr lang="zh-CN" altLang="en-US" dirty="0">
-                <a:latin typeface="微软雅黑" panose="020B0503020204020204" pitchFamily="34" charset="-122"/>
-                <a:ea typeface="微软雅黑" panose="020B0503020204020204" pitchFamily="34" charset="-122"/>
-                <a:cs typeface="微软雅黑" panose="020B0503020204020204" pitchFamily="34" charset="-122"/>
-              </a:rPr>
-              <a:t>正文</a:t>
-            </a:r>
+              <a:rPr lang="en-US" altLang="zh-CN" sz="2400" b="1" dirty="0"/>
+              <a:t>S</a:t>
+            </a:r>
+            <a:r>
+              <a:rPr lang="zh-CN" altLang="en-US" sz="2400" b="1" dirty="0"/>
+              <a:t>erver </a:t>
+            </a:r>
+            <a:r>
+              <a:rPr lang="en-US" altLang="zh-CN" sz="2400" b="1" dirty="0"/>
+              <a:t>provided by ML course</a:t>
+            </a:r>
+            <a:endParaRPr lang="zh-CN" altLang="en-US" sz="2400" b="1" dirty="0"/>
           </a:p>
         </p:txBody>
       </p:sp>
     </p:spTree>
     <p:extLst>
       <p:ext uri="{BB962C8B-B14F-4D97-AF65-F5344CB8AC3E}">
-        <p14:creationId xmlns:p14="http://schemas.microsoft.com/office/powerpoint/2010/main" val="3110451033"/>
+        <p14:creationId xmlns:p14="http://schemas.microsoft.com/office/powerpoint/2010/main" val="2267199000"/>
       </p:ext>
     </p:extLst>
   </p:cSld>
@@ -5781,4 +9254,299 @@
     </a:ext>
   </a:extLst>
 </a:theme>
+</file>
+
+<file path=ppt/theme/theme2.xml><?xml version="1.0" encoding="utf-8"?>
+<a:theme xmlns:a="http://schemas.openxmlformats.org/drawingml/2006/main" name="Office 主题​​">
+  <a:themeElements>
+    <a:clrScheme name="Office">
+      <a:dk1>
+        <a:sysClr val="windowText" lastClr="000000"/>
+      </a:dk1>
+      <a:lt1>
+        <a:sysClr val="window" lastClr="FFFFFF"/>
+      </a:lt1>
+      <a:dk2>
+        <a:srgbClr val="44546A"/>
+      </a:dk2>
+      <a:lt2>
+        <a:srgbClr val="E7E6E6"/>
+      </a:lt2>
+      <a:accent1>
+        <a:srgbClr val="4472C4"/>
+      </a:accent1>
+      <a:accent2>
+        <a:srgbClr val="ED7D31"/>
+      </a:accent2>
+      <a:accent3>
+        <a:srgbClr val="A5A5A5"/>
+      </a:accent3>
+      <a:accent4>
+        <a:srgbClr val="FFC000"/>
+      </a:accent4>
+      <a:accent5>
+        <a:srgbClr val="5B9BD5"/>
+      </a:accent5>
+      <a:accent6>
+        <a:srgbClr val="70AD47"/>
+      </a:accent6>
+      <a:hlink>
+        <a:srgbClr val="0563C1"/>
+      </a:hlink>
+      <a:folHlink>
+        <a:srgbClr val="954F72"/>
+      </a:folHlink>
+    </a:clrScheme>
+    <a:fontScheme name="Office">
+      <a:majorFont>
+        <a:latin typeface="等线 Light" panose="020F0302020204030204"/>
+        <a:ea typeface=""/>
+        <a:cs typeface=""/>
+        <a:font script="Jpan" typeface="游ゴシック Light"/>
+        <a:font script="Hang" typeface="맑은 고딕"/>
+        <a:font script="Hans" typeface="等线 Light"/>
+        <a:font script="Hant" typeface="新細明體"/>
+        <a:font script="Arab" typeface="Times New Roman"/>
+        <a:font script="Hebr" typeface="Times New Roman"/>
+        <a:font script="Thai" typeface="Angsana New"/>
+        <a:font script="Ethi" typeface="Nyala"/>
+        <a:font script="Beng" typeface="Vrinda"/>
+        <a:font script="Gujr" typeface="Shruti"/>
+        <a:font script="Khmr" typeface="MoolBoran"/>
+        <a:font script="Knda" typeface="Tunga"/>
+        <a:font script="Guru" typeface="Raavi"/>
+        <a:font script="Cans" typeface="Euphemia"/>
+        <a:font script="Cher" typeface="Plantagenet Cherokee"/>
+        <a:font script="Yiii" typeface="Microsoft Yi Baiti"/>
+        <a:font script="Tibt" typeface="Microsoft Himalaya"/>
+        <a:font script="Thaa" typeface="MV Boli"/>
+        <a:font script="Deva" typeface="Mangal"/>
+        <a:font script="Telu" typeface="Gautami"/>
+        <a:font script="Taml" typeface="Latha"/>
+        <a:font script="Syrc" typeface="Estrangelo Edessa"/>
+        <a:font script="Orya" typeface="Kalinga"/>
+        <a:font script="Mlym" typeface="Kartika"/>
+        <a:font script="Laoo" typeface="DokChampa"/>
+        <a:font script="Sinh" typeface="Iskoola Pota"/>
+        <a:font script="Mong" typeface="Mongolian Baiti"/>
+        <a:font script="Viet" typeface="Times New Roman"/>
+        <a:font script="Uigh" typeface="Microsoft Uighur"/>
+        <a:font script="Geor" typeface="Sylfaen"/>
+        <a:font script="Armn" typeface="Arial"/>
+        <a:font script="Bugi" typeface="Leelawadee UI"/>
+        <a:font script="Bopo" typeface="Microsoft JhengHei"/>
+        <a:font script="Java" typeface="Javanese Text"/>
+        <a:font script="Lisu" typeface="Segoe UI"/>
+        <a:font script="Mymr" typeface="Myanmar Text"/>
+        <a:font script="Nkoo" typeface="Ebrima"/>
+        <a:font script="Olck" typeface="Nirmala UI"/>
+        <a:font script="Osma" typeface="Ebrima"/>
+        <a:font script="Phag" typeface="Phagspa"/>
+        <a:font script="Syrn" typeface="Estrangelo Edessa"/>
+        <a:font script="Syrj" typeface="Estrangelo Edessa"/>
+        <a:font script="Syre" typeface="Estrangelo Edessa"/>
+        <a:font script="Sora" typeface="Nirmala UI"/>
+        <a:font script="Tale" typeface="Microsoft Tai Le"/>
+        <a:font script="Talu" typeface="Microsoft New Tai Lue"/>
+        <a:font script="Tfng" typeface="Ebrima"/>
+      </a:majorFont>
+      <a:minorFont>
+        <a:latin typeface="等线" panose="020F0502020204030204"/>
+        <a:ea typeface=""/>
+        <a:cs typeface=""/>
+        <a:font script="Jpan" typeface="游ゴシック"/>
+        <a:font script="Hang" typeface="맑은 고딕"/>
+        <a:font script="Hans" typeface="等线"/>
+        <a:font script="Hant" typeface="新細明體"/>
+        <a:font script="Arab" typeface="Arial"/>
+        <a:font script="Hebr" typeface="Arial"/>
+        <a:font script="Thai" typeface="Cordia New"/>
+        <a:font script="Ethi" typeface="Nyala"/>
+        <a:font script="Beng" typeface="Vrinda"/>
+        <a:font script="Gujr" typeface="Shruti"/>
+        <a:font script="Khmr" typeface="DaunPenh"/>
+        <a:font script="Knda" typeface="Tunga"/>
+        <a:font script="Guru" typeface="Raavi"/>
+        <a:font script="Cans" typeface="Euphemia"/>
+        <a:font script="Cher" typeface="Plantagenet Cherokee"/>
+        <a:font script="Yiii" typeface="Microsoft Yi Baiti"/>
+        <a:font script="Tibt" typeface="Microsoft Himalaya"/>
+        <a:font script="Thaa" typeface="MV Boli"/>
+        <a:font script="Deva" typeface="Mangal"/>
+        <a:font script="Telu" typeface="Gautami"/>
+        <a:font script="Taml" typeface="Latha"/>
+        <a:font script="Syrc" typeface="Estrangelo Edessa"/>
+        <a:font script="Orya" typeface="Kalinga"/>
+        <a:font script="Mlym" typeface="Kartika"/>
+        <a:font script="Laoo" typeface="DokChampa"/>
+        <a:font script="Sinh" typeface="Iskoola Pota"/>
+        <a:font script="Mong" typeface="Mongolian Baiti"/>
+        <a:font script="Viet" typeface="Arial"/>
+        <a:font script="Uigh" typeface="Microsoft Uighur"/>
+        <a:font script="Geor" typeface="Sylfaen"/>
+        <a:font script="Armn" typeface="Arial"/>
+        <a:font script="Bugi" typeface="Leelawadee UI"/>
+        <a:font script="Bopo" typeface="Microsoft JhengHei"/>
+        <a:font script="Java" typeface="Javanese Text"/>
+        <a:font script="Lisu" typeface="Segoe UI"/>
+        <a:font script="Mymr" typeface="Myanmar Text"/>
+        <a:font script="Nkoo" typeface="Ebrima"/>
+        <a:font script="Olck" typeface="Nirmala UI"/>
+        <a:font script="Osma" typeface="Ebrima"/>
+        <a:font script="Phag" typeface="Phagspa"/>
+        <a:font script="Syrn" typeface="Estrangelo Edessa"/>
+        <a:font script="Syrj" typeface="Estrangelo Edessa"/>
+        <a:font script="Syre" typeface="Estrangelo Edessa"/>
+        <a:font script="Sora" typeface="Nirmala UI"/>
+        <a:font script="Tale" typeface="Microsoft Tai Le"/>
+        <a:font script="Talu" typeface="Microsoft New Tai Lue"/>
+        <a:font script="Tfng" typeface="Ebrima"/>
+      </a:minorFont>
+    </a:fontScheme>
+    <a:fmtScheme name="Office">
+      <a:fillStyleLst>
+        <a:solidFill>
+          <a:schemeClr val="phClr"/>
+        </a:solidFill>
+        <a:gradFill rotWithShape="1">
+          <a:gsLst>
+            <a:gs pos="0">
+              <a:schemeClr val="phClr">
+                <a:lumMod val="110000"/>
+                <a:satMod val="105000"/>
+                <a:tint val="67000"/>
+              </a:schemeClr>
+            </a:gs>
+            <a:gs pos="50000">
+              <a:schemeClr val="phClr">
+                <a:lumMod val="105000"/>
+                <a:satMod val="103000"/>
+                <a:tint val="73000"/>
+              </a:schemeClr>
+            </a:gs>
+            <a:gs pos="100000">
+              <a:schemeClr val="phClr">
+                <a:lumMod val="105000"/>
+                <a:satMod val="109000"/>
+                <a:tint val="81000"/>
+              </a:schemeClr>
+            </a:gs>
+          </a:gsLst>
+          <a:lin ang="5400000" scaled="0"/>
+        </a:gradFill>
+        <a:gradFill rotWithShape="1">
+          <a:gsLst>
+            <a:gs pos="0">
+              <a:schemeClr val="phClr">
+                <a:satMod val="103000"/>
+                <a:lumMod val="102000"/>
+                <a:tint val="94000"/>
+              </a:schemeClr>
+            </a:gs>
+            <a:gs pos="50000">
+              <a:schemeClr val="phClr">
+                <a:satMod val="110000"/>
+                <a:lumMod val="100000"/>
+                <a:shade val="100000"/>
+              </a:schemeClr>
+            </a:gs>
+            <a:gs pos="100000">
+              <a:schemeClr val="phClr">
+                <a:lumMod val="99000"/>
+                <a:satMod val="120000"/>
+                <a:shade val="78000"/>
+              </a:schemeClr>
+            </a:gs>
+          </a:gsLst>
+          <a:lin ang="5400000" scaled="0"/>
+        </a:gradFill>
+      </a:fillStyleLst>
+      <a:lnStyleLst>
+        <a:ln w="6350" cap="flat" cmpd="sng" algn="ctr">
+          <a:solidFill>
+            <a:schemeClr val="phClr"/>
+          </a:solidFill>
+          <a:prstDash val="solid"/>
+          <a:miter lim="800000"/>
+        </a:ln>
+        <a:ln w="12700" cap="flat" cmpd="sng" algn="ctr">
+          <a:solidFill>
+            <a:schemeClr val="phClr"/>
+          </a:solidFill>
+          <a:prstDash val="solid"/>
+          <a:miter lim="800000"/>
+        </a:ln>
+        <a:ln w="19050" cap="flat" cmpd="sng" algn="ctr">
+          <a:solidFill>
+            <a:schemeClr val="phClr"/>
+          </a:solidFill>
+          <a:prstDash val="solid"/>
+          <a:miter lim="800000"/>
+        </a:ln>
+      </a:lnStyleLst>
+      <a:effectStyleLst>
+        <a:effectStyle>
+          <a:effectLst/>
+        </a:effectStyle>
+        <a:effectStyle>
+          <a:effectLst/>
+        </a:effectStyle>
+        <a:effectStyle>
+          <a:effectLst>
+            <a:outerShdw blurRad="57150" dist="19050" dir="5400000" algn="ctr" rotWithShape="0">
+              <a:srgbClr val="000000">
+                <a:alpha val="63000"/>
+              </a:srgbClr>
+            </a:outerShdw>
+          </a:effectLst>
+        </a:effectStyle>
+      </a:effectStyleLst>
+      <a:bgFillStyleLst>
+        <a:solidFill>
+          <a:schemeClr val="phClr"/>
+        </a:solidFill>
+        <a:solidFill>
+          <a:schemeClr val="phClr">
+            <a:tint val="95000"/>
+            <a:satMod val="170000"/>
+          </a:schemeClr>
+        </a:solidFill>
+        <a:gradFill rotWithShape="1">
+          <a:gsLst>
+            <a:gs pos="0">
+              <a:schemeClr val="phClr">
+                <a:tint val="93000"/>
+                <a:satMod val="150000"/>
+                <a:shade val="98000"/>
+                <a:lumMod val="102000"/>
+              </a:schemeClr>
+            </a:gs>
+            <a:gs pos="50000">
+              <a:schemeClr val="phClr">
+                <a:tint val="98000"/>
+                <a:satMod val="130000"/>
+                <a:shade val="90000"/>
+                <a:lumMod val="103000"/>
+              </a:schemeClr>
+            </a:gs>
+            <a:gs pos="100000">
+              <a:schemeClr val="phClr">
+                <a:shade val="63000"/>
+                <a:satMod val="120000"/>
+              </a:schemeClr>
+            </a:gs>
+          </a:gsLst>
+          <a:lin ang="5400000" scaled="0"/>
+        </a:gradFill>
+      </a:bgFillStyleLst>
+    </a:fmtScheme>
+  </a:themeElements>
+  <a:objectDefaults/>
+  <a:extraClrSchemeLst/>
+  <a:extLst>
+    <a:ext uri="{05A4C25C-085E-4340-85A3-A5531E510DB2}">
+      <thm15:themeFamily xmlns:thm15="http://schemas.microsoft.com/office/thememl/2012/main" name="Office Theme" id="{62F939B6-93AF-4DB8-9C6B-D6C7DFDC589F}" vid="{4A3C46E8-61CC-4603-A589-7422A47A8E4A}"/>
+    </a:ext>
+  </a:extLst>
+</a:theme>
 </file>
</xml_diff>

<commit_message>
[update] proposal.pptx, TODO:'Proposal Method'
</commit_message>
<xml_diff>
--- a/proposal.pptx
+++ b/proposal.pptx
@@ -5,7 +5,7 @@
     <p:sldMasterId id="2147483648" r:id="rId1"/>
   </p:sldMasterIdLst>
   <p:notesMasterIdLst>
-    <p:notesMasterId r:id="rId19"/>
+    <p:notesMasterId r:id="rId21"/>
   </p:notesMasterIdLst>
   <p:sldIdLst>
     <p:sldId id="267" r:id="rId2"/>
@@ -14,17 +14,19 @@
     <p:sldId id="295" r:id="rId5"/>
     <p:sldId id="301" r:id="rId6"/>
     <p:sldId id="311" r:id="rId7"/>
-    <p:sldId id="302" r:id="rId8"/>
-    <p:sldId id="303" r:id="rId9"/>
-    <p:sldId id="304" r:id="rId10"/>
-    <p:sldId id="309" r:id="rId11"/>
-    <p:sldId id="310" r:id="rId12"/>
-    <p:sldId id="305" r:id="rId13"/>
-    <p:sldId id="306" r:id="rId14"/>
-    <p:sldId id="308" r:id="rId15"/>
-    <p:sldId id="298" r:id="rId16"/>
-    <p:sldId id="268" r:id="rId17"/>
-    <p:sldId id="300" r:id="rId18"/>
+    <p:sldId id="313" r:id="rId8"/>
+    <p:sldId id="312" r:id="rId9"/>
+    <p:sldId id="302" r:id="rId10"/>
+    <p:sldId id="303" r:id="rId11"/>
+    <p:sldId id="304" r:id="rId12"/>
+    <p:sldId id="309" r:id="rId13"/>
+    <p:sldId id="310" r:id="rId14"/>
+    <p:sldId id="305" r:id="rId15"/>
+    <p:sldId id="306" r:id="rId16"/>
+    <p:sldId id="308" r:id="rId17"/>
+    <p:sldId id="298" r:id="rId18"/>
+    <p:sldId id="268" r:id="rId19"/>
+    <p:sldId id="300" r:id="rId20"/>
   </p:sldIdLst>
   <p:sldSz cx="12192000" cy="6858000"/>
   <p:notesSz cx="6858000" cy="9144000"/>
@@ -213,7 +215,7 @@
           <a:p>
             <a:fld id="{66A6A335-5269-4B85-95DB-91C53040B856}" type="datetimeFigureOut">
               <a:rPr lang="zh-CN" altLang="en-US" smtClean="0"/>
-              <a:t>2023/12/8</a:t>
+              <a:t>2023/12/9</a:t>
             </a:fld>
             <a:endParaRPr lang="zh-CN" altLang="en-US"/>
           </a:p>
@@ -971,7 +973,7 @@
                 <a:effectLst/>
                 <a:latin typeface="-apple-system"/>
               </a:rPr>
-              <a:t>形形状。</a:t>
+              <a:t>形形状。它包含压缩路径和扩展路径，两个路径分别进行最大池降采样操作和反卷积，最终得到</a:t>
             </a:r>
             <a:endParaRPr lang="en-US" altLang="zh-CN" b="0" i="0" dirty="0">
               <a:solidFill>
@@ -1000,86 +1002,22 @@
               <a:defRPr/>
             </a:pPr>
             <a:r>
-              <a:rPr lang="en-US" altLang="zh-CN" b="0" i="0" dirty="0">
+              <a:rPr lang="zh-CN" altLang="en-US" b="0" i="0" dirty="0">
                 <a:solidFill>
                   <a:srgbClr val="191B1F"/>
                 </a:solidFill>
                 <a:effectLst/>
                 <a:latin typeface="-apple-system"/>
               </a:rPr>
-              <a:t>U-Net</a:t>
-            </a:r>
-            <a:r>
-              <a:rPr lang="zh-CN" altLang="en-US" b="0" i="0" dirty="0">
-                <a:solidFill>
-                  <a:srgbClr val="191B1F"/>
-                </a:solidFill>
-                <a:effectLst/>
-                <a:latin typeface="-apple-system"/>
-              </a:rPr>
-              <a:t>的实验是一个比较简单的</a:t>
-            </a:r>
-            <a:r>
-              <a:rPr lang="en-US" altLang="zh-CN" b="0" i="0" dirty="0">
-                <a:solidFill>
-                  <a:srgbClr val="191B1F"/>
-                </a:solidFill>
-                <a:effectLst/>
-                <a:latin typeface="-apple-system"/>
-              </a:rPr>
-              <a:t>ISBI cell tracking</a:t>
-            </a:r>
-            <a:r>
-              <a:rPr lang="zh-CN" altLang="en-US" b="0" i="0" dirty="0">
-                <a:solidFill>
-                  <a:srgbClr val="191B1F"/>
-                </a:solidFill>
-                <a:effectLst/>
-                <a:latin typeface="-apple-system"/>
-              </a:rPr>
-              <a:t>数据集，由于本身的任务比较简单，</a:t>
-            </a:r>
-            <a:r>
-              <a:rPr lang="en-US" altLang="zh-CN" b="0" i="0" dirty="0">
-                <a:solidFill>
-                  <a:srgbClr val="191B1F"/>
-                </a:solidFill>
-                <a:effectLst/>
-                <a:latin typeface="-apple-system"/>
-              </a:rPr>
-              <a:t>U-Net</a:t>
-            </a:r>
-            <a:r>
-              <a:rPr lang="zh-CN" altLang="en-US" b="0" i="0" dirty="0">
-                <a:solidFill>
-                  <a:srgbClr val="191B1F"/>
-                </a:solidFill>
-                <a:effectLst/>
-                <a:latin typeface="-apple-system"/>
-              </a:rPr>
-              <a:t>紧紧通过</a:t>
-            </a:r>
-            <a:r>
-              <a:rPr lang="en-US" altLang="zh-CN" b="0" i="0" dirty="0">
-                <a:solidFill>
-                  <a:srgbClr val="191B1F"/>
-                </a:solidFill>
-                <a:effectLst/>
-                <a:latin typeface="-apple-system"/>
-              </a:rPr>
-              <a:t>30</a:t>
-            </a:r>
-            <a:r>
-              <a:rPr lang="zh-CN" altLang="en-US" b="0" i="0" dirty="0">
-                <a:solidFill>
-                  <a:srgbClr val="191B1F"/>
-                </a:solidFill>
-                <a:effectLst/>
-                <a:latin typeface="-apple-system"/>
-              </a:rPr>
-              <a:t>张图片并辅以数据扩充策略便达到非常低的错误率，拿了当届比赛的冠军。</a:t>
-            </a:r>
-            <a:endParaRPr lang="zh-CN" altLang="en-US" dirty="0"/>
+              <a:t>。</a:t>
+            </a:r>
+            <a:endParaRPr lang="en-US" altLang="zh-CN" b="0" i="0" dirty="0">
+              <a:solidFill>
+                <a:srgbClr val="191B1F"/>
+              </a:solidFill>
+              <a:effectLst/>
+              <a:latin typeface="-apple-system"/>
+            </a:endParaRPr>
           </a:p>
         </p:txBody>
       </p:sp>
@@ -1181,72 +1119,145 @@
               <a:defRPr/>
             </a:pPr>
             <a:r>
-              <a:rPr lang="en-US" altLang="zh-CN" b="0" i="0" dirty="0">
+              <a:rPr lang="zh-CN" altLang="en-US" b="0" i="0" dirty="0">
                 <a:solidFill>
                   <a:srgbClr val="191B1F"/>
                 </a:solidFill>
                 <a:effectLst/>
                 <a:latin typeface="-apple-system"/>
               </a:rPr>
-              <a:t>U-Net</a:t>
-            </a:r>
-            <a:r>
-              <a:rPr lang="zh-CN" altLang="en-US" b="0" i="0" dirty="0">
+              <a:t>由于</a:t>
+            </a:r>
+            <a:r>
+              <a:rPr lang="en-US" altLang="zh-CN" b="0" i="0" dirty="0">
                 <a:solidFill>
                   <a:srgbClr val="191B1F"/>
                 </a:solidFill>
                 <a:effectLst/>
                 <a:latin typeface="-apple-system"/>
               </a:rPr>
-              <a:t>是比较早的使用全卷积网络进行语义分割的算法之一，论文中使用包含压缩路径和扩展路径的对称</a:t>
-            </a:r>
-            <a:r>
-              <a:rPr lang="en-US" altLang="zh-CN" b="0" i="0" dirty="0">
+              <a:t>batch size</a:t>
+            </a:r>
+            <a:r>
+              <a:rPr lang="zh-CN" altLang="en-US" b="0" i="0" dirty="0">
                 <a:solidFill>
                   <a:srgbClr val="191B1F"/>
                 </a:solidFill>
                 <a:effectLst/>
                 <a:latin typeface="-apple-system"/>
               </a:rPr>
-              <a:t>U</a:t>
-            </a:r>
-            <a:r>
-              <a:rPr lang="zh-CN" altLang="en-US" b="0" i="0" dirty="0">
+              <a:t>非常大的时候，很多</a:t>
+            </a:r>
+            <a:r>
+              <a:rPr lang="en-US" altLang="zh-CN" b="0" i="0" dirty="0" err="1">
                 <a:solidFill>
                   <a:srgbClr val="191B1F"/>
                 </a:solidFill>
                 <a:effectLst/>
                 <a:latin typeface="-apple-system"/>
               </a:rPr>
-              <a:t>形结构在当时非常具有创新性，且一定程度上影响了后面若干个分割网络的设计，该网络的名字也是取自其</a:t>
-            </a:r>
-            <a:r>
-              <a:rPr lang="en-US" altLang="zh-CN" b="0" i="0" dirty="0">
+              <a:t>gpu</a:t>
+            </a:r>
+            <a:r>
+              <a:rPr lang="zh-CN" altLang="en-US" b="0" i="0" dirty="0">
                 <a:solidFill>
                   <a:srgbClr val="191B1F"/>
                 </a:solidFill>
                 <a:effectLst/>
                 <a:latin typeface="-apple-system"/>
               </a:rPr>
-              <a:t>U</a:t>
-            </a:r>
-            <a:r>
-              <a:rPr lang="zh-CN" altLang="en-US" b="0" i="0" dirty="0">
+              <a:t>的显存用于存储模型权重，使得</a:t>
+            </a:r>
+            <a:r>
+              <a:rPr lang="en-US" altLang="zh-CN" b="0" i="0" dirty="0" err="1">
                 <a:solidFill>
                   <a:srgbClr val="191B1F"/>
                 </a:solidFill>
                 <a:effectLst/>
                 <a:latin typeface="-apple-system"/>
               </a:rPr>
-              <a:t>形形状。</a:t>
-            </a:r>
-            <a:endParaRPr lang="en-US" altLang="zh-CN" b="0" i="0" dirty="0">
-              <a:solidFill>
-                <a:srgbClr val="191B1F"/>
-              </a:solidFill>
-              <a:effectLst/>
-              <a:latin typeface="-apple-system"/>
-            </a:endParaRPr>
+              <a:t>gpu</a:t>
+            </a:r>
+            <a:r>
+              <a:rPr lang="zh-CN" altLang="en-US" b="0" i="0" dirty="0">
+                <a:solidFill>
+                  <a:srgbClr val="191B1F"/>
+                </a:solidFill>
+                <a:effectLst/>
+                <a:latin typeface="-apple-system"/>
+              </a:rPr>
+              <a:t>显存浪费很多；因此 </a:t>
+            </a:r>
+            <a:r>
+              <a:rPr lang="en-US" altLang="zh-CN" b="0" i="0" dirty="0">
+                <a:solidFill>
+                  <a:srgbClr val="191B1F"/>
+                </a:solidFill>
+                <a:effectLst/>
+                <a:latin typeface="-apple-system"/>
+              </a:rPr>
+              <a:t>U-Net </a:t>
+            </a:r>
+            <a:r>
+              <a:rPr lang="zh-CN" altLang="en-US" b="0" i="0" dirty="0">
+                <a:solidFill>
+                  <a:srgbClr val="191B1F"/>
+                </a:solidFill>
+                <a:effectLst/>
+                <a:latin typeface="-apple-system"/>
+              </a:rPr>
+              <a:t>的团队采用更大的单张图片，而</a:t>
+            </a:r>
+            <a:r>
+              <a:rPr lang="en-US" altLang="zh-CN" b="0" i="0" dirty="0">
+                <a:solidFill>
+                  <a:srgbClr val="191B1F"/>
+                </a:solidFill>
+                <a:effectLst/>
+                <a:latin typeface="-apple-system"/>
+              </a:rPr>
+              <a:t>batch size</a:t>
+            </a:r>
+            <a:r>
+              <a:rPr lang="zh-CN" altLang="en-US" b="0" i="0" dirty="0">
+                <a:solidFill>
+                  <a:srgbClr val="191B1F"/>
+                </a:solidFill>
+                <a:effectLst/>
+                <a:latin typeface="-apple-system"/>
+              </a:rPr>
+              <a:t>设置为</a:t>
+            </a:r>
+            <a:r>
+              <a:rPr lang="en-US" altLang="zh-CN" b="0" i="0" dirty="0">
+                <a:solidFill>
+                  <a:srgbClr val="191B1F"/>
+                </a:solidFill>
+                <a:effectLst/>
+                <a:latin typeface="-apple-system"/>
+              </a:rPr>
+              <a:t>1</a:t>
+            </a:r>
+            <a:r>
+              <a:rPr lang="zh-CN" altLang="en-US" b="0" i="0" dirty="0">
+                <a:solidFill>
+                  <a:srgbClr val="191B1F"/>
+                </a:solidFill>
+                <a:effectLst/>
+                <a:latin typeface="-apple-system"/>
+              </a:rPr>
+              <a:t>。这会导致梯度估计依赖于单张图片造成噪声比较大，因此采用一个很高的动量，使得早期的训练样本也可以对梯度下降方式产生较大的影响。</a:t>
+            </a:r>
+            <a:r>
+              <a:rPr lang="en-US" altLang="zh-CN" b="0" i="0" dirty="0">
+                <a:solidFill>
+                  <a:srgbClr val="191B1F"/>
+                </a:solidFill>
+                <a:effectLst/>
+                <a:latin typeface="-apple-system"/>
+              </a:rPr>
+              <a:t> </a:t>
+            </a:r>
           </a:p>
           <a:p>
             <a:pPr marL="0" marR="0" lvl="0" indent="0" algn="l" defTabSz="914400" rtl="0" eaLnBrk="1" fontAlgn="auto" latinLnBrk="0" hangingPunct="1">
@@ -1274,7 +1285,7 @@
                 <a:effectLst/>
                 <a:latin typeface="-apple-system"/>
               </a:rPr>
-              <a:t>U-Net</a:t>
+              <a:t>(a)</a:t>
             </a:r>
             <a:r>
               <a:rPr lang="zh-CN" altLang="en-US" b="0" i="0" dirty="0">
@@ -1284,7 +1295,7 @@
                 <a:effectLst/>
                 <a:latin typeface="-apple-system"/>
               </a:rPr>
-              <a:t>的实验是一个比较简单的</a:t>
+              <a:t>是输入数据，</a:t>
             </a:r>
             <a:r>
               <a:rPr lang="en-US" altLang="zh-CN" b="0" i="0" dirty="0">
@@ -1294,7 +1305,7 @@
                 <a:effectLst/>
                 <a:latin typeface="-apple-system"/>
               </a:rPr>
-              <a:t>ISBI cell tracking</a:t>
+              <a:t>(b)</a:t>
             </a:r>
             <a:r>
               <a:rPr lang="zh-CN" altLang="en-US" b="0" i="0" dirty="0">
@@ -1304,7 +1315,7 @@
                 <a:effectLst/>
                 <a:latin typeface="-apple-system"/>
               </a:rPr>
-              <a:t>数据集，由于本身的任务比较简单，</a:t>
+              <a:t>是</a:t>
             </a:r>
             <a:r>
               <a:rPr lang="en-US" altLang="zh-CN" b="0" i="0" dirty="0">
@@ -1314,7 +1325,7 @@
                 <a:effectLst/>
                 <a:latin typeface="-apple-system"/>
               </a:rPr>
-              <a:t>U-Net</a:t>
+              <a:t>Ground Truth</a:t>
             </a:r>
             <a:r>
               <a:rPr lang="zh-CN" altLang="en-US" b="0" i="0" dirty="0">
@@ -1324,7 +1335,7 @@
                 <a:effectLst/>
                 <a:latin typeface="-apple-system"/>
               </a:rPr>
-              <a:t>紧紧通过</a:t>
+              <a:t>，</a:t>
             </a:r>
             <a:r>
               <a:rPr lang="en-US" altLang="zh-CN" b="0" i="0" dirty="0">
@@ -1334,7 +1345,7 @@
                 <a:effectLst/>
                 <a:latin typeface="-apple-system"/>
               </a:rPr>
-              <a:t>30</a:t>
+              <a:t>(c)</a:t>
             </a:r>
             <a:r>
               <a:rPr lang="zh-CN" altLang="en-US" b="0" i="0" dirty="0">
@@ -1344,7 +1355,67 @@
                 <a:effectLst/>
                 <a:latin typeface="-apple-system"/>
               </a:rPr>
-              <a:t>张图片并辅以数据扩充策略便达到非常低的错误率，拿了当届比赛的冠军。</a:t>
+              <a:t>是基于</a:t>
+            </a:r>
+            <a:r>
+              <a:rPr lang="en-US" altLang="zh-CN" b="0" i="0" dirty="0">
+                <a:solidFill>
+                  <a:srgbClr val="191B1F"/>
+                </a:solidFill>
+                <a:effectLst/>
+                <a:latin typeface="-apple-system"/>
+              </a:rPr>
+              <a:t>Ground Truth</a:t>
+            </a:r>
+            <a:r>
+              <a:rPr lang="zh-CN" altLang="en-US" b="0" i="0" dirty="0">
+                <a:solidFill>
+                  <a:srgbClr val="191B1F"/>
+                </a:solidFill>
+                <a:effectLst/>
+                <a:latin typeface="-apple-system"/>
+              </a:rPr>
+              <a:t>生成的分割掩码，</a:t>
+            </a:r>
+            <a:r>
+              <a:rPr lang="en-US" altLang="zh-CN" b="0" i="0" dirty="0">
+                <a:solidFill>
+                  <a:srgbClr val="191B1F"/>
+                </a:solidFill>
+                <a:effectLst/>
+                <a:latin typeface="-apple-system"/>
+              </a:rPr>
+              <a:t>(d)</a:t>
+            </a:r>
+            <a:r>
+              <a:rPr lang="zh-CN" altLang="en-US" b="0" i="0" dirty="0">
+                <a:solidFill>
+                  <a:srgbClr val="191B1F"/>
+                </a:solidFill>
+                <a:effectLst/>
+                <a:latin typeface="-apple-system"/>
+              </a:rPr>
+              <a:t>是</a:t>
+            </a:r>
+            <a:r>
+              <a:rPr lang="en-US" altLang="zh-CN" b="0" i="0" dirty="0">
+                <a:solidFill>
+                  <a:srgbClr val="191B1F"/>
+                </a:solidFill>
+                <a:effectLst/>
+                <a:latin typeface="-apple-system"/>
+              </a:rPr>
+              <a:t>U-Net</a:t>
+            </a:r>
+            <a:r>
+              <a:rPr lang="zh-CN" altLang="en-US" b="0" i="0" dirty="0">
+                <a:solidFill>
+                  <a:srgbClr val="191B1F"/>
+                </a:solidFill>
+                <a:effectLst/>
+                <a:latin typeface="-apple-system"/>
+              </a:rPr>
+              <a:t>使用的用于分离边界的损失权值。</a:t>
             </a:r>
             <a:endParaRPr lang="zh-CN" altLang="en-US" dirty="0"/>
           </a:p>
@@ -1377,6 +1448,587 @@
     <p:extLst>
       <p:ext uri="{BB962C8B-B14F-4D97-AF65-F5344CB8AC3E}">
         <p14:creationId xmlns:p14="http://schemas.microsoft.com/office/powerpoint/2010/main" val="1602455186"/>
+      </p:ext>
+    </p:extLst>
+  </p:cSld>
+  <p:clrMapOvr>
+    <a:masterClrMapping/>
+  </p:clrMapOvr>
+</p:notes>
+</file>
+
+<file path=ppt/notesSlides/notesSlide5.xml><?xml version="1.0" encoding="utf-8"?>
+<p:notes xmlns:a="http://schemas.openxmlformats.org/drawingml/2006/main" xmlns:r="http://schemas.openxmlformats.org/officeDocument/2006/relationships" xmlns:p="http://schemas.openxmlformats.org/presentationml/2006/main">
+  <p:cSld>
+    <p:spTree>
+      <p:nvGrpSpPr>
+        <p:cNvPr id="1" name=""/>
+        <p:cNvGrpSpPr/>
+        <p:nvPr/>
+      </p:nvGrpSpPr>
+      <p:grpSpPr>
+        <a:xfrm>
+          <a:off x="0" y="0"/>
+          <a:ext cx="0" cy="0"/>
+          <a:chOff x="0" y="0"/>
+          <a:chExt cx="0" cy="0"/>
+        </a:xfrm>
+      </p:grpSpPr>
+      <p:sp>
+        <p:nvSpPr>
+          <p:cNvPr id="2" name="幻灯片图像占位符 1"/>
+          <p:cNvSpPr>
+            <a:spLocks noGrp="1" noRot="1" noChangeAspect="1"/>
+          </p:cNvSpPr>
+          <p:nvPr>
+            <p:ph type="sldImg"/>
+          </p:nvPr>
+        </p:nvSpPr>
+        <p:spPr/>
+      </p:sp>
+      <p:sp>
+        <p:nvSpPr>
+          <p:cNvPr id="3" name="备注占位符 2"/>
+          <p:cNvSpPr>
+            <a:spLocks noGrp="1"/>
+          </p:cNvSpPr>
+          <p:nvPr>
+            <p:ph type="body" idx="1"/>
+          </p:nvPr>
+        </p:nvSpPr>
+        <p:spPr/>
+        <p:txBody>
+          <a:bodyPr/>
+          <a:lstStyle/>
+          <a:p>
+            <a:pPr marL="0" marR="0" lvl="0" indent="0" algn="l" defTabSz="914400" rtl="0" eaLnBrk="1" fontAlgn="auto" latinLnBrk="0" hangingPunct="1">
+              <a:lnSpc>
+                <a:spcPct val="100000"/>
+              </a:lnSpc>
+              <a:spcBef>
+                <a:spcPts val="0"/>
+              </a:spcBef>
+              <a:spcAft>
+                <a:spcPts val="0"/>
+              </a:spcAft>
+              <a:buClrTx/>
+              <a:buSzTx/>
+              <a:buFontTx/>
+              <a:buNone/>
+              <a:tabLst/>
+              <a:defRPr/>
+            </a:pPr>
+            <a:r>
+              <a:rPr lang="zh-CN" altLang="en-US" b="0" i="0" dirty="0">
+                <a:solidFill>
+                  <a:srgbClr val="191B1F"/>
+                </a:solidFill>
+                <a:effectLst/>
+                <a:latin typeface="-apple-system"/>
+              </a:rPr>
+              <a:t>由于</a:t>
+            </a:r>
+            <a:r>
+              <a:rPr lang="en-US" altLang="zh-CN" b="0" i="0" dirty="0">
+                <a:solidFill>
+                  <a:srgbClr val="191B1F"/>
+                </a:solidFill>
+                <a:effectLst/>
+                <a:latin typeface="-apple-system"/>
+              </a:rPr>
+              <a:t>batch size</a:t>
+            </a:r>
+            <a:r>
+              <a:rPr lang="zh-CN" altLang="en-US" b="0" i="0" dirty="0">
+                <a:solidFill>
+                  <a:srgbClr val="191B1F"/>
+                </a:solidFill>
+                <a:effectLst/>
+                <a:latin typeface="-apple-system"/>
+              </a:rPr>
+              <a:t>非常大的时候，很多</a:t>
+            </a:r>
+            <a:r>
+              <a:rPr lang="en-US" altLang="zh-CN" b="0" i="0" dirty="0" err="1">
+                <a:solidFill>
+                  <a:srgbClr val="191B1F"/>
+                </a:solidFill>
+                <a:effectLst/>
+                <a:latin typeface="-apple-system"/>
+              </a:rPr>
+              <a:t>gpu</a:t>
+            </a:r>
+            <a:r>
+              <a:rPr lang="zh-CN" altLang="en-US" b="0" i="0" dirty="0">
+                <a:solidFill>
+                  <a:srgbClr val="191B1F"/>
+                </a:solidFill>
+                <a:effectLst/>
+                <a:latin typeface="-apple-system"/>
+              </a:rPr>
+              <a:t>的显存用于存储模型权重，使得</a:t>
+            </a:r>
+            <a:r>
+              <a:rPr lang="en-US" altLang="zh-CN" b="0" i="0" dirty="0" err="1">
+                <a:solidFill>
+                  <a:srgbClr val="191B1F"/>
+                </a:solidFill>
+                <a:effectLst/>
+                <a:latin typeface="-apple-system"/>
+              </a:rPr>
+              <a:t>gpu</a:t>
+            </a:r>
+            <a:r>
+              <a:rPr lang="zh-CN" altLang="en-US" b="0" i="0" dirty="0">
+                <a:solidFill>
+                  <a:srgbClr val="191B1F"/>
+                </a:solidFill>
+                <a:effectLst/>
+                <a:latin typeface="-apple-system"/>
+              </a:rPr>
+              <a:t>显存浪费很多；因此 </a:t>
+            </a:r>
+            <a:r>
+              <a:rPr lang="en-US" altLang="zh-CN" b="0" i="0" dirty="0">
+                <a:solidFill>
+                  <a:srgbClr val="191B1F"/>
+                </a:solidFill>
+                <a:effectLst/>
+                <a:latin typeface="-apple-system"/>
+              </a:rPr>
+              <a:t>U-Net </a:t>
+            </a:r>
+            <a:r>
+              <a:rPr lang="zh-CN" altLang="en-US" b="0" i="0" dirty="0">
+                <a:solidFill>
+                  <a:srgbClr val="191B1F"/>
+                </a:solidFill>
+                <a:effectLst/>
+                <a:latin typeface="-apple-system"/>
+              </a:rPr>
+              <a:t>的团队采用更大的单张图片，而</a:t>
+            </a:r>
+            <a:r>
+              <a:rPr lang="en-US" altLang="zh-CN" b="0" i="0" dirty="0">
+                <a:solidFill>
+                  <a:srgbClr val="191B1F"/>
+                </a:solidFill>
+                <a:effectLst/>
+                <a:latin typeface="-apple-system"/>
+              </a:rPr>
+              <a:t>batch size</a:t>
+            </a:r>
+            <a:r>
+              <a:rPr lang="zh-CN" altLang="en-US" b="0" i="0" dirty="0">
+                <a:solidFill>
+                  <a:srgbClr val="191B1F"/>
+                </a:solidFill>
+                <a:effectLst/>
+                <a:latin typeface="-apple-system"/>
+              </a:rPr>
+              <a:t>设置为</a:t>
+            </a:r>
+            <a:r>
+              <a:rPr lang="en-US" altLang="zh-CN" b="0" i="0" dirty="0">
+                <a:solidFill>
+                  <a:srgbClr val="191B1F"/>
+                </a:solidFill>
+                <a:effectLst/>
+                <a:latin typeface="-apple-system"/>
+              </a:rPr>
+              <a:t>1</a:t>
+            </a:r>
+            <a:r>
+              <a:rPr lang="zh-CN" altLang="en-US" b="0" i="0" dirty="0">
+                <a:solidFill>
+                  <a:srgbClr val="191B1F"/>
+                </a:solidFill>
+                <a:effectLst/>
+                <a:latin typeface="-apple-system"/>
+              </a:rPr>
+              <a:t>。这会导致梯度估计依赖于单张图片造成噪声比较大，因此采用一个很高的动量，使得早期的训练样本也可以对梯度下降方式产生较大的影响。</a:t>
+            </a:r>
+            <a:r>
+              <a:rPr lang="en-US" altLang="zh-CN" b="0" i="0" dirty="0">
+                <a:solidFill>
+                  <a:srgbClr val="191B1F"/>
+                </a:solidFill>
+                <a:effectLst/>
+                <a:latin typeface="-apple-system"/>
+              </a:rPr>
+              <a:t> </a:t>
+            </a:r>
+          </a:p>
+          <a:p>
+            <a:pPr marL="0" marR="0" lvl="0" indent="0" algn="l" defTabSz="914400" rtl="0" eaLnBrk="1" fontAlgn="auto" latinLnBrk="0" hangingPunct="1">
+              <a:lnSpc>
+                <a:spcPct val="100000"/>
+              </a:lnSpc>
+              <a:spcBef>
+                <a:spcPts val="0"/>
+              </a:spcBef>
+              <a:spcAft>
+                <a:spcPts val="0"/>
+              </a:spcAft>
+              <a:buClrTx/>
+              <a:buSzTx/>
+              <a:buFontTx/>
+              <a:buNone/>
+              <a:tabLst/>
+              <a:defRPr/>
+            </a:pPr>
+            <a:r>
+              <a:rPr lang="en-US" altLang="zh-CN" b="0" i="0" dirty="0">
+                <a:solidFill>
+                  <a:srgbClr val="191B1F"/>
+                </a:solidFill>
+                <a:effectLst/>
+                <a:latin typeface="-apple-system"/>
+              </a:rPr>
+              <a:t>(a)</a:t>
+            </a:r>
+            <a:r>
+              <a:rPr lang="zh-CN" altLang="en-US" b="0" i="0" dirty="0">
+                <a:solidFill>
+                  <a:srgbClr val="191B1F"/>
+                </a:solidFill>
+                <a:effectLst/>
+                <a:latin typeface="-apple-system"/>
+              </a:rPr>
+              <a:t>是输入数据，</a:t>
+            </a:r>
+            <a:r>
+              <a:rPr lang="en-US" altLang="zh-CN" b="0" i="0" dirty="0">
+                <a:solidFill>
+                  <a:srgbClr val="191B1F"/>
+                </a:solidFill>
+                <a:effectLst/>
+                <a:latin typeface="-apple-system"/>
+              </a:rPr>
+              <a:t>(b)</a:t>
+            </a:r>
+            <a:r>
+              <a:rPr lang="zh-CN" altLang="en-US" b="0" i="0" dirty="0">
+                <a:solidFill>
+                  <a:srgbClr val="191B1F"/>
+                </a:solidFill>
+                <a:effectLst/>
+                <a:latin typeface="-apple-system"/>
+              </a:rPr>
+              <a:t>是</a:t>
+            </a:r>
+            <a:r>
+              <a:rPr lang="en-US" altLang="zh-CN" b="0" i="0" dirty="0">
+                <a:solidFill>
+                  <a:srgbClr val="191B1F"/>
+                </a:solidFill>
+                <a:effectLst/>
+                <a:latin typeface="-apple-system"/>
+              </a:rPr>
+              <a:t>Ground Truth</a:t>
+            </a:r>
+            <a:r>
+              <a:rPr lang="zh-CN" altLang="en-US" b="0" i="0" dirty="0">
+                <a:solidFill>
+                  <a:srgbClr val="191B1F"/>
+                </a:solidFill>
+                <a:effectLst/>
+                <a:latin typeface="-apple-system"/>
+              </a:rPr>
+              <a:t>，</a:t>
+            </a:r>
+            <a:r>
+              <a:rPr lang="en-US" altLang="zh-CN" b="0" i="0" dirty="0">
+                <a:solidFill>
+                  <a:srgbClr val="191B1F"/>
+                </a:solidFill>
+                <a:effectLst/>
+                <a:latin typeface="-apple-system"/>
+              </a:rPr>
+              <a:t>(c)</a:t>
+            </a:r>
+            <a:r>
+              <a:rPr lang="zh-CN" altLang="en-US" b="0" i="0" dirty="0">
+                <a:solidFill>
+                  <a:srgbClr val="191B1F"/>
+                </a:solidFill>
+                <a:effectLst/>
+                <a:latin typeface="-apple-system"/>
+              </a:rPr>
+              <a:t>是基于</a:t>
+            </a:r>
+            <a:r>
+              <a:rPr lang="en-US" altLang="zh-CN" b="0" i="0" dirty="0">
+                <a:solidFill>
+                  <a:srgbClr val="191B1F"/>
+                </a:solidFill>
+                <a:effectLst/>
+                <a:latin typeface="-apple-system"/>
+              </a:rPr>
+              <a:t>Ground Truth</a:t>
+            </a:r>
+            <a:r>
+              <a:rPr lang="zh-CN" altLang="en-US" b="0" i="0" dirty="0">
+                <a:solidFill>
+                  <a:srgbClr val="191B1F"/>
+                </a:solidFill>
+                <a:effectLst/>
+                <a:latin typeface="-apple-system"/>
+              </a:rPr>
+              <a:t>生成的分割掩码，</a:t>
+            </a:r>
+            <a:r>
+              <a:rPr lang="en-US" altLang="zh-CN" b="0" i="0" dirty="0">
+                <a:solidFill>
+                  <a:srgbClr val="191B1F"/>
+                </a:solidFill>
+                <a:effectLst/>
+                <a:latin typeface="-apple-system"/>
+              </a:rPr>
+              <a:t>(d)</a:t>
+            </a:r>
+            <a:r>
+              <a:rPr lang="zh-CN" altLang="en-US" b="0" i="0" dirty="0">
+                <a:solidFill>
+                  <a:srgbClr val="191B1F"/>
+                </a:solidFill>
+                <a:effectLst/>
+                <a:latin typeface="-apple-system"/>
+              </a:rPr>
+              <a:t>是</a:t>
+            </a:r>
+            <a:r>
+              <a:rPr lang="en-US" altLang="zh-CN" b="0" i="0" dirty="0">
+                <a:solidFill>
+                  <a:srgbClr val="191B1F"/>
+                </a:solidFill>
+                <a:effectLst/>
+                <a:latin typeface="-apple-system"/>
+              </a:rPr>
+              <a:t>U-Net</a:t>
+            </a:r>
+            <a:r>
+              <a:rPr lang="zh-CN" altLang="en-US" b="0" i="0" dirty="0">
+                <a:solidFill>
+                  <a:srgbClr val="191B1F"/>
+                </a:solidFill>
+                <a:effectLst/>
+                <a:latin typeface="-apple-system"/>
+              </a:rPr>
+              <a:t>使用的用于分离边界的损失权值。</a:t>
+            </a:r>
+            <a:endParaRPr lang="zh-CN" altLang="en-US" dirty="0"/>
+          </a:p>
+        </p:txBody>
+      </p:sp>
+      <p:sp>
+        <p:nvSpPr>
+          <p:cNvPr id="4" name="灯片编号占位符 3"/>
+          <p:cNvSpPr>
+            <a:spLocks noGrp="1"/>
+          </p:cNvSpPr>
+          <p:nvPr>
+            <p:ph type="sldNum" sz="quarter" idx="5"/>
+          </p:nvPr>
+        </p:nvSpPr>
+        <p:spPr/>
+        <p:txBody>
+          <a:bodyPr/>
+          <a:lstStyle/>
+          <a:p>
+            <a:fld id="{54290F55-E33F-4F55-B56D-790968137D6B}" type="slidenum">
+              <a:rPr lang="zh-CN" altLang="en-US" smtClean="0"/>
+              <a:t>7</a:t>
+            </a:fld>
+            <a:endParaRPr lang="zh-CN" altLang="en-US"/>
+          </a:p>
+        </p:txBody>
+      </p:sp>
+    </p:spTree>
+    <p:extLst>
+      <p:ext uri="{BB962C8B-B14F-4D97-AF65-F5344CB8AC3E}">
+        <p14:creationId xmlns:p14="http://schemas.microsoft.com/office/powerpoint/2010/main" val="2322646270"/>
+      </p:ext>
+    </p:extLst>
+  </p:cSld>
+  <p:clrMapOvr>
+    <a:masterClrMapping/>
+  </p:clrMapOvr>
+</p:notes>
+</file>
+
+<file path=ppt/notesSlides/notesSlide6.xml><?xml version="1.0" encoding="utf-8"?>
+<p:notes xmlns:a="http://schemas.openxmlformats.org/drawingml/2006/main" xmlns:r="http://schemas.openxmlformats.org/officeDocument/2006/relationships" xmlns:p="http://schemas.openxmlformats.org/presentationml/2006/main">
+  <p:cSld>
+    <p:spTree>
+      <p:nvGrpSpPr>
+        <p:cNvPr id="1" name=""/>
+        <p:cNvGrpSpPr/>
+        <p:nvPr/>
+      </p:nvGrpSpPr>
+      <p:grpSpPr>
+        <a:xfrm>
+          <a:off x="0" y="0"/>
+          <a:ext cx="0" cy="0"/>
+          <a:chOff x="0" y="0"/>
+          <a:chExt cx="0" cy="0"/>
+        </a:xfrm>
+      </p:grpSpPr>
+      <p:sp>
+        <p:nvSpPr>
+          <p:cNvPr id="2" name="幻灯片图像占位符 1"/>
+          <p:cNvSpPr>
+            <a:spLocks noGrp="1" noRot="1" noChangeAspect="1"/>
+          </p:cNvSpPr>
+          <p:nvPr>
+            <p:ph type="sldImg"/>
+          </p:nvPr>
+        </p:nvSpPr>
+        <p:spPr/>
+      </p:sp>
+      <p:sp>
+        <p:nvSpPr>
+          <p:cNvPr id="3" name="备注占位符 2"/>
+          <p:cNvSpPr>
+            <a:spLocks noGrp="1"/>
+          </p:cNvSpPr>
+          <p:nvPr>
+            <p:ph type="body" idx="1"/>
+          </p:nvPr>
+        </p:nvSpPr>
+        <p:spPr/>
+        <p:txBody>
+          <a:bodyPr/>
+          <a:lstStyle/>
+          <a:p>
+            <a:pPr marL="0" marR="0" lvl="0" indent="0" algn="l" defTabSz="914400" rtl="0" eaLnBrk="1" fontAlgn="auto" latinLnBrk="0" hangingPunct="1">
+              <a:lnSpc>
+                <a:spcPct val="100000"/>
+              </a:lnSpc>
+              <a:spcBef>
+                <a:spcPts val="0"/>
+              </a:spcBef>
+              <a:spcAft>
+                <a:spcPts val="0"/>
+              </a:spcAft>
+              <a:buClrTx/>
+              <a:buSzTx/>
+              <a:buFontTx/>
+              <a:buNone/>
+              <a:tabLst/>
+              <a:defRPr/>
+            </a:pPr>
+            <a:r>
+              <a:rPr lang="en-US" altLang="zh-CN" b="0" i="0" dirty="0">
+                <a:solidFill>
+                  <a:srgbClr val="191B1F"/>
+                </a:solidFill>
+                <a:effectLst/>
+                <a:latin typeface="-apple-system"/>
+              </a:rPr>
+              <a:t>U-Net</a:t>
+            </a:r>
+            <a:r>
+              <a:rPr lang="zh-CN" altLang="en-US" b="0" i="0" dirty="0">
+                <a:solidFill>
+                  <a:srgbClr val="191B1F"/>
+                </a:solidFill>
+                <a:effectLst/>
+                <a:latin typeface="-apple-system"/>
+              </a:rPr>
+              <a:t>的实验是一个比较简单的</a:t>
+            </a:r>
+            <a:r>
+              <a:rPr lang="en-US" altLang="zh-CN" b="0" i="0" dirty="0">
+                <a:solidFill>
+                  <a:srgbClr val="191B1F"/>
+                </a:solidFill>
+                <a:effectLst/>
+                <a:latin typeface="-apple-system"/>
+              </a:rPr>
+              <a:t>ISBI cell tracking</a:t>
+            </a:r>
+            <a:r>
+              <a:rPr lang="zh-CN" altLang="en-US" b="0" i="0" dirty="0">
+                <a:solidFill>
+                  <a:srgbClr val="191B1F"/>
+                </a:solidFill>
+                <a:effectLst/>
+                <a:latin typeface="-apple-system"/>
+              </a:rPr>
+              <a:t>数据集，由于本身的任务比较简单，</a:t>
+            </a:r>
+            <a:r>
+              <a:rPr lang="en-US" altLang="zh-CN" b="0" i="0" dirty="0">
+                <a:solidFill>
+                  <a:srgbClr val="191B1F"/>
+                </a:solidFill>
+                <a:effectLst/>
+                <a:latin typeface="-apple-system"/>
+              </a:rPr>
+              <a:t>U-Net</a:t>
+            </a:r>
+            <a:r>
+              <a:rPr lang="zh-CN" altLang="en-US" b="0" i="0" dirty="0">
+                <a:solidFill>
+                  <a:srgbClr val="191B1F"/>
+                </a:solidFill>
+                <a:effectLst/>
+                <a:latin typeface="-apple-system"/>
+              </a:rPr>
+              <a:t> 仅通过</a:t>
+            </a:r>
+            <a:r>
+              <a:rPr lang="en-US" altLang="zh-CN" b="0" i="0" dirty="0">
+                <a:solidFill>
+                  <a:srgbClr val="191B1F"/>
+                </a:solidFill>
+                <a:effectLst/>
+                <a:latin typeface="-apple-system"/>
+              </a:rPr>
+              <a:t>30</a:t>
+            </a:r>
+            <a:r>
+              <a:rPr lang="zh-CN" altLang="en-US" b="0" i="0" dirty="0">
+                <a:solidFill>
+                  <a:srgbClr val="191B1F"/>
+                </a:solidFill>
+                <a:effectLst/>
+                <a:latin typeface="-apple-system"/>
+              </a:rPr>
+              <a:t>张图片并辅以数据扩充策略便达到非常低的错误率</a:t>
+            </a:r>
+            <a:endParaRPr lang="zh-CN" altLang="en-US" dirty="0"/>
+          </a:p>
+        </p:txBody>
+      </p:sp>
+      <p:sp>
+        <p:nvSpPr>
+          <p:cNvPr id="4" name="灯片编号占位符 3"/>
+          <p:cNvSpPr>
+            <a:spLocks noGrp="1"/>
+          </p:cNvSpPr>
+          <p:nvPr>
+            <p:ph type="sldNum" sz="quarter" idx="5"/>
+          </p:nvPr>
+        </p:nvSpPr>
+        <p:spPr/>
+        <p:txBody>
+          <a:bodyPr/>
+          <a:lstStyle/>
+          <a:p>
+            <a:fld id="{54290F55-E33F-4F55-B56D-790968137D6B}" type="slidenum">
+              <a:rPr lang="zh-CN" altLang="en-US" smtClean="0"/>
+              <a:t>8</a:t>
+            </a:fld>
+            <a:endParaRPr lang="zh-CN" altLang="en-US"/>
+          </a:p>
+        </p:txBody>
+      </p:sp>
+    </p:spTree>
+    <p:extLst>
+      <p:ext uri="{BB962C8B-B14F-4D97-AF65-F5344CB8AC3E}">
+        <p14:creationId xmlns:p14="http://schemas.microsoft.com/office/powerpoint/2010/main" val="1783813165"/>
       </p:ext>
     </p:extLst>
   </p:cSld>
@@ -1515,7 +2167,7 @@
           <a:p>
             <a:fld id="{AF3DFB88-C66D-4D4F-992A-21D8B5C2FC83}" type="datetimeFigureOut">
               <a:rPr lang="zh-CN" altLang="en-US" smtClean="0"/>
-              <a:t>2023/12/8</a:t>
+              <a:t>2023/12/9</a:t>
             </a:fld>
             <a:endParaRPr lang="zh-CN" altLang="en-US"/>
           </a:p>
@@ -1678,7 +2330,7 @@
           <a:p>
             <a:fld id="{AF3DFB88-C66D-4D4F-992A-21D8B5C2FC83}" type="datetimeFigureOut">
               <a:rPr lang="zh-CN" altLang="en-US" smtClean="0"/>
-              <a:t>2023/12/8</a:t>
+              <a:t>2023/12/9</a:t>
             </a:fld>
             <a:endParaRPr lang="zh-CN" altLang="en-US"/>
           </a:p>
@@ -1851,7 +2503,7 @@
           <a:p>
             <a:fld id="{AF3DFB88-C66D-4D4F-992A-21D8B5C2FC83}" type="datetimeFigureOut">
               <a:rPr lang="zh-CN" altLang="en-US" smtClean="0"/>
-              <a:t>2023/12/8</a:t>
+              <a:t>2023/12/9</a:t>
             </a:fld>
             <a:endParaRPr lang="zh-CN" altLang="en-US"/>
           </a:p>
@@ -2014,7 +2666,7 @@
           <a:p>
             <a:fld id="{AF3DFB88-C66D-4D4F-992A-21D8B5C2FC83}" type="datetimeFigureOut">
               <a:rPr lang="zh-CN" altLang="en-US" smtClean="0"/>
-              <a:t>2023/12/8</a:t>
+              <a:t>2023/12/9</a:t>
             </a:fld>
             <a:endParaRPr lang="zh-CN" altLang="en-US"/>
           </a:p>
@@ -2254,7 +2906,7 @@
           <a:p>
             <a:fld id="{AF3DFB88-C66D-4D4F-992A-21D8B5C2FC83}" type="datetimeFigureOut">
               <a:rPr lang="zh-CN" altLang="en-US" smtClean="0"/>
-              <a:t>2023/12/8</a:t>
+              <a:t>2023/12/9</a:t>
             </a:fld>
             <a:endParaRPr lang="zh-CN" altLang="en-US"/>
           </a:p>
@@ -2478,7 +3130,7 @@
           <a:p>
             <a:fld id="{AF3DFB88-C66D-4D4F-992A-21D8B5C2FC83}" type="datetimeFigureOut">
               <a:rPr lang="zh-CN" altLang="en-US" smtClean="0"/>
-              <a:t>2023/12/8</a:t>
+              <a:t>2023/12/9</a:t>
             </a:fld>
             <a:endParaRPr lang="zh-CN" altLang="en-US"/>
           </a:p>
@@ -2837,7 +3489,7 @@
           <a:p>
             <a:fld id="{AF3DFB88-C66D-4D4F-992A-21D8B5C2FC83}" type="datetimeFigureOut">
               <a:rPr lang="zh-CN" altLang="en-US" smtClean="0"/>
-              <a:t>2023/12/8</a:t>
+              <a:t>2023/12/9</a:t>
             </a:fld>
             <a:endParaRPr lang="zh-CN" altLang="en-US"/>
           </a:p>
@@ -2949,7 +3601,7 @@
           <a:p>
             <a:fld id="{AF3DFB88-C66D-4D4F-992A-21D8B5C2FC83}" type="datetimeFigureOut">
               <a:rPr lang="zh-CN" altLang="en-US" smtClean="0"/>
-              <a:t>2023/12/8</a:t>
+              <a:t>2023/12/9</a:t>
             </a:fld>
             <a:endParaRPr lang="zh-CN" altLang="en-US"/>
           </a:p>
@@ -3039,7 +3691,7 @@
           <a:p>
             <a:fld id="{AF3DFB88-C66D-4D4F-992A-21D8B5C2FC83}" type="datetimeFigureOut">
               <a:rPr lang="zh-CN" altLang="en-US" smtClean="0"/>
-              <a:t>2023/12/8</a:t>
+              <a:t>2023/12/9</a:t>
             </a:fld>
             <a:endParaRPr lang="zh-CN" altLang="en-US"/>
           </a:p>
@@ -3309,7 +3961,7 @@
           <a:p>
             <a:fld id="{AF3DFB88-C66D-4D4F-992A-21D8B5C2FC83}" type="datetimeFigureOut">
               <a:rPr lang="zh-CN" altLang="en-US" smtClean="0"/>
-              <a:t>2023/12/8</a:t>
+              <a:t>2023/12/9</a:t>
             </a:fld>
             <a:endParaRPr lang="zh-CN" altLang="en-US"/>
           </a:p>
@@ -3556,7 +4208,7 @@
           <a:p>
             <a:fld id="{AF3DFB88-C66D-4D4F-992A-21D8B5C2FC83}" type="datetimeFigureOut">
               <a:rPr lang="zh-CN" altLang="en-US" smtClean="0"/>
-              <a:t>2023/12/8</a:t>
+              <a:t>2023/12/9</a:t>
             </a:fld>
             <a:endParaRPr lang="zh-CN" altLang="en-US"/>
           </a:p>
@@ -3762,7 +4414,7 @@
           <a:p>
             <a:fld id="{AF3DFB88-C66D-4D4F-992A-21D8B5C2FC83}" type="datetimeFigureOut">
               <a:rPr lang="zh-CN" altLang="en-US" smtClean="0"/>
-              <a:t>2023/12/8</a:t>
+              <a:t>2023/12/9</a:t>
             </a:fld>
             <a:endParaRPr lang="zh-CN" altLang="en-US"/>
           </a:p>
@@ -4452,7 +5104,7 @@
                 <a:cs typeface="Times New Roman" panose="02020603050405020304" charset="0"/>
                 <a:sym typeface="+mn-ea"/>
               </a:rPr>
-              <a:t>Initial Results</a:t>
+              <a:t>Proposed Method</a:t>
             </a:r>
           </a:p>
         </p:txBody>
@@ -4538,8 +5190,8 @@
         </p:nvSpPr>
         <p:spPr>
           <a:xfrm>
-            <a:off x="1378811" y="1641315"/>
-            <a:ext cx="3554426" cy="461665"/>
+            <a:off x="712774" y="1197969"/>
+            <a:ext cx="1616958" cy="923330"/>
           </a:xfrm>
           <a:prstGeom prst="rect">
             <a:avLst/>
@@ -4553,7 +5205,7 @@
           <a:lstStyle/>
           <a:p>
             <a:r>
-              <a:rPr lang="en-US" altLang="zh-CN" sz="2400" b="1" u="sng" dirty="0">
+              <a:rPr lang="zh-CN" altLang="en-US" b="1" u="sng" dirty="0">
                 <a:solidFill>
                   <a:srgbClr val="002060"/>
                 </a:solidFill>
@@ -4562,21 +5214,9 @@
                 <a:cs typeface="微软雅黑" panose="020B0503020204020204" pitchFamily="34" charset="-122"/>
                 <a:sym typeface="+mn-ea"/>
               </a:rPr>
-              <a:t>Hyperparameters</a:t>
-            </a:r>
-            <a:r>
-              <a:rPr lang="zh-CN" altLang="en-US" sz="2400" b="1" u="sng" dirty="0">
-                <a:solidFill>
-                  <a:srgbClr val="002060"/>
-                </a:solidFill>
-                <a:latin typeface="微软雅黑" panose="020B0503020204020204" pitchFamily="34" charset="-122"/>
-                <a:ea typeface="微软雅黑" panose="020B0503020204020204" pitchFamily="34" charset="-122"/>
-                <a:cs typeface="微软雅黑" panose="020B0503020204020204" pitchFamily="34" charset="-122"/>
-                <a:sym typeface="+mn-ea"/>
-              </a:rPr>
-              <a:t> </a:t>
-            </a:r>
-            <a:endParaRPr lang="en-US" altLang="zh-CN" sz="2400" b="1" u="sng" dirty="0">
+              <a:t>强调</a:t>
+            </a:r>
+            <a:endParaRPr lang="en-US" altLang="zh-CN" b="1" u="sng" dirty="0">
               <a:solidFill>
                 <a:srgbClr val="002060"/>
               </a:solidFill>
@@ -4586,14 +5226,35 @@
               <a:sym typeface="+mn-ea"/>
             </a:endParaRPr>
           </a:p>
+          <a:p>
+            <a:endParaRPr lang="en-US" altLang="zh-CN" b="1" u="sng" dirty="0">
+              <a:solidFill>
+                <a:srgbClr val="002060"/>
+              </a:solidFill>
+              <a:latin typeface="微软雅黑" panose="020B0503020204020204" pitchFamily="34" charset="-122"/>
+              <a:ea typeface="微软雅黑" panose="020B0503020204020204" pitchFamily="34" charset="-122"/>
+              <a:cs typeface="微软雅黑" panose="020B0503020204020204" pitchFamily="34" charset="-122"/>
+              <a:sym typeface="+mn-ea"/>
+            </a:endParaRPr>
+          </a:p>
+          <a:p>
+            <a:r>
+              <a:rPr lang="zh-CN" altLang="en-US" dirty="0">
+                <a:latin typeface="微软雅黑" panose="020B0503020204020204" pitchFamily="34" charset="-122"/>
+                <a:ea typeface="微软雅黑" panose="020B0503020204020204" pitchFamily="34" charset="-122"/>
+                <a:cs typeface="微软雅黑" panose="020B0503020204020204" pitchFamily="34" charset="-122"/>
+              </a:rPr>
+              <a:t>正文</a:t>
+            </a:r>
+          </a:p>
         </p:txBody>
       </p:sp>
       <p:pic>
         <p:nvPicPr>
-          <p:cNvPr id="8" name="图片 7">
+          <p:cNvPr id="4" name="图片 3">
             <a:extLst>
               <a:ext uri="{FF2B5EF4-FFF2-40B4-BE49-F238E27FC236}">
-                <a16:creationId xmlns:a16="http://schemas.microsoft.com/office/drawing/2014/main" id="{D451E4A0-1CF9-84F2-B5F9-730E8144B828}"/>
+                <a16:creationId xmlns:a16="http://schemas.microsoft.com/office/drawing/2014/main" id="{531A4300-5D38-E48B-3EFA-39AF6EC8636A}"/>
               </a:ext>
             </a:extLst>
           </p:cNvPr>
@@ -4610,8 +5271,8 @@
         </p:blipFill>
         <p:spPr>
           <a:xfrm>
-            <a:off x="1378811" y="2308763"/>
-            <a:ext cx="9434378" cy="2240474"/>
+            <a:off x="2653993" y="1363075"/>
+            <a:ext cx="7087214" cy="4770533"/>
           </a:xfrm>
           <a:prstGeom prst="rect">
             <a:avLst/>
@@ -4621,7 +5282,7 @@
     </p:spTree>
     <p:extLst>
       <p:ext uri="{BB962C8B-B14F-4D97-AF65-F5344CB8AC3E}">
-        <p14:creationId xmlns:p14="http://schemas.microsoft.com/office/powerpoint/2010/main" val="4055491203"/>
+        <p14:creationId xmlns:p14="http://schemas.microsoft.com/office/powerpoint/2010/main" val="2498790264"/>
       </p:ext>
     </p:extLst>
   </p:cSld>
@@ -4683,7 +5344,7 @@
                 <a:cs typeface="Times New Roman" panose="02020603050405020304" charset="0"/>
                 <a:sym typeface="+mn-ea"/>
               </a:rPr>
-              <a:t>Initial Results</a:t>
+              <a:t>Resources and Experiment Platform</a:t>
             </a:r>
           </a:p>
         </p:txBody>
@@ -4761,49 +5422,12 @@
           </a:prstGeom>
         </p:spPr>
       </p:pic>
-      <p:sp>
-        <p:nvSpPr>
-          <p:cNvPr id="5" name="文本框 4"/>
-          <p:cNvSpPr txBox="1"/>
-          <p:nvPr/>
-        </p:nvSpPr>
-        <p:spPr>
-          <a:xfrm>
-            <a:off x="648119" y="1733601"/>
-            <a:ext cx="2769335" cy="461665"/>
-          </a:xfrm>
-          <a:prstGeom prst="rect">
-            <a:avLst/>
-          </a:prstGeom>
-          <a:noFill/>
-        </p:spPr>
-        <p:txBody>
-          <a:bodyPr wrap="square" rtlCol="0">
-            <a:spAutoFit/>
-          </a:bodyPr>
-          <a:lstStyle/>
-          <a:p>
-            <a:r>
-              <a:rPr lang="en-US" altLang="zh-CN" sz="2400" b="1" u="sng" dirty="0">
-                <a:solidFill>
-                  <a:srgbClr val="002060"/>
-                </a:solidFill>
-                <a:latin typeface="微软雅黑" panose="020B0503020204020204" pitchFamily="34" charset="-122"/>
-                <a:ea typeface="微软雅黑" panose="020B0503020204020204" pitchFamily="34" charset="-122"/>
-                <a:cs typeface="微软雅黑" panose="020B0503020204020204" pitchFamily="34" charset="-122"/>
-                <a:sym typeface="+mn-ea"/>
-              </a:rPr>
-              <a:t>Training Loss</a:t>
-            </a:r>
-          </a:p>
-        </p:txBody>
-      </p:sp>
       <p:pic>
         <p:nvPicPr>
           <p:cNvPr id="4" name="图片 3">
             <a:extLst>
               <a:ext uri="{FF2B5EF4-FFF2-40B4-BE49-F238E27FC236}">
-                <a16:creationId xmlns:a16="http://schemas.microsoft.com/office/drawing/2014/main" id="{3428BAFF-1167-975D-E568-73D5487E7C01}"/>
+                <a16:creationId xmlns:a16="http://schemas.microsoft.com/office/drawing/2014/main" id="{74BA0674-6764-F9AF-416B-BA2D6CB95B4E}"/>
               </a:ext>
             </a:extLst>
           </p:cNvPr>
@@ -4820,50 +5444,20 @@
         </p:blipFill>
         <p:spPr>
           <a:xfrm>
-            <a:off x="259426" y="2549237"/>
-            <a:ext cx="5621719" cy="2871701"/>
+            <a:off x="829059" y="2190810"/>
+            <a:ext cx="10533882" cy="3301289"/>
           </a:xfrm>
           <a:prstGeom prst="rect">
             <a:avLst/>
           </a:prstGeom>
         </p:spPr>
       </p:pic>
-      <p:pic>
-        <p:nvPicPr>
-          <p:cNvPr id="8" name="图片 7">
+      <p:sp>
+        <p:nvSpPr>
+          <p:cNvPr id="8" name="文本框 7">
             <a:extLst>
               <a:ext uri="{FF2B5EF4-FFF2-40B4-BE49-F238E27FC236}">
-                <a16:creationId xmlns:a16="http://schemas.microsoft.com/office/drawing/2014/main" id="{3F200CC7-0424-BD23-6DC5-497D74C63D28}"/>
-              </a:ext>
-            </a:extLst>
-          </p:cNvPr>
-          <p:cNvPicPr>
-            <a:picLocks noChangeAspect="1"/>
-          </p:cNvPicPr>
-          <p:nvPr/>
-        </p:nvPicPr>
-        <p:blipFill>
-          <a:blip r:embed="rId4"/>
-          <a:stretch>
-            <a:fillRect/>
-          </a:stretch>
-        </p:blipFill>
-        <p:spPr>
-          <a:xfrm>
-            <a:off x="7621587" y="2416118"/>
-            <a:ext cx="2815503" cy="4441882"/>
-          </a:xfrm>
-          <a:prstGeom prst="rect">
-            <a:avLst/>
-          </a:prstGeom>
-        </p:spPr>
-      </p:pic>
-      <p:sp>
-        <p:nvSpPr>
-          <p:cNvPr id="13" name="文本框 12">
-            <a:extLst>
-              <a:ext uri="{FF2B5EF4-FFF2-40B4-BE49-F238E27FC236}">
-                <a16:creationId xmlns:a16="http://schemas.microsoft.com/office/drawing/2014/main" id="{0B7828CF-239D-472E-4733-EFB27FBBFEE0}"/>
+                <a16:creationId xmlns:a16="http://schemas.microsoft.com/office/drawing/2014/main" id="{B560E9D0-BD97-153D-5D84-57CE87E6F269}"/>
               </a:ext>
             </a:extLst>
           </p:cNvPr>
@@ -4872,8 +5466,8 @@
         </p:nvSpPr>
         <p:spPr>
           <a:xfrm>
-            <a:off x="7228595" y="1133436"/>
-            <a:ext cx="3582915" cy="830997"/>
+            <a:off x="1006765" y="1471872"/>
+            <a:ext cx="6114472" cy="461665"/>
           </a:xfrm>
           <a:prstGeom prst="rect">
             <a:avLst/>
@@ -4886,48 +5480,26 @@
           </a:bodyPr>
           <a:lstStyle/>
           <a:p>
-            <a:pPr marL="0" marR="0" lvl="0" indent="0" algn="l" defTabSz="914400" rtl="0" eaLnBrk="1" fontAlgn="auto" latinLnBrk="0" hangingPunct="1">
-              <a:lnSpc>
-                <a:spcPct val="100000"/>
-              </a:lnSpc>
-              <a:spcBef>
-                <a:spcPts val="0"/>
-              </a:spcBef>
-              <a:spcAft>
-                <a:spcPts val="0"/>
-              </a:spcAft>
-              <a:buClrTx/>
-              <a:buSzTx/>
-              <a:buFontTx/>
-              <a:buNone/>
-              <a:tabLst/>
-              <a:defRPr/>
-            </a:pPr>
-            <a:r>
-              <a:rPr kumimoji="0" lang="en-US" altLang="zh-CN" sz="2400" b="1" i="0" u="sng" strike="noStrike" kern="1200" cap="none" spc="0" normalizeH="0" baseline="0" noProof="0" dirty="0">
-                <a:ln>
-                  <a:noFill/>
-                </a:ln>
-                <a:solidFill>
-                  <a:srgbClr val="002060"/>
-                </a:solidFill>
-                <a:effectLst/>
-                <a:uLnTx/>
-                <a:uFillTx/>
-                <a:latin typeface="微软雅黑" panose="020B0503020204020204" pitchFamily="34" charset="-122"/>
-                <a:ea typeface="微软雅黑" panose="020B0503020204020204" pitchFamily="34" charset="-122"/>
-                <a:cs typeface="微软雅黑" panose="020B0503020204020204" pitchFamily="34" charset="-122"/>
-                <a:sym typeface="+mn-ea"/>
-              </a:rPr>
-              <a:t>example of semantic segmentation result</a:t>
-            </a:r>
+            <a:r>
+              <a:rPr lang="en-US" altLang="zh-CN" sz="2400" b="1" dirty="0"/>
+              <a:t>S</a:t>
+            </a:r>
+            <a:r>
+              <a:rPr lang="zh-CN" altLang="en-US" sz="2400" b="1" dirty="0"/>
+              <a:t>erver </a:t>
+            </a:r>
+            <a:r>
+              <a:rPr lang="en-US" altLang="zh-CN" sz="2400" b="1" dirty="0"/>
+              <a:t>provided by ML course</a:t>
+            </a:r>
+            <a:endParaRPr lang="zh-CN" altLang="en-US" sz="2400" b="1" dirty="0"/>
           </a:p>
         </p:txBody>
       </p:sp>
     </p:spTree>
     <p:extLst>
       <p:ext uri="{BB962C8B-B14F-4D97-AF65-F5344CB8AC3E}">
-        <p14:creationId xmlns:p14="http://schemas.microsoft.com/office/powerpoint/2010/main" val="2251863625"/>
+        <p14:creationId xmlns:p14="http://schemas.microsoft.com/office/powerpoint/2010/main" val="2267199000"/>
       </p:ext>
     </p:extLst>
   </p:cSld>
@@ -4989,7 +5561,7 @@
                 <a:cs typeface="Times New Roman" panose="02020603050405020304" charset="0"/>
                 <a:sym typeface="+mn-ea"/>
               </a:rPr>
-              <a:t>Goals and Objects</a:t>
+              <a:t>Initial Results</a:t>
             </a:r>
           </a:p>
         </p:txBody>
@@ -5075,8 +5647,8 @@
         </p:nvSpPr>
         <p:spPr>
           <a:xfrm>
-            <a:off x="1285427" y="1554586"/>
-            <a:ext cx="9188610" cy="3416320"/>
+            <a:off x="1378811" y="1641315"/>
+            <a:ext cx="3554426" cy="461665"/>
           </a:xfrm>
           <a:prstGeom prst="rect">
             <a:avLst/>
@@ -5089,7 +5661,31 @@
           </a:bodyPr>
           <a:lstStyle/>
           <a:p>
-            <a:endParaRPr lang="en-US" altLang="zh-CN" sz="2000" b="1" u="sng" dirty="0">
+            <a:r>
+              <a:rPr lang="en-US" altLang="zh-CN" sz="2400" b="1" u="sng" dirty="0">
+                <a:solidFill>
+                  <a:srgbClr val="002060"/>
+                </a:solidFill>
+                <a:latin typeface="微软雅黑" panose="020B0503020204020204" pitchFamily="34" charset="-122"/>
+                <a:ea typeface="微软雅黑" panose="020B0503020204020204" pitchFamily="34" charset="-122"/>
+                <a:cs typeface="微软雅黑" panose="020B0503020204020204" pitchFamily="34" charset="-122"/>
+                <a:sym typeface="+mn-ea"/>
+              </a:rPr>
+              <a:t>Hyperparameters</a:t>
+            </a:r>
+            <a:r>
+              <a:rPr lang="zh-CN" altLang="en-US" sz="2400" b="1" u="sng" dirty="0">
+                <a:solidFill>
+                  <a:srgbClr val="002060"/>
+                </a:solidFill>
+                <a:latin typeface="微软雅黑" panose="020B0503020204020204" pitchFamily="34" charset="-122"/>
+                <a:ea typeface="微软雅黑" panose="020B0503020204020204" pitchFamily="34" charset="-122"/>
+                <a:cs typeface="微软雅黑" panose="020B0503020204020204" pitchFamily="34" charset="-122"/>
+                <a:sym typeface="+mn-ea"/>
+              </a:rPr>
+              <a:t> </a:t>
+            </a:r>
+            <a:endParaRPr lang="en-US" altLang="zh-CN" sz="2400" b="1" u="sng" dirty="0">
               <a:solidFill>
                 <a:srgbClr val="002060"/>
               </a:solidFill>
@@ -5099,131 +5695,42 @@
               <a:sym typeface="+mn-ea"/>
             </a:endParaRPr>
           </a:p>
-          <a:p>
-            <a:pPr marL="285750" indent="-285750">
-              <a:buFont typeface="Arial" panose="020B0604020202020204" pitchFamily="34" charset="0"/>
-              <a:buChar char="•"/>
-            </a:pPr>
-            <a:r>
-              <a:rPr lang="en-US" altLang="zh-CN" sz="2000" dirty="0">
-                <a:latin typeface="微软雅黑" panose="020B0503020204020204" pitchFamily="34" charset="-122"/>
-                <a:ea typeface="微软雅黑" panose="020B0503020204020204" pitchFamily="34" charset="-122"/>
-                <a:cs typeface="微软雅黑" panose="020B0503020204020204" pitchFamily="34" charset="-122"/>
-              </a:rPr>
-              <a:t>Learn the basic mathematics behind CNN and self-attention mechanism in transformer. </a:t>
-            </a:r>
-          </a:p>
-          <a:p>
-            <a:pPr marL="285750" indent="-285750">
-              <a:buFont typeface="Arial" panose="020B0604020202020204" pitchFamily="34" charset="0"/>
-              <a:buChar char="•"/>
-            </a:pPr>
-            <a:endParaRPr lang="en-US" altLang="zh-CN" sz="2000" dirty="0">
-              <a:latin typeface="微软雅黑" panose="020B0503020204020204" pitchFamily="34" charset="-122"/>
-              <a:ea typeface="微软雅黑" panose="020B0503020204020204" pitchFamily="34" charset="-122"/>
-              <a:cs typeface="微软雅黑" panose="020B0503020204020204" pitchFamily="34" charset="-122"/>
-            </a:endParaRPr>
-          </a:p>
-          <a:p>
-            <a:pPr marL="285750" indent="-285750">
-              <a:buFont typeface="Arial" panose="020B0604020202020204" pitchFamily="34" charset="0"/>
-              <a:buChar char="•"/>
-            </a:pPr>
-            <a:r>
-              <a:rPr lang="en-US" altLang="zh-CN" sz="2000" dirty="0">
-                <a:latin typeface="微软雅黑" panose="020B0503020204020204" pitchFamily="34" charset="-122"/>
-                <a:ea typeface="微软雅黑" panose="020B0503020204020204" pitchFamily="34" charset="-122"/>
-                <a:cs typeface="微软雅黑" panose="020B0503020204020204" pitchFamily="34" charset="-122"/>
-              </a:rPr>
-              <a:t>Deploy models on semantic segmentation tasks. </a:t>
-            </a:r>
-          </a:p>
-          <a:p>
-            <a:pPr marL="285750" indent="-285750">
-              <a:buFont typeface="Arial" panose="020B0604020202020204" pitchFamily="34" charset="0"/>
-              <a:buChar char="•"/>
-            </a:pPr>
-            <a:endParaRPr lang="en-US" altLang="zh-CN" sz="2000" dirty="0">
-              <a:latin typeface="微软雅黑" panose="020B0503020204020204" pitchFamily="34" charset="-122"/>
-              <a:ea typeface="微软雅黑" panose="020B0503020204020204" pitchFamily="34" charset="-122"/>
-              <a:cs typeface="微软雅黑" panose="020B0503020204020204" pitchFamily="34" charset="-122"/>
-            </a:endParaRPr>
-          </a:p>
-          <a:p>
-            <a:pPr marL="285750" indent="-285750">
-              <a:buFont typeface="Arial" panose="020B0604020202020204" pitchFamily="34" charset="0"/>
-              <a:buChar char="•"/>
-            </a:pPr>
-            <a:r>
-              <a:rPr lang="en-US" altLang="zh-CN" sz="2000" dirty="0">
-                <a:latin typeface="微软雅黑" panose="020B0503020204020204" pitchFamily="34" charset="-122"/>
-                <a:ea typeface="微软雅黑" panose="020B0503020204020204" pitchFamily="34" charset="-122"/>
-                <a:cs typeface="微软雅黑" panose="020B0503020204020204" pitchFamily="34" charset="-122"/>
-              </a:rPr>
-              <a:t>Explore models in </a:t>
-            </a:r>
-            <a:r>
-              <a:rPr lang="en-US" altLang="zh-CN" sz="2000" dirty="0" err="1">
-                <a:latin typeface="微软雅黑" panose="020B0503020204020204" pitchFamily="34" charset="-122"/>
-                <a:ea typeface="微软雅黑" panose="020B0503020204020204" pitchFamily="34" charset="-122"/>
-                <a:cs typeface="微软雅黑" panose="020B0503020204020204" pitchFamily="34" charset="-122"/>
-              </a:rPr>
-              <a:t>SUSTech</a:t>
-            </a:r>
-            <a:r>
-              <a:rPr lang="en-US" altLang="zh-CN" sz="2000" dirty="0">
-                <a:latin typeface="微软雅黑" panose="020B0503020204020204" pitchFamily="34" charset="-122"/>
-                <a:ea typeface="微软雅黑" panose="020B0503020204020204" pitchFamily="34" charset="-122"/>
-                <a:cs typeface="微软雅黑" panose="020B0503020204020204" pitchFamily="34" charset="-122"/>
-              </a:rPr>
-              <a:t> dataset.</a:t>
-            </a:r>
-          </a:p>
-          <a:p>
-            <a:pPr marL="285750" indent="-285750">
-              <a:buFont typeface="Arial" panose="020B0604020202020204" pitchFamily="34" charset="0"/>
-              <a:buChar char="•"/>
-            </a:pPr>
-            <a:endParaRPr lang="en-US" altLang="zh-CN" sz="2000" dirty="0">
-              <a:latin typeface="微软雅黑" panose="020B0503020204020204" pitchFamily="34" charset="-122"/>
-              <a:ea typeface="微软雅黑" panose="020B0503020204020204" pitchFamily="34" charset="-122"/>
-              <a:cs typeface="微软雅黑" panose="020B0503020204020204" pitchFamily="34" charset="-122"/>
-            </a:endParaRPr>
-          </a:p>
-          <a:p>
-            <a:pPr marL="285750" indent="-285750">
-              <a:buFont typeface="Arial" panose="020B0604020202020204" pitchFamily="34" charset="0"/>
-              <a:buChar char="•"/>
-            </a:pPr>
-            <a:r>
-              <a:rPr lang="en-US" altLang="zh-CN" sz="2000" dirty="0">
-                <a:latin typeface="微软雅黑" panose="020B0503020204020204" pitchFamily="34" charset="-122"/>
-                <a:ea typeface="微软雅黑" panose="020B0503020204020204" pitchFamily="34" charset="-122"/>
-                <a:cs typeface="微软雅黑" panose="020B0503020204020204" pitchFamily="34" charset="-122"/>
-              </a:rPr>
-              <a:t>Optimize the architecture of models. </a:t>
-            </a:r>
-          </a:p>
-          <a:p>
-            <a:endParaRPr lang="en-US" altLang="zh-CN" dirty="0">
-              <a:latin typeface="微软雅黑" panose="020B0503020204020204" pitchFamily="34" charset="-122"/>
-              <a:ea typeface="微软雅黑" panose="020B0503020204020204" pitchFamily="34" charset="-122"/>
-              <a:cs typeface="微软雅黑" panose="020B0503020204020204" pitchFamily="34" charset="-122"/>
-            </a:endParaRPr>
-          </a:p>
-          <a:p>
-            <a:endParaRPr lang="en-US" altLang="zh-CN" dirty="0">
-              <a:latin typeface="微软雅黑" panose="020B0503020204020204" pitchFamily="34" charset="-122"/>
-              <a:ea typeface="微软雅黑" panose="020B0503020204020204" pitchFamily="34" charset="-122"/>
-              <a:cs typeface="微软雅黑" panose="020B0503020204020204" pitchFamily="34" charset="-122"/>
-            </a:endParaRPr>
-          </a:p>
-        </p:txBody>
-      </p:sp>
+        </p:txBody>
+      </p:sp>
+      <p:pic>
+        <p:nvPicPr>
+          <p:cNvPr id="8" name="图片 7">
+            <a:extLst>
+              <a:ext uri="{FF2B5EF4-FFF2-40B4-BE49-F238E27FC236}">
+                <a16:creationId xmlns:a16="http://schemas.microsoft.com/office/drawing/2014/main" id="{D451E4A0-1CF9-84F2-B5F9-730E8144B828}"/>
+              </a:ext>
+            </a:extLst>
+          </p:cNvPr>
+          <p:cNvPicPr>
+            <a:picLocks noChangeAspect="1"/>
+          </p:cNvPicPr>
+          <p:nvPr/>
+        </p:nvPicPr>
+        <p:blipFill>
+          <a:blip r:embed="rId3"/>
+          <a:stretch>
+            <a:fillRect/>
+          </a:stretch>
+        </p:blipFill>
+        <p:spPr>
+          <a:xfrm>
+            <a:off x="1378811" y="2308763"/>
+            <a:ext cx="9434378" cy="2240474"/>
+          </a:xfrm>
+          <a:prstGeom prst="rect">
+            <a:avLst/>
+          </a:prstGeom>
+        </p:spPr>
+      </p:pic>
     </p:spTree>
     <p:extLst>
       <p:ext uri="{BB962C8B-B14F-4D97-AF65-F5344CB8AC3E}">
-        <p14:creationId xmlns:p14="http://schemas.microsoft.com/office/powerpoint/2010/main" val="203805915"/>
+        <p14:creationId xmlns:p14="http://schemas.microsoft.com/office/powerpoint/2010/main" val="4055491203"/>
       </p:ext>
     </p:extLst>
   </p:cSld>
@@ -5285,7 +5792,7 @@
                 <a:cs typeface="Times New Roman" panose="02020603050405020304" charset="0"/>
                 <a:sym typeface="+mn-ea"/>
               </a:rPr>
-              <a:t>Task Assignment </a:t>
+              <a:t>Initial Results</a:t>
             </a:r>
           </a:p>
         </p:txBody>
@@ -5371,8 +5878,8 @@
         </p:nvSpPr>
         <p:spPr>
           <a:xfrm>
-            <a:off x="2042810" y="1287145"/>
-            <a:ext cx="7609190" cy="5078313"/>
+            <a:off x="648119" y="1733601"/>
+            <a:ext cx="2769335" cy="461665"/>
           </a:xfrm>
           <a:prstGeom prst="rect">
             <a:avLst/>
@@ -5385,320 +5892,151 @@
           </a:bodyPr>
           <a:lstStyle/>
           <a:p>
-            <a:pPr indent="-285750">
-              <a:buFont typeface="Arial" panose="020B0604020202020204" pitchFamily="34" charset="0"/>
-              <a:buChar char="•"/>
-            </a:pPr>
-            <a:r>
-              <a:rPr lang="zh-CN" altLang="en-US" b="1" u="sng" dirty="0">
+            <a:r>
+              <a:rPr lang="en-US" altLang="zh-CN" sz="2400" b="1" u="sng" dirty="0">
                 <a:solidFill>
                   <a:srgbClr val="002060"/>
                 </a:solidFill>
-                <a:latin typeface="微软雅黑" panose="020B0503020204020204" pitchFamily="34" charset="-122"/>
-                <a:ea typeface="微软雅黑" panose="020B0503020204020204" pitchFamily="34" charset="-122"/>
-              </a:rPr>
-              <a:t>王浩羽：</a:t>
-            </a:r>
-          </a:p>
-          <a:p>
-            <a:pPr marL="742950" lvl="1" indent="-285750">
-              <a:buFont typeface="Arial" panose="020B0604020202020204" pitchFamily="34" charset="0"/>
-              <a:buChar char="•"/>
-            </a:pPr>
-            <a:r>
-              <a:rPr lang="en-US" altLang="zh-CN" dirty="0">
                 <a:latin typeface="微软雅黑" panose="020B0503020204020204" pitchFamily="34" charset="-122"/>
                 <a:ea typeface="微软雅黑" panose="020B0503020204020204" pitchFamily="34" charset="-122"/>
                 <a:cs typeface="微软雅黑" panose="020B0503020204020204" pitchFamily="34" charset="-122"/>
-              </a:rPr>
-              <a:t>Survey on 2D semantic segmentation</a:t>
-            </a:r>
-          </a:p>
-          <a:p>
-            <a:pPr marL="742950" lvl="1" indent="-285750">
-              <a:buFont typeface="Arial" panose="020B0604020202020204" pitchFamily="34" charset="0"/>
-              <a:buChar char="•"/>
+                <a:sym typeface="+mn-ea"/>
+              </a:rPr>
+              <a:t>Training Loss</a:t>
+            </a:r>
+          </a:p>
+        </p:txBody>
+      </p:sp>
+      <p:pic>
+        <p:nvPicPr>
+          <p:cNvPr id="4" name="图片 3">
+            <a:extLst>
+              <a:ext uri="{FF2B5EF4-FFF2-40B4-BE49-F238E27FC236}">
+                <a16:creationId xmlns:a16="http://schemas.microsoft.com/office/drawing/2014/main" id="{3428BAFF-1167-975D-E568-73D5487E7C01}"/>
+              </a:ext>
+            </a:extLst>
+          </p:cNvPr>
+          <p:cNvPicPr>
+            <a:picLocks noChangeAspect="1"/>
+          </p:cNvPicPr>
+          <p:nvPr/>
+        </p:nvPicPr>
+        <p:blipFill>
+          <a:blip r:embed="rId3"/>
+          <a:stretch>
+            <a:fillRect/>
+          </a:stretch>
+        </p:blipFill>
+        <p:spPr>
+          <a:xfrm>
+            <a:off x="259426" y="2549237"/>
+            <a:ext cx="5621719" cy="2871701"/>
+          </a:xfrm>
+          <a:prstGeom prst="rect">
+            <a:avLst/>
+          </a:prstGeom>
+        </p:spPr>
+      </p:pic>
+      <p:pic>
+        <p:nvPicPr>
+          <p:cNvPr id="8" name="图片 7">
+            <a:extLst>
+              <a:ext uri="{FF2B5EF4-FFF2-40B4-BE49-F238E27FC236}">
+                <a16:creationId xmlns:a16="http://schemas.microsoft.com/office/drawing/2014/main" id="{3F200CC7-0424-BD23-6DC5-497D74C63D28}"/>
+              </a:ext>
+            </a:extLst>
+          </p:cNvPr>
+          <p:cNvPicPr>
+            <a:picLocks noChangeAspect="1"/>
+          </p:cNvPicPr>
+          <p:nvPr/>
+        </p:nvPicPr>
+        <p:blipFill>
+          <a:blip r:embed="rId4"/>
+          <a:stretch>
+            <a:fillRect/>
+          </a:stretch>
+        </p:blipFill>
+        <p:spPr>
+          <a:xfrm>
+            <a:off x="7621587" y="2416118"/>
+            <a:ext cx="2815503" cy="4441882"/>
+          </a:xfrm>
+          <a:prstGeom prst="rect">
+            <a:avLst/>
+          </a:prstGeom>
+        </p:spPr>
+      </p:pic>
+      <p:sp>
+        <p:nvSpPr>
+          <p:cNvPr id="13" name="文本框 12">
+            <a:extLst>
+              <a:ext uri="{FF2B5EF4-FFF2-40B4-BE49-F238E27FC236}">
+                <a16:creationId xmlns:a16="http://schemas.microsoft.com/office/drawing/2014/main" id="{0B7828CF-239D-472E-4733-EFB27FBBFEE0}"/>
+              </a:ext>
+            </a:extLst>
+          </p:cNvPr>
+          <p:cNvSpPr txBox="1"/>
+          <p:nvPr/>
+        </p:nvSpPr>
+        <p:spPr>
+          <a:xfrm>
+            <a:off x="7228595" y="1133436"/>
+            <a:ext cx="3582915" cy="830997"/>
+          </a:xfrm>
+          <a:prstGeom prst="rect">
+            <a:avLst/>
+          </a:prstGeom>
+          <a:noFill/>
+        </p:spPr>
+        <p:txBody>
+          <a:bodyPr wrap="square">
+            <a:spAutoFit/>
+          </a:bodyPr>
+          <a:lstStyle/>
+          <a:p>
+            <a:pPr marL="0" marR="0" lvl="0" indent="0" algn="l" defTabSz="914400" rtl="0" eaLnBrk="1" fontAlgn="auto" latinLnBrk="0" hangingPunct="1">
+              <a:lnSpc>
+                <a:spcPct val="100000"/>
+              </a:lnSpc>
+              <a:spcBef>
+                <a:spcPts val="0"/>
+              </a:spcBef>
+              <a:spcAft>
+                <a:spcPts val="0"/>
+              </a:spcAft>
+              <a:buClrTx/>
+              <a:buSzTx/>
+              <a:buFontTx/>
+              <a:buNone/>
+              <a:tabLst/>
+              <a:defRPr/>
             </a:pPr>
             <a:r>
-              <a:rPr lang="en-US" altLang="zh-CN" dirty="0">
+              <a:rPr kumimoji="0" lang="en-US" altLang="zh-CN" sz="2400" b="1" i="0" u="sng" strike="noStrike" kern="1200" cap="none" spc="0" normalizeH="0" baseline="0" noProof="0" dirty="0">
+                <a:ln>
+                  <a:noFill/>
+                </a:ln>
+                <a:solidFill>
+                  <a:srgbClr val="002060"/>
+                </a:solidFill>
+                <a:effectLst/>
+                <a:uLnTx/>
+                <a:uFillTx/>
                 <a:latin typeface="微软雅黑" panose="020B0503020204020204" pitchFamily="34" charset="-122"/>
                 <a:ea typeface="微软雅黑" panose="020B0503020204020204" pitchFamily="34" charset="-122"/>
                 <a:cs typeface="微软雅黑" panose="020B0503020204020204" pitchFamily="34" charset="-122"/>
-              </a:rPr>
-              <a:t>Construct cityscapes dataset</a:t>
-            </a:r>
-          </a:p>
-          <a:p>
-            <a:pPr lvl="1"/>
-            <a:endParaRPr lang="en-US" altLang="zh-CN" dirty="0">
-              <a:latin typeface="微软雅黑" panose="020B0503020204020204" pitchFamily="34" charset="-122"/>
-              <a:ea typeface="微软雅黑" panose="020B0503020204020204" pitchFamily="34" charset="-122"/>
-              <a:cs typeface="微软雅黑" panose="020B0503020204020204" pitchFamily="34" charset="-122"/>
-            </a:endParaRPr>
-          </a:p>
-          <a:p>
-            <a:pPr indent="-285750">
-              <a:buFont typeface="Arial" panose="020B0604020202020204" pitchFamily="34" charset="0"/>
-              <a:buChar char="•"/>
-            </a:pPr>
-            <a:r>
-              <a:rPr lang="zh-CN" altLang="en-US" b="1" u="sng" dirty="0">
-                <a:solidFill>
-                  <a:srgbClr val="002060"/>
-                </a:solidFill>
-                <a:latin typeface="微软雅黑" panose="020B0503020204020204" pitchFamily="34" charset="-122"/>
-                <a:ea typeface="微软雅黑" panose="020B0503020204020204" pitchFamily="34" charset="-122"/>
-              </a:rPr>
-              <a:t>陈张杰</a:t>
-            </a:r>
-            <a:r>
-              <a:rPr lang="en-US" altLang="zh-CN" b="1" u="sng" dirty="0">
-                <a:solidFill>
-                  <a:srgbClr val="002060"/>
-                </a:solidFill>
-                <a:latin typeface="微软雅黑" panose="020B0503020204020204" pitchFamily="34" charset="-122"/>
-                <a:ea typeface="微软雅黑" panose="020B0503020204020204" pitchFamily="34" charset="-122"/>
-              </a:rPr>
-              <a:t>:</a:t>
-            </a:r>
-          </a:p>
-          <a:p>
-            <a:pPr marL="742950" lvl="1" indent="-285750">
-              <a:buFont typeface="Arial" panose="020B0604020202020204" pitchFamily="34" charset="0"/>
-              <a:buChar char="•"/>
-            </a:pPr>
-            <a:r>
-              <a:rPr lang="en-US" altLang="zh-CN" dirty="0">
-                <a:latin typeface="微软雅黑" panose="020B0503020204020204" pitchFamily="34" charset="-122"/>
-                <a:ea typeface="微软雅黑" panose="020B0503020204020204" pitchFamily="34" charset="-122"/>
-                <a:cs typeface="微软雅黑" panose="020B0503020204020204" pitchFamily="34" charset="-122"/>
-              </a:rPr>
-              <a:t>Train the model</a:t>
-            </a:r>
-          </a:p>
-          <a:p>
-            <a:pPr marL="742950" lvl="1" indent="-285750">
-              <a:buFont typeface="Arial" panose="020B0604020202020204" pitchFamily="34" charset="0"/>
-              <a:buChar char="•"/>
-            </a:pPr>
-            <a:r>
-              <a:rPr lang="en-US" altLang="zh-CN" dirty="0">
-                <a:latin typeface="微软雅黑" panose="020B0503020204020204" pitchFamily="34" charset="-122"/>
-                <a:ea typeface="微软雅黑" panose="020B0503020204020204" pitchFamily="34" charset="-122"/>
-                <a:cs typeface="微软雅黑" panose="020B0503020204020204" pitchFamily="34" charset="-122"/>
-              </a:rPr>
-              <a:t>Evaluate test performance</a:t>
-            </a:r>
-          </a:p>
-          <a:p>
-            <a:pPr marL="742950" lvl="1" indent="-285750">
-              <a:buFont typeface="Arial" panose="020B0604020202020204" pitchFamily="34" charset="0"/>
-              <a:buChar char="•"/>
-            </a:pPr>
-            <a:r>
-              <a:rPr lang="en-US" altLang="zh-CN" dirty="0">
-                <a:latin typeface="微软雅黑" panose="020B0503020204020204" pitchFamily="34" charset="-122"/>
-                <a:ea typeface="微软雅黑" panose="020B0503020204020204" pitchFamily="34" charset="-122"/>
-                <a:cs typeface="微软雅黑" panose="020B0503020204020204" pitchFamily="34" charset="-122"/>
-              </a:rPr>
-              <a:t>Try better Performance</a:t>
-            </a:r>
-          </a:p>
-          <a:p>
-            <a:pPr lvl="1"/>
-            <a:endParaRPr lang="en-US" altLang="zh-CN" dirty="0">
-              <a:latin typeface="微软雅黑" panose="020B0503020204020204" pitchFamily="34" charset="-122"/>
-              <a:ea typeface="微软雅黑" panose="020B0503020204020204" pitchFamily="34" charset="-122"/>
-              <a:cs typeface="微软雅黑" panose="020B0503020204020204" pitchFamily="34" charset="-122"/>
-            </a:endParaRPr>
-          </a:p>
-          <a:p>
-            <a:pPr indent="-285750">
-              <a:buFont typeface="Arial" panose="020B0604020202020204" pitchFamily="34" charset="0"/>
-              <a:buChar char="•"/>
-            </a:pPr>
-            <a:r>
-              <a:rPr lang="zh-CN" altLang="en-US" b="1" u="sng" dirty="0">
-                <a:solidFill>
-                  <a:srgbClr val="002060"/>
-                </a:solidFill>
-                <a:latin typeface="微软雅黑" panose="020B0503020204020204" pitchFamily="34" charset="-122"/>
-                <a:ea typeface="微软雅黑" panose="020B0503020204020204" pitchFamily="34" charset="-122"/>
-              </a:rPr>
-              <a:t>张旭东</a:t>
-            </a:r>
-            <a:r>
-              <a:rPr lang="en-US" altLang="zh-CN" b="1" u="sng" dirty="0">
-                <a:solidFill>
-                  <a:srgbClr val="002060"/>
-                </a:solidFill>
-                <a:latin typeface="微软雅黑" panose="020B0503020204020204" pitchFamily="34" charset="-122"/>
-                <a:ea typeface="微软雅黑" panose="020B0503020204020204" pitchFamily="34" charset="-122"/>
-              </a:rPr>
-              <a:t>:</a:t>
-            </a:r>
-          </a:p>
-          <a:p>
-            <a:pPr marL="742950" lvl="1" indent="-285750">
-              <a:buFont typeface="Arial" panose="020B0604020202020204" pitchFamily="34" charset="0"/>
-              <a:buChar char="•"/>
-            </a:pPr>
-            <a:r>
-              <a:rPr lang="en-US" altLang="zh-CN" dirty="0">
-                <a:latin typeface="微软雅黑" panose="020B0503020204020204" pitchFamily="34" charset="-122"/>
-                <a:ea typeface="微软雅黑" panose="020B0503020204020204" pitchFamily="34" charset="-122"/>
-                <a:cs typeface="微软雅黑" panose="020B0503020204020204" pitchFamily="34" charset="-122"/>
-              </a:rPr>
-              <a:t>Choose model and estimate memory consumption</a:t>
-            </a:r>
-          </a:p>
-          <a:p>
-            <a:pPr marL="742950" lvl="1" indent="-285750">
-              <a:buFont typeface="Arial" panose="020B0604020202020204" pitchFamily="34" charset="0"/>
-              <a:buChar char="•"/>
-            </a:pPr>
-            <a:r>
-              <a:rPr lang="en-US" altLang="zh-CN" dirty="0">
-                <a:latin typeface="微软雅黑" panose="020B0503020204020204" pitchFamily="34" charset="-122"/>
-                <a:ea typeface="微软雅黑" panose="020B0503020204020204" pitchFamily="34" charset="-122"/>
-                <a:cs typeface="微软雅黑" panose="020B0503020204020204" pitchFamily="34" charset="-122"/>
-              </a:rPr>
-              <a:t>Evaluate test performance</a:t>
-            </a:r>
-          </a:p>
-          <a:p>
-            <a:pPr marL="742950" lvl="1" indent="-285750">
-              <a:buFont typeface="Arial" panose="020B0604020202020204" pitchFamily="34" charset="0"/>
-              <a:buChar char="•"/>
-            </a:pPr>
-            <a:r>
-              <a:rPr lang="en-US" altLang="zh-CN" dirty="0">
-                <a:latin typeface="微软雅黑" panose="020B0503020204020204" pitchFamily="34" charset="-122"/>
-                <a:ea typeface="微软雅黑" panose="020B0503020204020204" pitchFamily="34" charset="-122"/>
-                <a:cs typeface="微软雅黑" panose="020B0503020204020204" pitchFamily="34" charset="-122"/>
-              </a:rPr>
-              <a:t>Try better Performance</a:t>
-            </a:r>
-          </a:p>
-          <a:p>
-            <a:pPr lvl="1"/>
-            <a:endParaRPr lang="en-US" altLang="zh-CN" dirty="0">
-              <a:latin typeface="微软雅黑" panose="020B0503020204020204" pitchFamily="34" charset="-122"/>
-              <a:ea typeface="微软雅黑" panose="020B0503020204020204" pitchFamily="34" charset="-122"/>
-              <a:cs typeface="微软雅黑" panose="020B0503020204020204" pitchFamily="34" charset="-122"/>
-            </a:endParaRPr>
-          </a:p>
-          <a:p>
-            <a:pPr marL="285750" indent="-285750">
-              <a:buFont typeface="Arial" panose="020B0604020202020204" pitchFamily="34" charset="0"/>
-              <a:buChar char="•"/>
-            </a:pPr>
-            <a:r>
-              <a:rPr lang="zh-CN" altLang="en-US" b="1" u="sng" dirty="0">
-                <a:solidFill>
-                  <a:srgbClr val="002060"/>
-                </a:solidFill>
-                <a:latin typeface="微软雅黑" panose="020B0503020204020204" pitchFamily="34" charset="-122"/>
-                <a:ea typeface="微软雅黑" panose="020B0503020204020204" pitchFamily="34" charset="-122"/>
-              </a:rPr>
-              <a:t>李宇轩</a:t>
-            </a:r>
-            <a:r>
-              <a:rPr lang="en-US" altLang="zh-CN" b="1" u="sng" dirty="0">
-                <a:solidFill>
-                  <a:srgbClr val="002060"/>
-                </a:solidFill>
-                <a:latin typeface="微软雅黑" panose="020B0503020204020204" pitchFamily="34" charset="-122"/>
-                <a:ea typeface="微软雅黑" panose="020B0503020204020204" pitchFamily="34" charset="-122"/>
-              </a:rPr>
-              <a:t>:</a:t>
-            </a:r>
-          </a:p>
-          <a:p>
-            <a:pPr marL="742950" lvl="1" indent="-285750">
-              <a:buFont typeface="Arial" panose="020B0604020202020204" pitchFamily="34" charset="0"/>
-              <a:buChar char="•"/>
-            </a:pPr>
-            <a:r>
-              <a:rPr lang="en-US" altLang="zh-CN" dirty="0">
-                <a:latin typeface="微软雅黑" panose="020B0503020204020204" pitchFamily="34" charset="-122"/>
-                <a:ea typeface="微软雅黑" panose="020B0503020204020204" pitchFamily="34" charset="-122"/>
-                <a:cs typeface="微软雅黑" panose="020B0503020204020204" pitchFamily="34" charset="-122"/>
-              </a:rPr>
-              <a:t>Construct self-sampled </a:t>
-            </a:r>
-            <a:r>
-              <a:rPr lang="en-US" altLang="zh-CN" dirty="0" err="1">
-                <a:latin typeface="微软雅黑" panose="020B0503020204020204" pitchFamily="34" charset="-122"/>
-                <a:ea typeface="微软雅黑" panose="020B0503020204020204" pitchFamily="34" charset="-122"/>
-                <a:cs typeface="微软雅黑" panose="020B0503020204020204" pitchFamily="34" charset="-122"/>
-              </a:rPr>
-              <a:t>SUSTech</a:t>
-            </a:r>
-            <a:r>
-              <a:rPr lang="en-US" altLang="zh-CN" dirty="0">
-                <a:latin typeface="微软雅黑" panose="020B0503020204020204" pitchFamily="34" charset="-122"/>
-                <a:ea typeface="微软雅黑" panose="020B0503020204020204" pitchFamily="34" charset="-122"/>
-                <a:cs typeface="微软雅黑" panose="020B0503020204020204" pitchFamily="34" charset="-122"/>
-              </a:rPr>
-              <a:t> dataset</a:t>
-            </a:r>
-          </a:p>
-          <a:p>
-            <a:pPr marL="742950" lvl="1" indent="-285750">
-              <a:buFont typeface="Arial" panose="020B0604020202020204" pitchFamily="34" charset="0"/>
-              <a:buChar char="•"/>
-            </a:pPr>
-            <a:r>
-              <a:rPr lang="en-US" altLang="zh-CN" dirty="0">
-                <a:latin typeface="微软雅黑" panose="020B0503020204020204" pitchFamily="34" charset="-122"/>
-                <a:ea typeface="微软雅黑" panose="020B0503020204020204" pitchFamily="34" charset="-122"/>
-                <a:cs typeface="微软雅黑" panose="020B0503020204020204" pitchFamily="34" charset="-122"/>
-              </a:rPr>
-              <a:t>Data preprocessing for </a:t>
-            </a:r>
-            <a:r>
-              <a:rPr lang="en-US" altLang="zh-CN" dirty="0" err="1">
-                <a:latin typeface="微软雅黑" panose="020B0503020204020204" pitchFamily="34" charset="-122"/>
-                <a:ea typeface="微软雅黑" panose="020B0503020204020204" pitchFamily="34" charset="-122"/>
-                <a:cs typeface="微软雅黑" panose="020B0503020204020204" pitchFamily="34" charset="-122"/>
-              </a:rPr>
-              <a:t>SUSTech</a:t>
-            </a:r>
-            <a:r>
-              <a:rPr lang="en-US" altLang="zh-CN" dirty="0">
-                <a:latin typeface="微软雅黑" panose="020B0503020204020204" pitchFamily="34" charset="-122"/>
-                <a:ea typeface="微软雅黑" panose="020B0503020204020204" pitchFamily="34" charset="-122"/>
-                <a:cs typeface="微软雅黑" panose="020B0503020204020204" pitchFamily="34" charset="-122"/>
-              </a:rPr>
-              <a:t> dataset</a:t>
-            </a:r>
-          </a:p>
-          <a:p>
-            <a:pPr marL="742950" lvl="1" indent="-285750">
-              <a:buFont typeface="Arial" panose="020B0604020202020204" pitchFamily="34" charset="0"/>
-              <a:buChar char="•"/>
-            </a:pPr>
-            <a:r>
-              <a:rPr lang="en-US" altLang="zh-CN" dirty="0">
-                <a:latin typeface="微软雅黑" panose="020B0503020204020204" pitchFamily="34" charset="-122"/>
-                <a:ea typeface="微软雅黑" panose="020B0503020204020204" pitchFamily="34" charset="-122"/>
-                <a:cs typeface="微软雅黑" panose="020B0503020204020204" pitchFamily="34" charset="-122"/>
-              </a:rPr>
-              <a:t>Try better Performance</a:t>
-            </a:r>
-            <a:endParaRPr lang="zh-CN" altLang="en-US" dirty="0">
-              <a:latin typeface="微软雅黑" panose="020B0503020204020204" pitchFamily="34" charset="-122"/>
-              <a:ea typeface="微软雅黑" panose="020B0503020204020204" pitchFamily="34" charset="-122"/>
-              <a:cs typeface="微软雅黑" panose="020B0503020204020204" pitchFamily="34" charset="-122"/>
-            </a:endParaRPr>
+                <a:sym typeface="+mn-ea"/>
+              </a:rPr>
+              <a:t>example of semantic segmentation result</a:t>
+            </a:r>
           </a:p>
         </p:txBody>
       </p:sp>
     </p:spTree>
     <p:extLst>
       <p:ext uri="{BB962C8B-B14F-4D97-AF65-F5344CB8AC3E}">
-        <p14:creationId xmlns:p14="http://schemas.microsoft.com/office/powerpoint/2010/main" val="3110451033"/>
+        <p14:creationId xmlns:p14="http://schemas.microsoft.com/office/powerpoint/2010/main" val="2251863625"/>
       </p:ext>
     </p:extLst>
   </p:cSld>
@@ -5760,7 +6098,7 @@
                 <a:cs typeface="Times New Roman" panose="02020603050405020304" charset="0"/>
                 <a:sym typeface="+mn-ea"/>
               </a:rPr>
-              <a:t>Project Schedule</a:t>
+              <a:t>Goals and Objects</a:t>
             </a:r>
           </a:p>
         </p:txBody>
@@ -5838,40 +6176,163 @@
           </a:prstGeom>
         </p:spPr>
       </p:pic>
-      <p:pic>
-        <p:nvPicPr>
-          <p:cNvPr id="4" name="图片 3">
-            <a:extLst>
-              <a:ext uri="{FF2B5EF4-FFF2-40B4-BE49-F238E27FC236}">
-                <a16:creationId xmlns:a16="http://schemas.microsoft.com/office/drawing/2014/main" id="{56027C00-49AC-5573-65D6-5FE25416ACB7}"/>
-              </a:ext>
-            </a:extLst>
-          </p:cNvPr>
-          <p:cNvPicPr>
-            <a:picLocks noChangeAspect="1"/>
-          </p:cNvPicPr>
+      <p:sp>
+        <p:nvSpPr>
+          <p:cNvPr id="5" name="文本框 4"/>
+          <p:cNvSpPr txBox="1"/>
           <p:nvPr/>
-        </p:nvPicPr>
-        <p:blipFill>
-          <a:blip r:embed="rId3"/>
-          <a:stretch>
-            <a:fillRect/>
-          </a:stretch>
-        </p:blipFill>
-        <p:spPr>
-          <a:xfrm>
-            <a:off x="1325466" y="1494147"/>
-            <a:ext cx="9541067" cy="4183743"/>
+        </p:nvSpPr>
+        <p:spPr>
+          <a:xfrm>
+            <a:off x="1285427" y="1554586"/>
+            <a:ext cx="9188610" cy="3416320"/>
           </a:xfrm>
           <a:prstGeom prst="rect">
             <a:avLst/>
           </a:prstGeom>
-        </p:spPr>
-      </p:pic>
+          <a:noFill/>
+        </p:spPr>
+        <p:txBody>
+          <a:bodyPr wrap="square" rtlCol="0">
+            <a:spAutoFit/>
+          </a:bodyPr>
+          <a:lstStyle/>
+          <a:p>
+            <a:endParaRPr lang="en-US" altLang="zh-CN" sz="2000" b="1" u="sng" dirty="0">
+              <a:solidFill>
+                <a:srgbClr val="002060"/>
+              </a:solidFill>
+              <a:latin typeface="微软雅黑" panose="020B0503020204020204" pitchFamily="34" charset="-122"/>
+              <a:ea typeface="微软雅黑" panose="020B0503020204020204" pitchFamily="34" charset="-122"/>
+              <a:cs typeface="微软雅黑" panose="020B0503020204020204" pitchFamily="34" charset="-122"/>
+              <a:sym typeface="+mn-ea"/>
+            </a:endParaRPr>
+          </a:p>
+          <a:p>
+            <a:pPr marL="285750" indent="-285750">
+              <a:buFont typeface="Arial" panose="020B0604020202020204" pitchFamily="34" charset="0"/>
+              <a:buChar char="•"/>
+            </a:pPr>
+            <a:r>
+              <a:rPr lang="en-US" altLang="zh-CN" sz="2000" dirty="0">
+                <a:latin typeface="微软雅黑" panose="020B0503020204020204" pitchFamily="34" charset="-122"/>
+                <a:ea typeface="微软雅黑" panose="020B0503020204020204" pitchFamily="34" charset="-122"/>
+                <a:cs typeface="微软雅黑" panose="020B0503020204020204" pitchFamily="34" charset="-122"/>
+              </a:rPr>
+              <a:t>Learn the basic mathematics behind CNN and self-attention mechanism in transformer. </a:t>
+            </a:r>
+          </a:p>
+          <a:p>
+            <a:pPr marL="285750" indent="-285750">
+              <a:buFont typeface="Arial" panose="020B0604020202020204" pitchFamily="34" charset="0"/>
+              <a:buChar char="•"/>
+            </a:pPr>
+            <a:endParaRPr lang="en-US" altLang="zh-CN" sz="2000" dirty="0">
+              <a:latin typeface="微软雅黑" panose="020B0503020204020204" pitchFamily="34" charset="-122"/>
+              <a:ea typeface="微软雅黑" panose="020B0503020204020204" pitchFamily="34" charset="-122"/>
+              <a:cs typeface="微软雅黑" panose="020B0503020204020204" pitchFamily="34" charset="-122"/>
+            </a:endParaRPr>
+          </a:p>
+          <a:p>
+            <a:pPr marL="285750" indent="-285750">
+              <a:buFont typeface="Arial" panose="020B0604020202020204" pitchFamily="34" charset="0"/>
+              <a:buChar char="•"/>
+            </a:pPr>
+            <a:r>
+              <a:rPr lang="en-US" altLang="zh-CN" sz="2000" dirty="0">
+                <a:latin typeface="微软雅黑" panose="020B0503020204020204" pitchFamily="34" charset="-122"/>
+                <a:ea typeface="微软雅黑" panose="020B0503020204020204" pitchFamily="34" charset="-122"/>
+                <a:cs typeface="微软雅黑" panose="020B0503020204020204" pitchFamily="34" charset="-122"/>
+              </a:rPr>
+              <a:t>Deploy models on semantic segmentation tasks. </a:t>
+            </a:r>
+          </a:p>
+          <a:p>
+            <a:pPr marL="285750" indent="-285750">
+              <a:buFont typeface="Arial" panose="020B0604020202020204" pitchFamily="34" charset="0"/>
+              <a:buChar char="•"/>
+            </a:pPr>
+            <a:endParaRPr lang="en-US" altLang="zh-CN" sz="2000" dirty="0">
+              <a:latin typeface="微软雅黑" panose="020B0503020204020204" pitchFamily="34" charset="-122"/>
+              <a:ea typeface="微软雅黑" panose="020B0503020204020204" pitchFamily="34" charset="-122"/>
+              <a:cs typeface="微软雅黑" panose="020B0503020204020204" pitchFamily="34" charset="-122"/>
+            </a:endParaRPr>
+          </a:p>
+          <a:p>
+            <a:pPr marL="285750" indent="-285750">
+              <a:buFont typeface="Arial" panose="020B0604020202020204" pitchFamily="34" charset="0"/>
+              <a:buChar char="•"/>
+            </a:pPr>
+            <a:r>
+              <a:rPr lang="en-US" altLang="zh-CN" sz="2000" dirty="0">
+                <a:latin typeface="微软雅黑" panose="020B0503020204020204" pitchFamily="34" charset="-122"/>
+                <a:ea typeface="微软雅黑" panose="020B0503020204020204" pitchFamily="34" charset="-122"/>
+                <a:cs typeface="微软雅黑" panose="020B0503020204020204" pitchFamily="34" charset="-122"/>
+              </a:rPr>
+              <a:t>Explore models in </a:t>
+            </a:r>
+            <a:r>
+              <a:rPr lang="en-US" altLang="zh-CN" sz="2000" dirty="0" err="1">
+                <a:latin typeface="微软雅黑" panose="020B0503020204020204" pitchFamily="34" charset="-122"/>
+                <a:ea typeface="微软雅黑" panose="020B0503020204020204" pitchFamily="34" charset="-122"/>
+                <a:cs typeface="微软雅黑" panose="020B0503020204020204" pitchFamily="34" charset="-122"/>
+              </a:rPr>
+              <a:t>SUSTech</a:t>
+            </a:r>
+            <a:r>
+              <a:rPr lang="en-US" altLang="zh-CN" sz="2000" dirty="0">
+                <a:latin typeface="微软雅黑" panose="020B0503020204020204" pitchFamily="34" charset="-122"/>
+                <a:ea typeface="微软雅黑" panose="020B0503020204020204" pitchFamily="34" charset="-122"/>
+                <a:cs typeface="微软雅黑" panose="020B0503020204020204" pitchFamily="34" charset="-122"/>
+              </a:rPr>
+              <a:t> dataset.</a:t>
+            </a:r>
+          </a:p>
+          <a:p>
+            <a:pPr marL="285750" indent="-285750">
+              <a:buFont typeface="Arial" panose="020B0604020202020204" pitchFamily="34" charset="0"/>
+              <a:buChar char="•"/>
+            </a:pPr>
+            <a:endParaRPr lang="en-US" altLang="zh-CN" sz="2000" dirty="0">
+              <a:latin typeface="微软雅黑" panose="020B0503020204020204" pitchFamily="34" charset="-122"/>
+              <a:ea typeface="微软雅黑" panose="020B0503020204020204" pitchFamily="34" charset="-122"/>
+              <a:cs typeface="微软雅黑" panose="020B0503020204020204" pitchFamily="34" charset="-122"/>
+            </a:endParaRPr>
+          </a:p>
+          <a:p>
+            <a:pPr marL="285750" indent="-285750">
+              <a:buFont typeface="Arial" panose="020B0604020202020204" pitchFamily="34" charset="0"/>
+              <a:buChar char="•"/>
+            </a:pPr>
+            <a:r>
+              <a:rPr lang="en-US" altLang="zh-CN" sz="2000" dirty="0">
+                <a:latin typeface="微软雅黑" panose="020B0503020204020204" pitchFamily="34" charset="-122"/>
+                <a:ea typeface="微软雅黑" panose="020B0503020204020204" pitchFamily="34" charset="-122"/>
+                <a:cs typeface="微软雅黑" panose="020B0503020204020204" pitchFamily="34" charset="-122"/>
+              </a:rPr>
+              <a:t>Optimize the architecture of models. </a:t>
+            </a:r>
+          </a:p>
+          <a:p>
+            <a:endParaRPr lang="en-US" altLang="zh-CN" dirty="0">
+              <a:latin typeface="微软雅黑" panose="020B0503020204020204" pitchFamily="34" charset="-122"/>
+              <a:ea typeface="微软雅黑" panose="020B0503020204020204" pitchFamily="34" charset="-122"/>
+              <a:cs typeface="微软雅黑" panose="020B0503020204020204" pitchFamily="34" charset="-122"/>
+            </a:endParaRPr>
+          </a:p>
+          <a:p>
+            <a:endParaRPr lang="en-US" altLang="zh-CN" dirty="0">
+              <a:latin typeface="微软雅黑" panose="020B0503020204020204" pitchFamily="34" charset="-122"/>
+              <a:ea typeface="微软雅黑" panose="020B0503020204020204" pitchFamily="34" charset="-122"/>
+              <a:cs typeface="微软雅黑" panose="020B0503020204020204" pitchFamily="34" charset="-122"/>
+            </a:endParaRPr>
+          </a:p>
+        </p:txBody>
+      </p:sp>
     </p:spTree>
     <p:extLst>
       <p:ext uri="{BB962C8B-B14F-4D97-AF65-F5344CB8AC3E}">
-        <p14:creationId xmlns:p14="http://schemas.microsoft.com/office/powerpoint/2010/main" val="1941561364"/>
+        <p14:creationId xmlns:p14="http://schemas.microsoft.com/office/powerpoint/2010/main" val="203805915"/>
       </p:ext>
     </p:extLst>
   </p:cSld>
@@ -5913,13 +6374,13 @@
         </p:nvSpPr>
         <p:spPr>
           <a:xfrm>
-            <a:off x="3002295" y="127905"/>
-            <a:ext cx="6389370" cy="579755"/>
+            <a:off x="0" y="127905"/>
+            <a:ext cx="12192000" cy="579755"/>
           </a:xfrm>
         </p:spPr>
         <p:txBody>
           <a:bodyPr anchor="ctr" anchorCtr="0">
-            <a:noAutofit/>
+            <a:normAutofit/>
           </a:bodyPr>
           <a:lstStyle/>
           <a:p>
@@ -5933,7 +6394,7 @@
                 <a:cs typeface="Times New Roman" panose="02020603050405020304" charset="0"/>
                 <a:sym typeface="+mn-ea"/>
               </a:rPr>
-              <a:t>Reference</a:t>
+              <a:t>Task Assignment </a:t>
             </a:r>
           </a:p>
         </p:txBody>
@@ -6013,115 +6474,342 @@
       </p:pic>
       <p:sp>
         <p:nvSpPr>
-          <p:cNvPr id="4" name="矩形 3"/>
-          <p:cNvSpPr/>
+          <p:cNvPr id="5" name="文本框 4"/>
+          <p:cNvSpPr txBox="1"/>
           <p:nvPr/>
         </p:nvSpPr>
         <p:spPr>
           <a:xfrm>
-            <a:off x="1442476" y="2058421"/>
-            <a:ext cx="9307047" cy="2585323"/>
+            <a:off x="2042810" y="1287145"/>
+            <a:ext cx="7609190" cy="5078313"/>
           </a:xfrm>
           <a:prstGeom prst="rect">
             <a:avLst/>
           </a:prstGeom>
-        </p:spPr>
-        <p:txBody>
-          <a:bodyPr wrap="square">
+          <a:noFill/>
+        </p:spPr>
+        <p:txBody>
+          <a:bodyPr wrap="square" rtlCol="0">
             <a:spAutoFit/>
           </a:bodyPr>
           <a:lstStyle/>
           <a:p>
-            <a:r>
-              <a:rPr lang="en-US" altLang="zh-CN" dirty="0"/>
-              <a:t>[1]  Olaf </a:t>
-            </a:r>
-            <a:r>
-              <a:rPr lang="en-US" altLang="zh-CN" dirty="0" err="1"/>
-              <a:t>Ronneberger</a:t>
-            </a:r>
-            <a:r>
-              <a:rPr lang="en-US" altLang="zh-CN" dirty="0"/>
-              <a:t>, Philipp Fisher and M. </a:t>
-            </a:r>
-            <a:r>
-              <a:rPr lang="en-US" altLang="zh-CN" dirty="0" err="1"/>
-              <a:t>Kozubek</a:t>
-            </a:r>
-            <a:r>
-              <a:rPr lang="en-US" altLang="zh-CN" dirty="0"/>
-              <a:t>. U-Net: Convolutional Networks for Biomedical Image Segmentation[J] .</a:t>
-            </a:r>
-            <a:r>
-              <a:rPr lang="en-US" altLang="zh-CN" dirty="0" err="1"/>
-              <a:t>arXiv</a:t>
-            </a:r>
-            <a:r>
-              <a:rPr lang="en-US" altLang="zh-CN" dirty="0"/>
-              <a:t> e-prints arXiv:1505.04597,2015.</a:t>
-            </a:r>
-          </a:p>
-          <a:p>
-            <a:endParaRPr lang="en-US" altLang="zh-CN" dirty="0"/>
-          </a:p>
-          <a:p>
-            <a:r>
-              <a:rPr lang="en-US" altLang="zh-CN" dirty="0"/>
-              <a:t>[2]  </a:t>
-            </a:r>
-            <a:r>
-              <a:rPr lang="en-US" altLang="zh-CN" dirty="0" err="1"/>
-              <a:t>Prannay</a:t>
-            </a:r>
-            <a:r>
-              <a:rPr lang="en-US" altLang="zh-CN" dirty="0"/>
-              <a:t> Khosla, Piotr </a:t>
-            </a:r>
-            <a:r>
-              <a:rPr lang="en-US" altLang="zh-CN" dirty="0" err="1"/>
-              <a:t>Teterwak</a:t>
-            </a:r>
-            <a:r>
-              <a:rPr lang="en-US" altLang="zh-CN" dirty="0"/>
-              <a:t> and Chen Wang. Supervised Contrastive Learning[J] .</a:t>
-            </a:r>
-            <a:r>
-              <a:rPr lang="en-US" altLang="zh-CN" dirty="0" err="1"/>
-              <a:t>arXiv</a:t>
-            </a:r>
-            <a:r>
-              <a:rPr lang="en-US" altLang="zh-CN" dirty="0"/>
-              <a:t> e-prints arXiv:2004.11362,2021.</a:t>
-            </a:r>
-          </a:p>
-          <a:p>
-            <a:endParaRPr lang="en-US" altLang="zh-CN" dirty="0"/>
-          </a:p>
-          <a:p>
-            <a:r>
-              <a:rPr lang="en-US" altLang="zh-CN" dirty="0"/>
-              <a:t>[3]  </a:t>
-            </a:r>
-            <a:r>
-              <a:rPr lang="en-US" altLang="zh-CN" dirty="0" err="1"/>
-              <a:t>Xudong</a:t>
-            </a:r>
-            <a:r>
-              <a:rPr lang="en-US" altLang="zh-CN" dirty="0"/>
-              <a:t> Wang, Rohit Girdhar, Stella X. Yu, and Ishan Misra. Cut and Learn for Unsupervised Object Detection and Instance Segmentation[J]. </a:t>
-            </a:r>
-            <a:r>
-              <a:rPr lang="en-US" altLang="zh-CN" dirty="0" err="1"/>
-              <a:t>arXiv</a:t>
-            </a:r>
-            <a:r>
-              <a:rPr lang="en-US" altLang="zh-CN" dirty="0"/>
-              <a:t> pre-prints arXiv:2301.11320,2023.</a:t>
-            </a:r>
+            <a:pPr indent="-285750">
+              <a:buFont typeface="Arial" panose="020B0604020202020204" pitchFamily="34" charset="0"/>
+              <a:buChar char="•"/>
+            </a:pPr>
+            <a:r>
+              <a:rPr lang="zh-CN" altLang="en-US" b="1" u="sng" dirty="0">
+                <a:solidFill>
+                  <a:srgbClr val="002060"/>
+                </a:solidFill>
+                <a:latin typeface="微软雅黑" panose="020B0503020204020204" pitchFamily="34" charset="-122"/>
+                <a:ea typeface="微软雅黑" panose="020B0503020204020204" pitchFamily="34" charset="-122"/>
+              </a:rPr>
+              <a:t>王浩羽：</a:t>
+            </a:r>
+          </a:p>
+          <a:p>
+            <a:pPr marL="742950" lvl="1" indent="-285750">
+              <a:buFont typeface="Arial" panose="020B0604020202020204" pitchFamily="34" charset="0"/>
+              <a:buChar char="•"/>
+            </a:pPr>
+            <a:r>
+              <a:rPr lang="en-US" altLang="zh-CN" dirty="0">
+                <a:latin typeface="微软雅黑" panose="020B0503020204020204" pitchFamily="34" charset="-122"/>
+                <a:ea typeface="微软雅黑" panose="020B0503020204020204" pitchFamily="34" charset="-122"/>
+                <a:cs typeface="微软雅黑" panose="020B0503020204020204" pitchFamily="34" charset="-122"/>
+              </a:rPr>
+              <a:t>Survey on 2D semantic segmentation</a:t>
+            </a:r>
+          </a:p>
+          <a:p>
+            <a:pPr marL="742950" lvl="1" indent="-285750">
+              <a:buFont typeface="Arial" panose="020B0604020202020204" pitchFamily="34" charset="0"/>
+              <a:buChar char="•"/>
+            </a:pPr>
+            <a:r>
+              <a:rPr lang="en-US" altLang="zh-CN" dirty="0">
+                <a:latin typeface="微软雅黑" panose="020B0503020204020204" pitchFamily="34" charset="-122"/>
+                <a:ea typeface="微软雅黑" panose="020B0503020204020204" pitchFamily="34" charset="-122"/>
+                <a:cs typeface="微软雅黑" panose="020B0503020204020204" pitchFamily="34" charset="-122"/>
+              </a:rPr>
+              <a:t>Construct cityscapes dataset</a:t>
+            </a:r>
+          </a:p>
+          <a:p>
+            <a:pPr lvl="1"/>
+            <a:endParaRPr lang="en-US" altLang="zh-CN" dirty="0">
+              <a:latin typeface="微软雅黑" panose="020B0503020204020204" pitchFamily="34" charset="-122"/>
+              <a:ea typeface="微软雅黑" panose="020B0503020204020204" pitchFamily="34" charset="-122"/>
+              <a:cs typeface="微软雅黑" panose="020B0503020204020204" pitchFamily="34" charset="-122"/>
+            </a:endParaRPr>
+          </a:p>
+          <a:p>
+            <a:pPr indent="-285750">
+              <a:buFont typeface="Arial" panose="020B0604020202020204" pitchFamily="34" charset="0"/>
+              <a:buChar char="•"/>
+            </a:pPr>
+            <a:r>
+              <a:rPr lang="zh-CN" altLang="en-US" b="1" u="sng" dirty="0">
+                <a:solidFill>
+                  <a:srgbClr val="002060"/>
+                </a:solidFill>
+                <a:latin typeface="微软雅黑" panose="020B0503020204020204" pitchFamily="34" charset="-122"/>
+                <a:ea typeface="微软雅黑" panose="020B0503020204020204" pitchFamily="34" charset="-122"/>
+              </a:rPr>
+              <a:t>陈张杰</a:t>
+            </a:r>
+            <a:r>
+              <a:rPr lang="en-US" altLang="zh-CN" b="1" u="sng" dirty="0">
+                <a:solidFill>
+                  <a:srgbClr val="002060"/>
+                </a:solidFill>
+                <a:latin typeface="微软雅黑" panose="020B0503020204020204" pitchFamily="34" charset="-122"/>
+                <a:ea typeface="微软雅黑" panose="020B0503020204020204" pitchFamily="34" charset="-122"/>
+              </a:rPr>
+              <a:t>:</a:t>
+            </a:r>
+          </a:p>
+          <a:p>
+            <a:pPr marL="742950" lvl="1" indent="-285750">
+              <a:buFont typeface="Arial" panose="020B0604020202020204" pitchFamily="34" charset="0"/>
+              <a:buChar char="•"/>
+            </a:pPr>
+            <a:r>
+              <a:rPr lang="en-US" altLang="zh-CN" dirty="0">
+                <a:latin typeface="微软雅黑" panose="020B0503020204020204" pitchFamily="34" charset="-122"/>
+                <a:ea typeface="微软雅黑" panose="020B0503020204020204" pitchFamily="34" charset="-122"/>
+                <a:cs typeface="微软雅黑" panose="020B0503020204020204" pitchFamily="34" charset="-122"/>
+              </a:rPr>
+              <a:t>Train the model</a:t>
+            </a:r>
+          </a:p>
+          <a:p>
+            <a:pPr marL="742950" lvl="1" indent="-285750">
+              <a:buFont typeface="Arial" panose="020B0604020202020204" pitchFamily="34" charset="0"/>
+              <a:buChar char="•"/>
+            </a:pPr>
+            <a:r>
+              <a:rPr lang="en-US" altLang="zh-CN" dirty="0">
+                <a:latin typeface="微软雅黑" panose="020B0503020204020204" pitchFamily="34" charset="-122"/>
+                <a:ea typeface="微软雅黑" panose="020B0503020204020204" pitchFamily="34" charset="-122"/>
+                <a:cs typeface="微软雅黑" panose="020B0503020204020204" pitchFamily="34" charset="-122"/>
+              </a:rPr>
+              <a:t>Evaluate test performance</a:t>
+            </a:r>
+          </a:p>
+          <a:p>
+            <a:pPr marL="742950" lvl="1" indent="-285750">
+              <a:buFont typeface="Arial" panose="020B0604020202020204" pitchFamily="34" charset="0"/>
+              <a:buChar char="•"/>
+            </a:pPr>
+            <a:r>
+              <a:rPr lang="en-US" altLang="zh-CN" dirty="0">
+                <a:latin typeface="微软雅黑" panose="020B0503020204020204" pitchFamily="34" charset="-122"/>
+                <a:ea typeface="微软雅黑" panose="020B0503020204020204" pitchFamily="34" charset="-122"/>
+                <a:cs typeface="微软雅黑" panose="020B0503020204020204" pitchFamily="34" charset="-122"/>
+              </a:rPr>
+              <a:t>Try better Performance</a:t>
+            </a:r>
+          </a:p>
+          <a:p>
+            <a:pPr lvl="1"/>
+            <a:endParaRPr lang="en-US" altLang="zh-CN" dirty="0">
+              <a:latin typeface="微软雅黑" panose="020B0503020204020204" pitchFamily="34" charset="-122"/>
+              <a:ea typeface="微软雅黑" panose="020B0503020204020204" pitchFamily="34" charset="-122"/>
+              <a:cs typeface="微软雅黑" panose="020B0503020204020204" pitchFamily="34" charset="-122"/>
+            </a:endParaRPr>
+          </a:p>
+          <a:p>
+            <a:pPr indent="-285750">
+              <a:buFont typeface="Arial" panose="020B0604020202020204" pitchFamily="34" charset="0"/>
+              <a:buChar char="•"/>
+            </a:pPr>
+            <a:r>
+              <a:rPr lang="zh-CN" altLang="en-US" b="1" u="sng" dirty="0">
+                <a:solidFill>
+                  <a:srgbClr val="002060"/>
+                </a:solidFill>
+                <a:latin typeface="微软雅黑" panose="020B0503020204020204" pitchFamily="34" charset="-122"/>
+                <a:ea typeface="微软雅黑" panose="020B0503020204020204" pitchFamily="34" charset="-122"/>
+              </a:rPr>
+              <a:t>张旭东</a:t>
+            </a:r>
+            <a:r>
+              <a:rPr lang="en-US" altLang="zh-CN" b="1" u="sng" dirty="0">
+                <a:solidFill>
+                  <a:srgbClr val="002060"/>
+                </a:solidFill>
+                <a:latin typeface="微软雅黑" panose="020B0503020204020204" pitchFamily="34" charset="-122"/>
+                <a:ea typeface="微软雅黑" panose="020B0503020204020204" pitchFamily="34" charset="-122"/>
+              </a:rPr>
+              <a:t>:</a:t>
+            </a:r>
+          </a:p>
+          <a:p>
+            <a:pPr marL="742950" lvl="1" indent="-285750">
+              <a:buFont typeface="Arial" panose="020B0604020202020204" pitchFamily="34" charset="0"/>
+              <a:buChar char="•"/>
+            </a:pPr>
+            <a:r>
+              <a:rPr lang="en-US" altLang="zh-CN" dirty="0">
+                <a:latin typeface="微软雅黑" panose="020B0503020204020204" pitchFamily="34" charset="-122"/>
+                <a:ea typeface="微软雅黑" panose="020B0503020204020204" pitchFamily="34" charset="-122"/>
+                <a:cs typeface="微软雅黑" panose="020B0503020204020204" pitchFamily="34" charset="-122"/>
+              </a:rPr>
+              <a:t>Choose model and estimate memory consumption</a:t>
+            </a:r>
+          </a:p>
+          <a:p>
+            <a:pPr marL="742950" lvl="1" indent="-285750">
+              <a:buFont typeface="Arial" panose="020B0604020202020204" pitchFamily="34" charset="0"/>
+              <a:buChar char="•"/>
+            </a:pPr>
+            <a:r>
+              <a:rPr lang="en-US" altLang="zh-CN" dirty="0">
+                <a:latin typeface="微软雅黑" panose="020B0503020204020204" pitchFamily="34" charset="-122"/>
+                <a:ea typeface="微软雅黑" panose="020B0503020204020204" pitchFamily="34" charset="-122"/>
+                <a:cs typeface="微软雅黑" panose="020B0503020204020204" pitchFamily="34" charset="-122"/>
+              </a:rPr>
+              <a:t>Evaluate test performance</a:t>
+            </a:r>
+          </a:p>
+          <a:p>
+            <a:pPr marL="742950" lvl="1" indent="-285750">
+              <a:buFont typeface="Arial" panose="020B0604020202020204" pitchFamily="34" charset="0"/>
+              <a:buChar char="•"/>
+            </a:pPr>
+            <a:r>
+              <a:rPr lang="en-US" altLang="zh-CN" dirty="0">
+                <a:latin typeface="微软雅黑" panose="020B0503020204020204" pitchFamily="34" charset="-122"/>
+                <a:ea typeface="微软雅黑" panose="020B0503020204020204" pitchFamily="34" charset="-122"/>
+                <a:cs typeface="微软雅黑" panose="020B0503020204020204" pitchFamily="34" charset="-122"/>
+              </a:rPr>
+              <a:t>Try better Performance</a:t>
+            </a:r>
+          </a:p>
+          <a:p>
+            <a:pPr lvl="1"/>
+            <a:endParaRPr lang="en-US" altLang="zh-CN" dirty="0">
+              <a:latin typeface="微软雅黑" panose="020B0503020204020204" pitchFamily="34" charset="-122"/>
+              <a:ea typeface="微软雅黑" panose="020B0503020204020204" pitchFamily="34" charset="-122"/>
+              <a:cs typeface="微软雅黑" panose="020B0503020204020204" pitchFamily="34" charset="-122"/>
+            </a:endParaRPr>
+          </a:p>
+          <a:p>
+            <a:pPr marL="285750" indent="-285750">
+              <a:buFont typeface="Arial" panose="020B0604020202020204" pitchFamily="34" charset="0"/>
+              <a:buChar char="•"/>
+            </a:pPr>
+            <a:r>
+              <a:rPr lang="zh-CN" altLang="en-US" b="1" u="sng" dirty="0">
+                <a:solidFill>
+                  <a:srgbClr val="002060"/>
+                </a:solidFill>
+                <a:latin typeface="微软雅黑" panose="020B0503020204020204" pitchFamily="34" charset="-122"/>
+                <a:ea typeface="微软雅黑" panose="020B0503020204020204" pitchFamily="34" charset="-122"/>
+              </a:rPr>
+              <a:t>李宇轩</a:t>
+            </a:r>
+            <a:r>
+              <a:rPr lang="en-US" altLang="zh-CN" b="1" u="sng" dirty="0">
+                <a:solidFill>
+                  <a:srgbClr val="002060"/>
+                </a:solidFill>
+                <a:latin typeface="微软雅黑" panose="020B0503020204020204" pitchFamily="34" charset="-122"/>
+                <a:ea typeface="微软雅黑" panose="020B0503020204020204" pitchFamily="34" charset="-122"/>
+              </a:rPr>
+              <a:t>:</a:t>
+            </a:r>
+          </a:p>
+          <a:p>
+            <a:pPr marL="742950" lvl="1" indent="-285750">
+              <a:buFont typeface="Arial" panose="020B0604020202020204" pitchFamily="34" charset="0"/>
+              <a:buChar char="•"/>
+            </a:pPr>
+            <a:r>
+              <a:rPr lang="en-US" altLang="zh-CN" dirty="0">
+                <a:latin typeface="微软雅黑" panose="020B0503020204020204" pitchFamily="34" charset="-122"/>
+                <a:ea typeface="微软雅黑" panose="020B0503020204020204" pitchFamily="34" charset="-122"/>
+                <a:cs typeface="微软雅黑" panose="020B0503020204020204" pitchFamily="34" charset="-122"/>
+              </a:rPr>
+              <a:t>Construct self-sampled </a:t>
+            </a:r>
+            <a:r>
+              <a:rPr lang="en-US" altLang="zh-CN" dirty="0" err="1">
+                <a:latin typeface="微软雅黑" panose="020B0503020204020204" pitchFamily="34" charset="-122"/>
+                <a:ea typeface="微软雅黑" panose="020B0503020204020204" pitchFamily="34" charset="-122"/>
+                <a:cs typeface="微软雅黑" panose="020B0503020204020204" pitchFamily="34" charset="-122"/>
+              </a:rPr>
+              <a:t>SUSTech</a:t>
+            </a:r>
+            <a:r>
+              <a:rPr lang="en-US" altLang="zh-CN" dirty="0">
+                <a:latin typeface="微软雅黑" panose="020B0503020204020204" pitchFamily="34" charset="-122"/>
+                <a:ea typeface="微软雅黑" panose="020B0503020204020204" pitchFamily="34" charset="-122"/>
+                <a:cs typeface="微软雅黑" panose="020B0503020204020204" pitchFamily="34" charset="-122"/>
+              </a:rPr>
+              <a:t> dataset</a:t>
+            </a:r>
+          </a:p>
+          <a:p>
+            <a:pPr marL="742950" lvl="1" indent="-285750">
+              <a:buFont typeface="Arial" panose="020B0604020202020204" pitchFamily="34" charset="0"/>
+              <a:buChar char="•"/>
+            </a:pPr>
+            <a:r>
+              <a:rPr lang="en-US" altLang="zh-CN" dirty="0">
+                <a:latin typeface="微软雅黑" panose="020B0503020204020204" pitchFamily="34" charset="-122"/>
+                <a:ea typeface="微软雅黑" panose="020B0503020204020204" pitchFamily="34" charset="-122"/>
+                <a:cs typeface="微软雅黑" panose="020B0503020204020204" pitchFamily="34" charset="-122"/>
+              </a:rPr>
+              <a:t>Data preprocessing for </a:t>
+            </a:r>
+            <a:r>
+              <a:rPr lang="en-US" altLang="zh-CN" dirty="0" err="1">
+                <a:latin typeface="微软雅黑" panose="020B0503020204020204" pitchFamily="34" charset="-122"/>
+                <a:ea typeface="微软雅黑" panose="020B0503020204020204" pitchFamily="34" charset="-122"/>
+                <a:cs typeface="微软雅黑" panose="020B0503020204020204" pitchFamily="34" charset="-122"/>
+              </a:rPr>
+              <a:t>SUSTech</a:t>
+            </a:r>
+            <a:r>
+              <a:rPr lang="en-US" altLang="zh-CN" dirty="0">
+                <a:latin typeface="微软雅黑" panose="020B0503020204020204" pitchFamily="34" charset="-122"/>
+                <a:ea typeface="微软雅黑" panose="020B0503020204020204" pitchFamily="34" charset="-122"/>
+                <a:cs typeface="微软雅黑" panose="020B0503020204020204" pitchFamily="34" charset="-122"/>
+              </a:rPr>
+              <a:t> dataset</a:t>
+            </a:r>
+          </a:p>
+          <a:p>
+            <a:pPr marL="742950" lvl="1" indent="-285750">
+              <a:buFont typeface="Arial" panose="020B0604020202020204" pitchFamily="34" charset="0"/>
+              <a:buChar char="•"/>
+            </a:pPr>
+            <a:r>
+              <a:rPr lang="en-US" altLang="zh-CN" dirty="0">
+                <a:latin typeface="微软雅黑" panose="020B0503020204020204" pitchFamily="34" charset="-122"/>
+                <a:ea typeface="微软雅黑" panose="020B0503020204020204" pitchFamily="34" charset="-122"/>
+                <a:cs typeface="微软雅黑" panose="020B0503020204020204" pitchFamily="34" charset="-122"/>
+              </a:rPr>
+              <a:t>Try better Performance</a:t>
+            </a:r>
+            <a:endParaRPr lang="zh-CN" altLang="en-US" dirty="0">
+              <a:latin typeface="微软雅黑" panose="020B0503020204020204" pitchFamily="34" charset="-122"/>
+              <a:ea typeface="微软雅黑" panose="020B0503020204020204" pitchFamily="34" charset="-122"/>
+              <a:cs typeface="微软雅黑" panose="020B0503020204020204" pitchFamily="34" charset="-122"/>
+            </a:endParaRPr>
           </a:p>
         </p:txBody>
       </p:sp>
     </p:spTree>
+    <p:extLst>
+      <p:ext uri="{BB962C8B-B14F-4D97-AF65-F5344CB8AC3E}">
+        <p14:creationId xmlns:p14="http://schemas.microsoft.com/office/powerpoint/2010/main" val="3110451033"/>
+      </p:ext>
+    </p:extLst>
   </p:cSld>
   <p:clrMapOvr>
     <a:masterClrMapping/>
@@ -6161,57 +6849,31 @@
         </p:nvSpPr>
         <p:spPr>
           <a:xfrm>
-            <a:off x="3182564" y="2094249"/>
-            <a:ext cx="5826868" cy="1006429"/>
-          </a:xfrm>
-        </p:spPr>
-        <p:txBody>
-          <a:bodyPr wrap="square">
-            <a:spAutoFit/>
+            <a:off x="0" y="127905"/>
+            <a:ext cx="12192000" cy="579755"/>
+          </a:xfrm>
+        </p:spPr>
+        <p:txBody>
+          <a:bodyPr anchor="ctr" anchorCtr="0">
+            <a:normAutofit/>
           </a:bodyPr>
           <a:lstStyle/>
           <a:p>
             <a:r>
-              <a:rPr lang="en-US" altLang="zh-CN" sz="6600" dirty="0">
+              <a:rPr lang="en-US" altLang="zh-CN" sz="3100" b="1" dirty="0">
+                <a:solidFill>
+                  <a:srgbClr val="002060"/>
+                </a:solidFill>
                 <a:latin typeface="Times New Roman" panose="02020603050405020304" charset="0"/>
                 <a:ea typeface="微软雅黑" panose="020B0503020204020204" pitchFamily="34" charset="-122"/>
                 <a:cs typeface="Times New Roman" panose="02020603050405020304" charset="0"/>
-              </a:rPr>
-              <a:t>THANK YOU!</a:t>
-            </a:r>
-            <a:endParaRPr lang="zh-CN" altLang="en-US" sz="6600" dirty="0">
-              <a:latin typeface="Times New Roman" panose="02020603050405020304" charset="0"/>
-              <a:ea typeface="微软雅黑" panose="020B0503020204020204" pitchFamily="34" charset="-122"/>
-              <a:cs typeface="Times New Roman" panose="02020603050405020304" charset="0"/>
-            </a:endParaRPr>
-          </a:p>
-        </p:txBody>
-      </p:sp>
-      <p:pic>
-        <p:nvPicPr>
-          <p:cNvPr id="9" name="图片 8" descr="校徽"/>
-          <p:cNvPicPr>
-            <a:picLocks noChangeAspect="1"/>
-          </p:cNvPicPr>
-          <p:nvPr/>
-        </p:nvPicPr>
-        <p:blipFill>
-          <a:blip r:embed="rId2"/>
-          <a:srcRect l="21146" t="9697" r="22583" b="12705"/>
-          <a:stretch>
-            <a:fillRect/>
-          </a:stretch>
-        </p:blipFill>
-        <p:spPr>
-          <a:xfrm>
-            <a:off x="10811510" y="5556250"/>
-            <a:ext cx="1028700" cy="1020445"/>
-          </a:xfrm>
-          <a:prstGeom prst="rect">
-            <a:avLst/>
-          </a:prstGeom>
-        </p:spPr>
-      </p:pic>
+                <a:sym typeface="+mn-ea"/>
+              </a:rPr>
+              <a:t>Project Schedule</a:t>
+            </a:r>
+          </a:p>
+        </p:txBody>
+      </p:sp>
       <p:sp>
         <p:nvSpPr>
           <p:cNvPr id="6" name="矩形 5"/>
@@ -6219,9 +6881,9 @@
           <p:nvPr/>
         </p:nvSpPr>
         <p:spPr>
-          <a:xfrm flipV="1">
-            <a:off x="3113721" y="3024478"/>
-            <a:ext cx="5964555" cy="76200"/>
+          <a:xfrm>
+            <a:off x="-13970" y="707390"/>
+            <a:ext cx="12219940" cy="76200"/>
           </a:xfrm>
           <a:prstGeom prst="rect">
             <a:avLst/>
@@ -6260,6 +6922,314 @@
           </a:p>
         </p:txBody>
       </p:sp>
+      <p:pic>
+        <p:nvPicPr>
+          <p:cNvPr id="9" name="图片 8" descr="校徽"/>
+          <p:cNvPicPr>
+            <a:picLocks noChangeAspect="1"/>
+          </p:cNvPicPr>
+          <p:nvPr/>
+        </p:nvPicPr>
+        <p:blipFill>
+          <a:blip r:embed="rId2"/>
+          <a:srcRect l="21146" t="9697" r="22583" b="12705"/>
+          <a:stretch>
+            <a:fillRect/>
+          </a:stretch>
+        </p:blipFill>
+        <p:spPr>
+          <a:xfrm>
+            <a:off x="10811510" y="5556250"/>
+            <a:ext cx="1028700" cy="1020445"/>
+          </a:xfrm>
+          <a:prstGeom prst="rect">
+            <a:avLst/>
+          </a:prstGeom>
+        </p:spPr>
+      </p:pic>
+      <p:pic>
+        <p:nvPicPr>
+          <p:cNvPr id="4" name="图片 3">
+            <a:extLst>
+              <a:ext uri="{FF2B5EF4-FFF2-40B4-BE49-F238E27FC236}">
+                <a16:creationId xmlns:a16="http://schemas.microsoft.com/office/drawing/2014/main" id="{56027C00-49AC-5573-65D6-5FE25416ACB7}"/>
+              </a:ext>
+            </a:extLst>
+          </p:cNvPr>
+          <p:cNvPicPr>
+            <a:picLocks noChangeAspect="1"/>
+          </p:cNvPicPr>
+          <p:nvPr/>
+        </p:nvPicPr>
+        <p:blipFill>
+          <a:blip r:embed="rId3"/>
+          <a:stretch>
+            <a:fillRect/>
+          </a:stretch>
+        </p:blipFill>
+        <p:spPr>
+          <a:xfrm>
+            <a:off x="1325466" y="1494147"/>
+            <a:ext cx="9541067" cy="4183743"/>
+          </a:xfrm>
+          <a:prstGeom prst="rect">
+            <a:avLst/>
+          </a:prstGeom>
+        </p:spPr>
+      </p:pic>
+    </p:spTree>
+    <p:extLst>
+      <p:ext uri="{BB962C8B-B14F-4D97-AF65-F5344CB8AC3E}">
+        <p14:creationId xmlns:p14="http://schemas.microsoft.com/office/powerpoint/2010/main" val="1941561364"/>
+      </p:ext>
+    </p:extLst>
+  </p:cSld>
+  <p:clrMapOvr>
+    <a:masterClrMapping/>
+  </p:clrMapOvr>
+  <p:transition spd="slow">
+    <p:push dir="u"/>
+  </p:transition>
+</p:sld>
+</file>
+
+<file path=ppt/slides/slide17.xml><?xml version="1.0" encoding="utf-8"?>
+<p:sld xmlns:a="http://schemas.openxmlformats.org/drawingml/2006/main" xmlns:r="http://schemas.openxmlformats.org/officeDocument/2006/relationships" xmlns:p="http://schemas.openxmlformats.org/presentationml/2006/main">
+  <p:cSld>
+    <p:spTree>
+      <p:nvGrpSpPr>
+        <p:cNvPr id="1" name=""/>
+        <p:cNvGrpSpPr/>
+        <p:nvPr/>
+      </p:nvGrpSpPr>
+      <p:grpSpPr>
+        <a:xfrm>
+          <a:off x="0" y="0"/>
+          <a:ext cx="0" cy="0"/>
+          <a:chOff x="0" y="0"/>
+          <a:chExt cx="0" cy="0"/>
+        </a:xfrm>
+      </p:grpSpPr>
+      <p:sp>
+        <p:nvSpPr>
+          <p:cNvPr id="2" name="标题 1"/>
+          <p:cNvSpPr>
+            <a:spLocks noGrp="1"/>
+          </p:cNvSpPr>
+          <p:nvPr>
+            <p:ph type="ctrTitle"/>
+          </p:nvPr>
+        </p:nvSpPr>
+        <p:spPr>
+          <a:xfrm>
+            <a:off x="3002295" y="127905"/>
+            <a:ext cx="6389370" cy="579755"/>
+          </a:xfrm>
+        </p:spPr>
+        <p:txBody>
+          <a:bodyPr anchor="ctr" anchorCtr="0">
+            <a:noAutofit/>
+          </a:bodyPr>
+          <a:lstStyle/>
+          <a:p>
+            <a:r>
+              <a:rPr lang="en-US" altLang="zh-CN" sz="3100" b="1" dirty="0">
+                <a:solidFill>
+                  <a:srgbClr val="002060"/>
+                </a:solidFill>
+                <a:latin typeface="Times New Roman" panose="02020603050405020304" charset="0"/>
+                <a:ea typeface="微软雅黑" panose="020B0503020204020204" pitchFamily="34" charset="-122"/>
+                <a:cs typeface="Times New Roman" panose="02020603050405020304" charset="0"/>
+                <a:sym typeface="+mn-ea"/>
+              </a:rPr>
+              <a:t>Reference</a:t>
+            </a:r>
+          </a:p>
+        </p:txBody>
+      </p:sp>
+      <p:sp>
+        <p:nvSpPr>
+          <p:cNvPr id="6" name="矩形 5"/>
+          <p:cNvSpPr/>
+          <p:nvPr/>
+        </p:nvSpPr>
+        <p:spPr>
+          <a:xfrm>
+            <a:off x="-13970" y="707390"/>
+            <a:ext cx="12219940" cy="76200"/>
+          </a:xfrm>
+          <a:prstGeom prst="rect">
+            <a:avLst/>
+          </a:prstGeom>
+          <a:solidFill>
+            <a:srgbClr val="002060">
+              <a:alpha val="97000"/>
+            </a:srgbClr>
+          </a:solidFill>
+          <a:ln>
+            <a:noFill/>
+          </a:ln>
+        </p:spPr>
+        <p:style>
+          <a:lnRef idx="2">
+            <a:schemeClr val="accent1">
+              <a:shade val="50000"/>
+            </a:schemeClr>
+          </a:lnRef>
+          <a:fillRef idx="1">
+            <a:schemeClr val="accent1"/>
+          </a:fillRef>
+          <a:effectRef idx="0">
+            <a:schemeClr val="accent1"/>
+          </a:effectRef>
+          <a:fontRef idx="minor">
+            <a:schemeClr val="lt1"/>
+          </a:fontRef>
+        </p:style>
+        <p:txBody>
+          <a:bodyPr rtlCol="0" anchor="ctr"/>
+          <a:lstStyle/>
+          <a:p>
+            <a:pPr algn="ctr"/>
+            <a:endParaRPr lang="zh-CN" altLang="en-US"/>
+          </a:p>
+        </p:txBody>
+      </p:sp>
+      <p:pic>
+        <p:nvPicPr>
+          <p:cNvPr id="9" name="图片 8" descr="校徽"/>
+          <p:cNvPicPr>
+            <a:picLocks noChangeAspect="1"/>
+          </p:cNvPicPr>
+          <p:nvPr/>
+        </p:nvPicPr>
+        <p:blipFill>
+          <a:blip r:embed="rId2"/>
+          <a:srcRect l="21146" t="9697" r="22583" b="12705"/>
+          <a:stretch>
+            <a:fillRect/>
+          </a:stretch>
+        </p:blipFill>
+        <p:spPr>
+          <a:xfrm>
+            <a:off x="10811510" y="5556250"/>
+            <a:ext cx="1028700" cy="1020445"/>
+          </a:xfrm>
+          <a:prstGeom prst="rect">
+            <a:avLst/>
+          </a:prstGeom>
+        </p:spPr>
+      </p:pic>
+      <p:sp>
+        <p:nvSpPr>
+          <p:cNvPr id="4" name="矩形 3"/>
+          <p:cNvSpPr/>
+          <p:nvPr/>
+        </p:nvSpPr>
+        <p:spPr>
+          <a:xfrm>
+            <a:off x="1442476" y="2058421"/>
+            <a:ext cx="9307047" cy="2585323"/>
+          </a:xfrm>
+          <a:prstGeom prst="rect">
+            <a:avLst/>
+          </a:prstGeom>
+        </p:spPr>
+        <p:txBody>
+          <a:bodyPr wrap="square">
+            <a:spAutoFit/>
+          </a:bodyPr>
+          <a:lstStyle/>
+          <a:p>
+            <a:r>
+              <a:rPr lang="en-US" altLang="zh-CN" dirty="0"/>
+              <a:t>[1]  Olaf </a:t>
+            </a:r>
+            <a:r>
+              <a:rPr lang="en-US" altLang="zh-CN" dirty="0" err="1"/>
+              <a:t>Ronneberger</a:t>
+            </a:r>
+            <a:r>
+              <a:rPr lang="en-US" altLang="zh-CN" dirty="0"/>
+              <a:t>, Philipp Fisher and M. </a:t>
+            </a:r>
+            <a:r>
+              <a:rPr lang="en-US" altLang="zh-CN" dirty="0" err="1"/>
+              <a:t>Kozubek</a:t>
+            </a:r>
+            <a:r>
+              <a:rPr lang="en-US" altLang="zh-CN" dirty="0"/>
+              <a:t>. U-Net: Convolutional Networks for Biomedical Image Segmentation[J] .</a:t>
+            </a:r>
+            <a:r>
+              <a:rPr lang="en-US" altLang="zh-CN" dirty="0" err="1"/>
+              <a:t>arXiv</a:t>
+            </a:r>
+            <a:r>
+              <a:rPr lang="en-US" altLang="zh-CN" dirty="0"/>
+              <a:t> e-prints arXiv:1505.04597,2015.</a:t>
+            </a:r>
+          </a:p>
+          <a:p>
+            <a:endParaRPr lang="en-US" altLang="zh-CN" dirty="0"/>
+          </a:p>
+          <a:p>
+            <a:r>
+              <a:rPr lang="en-US" altLang="zh-CN" dirty="0"/>
+              <a:t>[2]  </a:t>
+            </a:r>
+            <a:r>
+              <a:rPr lang="en-US" altLang="zh-CN" dirty="0" err="1"/>
+              <a:t>Prannay</a:t>
+            </a:r>
+            <a:r>
+              <a:rPr lang="en-US" altLang="zh-CN" dirty="0"/>
+              <a:t> Khosla, Piotr </a:t>
+            </a:r>
+            <a:r>
+              <a:rPr lang="en-US" altLang="zh-CN" dirty="0" err="1"/>
+              <a:t>Teterwak</a:t>
+            </a:r>
+            <a:r>
+              <a:rPr lang="en-US" altLang="zh-CN" dirty="0"/>
+              <a:t> and Chen Wang. Supervised Contrastive Learning[J] .</a:t>
+            </a:r>
+            <a:r>
+              <a:rPr lang="en-US" altLang="zh-CN" dirty="0" err="1"/>
+              <a:t>arXiv</a:t>
+            </a:r>
+            <a:r>
+              <a:rPr lang="en-US" altLang="zh-CN" dirty="0"/>
+              <a:t> e-prints arXiv:2004.11362,2021.</a:t>
+            </a:r>
+          </a:p>
+          <a:p>
+            <a:endParaRPr lang="en-US" altLang="zh-CN" dirty="0"/>
+          </a:p>
+          <a:p>
+            <a:r>
+              <a:rPr lang="en-US" altLang="zh-CN" dirty="0"/>
+              <a:t>[3]  </a:t>
+            </a:r>
+            <a:r>
+              <a:rPr lang="en-US" altLang="zh-CN" dirty="0" err="1"/>
+              <a:t>Xudong</a:t>
+            </a:r>
+            <a:r>
+              <a:rPr lang="en-US" altLang="zh-CN" dirty="0"/>
+              <a:t> Wang, Rohit Girdhar, Stella X. Yu, and Ishan Misra. Cut and Learn for Unsupervised Object Detection and Instance Segmentation[J]. </a:t>
+            </a:r>
+            <a:r>
+              <a:rPr lang="en-US" altLang="zh-CN" dirty="0" err="1"/>
+              <a:t>arXiv</a:t>
+            </a:r>
+            <a:r>
+              <a:rPr lang="en-US" altLang="zh-CN" dirty="0"/>
+              <a:t> pre-prints arXiv:2301.11320,2023.</a:t>
+            </a:r>
+          </a:p>
+        </p:txBody>
+      </p:sp>
     </p:spTree>
   </p:cSld>
   <p:clrMapOvr>
@@ -6271,7 +7241,146 @@
 </p:sld>
 </file>
 
-<file path=ppt/slides/slide17.xml><?xml version="1.0" encoding="utf-8"?>
+<file path=ppt/slides/slide18.xml><?xml version="1.0" encoding="utf-8"?>
+<p:sld xmlns:a="http://schemas.openxmlformats.org/drawingml/2006/main" xmlns:r="http://schemas.openxmlformats.org/officeDocument/2006/relationships" xmlns:p="http://schemas.openxmlformats.org/presentationml/2006/main">
+  <p:cSld>
+    <p:spTree>
+      <p:nvGrpSpPr>
+        <p:cNvPr id="1" name=""/>
+        <p:cNvGrpSpPr/>
+        <p:nvPr/>
+      </p:nvGrpSpPr>
+      <p:grpSpPr>
+        <a:xfrm>
+          <a:off x="0" y="0"/>
+          <a:ext cx="0" cy="0"/>
+          <a:chOff x="0" y="0"/>
+          <a:chExt cx="0" cy="0"/>
+        </a:xfrm>
+      </p:grpSpPr>
+      <p:sp>
+        <p:nvSpPr>
+          <p:cNvPr id="2" name="标题 1"/>
+          <p:cNvSpPr>
+            <a:spLocks noGrp="1"/>
+          </p:cNvSpPr>
+          <p:nvPr>
+            <p:ph type="ctrTitle"/>
+          </p:nvPr>
+        </p:nvSpPr>
+        <p:spPr>
+          <a:xfrm>
+            <a:off x="3182564" y="2094249"/>
+            <a:ext cx="5826868" cy="1006429"/>
+          </a:xfrm>
+        </p:spPr>
+        <p:txBody>
+          <a:bodyPr wrap="square">
+            <a:spAutoFit/>
+          </a:bodyPr>
+          <a:lstStyle/>
+          <a:p>
+            <a:r>
+              <a:rPr lang="en-US" altLang="zh-CN" sz="6600" dirty="0">
+                <a:latin typeface="Times New Roman" panose="02020603050405020304" charset="0"/>
+                <a:ea typeface="微软雅黑" panose="020B0503020204020204" pitchFamily="34" charset="-122"/>
+                <a:cs typeface="Times New Roman" panose="02020603050405020304" charset="0"/>
+              </a:rPr>
+              <a:t>THANK YOU!</a:t>
+            </a:r>
+            <a:endParaRPr lang="zh-CN" altLang="en-US" sz="6600" dirty="0">
+              <a:latin typeface="Times New Roman" panose="02020603050405020304" charset="0"/>
+              <a:ea typeface="微软雅黑" panose="020B0503020204020204" pitchFamily="34" charset="-122"/>
+              <a:cs typeface="Times New Roman" panose="02020603050405020304" charset="0"/>
+            </a:endParaRPr>
+          </a:p>
+        </p:txBody>
+      </p:sp>
+      <p:pic>
+        <p:nvPicPr>
+          <p:cNvPr id="9" name="图片 8" descr="校徽"/>
+          <p:cNvPicPr>
+            <a:picLocks noChangeAspect="1"/>
+          </p:cNvPicPr>
+          <p:nvPr/>
+        </p:nvPicPr>
+        <p:blipFill>
+          <a:blip r:embed="rId2"/>
+          <a:srcRect l="21146" t="9697" r="22583" b="12705"/>
+          <a:stretch>
+            <a:fillRect/>
+          </a:stretch>
+        </p:blipFill>
+        <p:spPr>
+          <a:xfrm>
+            <a:off x="10811510" y="5556250"/>
+            <a:ext cx="1028700" cy="1020445"/>
+          </a:xfrm>
+          <a:prstGeom prst="rect">
+            <a:avLst/>
+          </a:prstGeom>
+        </p:spPr>
+      </p:pic>
+      <p:sp>
+        <p:nvSpPr>
+          <p:cNvPr id="6" name="矩形 5"/>
+          <p:cNvSpPr/>
+          <p:nvPr/>
+        </p:nvSpPr>
+        <p:spPr>
+          <a:xfrm flipV="1">
+            <a:off x="3113721" y="3024478"/>
+            <a:ext cx="5964555" cy="76200"/>
+          </a:xfrm>
+          <a:prstGeom prst="rect">
+            <a:avLst/>
+          </a:prstGeom>
+          <a:solidFill>
+            <a:srgbClr val="002060">
+              <a:alpha val="97000"/>
+            </a:srgbClr>
+          </a:solidFill>
+          <a:ln>
+            <a:noFill/>
+          </a:ln>
+        </p:spPr>
+        <p:style>
+          <a:lnRef idx="2">
+            <a:schemeClr val="accent1">
+              <a:shade val="50000"/>
+            </a:schemeClr>
+          </a:lnRef>
+          <a:fillRef idx="1">
+            <a:schemeClr val="accent1"/>
+          </a:fillRef>
+          <a:effectRef idx="0">
+            <a:schemeClr val="accent1"/>
+          </a:effectRef>
+          <a:fontRef idx="minor">
+            <a:schemeClr val="lt1"/>
+          </a:fontRef>
+        </p:style>
+        <p:txBody>
+          <a:bodyPr rtlCol="0" anchor="ctr"/>
+          <a:lstStyle/>
+          <a:p>
+            <a:pPr algn="ctr"/>
+            <a:endParaRPr lang="zh-CN" altLang="en-US"/>
+          </a:p>
+        </p:txBody>
+      </p:sp>
+    </p:spTree>
+  </p:cSld>
+  <p:clrMapOvr>
+    <a:masterClrMapping/>
+  </p:clrMapOvr>
+  <p:transition spd="slow">
+    <p:push dir="u"/>
+  </p:transition>
+</p:sld>
+</file>
+
+<file path=ppt/slides/slide19.xml><?xml version="1.0" encoding="utf-8"?>
 <p:sld xmlns:a="http://schemas.openxmlformats.org/drawingml/2006/main" xmlns:r="http://schemas.openxmlformats.org/officeDocument/2006/relationships" xmlns:p="http://schemas.openxmlformats.org/presentationml/2006/main" show="0">
   <p:cSld>
     <p:spTree>
@@ -8074,8 +9183,8 @@
         </p:nvSpPr>
         <p:spPr>
           <a:xfrm>
-            <a:off x="712774" y="1197969"/>
-            <a:ext cx="7766208" cy="1908215"/>
+            <a:off x="389501" y="1098616"/>
+            <a:ext cx="7766208" cy="3016210"/>
           </a:xfrm>
           <a:prstGeom prst="rect">
             <a:avLst/>
@@ -8098,7 +9207,7 @@
                 <a:cs typeface="微软雅黑" panose="020B0503020204020204" pitchFamily="34" charset="-122"/>
                 <a:sym typeface="+mn-ea"/>
               </a:rPr>
-              <a:t>U-Net: Optimizer and Loss Function</a:t>
+              <a:t>U-Net: Optimizer</a:t>
             </a:r>
             <a:endParaRPr lang="en-US" altLang="zh-CN" b="1" u="sng" dirty="0">
               <a:solidFill>
@@ -8128,7 +9237,7 @@
                 <a:ea typeface="微软雅黑" panose="020B0503020204020204" pitchFamily="34" charset="-122"/>
                 <a:cs typeface="微软雅黑" panose="020B0503020204020204" pitchFamily="34" charset="-122"/>
               </a:rPr>
-              <a:t>Stochastic Gradient Descent (SGD) with a high momentum (0.99)</a:t>
+              <a:t>Stochastic Gradient Descent (SGD) </a:t>
             </a:r>
           </a:p>
           <a:p>
@@ -8153,8 +9262,51 @@
                 <a:ea typeface="微软雅黑" panose="020B0503020204020204" pitchFamily="34" charset="-122"/>
                 <a:cs typeface="微软雅黑" panose="020B0503020204020204" pitchFamily="34" charset="-122"/>
               </a:rPr>
-              <a:t>Pixel-wise soft-max + Cross entropy loss function</a:t>
-            </a:r>
+              <a:t>Small batch size (size=1)  ------ Large input tiles</a:t>
+            </a:r>
+          </a:p>
+          <a:p>
+            <a:pPr marL="285750" indent="-285750">
+              <a:buFont typeface="Arial" panose="020B0604020202020204" pitchFamily="34" charset="0"/>
+              <a:buChar char="•"/>
+            </a:pPr>
+            <a:endParaRPr lang="en-US" altLang="zh-CN" dirty="0">
+              <a:latin typeface="微软雅黑" panose="020B0503020204020204" pitchFamily="34" charset="-122"/>
+              <a:ea typeface="微软雅黑" panose="020B0503020204020204" pitchFamily="34" charset="-122"/>
+              <a:cs typeface="微软雅黑" panose="020B0503020204020204" pitchFamily="34" charset="-122"/>
+            </a:endParaRPr>
+          </a:p>
+          <a:p>
+            <a:pPr marL="285750" indent="-285750">
+              <a:buFont typeface="Arial" panose="020B0604020202020204" pitchFamily="34" charset="0"/>
+              <a:buChar char="•"/>
+            </a:pPr>
+            <a:r>
+              <a:rPr lang="en-US" altLang="zh-CN" dirty="0">
+                <a:latin typeface="微软雅黑" panose="020B0503020204020204" pitchFamily="34" charset="-122"/>
+                <a:ea typeface="微软雅黑" panose="020B0503020204020204" pitchFamily="34" charset="-122"/>
+                <a:cs typeface="微软雅黑" panose="020B0503020204020204" pitchFamily="34" charset="-122"/>
+              </a:rPr>
+              <a:t>High momentum (0.99)</a:t>
+            </a:r>
+          </a:p>
+          <a:p>
+            <a:pPr marL="285750" indent="-285750">
+              <a:buFont typeface="Arial" panose="020B0604020202020204" pitchFamily="34" charset="0"/>
+              <a:buChar char="•"/>
+            </a:pPr>
+            <a:endParaRPr lang="en-US" altLang="zh-CN" dirty="0">
+              <a:latin typeface="微软雅黑" panose="020B0503020204020204" pitchFamily="34" charset="-122"/>
+              <a:ea typeface="微软雅黑" panose="020B0503020204020204" pitchFamily="34" charset="-122"/>
+              <a:cs typeface="微软雅黑" panose="020B0503020204020204" pitchFamily="34" charset="-122"/>
+            </a:endParaRPr>
+          </a:p>
+          <a:p>
+            <a:endParaRPr lang="en-US" altLang="zh-CN" dirty="0">
+              <a:latin typeface="微软雅黑" panose="020B0503020204020204" pitchFamily="34" charset="-122"/>
+              <a:ea typeface="微软雅黑" panose="020B0503020204020204" pitchFamily="34" charset="-122"/>
+              <a:cs typeface="微软雅黑" panose="020B0503020204020204" pitchFamily="34" charset="-122"/>
+            </a:endParaRPr>
           </a:p>
           <a:p>
             <a:endParaRPr lang="en-US" altLang="zh-CN" dirty="0">
@@ -8187,7 +9339,7 @@
         </p:blipFill>
         <p:spPr>
           <a:xfrm>
-            <a:off x="2810663" y="4783594"/>
+            <a:off x="2819899" y="3848860"/>
             <a:ext cx="6240974" cy="1560243"/>
           </a:xfrm>
           <a:prstGeom prst="rect">
@@ -8231,96 +9383,52 @@
           </a:p>
         </p:txBody>
       </p:sp>
-      <p:pic>
-        <p:nvPicPr>
-          <p:cNvPr id="12" name="图片 11">
+      <p:sp>
+        <p:nvSpPr>
+          <p:cNvPr id="4" name="文本框 3">
             <a:extLst>
               <a:ext uri="{FF2B5EF4-FFF2-40B4-BE49-F238E27FC236}">
-                <a16:creationId xmlns:a16="http://schemas.microsoft.com/office/drawing/2014/main" id="{4A9145A7-EE30-8984-24E8-63E9A5990F57}"/>
+                <a16:creationId xmlns:a16="http://schemas.microsoft.com/office/drawing/2014/main" id="{C1B03745-70BE-521C-2815-5FFB4351D6B2}"/>
               </a:ext>
             </a:extLst>
           </p:cNvPr>
-          <p:cNvPicPr>
-            <a:picLocks noChangeAspect="1"/>
-          </p:cNvPicPr>
+          <p:cNvSpPr txBox="1"/>
           <p:nvPr/>
-        </p:nvPicPr>
-        <p:blipFill>
-          <a:blip r:embed="rId5"/>
-          <a:stretch>
-            <a:fillRect/>
-          </a:stretch>
-        </p:blipFill>
-        <p:spPr>
-          <a:xfrm>
-            <a:off x="1061472" y="4062753"/>
-            <a:ext cx="4477506" cy="442222"/>
+        </p:nvSpPr>
+        <p:spPr>
+          <a:xfrm>
+            <a:off x="657913" y="5582005"/>
+            <a:ext cx="10878305" cy="369332"/>
           </a:xfrm>
           <a:prstGeom prst="rect">
             <a:avLst/>
           </a:prstGeom>
-        </p:spPr>
-      </p:pic>
-      <p:pic>
-        <p:nvPicPr>
-          <p:cNvPr id="15" name="图片 14">
-            <a:extLst>
-              <a:ext uri="{FF2B5EF4-FFF2-40B4-BE49-F238E27FC236}">
-                <a16:creationId xmlns:a16="http://schemas.microsoft.com/office/drawing/2014/main" id="{AF6D8B4E-0039-FBA2-A323-4557D399E9AF}"/>
-              </a:ext>
-            </a:extLst>
-          </p:cNvPr>
-          <p:cNvPicPr>
-            <a:picLocks noChangeAspect="1"/>
-          </p:cNvPicPr>
-          <p:nvPr/>
-        </p:nvPicPr>
-        <p:blipFill>
-          <a:blip r:embed="rId6"/>
-          <a:stretch>
-            <a:fillRect/>
-          </a:stretch>
-        </p:blipFill>
-        <p:spPr>
-          <a:xfrm>
-            <a:off x="6458316" y="3893681"/>
-            <a:ext cx="4477507" cy="835284"/>
-          </a:xfrm>
-          <a:prstGeom prst="rect">
-            <a:avLst/>
-          </a:prstGeom>
-        </p:spPr>
-      </p:pic>
-      <p:pic>
-        <p:nvPicPr>
-          <p:cNvPr id="17" name="图片 16">
-            <a:extLst>
-              <a:ext uri="{FF2B5EF4-FFF2-40B4-BE49-F238E27FC236}">
-                <a16:creationId xmlns:a16="http://schemas.microsoft.com/office/drawing/2014/main" id="{CC7CCA70-D4A0-219B-86DF-F13AA665B72A}"/>
-              </a:ext>
-            </a:extLst>
-          </p:cNvPr>
-          <p:cNvPicPr>
-            <a:picLocks noChangeAspect="1"/>
-          </p:cNvPicPr>
-          <p:nvPr/>
-        </p:nvPicPr>
-        <p:blipFill>
-          <a:blip r:embed="rId7"/>
-          <a:stretch>
-            <a:fillRect/>
-          </a:stretch>
-        </p:blipFill>
-        <p:spPr>
-          <a:xfrm>
-            <a:off x="4814575" y="2956376"/>
-            <a:ext cx="2562849" cy="789283"/>
-          </a:xfrm>
-          <a:prstGeom prst="rect">
-            <a:avLst/>
-          </a:prstGeom>
-        </p:spPr>
-      </p:pic>
+          <a:noFill/>
+        </p:spPr>
+        <p:txBody>
+          <a:bodyPr wrap="square">
+            <a:spAutoFit/>
+          </a:bodyPr>
+          <a:lstStyle/>
+          <a:p>
+            <a:pPr marL="285750" indent="-285750">
+              <a:buFont typeface="Arial" panose="020B0604020202020204" pitchFamily="34" charset="0"/>
+              <a:buChar char="•"/>
+            </a:pPr>
+            <a:r>
+              <a:rPr lang="en-US" altLang="zh-CN" dirty="0">
+                <a:latin typeface="微软雅黑" panose="020B0503020204020204" pitchFamily="34" charset="-122"/>
+                <a:ea typeface="微软雅黑" panose="020B0503020204020204" pitchFamily="34" charset="-122"/>
+              </a:rPr>
+              <a:t>(a) input ; (b) segmentation maps ; (c) generated segmentation mask ; (d) the border pixels</a:t>
+            </a:r>
+            <a:endParaRPr lang="zh-CN" altLang="en-US" dirty="0">
+              <a:latin typeface="微软雅黑" panose="020B0503020204020204" pitchFamily="34" charset="-122"/>
+              <a:ea typeface="微软雅黑" panose="020B0503020204020204" pitchFamily="34" charset="-122"/>
+            </a:endParaRPr>
+          </a:p>
+        </p:txBody>
+      </p:sp>
     </p:spTree>
     <p:extLst>
       <p:ext uri="{BB962C8B-B14F-4D97-AF65-F5344CB8AC3E}">
@@ -8386,7 +9494,7 @@
                 <a:cs typeface="Times New Roman" panose="02020603050405020304" charset="0"/>
                 <a:sym typeface="+mn-ea"/>
               </a:rPr>
-              <a:t>Improvements / Enlighten</a:t>
+              <a:t>Related Work</a:t>
             </a:r>
           </a:p>
         </p:txBody>
@@ -8448,7 +9556,7 @@
           <p:nvPr/>
         </p:nvPicPr>
         <p:blipFill>
-          <a:blip r:embed="rId2"/>
+          <a:blip r:embed="rId3"/>
           <a:srcRect l="21146" t="9697" r="22583" b="12705"/>
           <a:stretch>
             <a:fillRect/>
@@ -8456,7 +9564,7 @@
         </p:blipFill>
         <p:spPr>
           <a:xfrm>
-            <a:off x="10811510" y="5556250"/>
+            <a:off x="11163300" y="5818909"/>
             <a:ext cx="1028700" cy="1020445"/>
           </a:xfrm>
           <a:prstGeom prst="rect">
@@ -8472,8 +9580,8 @@
         </p:nvSpPr>
         <p:spPr>
           <a:xfrm>
-            <a:off x="712774" y="1197969"/>
-            <a:ext cx="1616958" cy="923330"/>
+            <a:off x="389501" y="1098616"/>
+            <a:ext cx="11737844" cy="3016210"/>
           </a:xfrm>
           <a:prstGeom prst="rect">
             <a:avLst/>
@@ -8487,7 +9595,7 @@
           <a:lstStyle/>
           <a:p>
             <a:r>
-              <a:rPr lang="zh-CN" altLang="en-US" b="1" u="sng" dirty="0">
+              <a:rPr lang="en-US" altLang="zh-CN" sz="2800" b="1" u="sng" dirty="0">
                 <a:solidFill>
                   <a:srgbClr val="002060"/>
                 </a:solidFill>
@@ -8496,7 +9604,7 @@
                 <a:cs typeface="微软雅黑" panose="020B0503020204020204" pitchFamily="34" charset="-122"/>
                 <a:sym typeface="+mn-ea"/>
               </a:rPr>
-              <a:t>强调</a:t>
+              <a:t>U-Net: Loss Function</a:t>
             </a:r>
             <a:endParaRPr lang="en-US" altLang="zh-CN" b="1" u="sng" dirty="0">
               <a:solidFill>
@@ -8509,32 +9617,336 @@
             </a:endParaRPr>
           </a:p>
           <a:p>
-            <a:endParaRPr lang="en-US" altLang="zh-CN" b="1" u="sng" dirty="0">
-              <a:solidFill>
-                <a:srgbClr val="002060"/>
-              </a:solidFill>
+            <a:endParaRPr lang="en-US" altLang="zh-CN" dirty="0">
               <a:latin typeface="微软雅黑" panose="020B0503020204020204" pitchFamily="34" charset="-122"/>
               <a:ea typeface="微软雅黑" panose="020B0503020204020204" pitchFamily="34" charset="-122"/>
               <a:cs typeface="微软雅黑" panose="020B0503020204020204" pitchFamily="34" charset="-122"/>
-              <a:sym typeface="+mn-ea"/>
             </a:endParaRPr>
           </a:p>
           <a:p>
-            <a:r>
-              <a:rPr lang="zh-CN" altLang="en-US" dirty="0">
+            <a:pPr marL="285750" indent="-285750">
+              <a:buFont typeface="Arial" panose="020B0604020202020204" pitchFamily="34" charset="0"/>
+              <a:buChar char="•"/>
+            </a:pPr>
+            <a:r>
+              <a:rPr lang="en-US" altLang="zh-CN" dirty="0">
                 <a:latin typeface="微软雅黑" panose="020B0503020204020204" pitchFamily="34" charset="-122"/>
                 <a:ea typeface="微软雅黑" panose="020B0503020204020204" pitchFamily="34" charset="-122"/>
                 <a:cs typeface="微软雅黑" panose="020B0503020204020204" pitchFamily="34" charset="-122"/>
               </a:rPr>
-              <a:t>正文</a:t>
-            </a:r>
+              <a:t>Pixel-wise soft-max </a:t>
+            </a:r>
+          </a:p>
+          <a:p>
+            <a:pPr marL="285750" indent="-285750">
+              <a:buFont typeface="Arial" panose="020B0604020202020204" pitchFamily="34" charset="0"/>
+              <a:buChar char="•"/>
+            </a:pPr>
+            <a:endParaRPr lang="en-US" altLang="zh-CN" dirty="0">
+              <a:latin typeface="微软雅黑" panose="020B0503020204020204" pitchFamily="34" charset="-122"/>
+              <a:ea typeface="微软雅黑" panose="020B0503020204020204" pitchFamily="34" charset="-122"/>
+              <a:cs typeface="微软雅黑" panose="020B0503020204020204" pitchFamily="34" charset="-122"/>
+            </a:endParaRPr>
+          </a:p>
+          <a:p>
+            <a:pPr marL="285750" indent="-285750">
+              <a:buFont typeface="Arial" panose="020B0604020202020204" pitchFamily="34" charset="0"/>
+              <a:buChar char="•"/>
+            </a:pPr>
+            <a:r>
+              <a:rPr lang="en-US" altLang="zh-CN" dirty="0">
+                <a:latin typeface="微软雅黑" panose="020B0503020204020204" pitchFamily="34" charset="-122"/>
+                <a:ea typeface="微软雅黑" panose="020B0503020204020204" pitchFamily="34" charset="-122"/>
+                <a:cs typeface="微软雅黑" panose="020B0503020204020204" pitchFamily="34" charset="-122"/>
+              </a:rPr>
+              <a:t>Cross entropy loss function                                                    ,“l(x)”: true label of pixel x</a:t>
+            </a:r>
+          </a:p>
+          <a:p>
+            <a:pPr marL="285750" indent="-285750">
+              <a:buFont typeface="Arial" panose="020B0604020202020204" pitchFamily="34" charset="0"/>
+              <a:buChar char="•"/>
+            </a:pPr>
+            <a:endParaRPr lang="en-US" altLang="zh-CN" dirty="0">
+              <a:latin typeface="微软雅黑" panose="020B0503020204020204" pitchFamily="34" charset="-122"/>
+              <a:ea typeface="微软雅黑" panose="020B0503020204020204" pitchFamily="34" charset="-122"/>
+              <a:cs typeface="微软雅黑" panose="020B0503020204020204" pitchFamily="34" charset="-122"/>
+            </a:endParaRPr>
+          </a:p>
+          <a:p>
+            <a:pPr marL="285750" indent="-285750">
+              <a:buFont typeface="Arial" panose="020B0604020202020204" pitchFamily="34" charset="0"/>
+              <a:buChar char="•"/>
+            </a:pPr>
+            <a:endParaRPr lang="en-US" altLang="zh-CN" dirty="0">
+              <a:latin typeface="微软雅黑" panose="020B0503020204020204" pitchFamily="34" charset="-122"/>
+              <a:ea typeface="微软雅黑" panose="020B0503020204020204" pitchFamily="34" charset="-122"/>
+              <a:cs typeface="微软雅黑" panose="020B0503020204020204" pitchFamily="34" charset="-122"/>
+            </a:endParaRPr>
+          </a:p>
+          <a:p>
+            <a:pPr marL="285750" indent="-285750">
+              <a:buFont typeface="Arial" panose="020B0604020202020204" pitchFamily="34" charset="0"/>
+              <a:buChar char="•"/>
+            </a:pPr>
+            <a:r>
+              <a:rPr lang="en-US" altLang="zh-CN" dirty="0">
+                <a:latin typeface="微软雅黑" panose="020B0503020204020204" pitchFamily="34" charset="-122"/>
+                <a:ea typeface="微软雅黑" panose="020B0503020204020204" pitchFamily="34" charset="-122"/>
+                <a:cs typeface="微软雅黑" panose="020B0503020204020204" pitchFamily="34" charset="-122"/>
+              </a:rPr>
+              <a:t>weight map “w(x)”                                                                     , </a:t>
+            </a:r>
+            <a:r>
+              <a:rPr lang="en-US" altLang="zh-CN" dirty="0" err="1">
+                <a:latin typeface="微软雅黑" panose="020B0503020204020204" pitchFamily="34" charset="-122"/>
+                <a:ea typeface="微软雅黑" panose="020B0503020204020204" pitchFamily="34" charset="-122"/>
+                <a:cs typeface="微软雅黑" panose="020B0503020204020204" pitchFamily="34" charset="-122"/>
+              </a:rPr>
+              <a:t>w</a:t>
+            </a:r>
+            <a:r>
+              <a:rPr lang="en-US" altLang="zh-CN" baseline="-25000" dirty="0" err="1">
+                <a:latin typeface="微软雅黑" panose="020B0503020204020204" pitchFamily="34" charset="-122"/>
+                <a:ea typeface="微软雅黑" panose="020B0503020204020204" pitchFamily="34" charset="-122"/>
+                <a:cs typeface="微软雅黑" panose="020B0503020204020204" pitchFamily="34" charset="-122"/>
+              </a:rPr>
+              <a:t>c</a:t>
+            </a:r>
+            <a:r>
+              <a:rPr lang="en-US" altLang="zh-CN" dirty="0">
+                <a:latin typeface="微软雅黑" panose="020B0503020204020204" pitchFamily="34" charset="-122"/>
+                <a:ea typeface="微软雅黑" panose="020B0503020204020204" pitchFamily="34" charset="-122"/>
+                <a:cs typeface="微软雅黑" panose="020B0503020204020204" pitchFamily="34" charset="-122"/>
+              </a:rPr>
+              <a:t>(x): weight of class</a:t>
+            </a:r>
+          </a:p>
+          <a:p>
+            <a:r>
+              <a:rPr lang="en-US" altLang="zh-CN" dirty="0">
+                <a:latin typeface="微软雅黑" panose="020B0503020204020204" pitchFamily="34" charset="-122"/>
+                <a:ea typeface="微软雅黑" panose="020B0503020204020204" pitchFamily="34" charset="-122"/>
+                <a:cs typeface="微软雅黑" panose="020B0503020204020204" pitchFamily="34" charset="-122"/>
+              </a:rPr>
+              <a:t>                                                                                                            d1(x), d2(x): distance to border of cell</a:t>
+            </a:r>
+          </a:p>
+          <a:p>
+            <a:endParaRPr lang="en-US" altLang="zh-CN" dirty="0">
+              <a:latin typeface="微软雅黑" panose="020B0503020204020204" pitchFamily="34" charset="-122"/>
+              <a:ea typeface="微软雅黑" panose="020B0503020204020204" pitchFamily="34" charset="-122"/>
+              <a:cs typeface="微软雅黑" panose="020B0503020204020204" pitchFamily="34" charset="-122"/>
+            </a:endParaRPr>
+          </a:p>
+        </p:txBody>
+      </p:sp>
+      <p:pic>
+        <p:nvPicPr>
+          <p:cNvPr id="7" name="图片 6">
+            <a:extLst>
+              <a:ext uri="{FF2B5EF4-FFF2-40B4-BE49-F238E27FC236}">
+                <a16:creationId xmlns:a16="http://schemas.microsoft.com/office/drawing/2014/main" id="{157B42EF-45F7-CD41-97F3-445C3978DD3C}"/>
+              </a:ext>
+            </a:extLst>
+          </p:cNvPr>
+          <p:cNvPicPr>
+            <a:picLocks noChangeAspect="1"/>
+          </p:cNvPicPr>
+          <p:nvPr/>
+        </p:nvPicPr>
+        <p:blipFill>
+          <a:blip r:embed="rId4"/>
+          <a:stretch>
+            <a:fillRect/>
+          </a:stretch>
+        </p:blipFill>
+        <p:spPr>
+          <a:xfrm>
+            <a:off x="2819898" y="4199141"/>
+            <a:ext cx="6240974" cy="1560243"/>
+          </a:xfrm>
+          <a:prstGeom prst="rect">
+            <a:avLst/>
+          </a:prstGeom>
+        </p:spPr>
+      </p:pic>
+      <p:sp>
+        <p:nvSpPr>
+          <p:cNvPr id="10" name="文本框 9">
+            <a:extLst>
+              <a:ext uri="{FF2B5EF4-FFF2-40B4-BE49-F238E27FC236}">
+                <a16:creationId xmlns:a16="http://schemas.microsoft.com/office/drawing/2014/main" id="{E1CD7A2E-8F8A-653D-7317-AF0737A033B8}"/>
+              </a:ext>
+            </a:extLst>
+          </p:cNvPr>
+          <p:cNvSpPr txBox="1"/>
+          <p:nvPr/>
+        </p:nvSpPr>
+        <p:spPr>
+          <a:xfrm>
+            <a:off x="5421746" y="6453096"/>
+            <a:ext cx="6114472" cy="276999"/>
+          </a:xfrm>
+          <a:prstGeom prst="rect">
+            <a:avLst/>
+          </a:prstGeom>
+          <a:noFill/>
+        </p:spPr>
+        <p:txBody>
+          <a:bodyPr wrap="square">
+            <a:spAutoFit/>
+          </a:bodyPr>
+          <a:lstStyle/>
+          <a:p>
+            <a:r>
+              <a:rPr lang="en-US" altLang="zh-CN" sz="1200" dirty="0"/>
+              <a:t>Image source: U-Net: Convolutional Networks for Biomedical Image Segmentation</a:t>
+            </a:r>
+            <a:endParaRPr lang="zh-CN" altLang="en-US" sz="1200" dirty="0"/>
+          </a:p>
+        </p:txBody>
+      </p:sp>
+      <p:pic>
+        <p:nvPicPr>
+          <p:cNvPr id="12" name="图片 11">
+            <a:extLst>
+              <a:ext uri="{FF2B5EF4-FFF2-40B4-BE49-F238E27FC236}">
+                <a16:creationId xmlns:a16="http://schemas.microsoft.com/office/drawing/2014/main" id="{4A9145A7-EE30-8984-24E8-63E9A5990F57}"/>
+              </a:ext>
+            </a:extLst>
+          </p:cNvPr>
+          <p:cNvPicPr>
+            <a:picLocks noChangeAspect="1"/>
+          </p:cNvPicPr>
+          <p:nvPr/>
+        </p:nvPicPr>
+        <p:blipFill>
+          <a:blip r:embed="rId5"/>
+          <a:stretch>
+            <a:fillRect/>
+          </a:stretch>
+        </p:blipFill>
+        <p:spPr>
+          <a:xfrm>
+            <a:off x="3129705" y="1749001"/>
+            <a:ext cx="4477506" cy="442222"/>
+          </a:xfrm>
+          <a:prstGeom prst="rect">
+            <a:avLst/>
+          </a:prstGeom>
+        </p:spPr>
+      </p:pic>
+      <p:pic>
+        <p:nvPicPr>
+          <p:cNvPr id="15" name="图片 14">
+            <a:extLst>
+              <a:ext uri="{FF2B5EF4-FFF2-40B4-BE49-F238E27FC236}">
+                <a16:creationId xmlns:a16="http://schemas.microsoft.com/office/drawing/2014/main" id="{AF6D8B4E-0039-FBA2-A323-4557D399E9AF}"/>
+              </a:ext>
+            </a:extLst>
+          </p:cNvPr>
+          <p:cNvPicPr>
+            <a:picLocks noChangeAspect="1"/>
+          </p:cNvPicPr>
+          <p:nvPr/>
+        </p:nvPicPr>
+        <p:blipFill>
+          <a:blip r:embed="rId6"/>
+          <a:stretch>
+            <a:fillRect/>
+          </a:stretch>
+        </p:blipFill>
+        <p:spPr>
+          <a:xfrm>
+            <a:off x="3129704" y="2987102"/>
+            <a:ext cx="4477507" cy="835284"/>
+          </a:xfrm>
+          <a:prstGeom prst="rect">
+            <a:avLst/>
+          </a:prstGeom>
+        </p:spPr>
+      </p:pic>
+      <p:pic>
+        <p:nvPicPr>
+          <p:cNvPr id="17" name="图片 16">
+            <a:extLst>
+              <a:ext uri="{FF2B5EF4-FFF2-40B4-BE49-F238E27FC236}">
+                <a16:creationId xmlns:a16="http://schemas.microsoft.com/office/drawing/2014/main" id="{CC7CCA70-D4A0-219B-86DF-F13AA665B72A}"/>
+              </a:ext>
+            </a:extLst>
+          </p:cNvPr>
+          <p:cNvPicPr>
+            <a:picLocks noChangeAspect="1"/>
+          </p:cNvPicPr>
+          <p:nvPr/>
+        </p:nvPicPr>
+        <p:blipFill>
+          <a:blip r:embed="rId7"/>
+          <a:stretch>
+            <a:fillRect/>
+          </a:stretch>
+        </p:blipFill>
+        <p:spPr>
+          <a:xfrm>
+            <a:off x="4272605" y="2171384"/>
+            <a:ext cx="2562849" cy="789283"/>
+          </a:xfrm>
+          <a:prstGeom prst="rect">
+            <a:avLst/>
+          </a:prstGeom>
+        </p:spPr>
+      </p:pic>
+      <p:sp>
+        <p:nvSpPr>
+          <p:cNvPr id="4" name="文本框 3">
+            <a:extLst>
+              <a:ext uri="{FF2B5EF4-FFF2-40B4-BE49-F238E27FC236}">
+                <a16:creationId xmlns:a16="http://schemas.microsoft.com/office/drawing/2014/main" id="{C1B03745-70BE-521C-2815-5FFB4351D6B2}"/>
+              </a:ext>
+            </a:extLst>
+          </p:cNvPr>
+          <p:cNvSpPr txBox="1"/>
+          <p:nvPr/>
+        </p:nvSpPr>
+        <p:spPr>
+          <a:xfrm>
+            <a:off x="656847" y="5838265"/>
+            <a:ext cx="10878305" cy="369332"/>
+          </a:xfrm>
+          <a:prstGeom prst="rect">
+            <a:avLst/>
+          </a:prstGeom>
+          <a:noFill/>
+        </p:spPr>
+        <p:txBody>
+          <a:bodyPr wrap="square">
+            <a:spAutoFit/>
+          </a:bodyPr>
+          <a:lstStyle/>
+          <a:p>
+            <a:pPr marL="285750" indent="-285750">
+              <a:buFont typeface="Arial" panose="020B0604020202020204" pitchFamily="34" charset="0"/>
+              <a:buChar char="•"/>
+            </a:pPr>
+            <a:r>
+              <a:rPr lang="en-US" altLang="zh-CN" dirty="0">
+                <a:latin typeface="微软雅黑" panose="020B0503020204020204" pitchFamily="34" charset="-122"/>
+                <a:ea typeface="微软雅黑" panose="020B0503020204020204" pitchFamily="34" charset="-122"/>
+              </a:rPr>
+              <a:t>(a) input ; (b) segmentation maps ; (c) generated segmentation mask ; (d) the border pixels</a:t>
+            </a:r>
+            <a:endParaRPr lang="zh-CN" altLang="en-US" dirty="0">
+              <a:latin typeface="微软雅黑" panose="020B0503020204020204" pitchFamily="34" charset="-122"/>
+              <a:ea typeface="微软雅黑" panose="020B0503020204020204" pitchFamily="34" charset="-122"/>
+            </a:endParaRPr>
           </a:p>
         </p:txBody>
       </p:sp>
     </p:spTree>
     <p:extLst>
       <p:ext uri="{BB962C8B-B14F-4D97-AF65-F5344CB8AC3E}">
-        <p14:creationId xmlns:p14="http://schemas.microsoft.com/office/powerpoint/2010/main" val="1189555699"/>
+        <p14:creationId xmlns:p14="http://schemas.microsoft.com/office/powerpoint/2010/main" val="4030503049"/>
       </p:ext>
     </p:extLst>
   </p:cSld>
@@ -8596,7 +10008,7 @@
                 <a:cs typeface="Times New Roman" panose="02020603050405020304" charset="0"/>
                 <a:sym typeface="+mn-ea"/>
               </a:rPr>
-              <a:t>Proposed Method</a:t>
+              <a:t>Related Work</a:t>
             </a:r>
           </a:p>
         </p:txBody>
@@ -8658,7 +10070,7 @@
           <p:nvPr/>
         </p:nvPicPr>
         <p:blipFill>
-          <a:blip r:embed="rId2"/>
+          <a:blip r:embed="rId3"/>
           <a:srcRect l="21146" t="9697" r="22583" b="12705"/>
           <a:stretch>
             <a:fillRect/>
@@ -8666,7 +10078,7 @@
         </p:blipFill>
         <p:spPr>
           <a:xfrm>
-            <a:off x="10811510" y="5556250"/>
+            <a:off x="11163300" y="5818909"/>
             <a:ext cx="1028700" cy="1020445"/>
           </a:xfrm>
           <a:prstGeom prst="rect">
@@ -8682,8 +10094,8 @@
         </p:nvSpPr>
         <p:spPr>
           <a:xfrm>
-            <a:off x="712774" y="1197969"/>
-            <a:ext cx="1616958" cy="923330"/>
+            <a:off x="1460920" y="1185731"/>
+            <a:ext cx="9437990" cy="2585323"/>
           </a:xfrm>
           <a:prstGeom prst="rect">
             <a:avLst/>
@@ -8697,7 +10109,7 @@
           <a:lstStyle/>
           <a:p>
             <a:r>
-              <a:rPr lang="zh-CN" altLang="en-US" b="1" u="sng" dirty="0">
+              <a:rPr lang="en-US" altLang="zh-CN" sz="2800" b="1" u="sng" dirty="0">
                 <a:solidFill>
                   <a:srgbClr val="002060"/>
                 </a:solidFill>
@@ -8706,9 +10118,23 @@
                 <a:cs typeface="微软雅黑" panose="020B0503020204020204" pitchFamily="34" charset="-122"/>
                 <a:sym typeface="+mn-ea"/>
               </a:rPr>
-              <a:t>强调</a:t>
-            </a:r>
-            <a:endParaRPr lang="en-US" altLang="zh-CN" b="1" u="sng" dirty="0">
+              <a:t>U-Net: Dataset - ISBI cell tracking challenge </a:t>
+            </a:r>
+          </a:p>
+          <a:p>
+            <a:r>
+              <a:rPr lang="en-US" altLang="zh-CN" sz="2400" b="1" u="sng" dirty="0">
+                <a:solidFill>
+                  <a:srgbClr val="002060"/>
+                </a:solidFill>
+                <a:latin typeface="微软雅黑" panose="020B0503020204020204" pitchFamily="34" charset="-122"/>
+                <a:ea typeface="微软雅黑" panose="020B0503020204020204" pitchFamily="34" charset="-122"/>
+                <a:cs typeface="微软雅黑" panose="020B0503020204020204" pitchFamily="34" charset="-122"/>
+                <a:sym typeface="+mn-ea"/>
+              </a:rPr>
+              <a:t>(2012, 2014, 2015)</a:t>
+            </a:r>
+            <a:endParaRPr lang="en-US" altLang="zh-CN" sz="1600" b="1" u="sng" dirty="0">
               <a:solidFill>
                 <a:srgbClr val="002060"/>
               </a:solidFill>
@@ -8719,32 +10145,194 @@
             </a:endParaRPr>
           </a:p>
           <a:p>
-            <a:endParaRPr lang="en-US" altLang="zh-CN" b="1" u="sng" dirty="0">
-              <a:solidFill>
-                <a:srgbClr val="002060"/>
-              </a:solidFill>
+            <a:endParaRPr lang="en-US" altLang="zh-CN" dirty="0">
               <a:latin typeface="微软雅黑" panose="020B0503020204020204" pitchFamily="34" charset="-122"/>
               <a:ea typeface="微软雅黑" panose="020B0503020204020204" pitchFamily="34" charset="-122"/>
               <a:cs typeface="微软雅黑" panose="020B0503020204020204" pitchFamily="34" charset="-122"/>
-              <a:sym typeface="+mn-ea"/>
             </a:endParaRPr>
           </a:p>
           <a:p>
-            <a:r>
-              <a:rPr lang="zh-CN" altLang="en-US" dirty="0">
+            <a:pPr marL="285750" indent="-285750">
+              <a:buFont typeface="Arial" panose="020B0604020202020204" pitchFamily="34" charset="0"/>
+              <a:buChar char="•"/>
+            </a:pPr>
+            <a:r>
+              <a:rPr lang="en-US" altLang="zh-CN" dirty="0">
                 <a:latin typeface="微软雅黑" panose="020B0503020204020204" pitchFamily="34" charset="-122"/>
                 <a:ea typeface="微软雅黑" panose="020B0503020204020204" pitchFamily="34" charset="-122"/>
                 <a:cs typeface="微软雅黑" panose="020B0503020204020204" pitchFamily="34" charset="-122"/>
               </a:rPr>
-              <a:t>正文</a:t>
-            </a:r>
-          </a:p>
-        </p:txBody>
-      </p:sp>
+              <a:t>Size: 30, 35, 20 (Very Small)</a:t>
+            </a:r>
+          </a:p>
+          <a:p>
+            <a:pPr marL="285750" indent="-285750">
+              <a:buFont typeface="Arial" panose="020B0604020202020204" pitchFamily="34" charset="0"/>
+              <a:buChar char="•"/>
+            </a:pPr>
+            <a:r>
+              <a:rPr lang="en-US" altLang="zh-CN" dirty="0">
+                <a:latin typeface="微软雅黑" panose="020B0503020204020204" pitchFamily="34" charset="-122"/>
+                <a:ea typeface="微软雅黑" panose="020B0503020204020204" pitchFamily="34" charset="-122"/>
+                <a:cs typeface="微软雅黑" panose="020B0503020204020204" pitchFamily="34" charset="-122"/>
+              </a:rPr>
+              <a:t>Data Augmentation</a:t>
+            </a:r>
+          </a:p>
+          <a:p>
+            <a:pPr marL="742950" lvl="1" indent="-285750">
+              <a:buFont typeface="Arial" panose="020B0604020202020204" pitchFamily="34" charset="0"/>
+              <a:buChar char="•"/>
+            </a:pPr>
+            <a:r>
+              <a:rPr lang="en-US" altLang="zh-CN" dirty="0">
+                <a:latin typeface="微软雅黑" panose="020B0503020204020204" pitchFamily="34" charset="-122"/>
+                <a:ea typeface="微软雅黑" panose="020B0503020204020204" pitchFamily="34" charset="-122"/>
+                <a:cs typeface="微软雅黑" panose="020B0503020204020204" pitchFamily="34" charset="-122"/>
+              </a:rPr>
+              <a:t>Shift, Rotation</a:t>
+            </a:r>
+          </a:p>
+          <a:p>
+            <a:pPr marL="742950" lvl="1" indent="-285750">
+              <a:buFont typeface="Arial" panose="020B0604020202020204" pitchFamily="34" charset="0"/>
+              <a:buChar char="•"/>
+            </a:pPr>
+            <a:r>
+              <a:rPr lang="en-US" altLang="zh-CN" sz="2000" b="0" i="0" dirty="0">
+                <a:effectLst/>
+                <a:latin typeface="Arial" panose="020B0604020202020204" pitchFamily="34" charset="0"/>
+              </a:rPr>
+              <a:t>random elastic </a:t>
+            </a:r>
+            <a:r>
+              <a:rPr lang="en-US" altLang="zh-CN" sz="2000" b="1" u="sng" dirty="0">
+                <a:solidFill>
+                  <a:srgbClr val="002060"/>
+                </a:solidFill>
+                <a:latin typeface="微软雅黑" panose="020B0503020204020204" pitchFamily="34" charset="-122"/>
+                <a:ea typeface="微软雅黑" panose="020B0503020204020204" pitchFamily="34" charset="-122"/>
+              </a:rPr>
+              <a:t>Deformation</a:t>
+            </a:r>
+            <a:r>
+              <a:rPr lang="en-US" altLang="zh-CN" dirty="0">
+                <a:latin typeface="微软雅黑" panose="020B0503020204020204" pitchFamily="34" charset="-122"/>
+                <a:ea typeface="微软雅黑" panose="020B0503020204020204" pitchFamily="34" charset="-122"/>
+                <a:cs typeface="微软雅黑" panose="020B0503020204020204" pitchFamily="34" charset="-122"/>
+              </a:rPr>
+              <a:t>, Gray value variations</a:t>
+            </a:r>
+          </a:p>
+          <a:p>
+            <a:endParaRPr lang="en-US" altLang="zh-CN" dirty="0">
+              <a:latin typeface="微软雅黑" panose="020B0503020204020204" pitchFamily="34" charset="-122"/>
+              <a:ea typeface="微软雅黑" panose="020B0503020204020204" pitchFamily="34" charset="-122"/>
+              <a:cs typeface="微软雅黑" panose="020B0503020204020204" pitchFamily="34" charset="-122"/>
+            </a:endParaRPr>
+          </a:p>
+        </p:txBody>
+      </p:sp>
+      <p:pic>
+        <p:nvPicPr>
+          <p:cNvPr id="7" name="图片 6">
+            <a:extLst>
+              <a:ext uri="{FF2B5EF4-FFF2-40B4-BE49-F238E27FC236}">
+                <a16:creationId xmlns:a16="http://schemas.microsoft.com/office/drawing/2014/main" id="{157B42EF-45F7-CD41-97F3-445C3978DD3C}"/>
+              </a:ext>
+            </a:extLst>
+          </p:cNvPr>
+          <p:cNvPicPr>
+            <a:picLocks noChangeAspect="1"/>
+          </p:cNvPicPr>
+          <p:nvPr/>
+        </p:nvPicPr>
+        <p:blipFill>
+          <a:blip r:embed="rId4"/>
+          <a:stretch>
+            <a:fillRect/>
+          </a:stretch>
+        </p:blipFill>
+        <p:spPr>
+          <a:xfrm>
+            <a:off x="2378062" y="3637773"/>
+            <a:ext cx="6087365" cy="1521841"/>
+          </a:xfrm>
+          <a:prstGeom prst="rect">
+            <a:avLst/>
+          </a:prstGeom>
+        </p:spPr>
+      </p:pic>
+      <p:sp>
+        <p:nvSpPr>
+          <p:cNvPr id="10" name="文本框 9">
+            <a:extLst>
+              <a:ext uri="{FF2B5EF4-FFF2-40B4-BE49-F238E27FC236}">
+                <a16:creationId xmlns:a16="http://schemas.microsoft.com/office/drawing/2014/main" id="{E1CD7A2E-8F8A-653D-7317-AF0737A033B8}"/>
+              </a:ext>
+            </a:extLst>
+          </p:cNvPr>
+          <p:cNvSpPr txBox="1"/>
+          <p:nvPr/>
+        </p:nvSpPr>
+        <p:spPr>
+          <a:xfrm>
+            <a:off x="5408191" y="6529296"/>
+            <a:ext cx="6114472" cy="276999"/>
+          </a:xfrm>
+          <a:prstGeom prst="rect">
+            <a:avLst/>
+          </a:prstGeom>
+          <a:noFill/>
+        </p:spPr>
+        <p:txBody>
+          <a:bodyPr wrap="square">
+            <a:spAutoFit/>
+          </a:bodyPr>
+          <a:lstStyle/>
+          <a:p>
+            <a:r>
+              <a:rPr lang="en-US" altLang="zh-CN" sz="1200" dirty="0"/>
+              <a:t>Image source: U-Net: Convolutional Networks for Biomedical Image Segmentation</a:t>
+            </a:r>
+            <a:endParaRPr lang="zh-CN" altLang="en-US" sz="1200" dirty="0"/>
+          </a:p>
+        </p:txBody>
+      </p:sp>
+      <p:pic>
+        <p:nvPicPr>
+          <p:cNvPr id="4" name="图片 3">
+            <a:extLst>
+              <a:ext uri="{FF2B5EF4-FFF2-40B4-BE49-F238E27FC236}">
+                <a16:creationId xmlns:a16="http://schemas.microsoft.com/office/drawing/2014/main" id="{3F83D96C-1DC8-3A2E-A4A0-87B38830D8C1}"/>
+              </a:ext>
+            </a:extLst>
+          </p:cNvPr>
+          <p:cNvPicPr>
+            <a:picLocks noChangeAspect="1"/>
+          </p:cNvPicPr>
+          <p:nvPr/>
+        </p:nvPicPr>
+        <p:blipFill>
+          <a:blip r:embed="rId5"/>
+          <a:stretch>
+            <a:fillRect/>
+          </a:stretch>
+        </p:blipFill>
+        <p:spPr>
+          <a:xfrm>
+            <a:off x="2427585" y="5082371"/>
+            <a:ext cx="6037842" cy="1409613"/>
+          </a:xfrm>
+          <a:prstGeom prst="rect">
+            <a:avLst/>
+          </a:prstGeom>
+        </p:spPr>
+      </p:pic>
     </p:spTree>
     <p:extLst>
       <p:ext uri="{BB962C8B-B14F-4D97-AF65-F5344CB8AC3E}">
-        <p14:creationId xmlns:p14="http://schemas.microsoft.com/office/powerpoint/2010/main" val="2498790264"/>
+        <p14:creationId xmlns:p14="http://schemas.microsoft.com/office/powerpoint/2010/main" val="2362706787"/>
       </p:ext>
     </p:extLst>
   </p:cSld>
@@ -8797,7 +10385,7 @@
           <a:lstStyle/>
           <a:p>
             <a:r>
-              <a:rPr lang="en-US" altLang="zh-CN" sz="3100" b="1" dirty="0">
+              <a:rPr lang="en-US" altLang="zh-CN" sz="3100" b="1" strike="sngStrike" dirty="0">
                 <a:solidFill>
                   <a:srgbClr val="002060"/>
                 </a:solidFill>
@@ -8806,7 +10394,19 @@
                 <a:cs typeface="Times New Roman" panose="02020603050405020304" charset="0"/>
                 <a:sym typeface="+mn-ea"/>
               </a:rPr>
-              <a:t>Resources and Experiment Platform</a:t>
+              <a:t>Improvements</a:t>
+            </a:r>
+            <a:r>
+              <a:rPr lang="en-US" altLang="zh-CN" sz="3100" b="1" dirty="0">
+                <a:solidFill>
+                  <a:srgbClr val="002060"/>
+                </a:solidFill>
+                <a:latin typeface="Times New Roman" panose="02020603050405020304" charset="0"/>
+                <a:ea typeface="微软雅黑" panose="020B0503020204020204" pitchFamily="34" charset="-122"/>
+                <a:cs typeface="Times New Roman" panose="02020603050405020304" charset="0"/>
+                <a:sym typeface="+mn-ea"/>
+              </a:rPr>
+              <a:t> Enlighten</a:t>
             </a:r>
           </a:p>
         </p:txBody>
@@ -8884,52 +10484,16 @@
           </a:prstGeom>
         </p:spPr>
       </p:pic>
-      <p:pic>
-        <p:nvPicPr>
-          <p:cNvPr id="4" name="图片 3">
-            <a:extLst>
-              <a:ext uri="{FF2B5EF4-FFF2-40B4-BE49-F238E27FC236}">
-                <a16:creationId xmlns:a16="http://schemas.microsoft.com/office/drawing/2014/main" id="{74BA0674-6764-F9AF-416B-BA2D6CB95B4E}"/>
-              </a:ext>
-            </a:extLst>
-          </p:cNvPr>
-          <p:cNvPicPr>
-            <a:picLocks noChangeAspect="1"/>
-          </p:cNvPicPr>
-          <p:nvPr/>
-        </p:nvPicPr>
-        <p:blipFill>
-          <a:blip r:embed="rId3"/>
-          <a:stretch>
-            <a:fillRect/>
-          </a:stretch>
-        </p:blipFill>
-        <p:spPr>
-          <a:xfrm>
-            <a:off x="829059" y="2190810"/>
-            <a:ext cx="10533882" cy="3301289"/>
-          </a:xfrm>
-          <a:prstGeom prst="rect">
-            <a:avLst/>
-          </a:prstGeom>
-        </p:spPr>
-      </p:pic>
-      <p:sp>
-        <p:nvSpPr>
-          <p:cNvPr id="8" name="文本框 7">
-            <a:extLst>
-              <a:ext uri="{FF2B5EF4-FFF2-40B4-BE49-F238E27FC236}">
-                <a16:creationId xmlns:a16="http://schemas.microsoft.com/office/drawing/2014/main" id="{B560E9D0-BD97-153D-5D84-57CE87E6F269}"/>
-              </a:ext>
-            </a:extLst>
-          </p:cNvPr>
+      <p:sp>
+        <p:nvSpPr>
+          <p:cNvPr id="5" name="文本框 4"/>
           <p:cNvSpPr txBox="1"/>
           <p:nvPr/>
         </p:nvSpPr>
         <p:spPr>
           <a:xfrm>
-            <a:off x="1006765" y="1471872"/>
-            <a:ext cx="6114472" cy="461665"/>
+            <a:off x="1627173" y="1826041"/>
+            <a:ext cx="9308681" cy="4154984"/>
           </a:xfrm>
           <a:prstGeom prst="rect">
             <a:avLst/>
@@ -8937,31 +10501,146 @@
           <a:noFill/>
         </p:spPr>
         <p:txBody>
-          <a:bodyPr wrap="square">
+          <a:bodyPr wrap="square" rtlCol="0">
             <a:spAutoFit/>
           </a:bodyPr>
           <a:lstStyle/>
           <a:p>
             <a:r>
-              <a:rPr lang="en-US" altLang="zh-CN" sz="2400" b="1" dirty="0"/>
-              <a:t>S</a:t>
-            </a:r>
-            <a:r>
-              <a:rPr lang="zh-CN" altLang="en-US" sz="2400" b="1" dirty="0"/>
-              <a:t>erver </a:t>
-            </a:r>
-            <a:r>
-              <a:rPr lang="en-US" altLang="zh-CN" sz="2400" b="1" dirty="0"/>
-              <a:t>provided by ML course</a:t>
-            </a:r>
-            <a:endParaRPr lang="zh-CN" altLang="en-US" sz="2400" b="1" dirty="0"/>
+              <a:rPr lang="en-US" altLang="zh-CN" sz="2400" b="1" u="sng" dirty="0">
+                <a:solidFill>
+                  <a:srgbClr val="002060"/>
+                </a:solidFill>
+                <a:latin typeface="微软雅黑" panose="020B0503020204020204" pitchFamily="34" charset="-122"/>
+                <a:ea typeface="微软雅黑" panose="020B0503020204020204" pitchFamily="34" charset="-122"/>
+                <a:cs typeface="微软雅黑" panose="020B0503020204020204" pitchFamily="34" charset="-122"/>
+                <a:sym typeface="+mn-ea"/>
+              </a:rPr>
+              <a:t>Some insights from U-Net paper</a:t>
+            </a:r>
+          </a:p>
+          <a:p>
+            <a:endParaRPr lang="en-US" altLang="zh-CN" sz="2400" b="1" u="sng" dirty="0">
+              <a:solidFill>
+                <a:srgbClr val="002060"/>
+              </a:solidFill>
+              <a:latin typeface="微软雅黑" panose="020B0503020204020204" pitchFamily="34" charset="-122"/>
+              <a:ea typeface="微软雅黑" panose="020B0503020204020204" pitchFamily="34" charset="-122"/>
+              <a:cs typeface="微软雅黑" panose="020B0503020204020204" pitchFamily="34" charset="-122"/>
+              <a:sym typeface="+mn-ea"/>
+            </a:endParaRPr>
+          </a:p>
+          <a:p>
+            <a:endParaRPr lang="en-US" altLang="zh-CN" sz="2400" b="1" u="sng" dirty="0">
+              <a:solidFill>
+                <a:srgbClr val="002060"/>
+              </a:solidFill>
+              <a:latin typeface="微软雅黑" panose="020B0503020204020204" pitchFamily="34" charset="-122"/>
+              <a:ea typeface="微软雅黑" panose="020B0503020204020204" pitchFamily="34" charset="-122"/>
+              <a:cs typeface="微软雅黑" panose="020B0503020204020204" pitchFamily="34" charset="-122"/>
+              <a:sym typeface="+mn-ea"/>
+            </a:endParaRPr>
+          </a:p>
+          <a:p>
+            <a:pPr marL="285750" indent="-285750">
+              <a:buFont typeface="Arial" panose="020B0604020202020204" pitchFamily="34" charset="0"/>
+              <a:buChar char="•"/>
+            </a:pPr>
+            <a:r>
+              <a:rPr lang="en-US" altLang="zh-CN" sz="2400" dirty="0">
+                <a:latin typeface="微软雅黑" panose="020B0503020204020204" pitchFamily="34" charset="-122"/>
+                <a:ea typeface="微软雅黑" panose="020B0503020204020204" pitchFamily="34" charset="-122"/>
+                <a:cs typeface="微软雅黑" panose="020B0503020204020204" pitchFamily="34" charset="-122"/>
+              </a:rPr>
+              <a:t>Architecture: It seems difficult to change?</a:t>
+            </a:r>
+          </a:p>
+          <a:p>
+            <a:pPr marL="285750" indent="-285750">
+              <a:buFont typeface="Arial" panose="020B0604020202020204" pitchFamily="34" charset="0"/>
+              <a:buChar char="•"/>
+            </a:pPr>
+            <a:endParaRPr lang="en-US" altLang="zh-CN" sz="2400" dirty="0">
+              <a:latin typeface="微软雅黑" panose="020B0503020204020204" pitchFamily="34" charset="-122"/>
+              <a:ea typeface="微软雅黑" panose="020B0503020204020204" pitchFamily="34" charset="-122"/>
+              <a:cs typeface="微软雅黑" panose="020B0503020204020204" pitchFamily="34" charset="-122"/>
+            </a:endParaRPr>
+          </a:p>
+          <a:p>
+            <a:pPr marL="285750" indent="-285750">
+              <a:buFont typeface="Arial" panose="020B0604020202020204" pitchFamily="34" charset="0"/>
+              <a:buChar char="•"/>
+            </a:pPr>
+            <a:r>
+              <a:rPr lang="en-US" altLang="zh-CN" sz="2400" dirty="0">
+                <a:latin typeface="微软雅黑" panose="020B0503020204020204" pitchFamily="34" charset="-122"/>
+                <a:ea typeface="微软雅黑" panose="020B0503020204020204" pitchFamily="34" charset="-122"/>
+                <a:cs typeface="微软雅黑" panose="020B0503020204020204" pitchFamily="34" charset="-122"/>
+              </a:rPr>
+              <a:t>Optimizer: calculation resource ------ trade off</a:t>
+            </a:r>
+          </a:p>
+          <a:p>
+            <a:pPr marL="285750" indent="-285750">
+              <a:buFont typeface="Arial" panose="020B0604020202020204" pitchFamily="34" charset="0"/>
+              <a:buChar char="•"/>
+            </a:pPr>
+            <a:endParaRPr lang="en-US" altLang="zh-CN" sz="2400" dirty="0">
+              <a:latin typeface="微软雅黑" panose="020B0503020204020204" pitchFamily="34" charset="-122"/>
+              <a:ea typeface="微软雅黑" panose="020B0503020204020204" pitchFamily="34" charset="-122"/>
+              <a:cs typeface="微软雅黑" panose="020B0503020204020204" pitchFamily="34" charset="-122"/>
+            </a:endParaRPr>
+          </a:p>
+          <a:p>
+            <a:pPr marL="285750" indent="-285750">
+              <a:buFont typeface="Arial" panose="020B0604020202020204" pitchFamily="34" charset="0"/>
+              <a:buChar char="•"/>
+            </a:pPr>
+            <a:r>
+              <a:rPr lang="en-US" altLang="zh-CN" sz="2400" dirty="0">
+                <a:latin typeface="微软雅黑" panose="020B0503020204020204" pitchFamily="34" charset="-122"/>
+                <a:ea typeface="微软雅黑" panose="020B0503020204020204" pitchFamily="34" charset="-122"/>
+                <a:cs typeface="微软雅黑" panose="020B0503020204020204" pitchFamily="34" charset="-122"/>
+              </a:rPr>
+              <a:t>Loss Function: How to recognize “border”?</a:t>
+            </a:r>
+          </a:p>
+          <a:p>
+            <a:pPr marL="285750" indent="-285750">
+              <a:buFont typeface="Arial" panose="020B0604020202020204" pitchFamily="34" charset="0"/>
+              <a:buChar char="•"/>
+            </a:pPr>
+            <a:endParaRPr lang="en-US" altLang="zh-CN" sz="2400" dirty="0">
+              <a:latin typeface="微软雅黑" panose="020B0503020204020204" pitchFamily="34" charset="-122"/>
+              <a:ea typeface="微软雅黑" panose="020B0503020204020204" pitchFamily="34" charset="-122"/>
+              <a:cs typeface="微软雅黑" panose="020B0503020204020204" pitchFamily="34" charset="-122"/>
+            </a:endParaRPr>
+          </a:p>
+          <a:p>
+            <a:pPr marL="285750" indent="-285750">
+              <a:buFont typeface="Arial" panose="020B0604020202020204" pitchFamily="34" charset="0"/>
+              <a:buChar char="•"/>
+            </a:pPr>
+            <a:r>
+              <a:rPr lang="en-US" altLang="zh-CN" sz="2400" dirty="0">
+                <a:latin typeface="微软雅黑" panose="020B0503020204020204" pitchFamily="34" charset="-122"/>
+                <a:ea typeface="微软雅黑" panose="020B0503020204020204" pitchFamily="34" charset="-122"/>
+                <a:cs typeface="微软雅黑" panose="020B0503020204020204" pitchFamily="34" charset="-122"/>
+              </a:rPr>
+              <a:t>Data Preprocessing: How to Augment data to improve the Robustness of model?</a:t>
+            </a:r>
+            <a:endParaRPr lang="zh-CN" altLang="en-US" sz="2400" dirty="0">
+              <a:latin typeface="微软雅黑" panose="020B0503020204020204" pitchFamily="34" charset="-122"/>
+              <a:ea typeface="微软雅黑" panose="020B0503020204020204" pitchFamily="34" charset="-122"/>
+              <a:cs typeface="微软雅黑" panose="020B0503020204020204" pitchFamily="34" charset="-122"/>
+            </a:endParaRPr>
           </a:p>
         </p:txBody>
       </p:sp>
     </p:spTree>
     <p:extLst>
       <p:ext uri="{BB962C8B-B14F-4D97-AF65-F5344CB8AC3E}">
-        <p14:creationId xmlns:p14="http://schemas.microsoft.com/office/powerpoint/2010/main" val="2267199000"/>
+        <p14:creationId xmlns:p14="http://schemas.microsoft.com/office/powerpoint/2010/main" val="1189555699"/>
       </p:ext>
     </p:extLst>
   </p:cSld>

</xml_diff>